<commit_message>
redid the bg section
</commit_message>
<xml_diff>
--- a/poster.pptx
+++ b/poster.pptx
@@ -3489,8 +3489,513 @@
                 </a:solidFill>
                 <a:latin typeface="+mj-lt"/>
               </a:rPr>
-              <a:t>Results</a:t>
-            </a:r>
+              <a:t>SIM is more efficient than CM</a:t>
+            </a:r>
+            <a:endParaRPr lang="en-US" sz="4400" b="1" kern="0" dirty="0" smtClean="0">
+              <a:solidFill>
+                <a:schemeClr val="accent2"/>
+              </a:solidFill>
+              <a:latin typeface="+mj-lt"/>
+            </a:endParaRPr>
+          </a:p>
+          <a:p>
+            <a:pPr algn="just" defTabSz="908920" rtl="0" eaLnBrk="1" hangingPunct="1">
+              <a:spcBef>
+                <a:spcPct val="50000"/>
+              </a:spcBef>
+              <a:tabLst>
+                <a:tab pos="497067" algn="l"/>
+              </a:tabLst>
+              <a:defRPr/>
+            </a:pPr>
+            <a:r>
+              <a:rPr lang="en-US" b="1" kern="0" dirty="0" smtClean="0">
+                <a:solidFill>
+                  <a:srgbClr val="C0504D"/>
+                </a:solidFill>
+                <a:latin typeface="Calibri"/>
+                <a:ea typeface="+mn-ea"/>
+              </a:rPr>
+              <a:t>Adaptability</a:t>
+            </a:r>
+            <a:endParaRPr lang="en-US" kern="0" dirty="0" smtClean="0">
+              <a:solidFill>
+                <a:srgbClr val="000000"/>
+              </a:solidFill>
+              <a:latin typeface="Calibri"/>
+              <a:ea typeface="+mn-ea"/>
+            </a:endParaRPr>
+          </a:p>
+          <a:p>
+            <a:pPr marL="457200" indent="-457200" algn="just" defTabSz="908920" rtl="0" eaLnBrk="1" hangingPunct="1">
+              <a:spcBef>
+                <a:spcPct val="50000"/>
+              </a:spcBef>
+              <a:buFont typeface="Arial" pitchFamily="34" charset="0"/>
+              <a:buChar char="•"/>
+              <a:tabLst>
+                <a:tab pos="497067" algn="l"/>
+              </a:tabLst>
+              <a:defRPr/>
+            </a:pPr>
+            <a:r>
+              <a:rPr lang="en-US" sz="2800" kern="0" dirty="0" smtClean="0">
+                <a:solidFill>
+                  <a:srgbClr val="000000"/>
+                </a:solidFill>
+                <a:latin typeface="Calibri"/>
+                <a:ea typeface="+mn-ea"/>
+              </a:rPr>
+              <a:t>Constitutive mutagenesis (CM) </a:t>
+            </a:r>
+            <a:r>
+              <a:rPr lang="en-US" sz="2800" kern="0" dirty="0">
+                <a:solidFill>
+                  <a:srgbClr val="000000"/>
+                </a:solidFill>
+                <a:latin typeface="Calibri"/>
+              </a:rPr>
+              <a:t>increases the rate of complex adaptation </a:t>
+            </a:r>
+            <a:r>
+              <a:rPr lang="el-GR" sz="2800" i="1" kern="0" dirty="0" smtClean="0">
+                <a:solidFill>
+                  <a:srgbClr val="000000"/>
+                </a:solidFill>
+                <a:latin typeface="Calibri"/>
+              </a:rPr>
+              <a:t>τ</a:t>
+            </a:r>
+            <a:r>
+              <a:rPr lang="en-US" sz="2800" kern="0" baseline="30000" dirty="0" smtClean="0">
+                <a:solidFill>
+                  <a:srgbClr val="000000"/>
+                </a:solidFill>
+                <a:latin typeface="Calibri"/>
+              </a:rPr>
+              <a:t>2</a:t>
+            </a:r>
+            <a:r>
+              <a:rPr lang="en-US" sz="2800" kern="0" dirty="0" smtClean="0">
+                <a:solidFill>
+                  <a:srgbClr val="000000"/>
+                </a:solidFill>
+                <a:latin typeface="Calibri"/>
+              </a:rPr>
+              <a:t>-fold.</a:t>
+            </a:r>
+            <a:endParaRPr lang="en-US" sz="2800" kern="0" dirty="0" smtClean="0">
+              <a:solidFill>
+                <a:srgbClr val="000000"/>
+              </a:solidFill>
+              <a:latin typeface="Calibri"/>
+              <a:ea typeface="+mn-ea"/>
+            </a:endParaRPr>
+          </a:p>
+          <a:p>
+            <a:pPr marL="457200" indent="-457200" algn="just" defTabSz="908920" rtl="0" eaLnBrk="1" hangingPunct="1">
+              <a:spcBef>
+                <a:spcPct val="50000"/>
+              </a:spcBef>
+              <a:buFont typeface="Arial" pitchFamily="34" charset="0"/>
+              <a:buChar char="•"/>
+              <a:tabLst>
+                <a:tab pos="497067" algn="l"/>
+              </a:tabLst>
+              <a:defRPr/>
+            </a:pPr>
+            <a:r>
+              <a:rPr lang="en-US" sz="2800" kern="0" dirty="0" smtClean="0">
+                <a:solidFill>
+                  <a:srgbClr val="000000"/>
+                </a:solidFill>
+                <a:latin typeface="Calibri"/>
+                <a:ea typeface="+mn-ea"/>
+              </a:rPr>
+              <a:t>Stress-induced mutagenesis (SIM) increases the rate of complex adaptation </a:t>
+            </a:r>
+            <a:r>
+              <a:rPr lang="el-GR" sz="2800" i="1" kern="0" dirty="0" smtClean="0">
+                <a:solidFill>
+                  <a:srgbClr val="000000"/>
+                </a:solidFill>
+                <a:latin typeface="Calibri"/>
+              </a:rPr>
+              <a:t>τ</a:t>
+            </a:r>
+            <a:r>
+              <a:rPr lang="en-US" sz="2800" kern="0" dirty="0" smtClean="0">
+                <a:solidFill>
+                  <a:srgbClr val="000000"/>
+                </a:solidFill>
+                <a:latin typeface="Calibri"/>
+              </a:rPr>
+              <a:t>-fold.</a:t>
+            </a:r>
+          </a:p>
+          <a:p>
+            <a:pPr lvl="0" algn="just" defTabSz="908920" rtl="0" eaLnBrk="1" hangingPunct="1">
+              <a:spcBef>
+                <a:spcPct val="50000"/>
+              </a:spcBef>
+              <a:tabLst>
+                <a:tab pos="497067" algn="l"/>
+              </a:tabLst>
+              <a:defRPr/>
+            </a:pPr>
+            <a:r>
+              <a:rPr lang="en-US" b="1" kern="0" dirty="0" smtClean="0">
+                <a:solidFill>
+                  <a:srgbClr val="C0504D"/>
+                </a:solidFill>
+                <a:latin typeface="Calibri"/>
+                <a:ea typeface="+mn-ea"/>
+              </a:rPr>
+              <a:t>Adaptedness</a:t>
+            </a:r>
+            <a:endParaRPr lang="en-US" kern="0" dirty="0">
+              <a:solidFill>
+                <a:srgbClr val="000000"/>
+              </a:solidFill>
+              <a:latin typeface="Calibri"/>
+              <a:ea typeface="+mn-ea"/>
+            </a:endParaRPr>
+          </a:p>
+          <a:p>
+            <a:pPr marL="457200" indent="-457200" algn="just" defTabSz="908920" rtl="0" eaLnBrk="1" hangingPunct="1">
+              <a:spcBef>
+                <a:spcPct val="50000"/>
+              </a:spcBef>
+              <a:buFont typeface="Arial" pitchFamily="34" charset="0"/>
+              <a:buChar char="•"/>
+              <a:tabLst>
+                <a:tab pos="497067" algn="l"/>
+              </a:tabLst>
+              <a:defRPr/>
+            </a:pPr>
+            <a:r>
+              <a:rPr lang="en-US" sz="2800" kern="0" dirty="0" smtClean="0">
+                <a:solidFill>
+                  <a:srgbClr val="000000"/>
+                </a:solidFill>
+                <a:latin typeface="Calibri"/>
+                <a:ea typeface="+mn-ea"/>
+              </a:rPr>
+              <a:t>CM decreases the population mean fitness </a:t>
+            </a:r>
+            <a:r>
+              <a:rPr lang="en-US" sz="2800" i="1" kern="0" dirty="0" smtClean="0">
+                <a:solidFill>
+                  <a:srgbClr val="000000"/>
+                </a:solidFill>
+                <a:latin typeface="Calibri"/>
+                <a:ea typeface="+mn-ea"/>
+              </a:rPr>
+              <a:t>e</a:t>
+            </a:r>
+            <a:r>
+              <a:rPr lang="en-US" sz="2800" i="1" kern="0" baseline="30000" dirty="0" smtClean="0">
+                <a:solidFill>
+                  <a:srgbClr val="000000"/>
+                </a:solidFill>
+                <a:latin typeface="Calibri"/>
+                <a:ea typeface="+mn-ea"/>
+              </a:rPr>
+              <a:t>-U(</a:t>
+            </a:r>
+            <a:r>
+              <a:rPr lang="el-GR" sz="2800" i="1" kern="0" baseline="30000" dirty="0" smtClean="0">
+                <a:solidFill>
+                  <a:srgbClr val="000000"/>
+                </a:solidFill>
+                <a:latin typeface="Calibri"/>
+              </a:rPr>
+              <a:t>τ</a:t>
+            </a:r>
+            <a:r>
+              <a:rPr lang="en-US" sz="2800" i="1" kern="0" baseline="30000" dirty="0" smtClean="0">
+                <a:solidFill>
+                  <a:srgbClr val="000000"/>
+                </a:solidFill>
+                <a:latin typeface="Calibri"/>
+              </a:rPr>
+              <a:t>-1)</a:t>
+            </a:r>
+            <a:r>
+              <a:rPr lang="en-US" sz="2800" kern="0" dirty="0" smtClean="0">
+                <a:solidFill>
+                  <a:srgbClr val="000000"/>
+                </a:solidFill>
+                <a:latin typeface="Calibri"/>
+              </a:rPr>
+              <a:t>-fold due to </a:t>
+            </a:r>
+            <a:r>
+              <a:rPr lang="en-US" sz="2800" kern="0" dirty="0">
+                <a:solidFill>
+                  <a:srgbClr val="000000"/>
+                </a:solidFill>
+                <a:latin typeface="Calibri"/>
+              </a:rPr>
+              <a:t>due to accumulation of deleterious </a:t>
+            </a:r>
+            <a:r>
+              <a:rPr lang="en-US" sz="2800" kern="0" dirty="0" smtClean="0">
+                <a:solidFill>
+                  <a:srgbClr val="000000"/>
+                </a:solidFill>
+                <a:latin typeface="Calibri"/>
+              </a:rPr>
+              <a:t>mutations [REF].</a:t>
+            </a:r>
+          </a:p>
+          <a:p>
+            <a:pPr marL="457200" indent="-457200" algn="just" defTabSz="908920" rtl="0" eaLnBrk="1" hangingPunct="1">
+              <a:spcBef>
+                <a:spcPct val="50000"/>
+              </a:spcBef>
+              <a:buFont typeface="Arial" pitchFamily="34" charset="0"/>
+              <a:buChar char="•"/>
+              <a:tabLst>
+                <a:tab pos="497067" algn="l"/>
+              </a:tabLst>
+              <a:defRPr/>
+            </a:pPr>
+            <a:r>
+              <a:rPr lang="en-US" sz="2800" kern="0" dirty="0" smtClean="0">
+                <a:solidFill>
+                  <a:srgbClr val="000000"/>
+                </a:solidFill>
+                <a:latin typeface="Calibri"/>
+                <a:ea typeface="+mn-ea"/>
+              </a:rPr>
+              <a:t>SIM slightly increases the population mean fitness (4).</a:t>
+            </a:r>
+          </a:p>
+          <a:p>
+            <a:pPr algn="just" defTabSz="908920" rtl="0" eaLnBrk="1" hangingPunct="1">
+              <a:spcBef>
+                <a:spcPct val="50000"/>
+              </a:spcBef>
+              <a:tabLst>
+                <a:tab pos="497067" algn="l"/>
+              </a:tabLst>
+              <a:defRPr/>
+            </a:pPr>
+            <a:r>
+              <a:rPr lang="en-US" b="1" kern="0" dirty="0" smtClean="0">
+                <a:solidFill>
+                  <a:srgbClr val="C0504D"/>
+                </a:solidFill>
+                <a:latin typeface="Calibri"/>
+                <a:ea typeface="+mn-ea"/>
+              </a:rPr>
+              <a:t>SIM breaks the adaptability-adaptedness trade-off</a:t>
+            </a:r>
+          </a:p>
+          <a:p>
+            <a:pPr algn="just" defTabSz="908920" rtl="0" eaLnBrk="1" hangingPunct="1">
+              <a:spcBef>
+                <a:spcPct val="50000"/>
+              </a:spcBef>
+              <a:tabLst>
+                <a:tab pos="497067" algn="l"/>
+              </a:tabLst>
+              <a:defRPr/>
+            </a:pPr>
+            <a:r>
+              <a:rPr lang="en-US" sz="2800" kern="0" dirty="0">
+                <a:solidFill>
+                  <a:srgbClr val="000000"/>
+                </a:solidFill>
+                <a:latin typeface="Calibri"/>
+                <a:ea typeface="+mn-ea"/>
+              </a:rPr>
+              <a:t>SIM is </a:t>
+            </a:r>
+            <a:r>
+              <a:rPr lang="en-US" sz="2800" kern="0" dirty="0" smtClean="0">
+                <a:solidFill>
+                  <a:srgbClr val="000000"/>
+                </a:solidFill>
+                <a:latin typeface="Calibri"/>
+                <a:ea typeface="+mn-ea"/>
+              </a:rPr>
+              <a:t>a Pareto improvement over CM – it can achieve the same adaptation rate (by increasing </a:t>
+            </a:r>
+            <a:r>
+              <a:rPr lang="el-GR" sz="2800" i="1" kern="0" dirty="0" smtClean="0">
+                <a:solidFill>
+                  <a:srgbClr val="000000"/>
+                </a:solidFill>
+                <a:latin typeface="Calibri"/>
+              </a:rPr>
+              <a:t>τ</a:t>
+            </a:r>
+            <a:r>
+              <a:rPr lang="en-US" sz="2800" kern="0" dirty="0" smtClean="0">
+                <a:solidFill>
+                  <a:srgbClr val="000000"/>
+                </a:solidFill>
+                <a:latin typeface="Calibri"/>
+              </a:rPr>
+              <a:t>), without reducing the fitness of the population. </a:t>
+            </a:r>
+          </a:p>
+          <a:p>
+            <a:pPr algn="just" defTabSz="908920" rtl="0" eaLnBrk="1" hangingPunct="1">
+              <a:spcBef>
+                <a:spcPct val="50000"/>
+              </a:spcBef>
+              <a:tabLst>
+                <a:tab pos="497067" algn="l"/>
+              </a:tabLst>
+              <a:defRPr/>
+            </a:pPr>
+            <a:r>
+              <a:rPr lang="en-US" sz="2800" kern="0" dirty="0" smtClean="0">
+                <a:solidFill>
+                  <a:srgbClr val="000000"/>
+                </a:solidFill>
+                <a:latin typeface="Calibri"/>
+                <a:ea typeface="+mn-ea"/>
+              </a:rPr>
+              <a:t>If </a:t>
+            </a:r>
+            <a:r>
+              <a:rPr lang="el-GR" sz="2800" i="1" kern="0" dirty="0" smtClean="0">
+                <a:solidFill>
+                  <a:srgbClr val="000000"/>
+                </a:solidFill>
+                <a:latin typeface="Calibri"/>
+              </a:rPr>
+              <a:t>τ</a:t>
+            </a:r>
+            <a:r>
+              <a:rPr lang="en-US" sz="2800" i="1" kern="0" baseline="30000" dirty="0" smtClean="0">
+                <a:solidFill>
+                  <a:srgbClr val="000000"/>
+                </a:solidFill>
+                <a:latin typeface="Calibri"/>
+              </a:rPr>
+              <a:t>2</a:t>
+            </a:r>
+            <a:r>
+              <a:rPr lang="en-US" sz="2800" kern="0" dirty="0">
+                <a:solidFill>
+                  <a:srgbClr val="000000"/>
+                </a:solidFill>
+                <a:latin typeface="Calibri"/>
+              </a:rPr>
+              <a:t> </a:t>
+            </a:r>
+            <a:r>
+              <a:rPr lang="en-US" sz="2800" kern="0" dirty="0" smtClean="0">
+                <a:solidFill>
+                  <a:srgbClr val="000000"/>
+                </a:solidFill>
+                <a:latin typeface="Calibri"/>
+              </a:rPr>
+              <a:t>is to high, a mixed strategy, in which all individuals increase their mutation rate </a:t>
+            </a:r>
+            <a:r>
+              <a:rPr lang="el-GR" sz="2800" i="1" kern="0" dirty="0" smtClean="0">
+                <a:solidFill>
+                  <a:srgbClr val="000000"/>
+                </a:solidFill>
+                <a:latin typeface="Calibri"/>
+              </a:rPr>
+              <a:t>τ</a:t>
+            </a:r>
+            <a:r>
+              <a:rPr lang="en-US" sz="2800" i="1" kern="0" baseline="-25000" dirty="0" smtClean="0">
+                <a:solidFill>
+                  <a:srgbClr val="000000"/>
+                </a:solidFill>
+                <a:latin typeface="Calibri"/>
+              </a:rPr>
+              <a:t>CM</a:t>
+            </a:r>
+            <a:r>
+              <a:rPr lang="en-US" sz="2800" kern="0" dirty="0" smtClean="0">
+                <a:solidFill>
+                  <a:srgbClr val="000000"/>
+                </a:solidFill>
+                <a:latin typeface="Calibri"/>
+              </a:rPr>
+              <a:t>-fold and stressed individuals increase their mutation rate </a:t>
+            </a:r>
+            <a:r>
+              <a:rPr lang="el-GR" sz="2800" i="1" kern="0" dirty="0" smtClean="0">
+                <a:solidFill>
+                  <a:srgbClr val="000000"/>
+                </a:solidFill>
+                <a:latin typeface="Calibri"/>
+              </a:rPr>
+              <a:t>τ</a:t>
+            </a:r>
+            <a:r>
+              <a:rPr lang="en-US" sz="2800" i="1" kern="0" baseline="-25000" dirty="0" smtClean="0">
+                <a:solidFill>
+                  <a:srgbClr val="000000"/>
+                </a:solidFill>
+                <a:latin typeface="Calibri"/>
+              </a:rPr>
+              <a:t>SIM</a:t>
+            </a:r>
+            <a:r>
+              <a:rPr lang="en-US" sz="2800" kern="0" dirty="0" smtClean="0">
+                <a:solidFill>
+                  <a:srgbClr val="000000"/>
+                </a:solidFill>
+                <a:latin typeface="Calibri"/>
+              </a:rPr>
+              <a:t>-fold, is still more efficient than CM.</a:t>
+            </a:r>
+            <a:endParaRPr lang="en-US" sz="2800" kern="0" dirty="0">
+              <a:solidFill>
+                <a:srgbClr val="000000"/>
+              </a:solidFill>
+              <a:latin typeface="Calibri"/>
+              <a:ea typeface="+mn-ea"/>
+            </a:endParaRPr>
+          </a:p>
+          <a:p>
+            <a:pPr algn="just" defTabSz="908920" rtl="0" eaLnBrk="1" hangingPunct="1">
+              <a:spcBef>
+                <a:spcPct val="50000"/>
+              </a:spcBef>
+              <a:tabLst>
+                <a:tab pos="497067" algn="l"/>
+              </a:tabLst>
+              <a:defRPr/>
+            </a:pPr>
+            <a:endParaRPr lang="en-US" kern="0" dirty="0" smtClean="0">
+              <a:solidFill>
+                <a:srgbClr val="000000"/>
+              </a:solidFill>
+              <a:latin typeface="Calibri"/>
+              <a:ea typeface="+mn-ea"/>
+            </a:endParaRPr>
+          </a:p>
+          <a:p>
+            <a:pPr marL="457200" indent="-457200" algn="just" defTabSz="908920" rtl="0" eaLnBrk="1" hangingPunct="1">
+              <a:spcBef>
+                <a:spcPct val="50000"/>
+              </a:spcBef>
+              <a:buFont typeface="Arial" pitchFamily="34" charset="0"/>
+              <a:buChar char="•"/>
+              <a:tabLst>
+                <a:tab pos="497067" algn="l"/>
+              </a:tabLst>
+              <a:defRPr/>
+            </a:pPr>
+            <a:endParaRPr lang="en-US" sz="4400" b="1" kern="0" dirty="0">
+              <a:solidFill>
+                <a:schemeClr val="accent2"/>
+              </a:solidFill>
+              <a:latin typeface="+mj-lt"/>
+            </a:endParaRPr>
           </a:p>
           <a:p>
             <a:pPr indent="205704" algn="just" defTabSz="908920" rtl="0" eaLnBrk="1" hangingPunct="1">
@@ -3502,47 +4007,11 @@
               </a:tabLst>
               <a:defRPr/>
             </a:pPr>
-            <a:r>
-              <a:rPr lang="en-US" b="1" kern="0" dirty="0">
-                <a:solidFill>
-                  <a:schemeClr val="accent2"/>
-                </a:solidFill>
-                <a:latin typeface="+mj-lt"/>
-              </a:rPr>
-              <a:t>SIM </a:t>
-            </a:r>
-            <a:r>
-              <a:rPr lang="en-US" b="1" kern="0" dirty="0" smtClean="0">
-                <a:solidFill>
-                  <a:schemeClr val="accent2"/>
-                </a:solidFill>
-                <a:latin typeface="+mj-lt"/>
-              </a:rPr>
-              <a:t>increases the adaptation </a:t>
-            </a:r>
-            <a:r>
-              <a:rPr lang="en-US" b="1" kern="0" dirty="0">
-                <a:solidFill>
-                  <a:schemeClr val="accent2"/>
-                </a:solidFill>
-                <a:latin typeface="+mj-lt"/>
-              </a:rPr>
-              <a:t>rate </a:t>
-            </a:r>
-            <a:r>
-              <a:rPr lang="en-US" sz="2800" kern="0" dirty="0" smtClean="0">
-                <a:solidFill>
-                  <a:srgbClr val="000000"/>
-                </a:solidFill>
-                <a:latin typeface="+mn-lt"/>
-              </a:rPr>
-              <a:t>in a rugged fitness landscape. Solid lines are analytic approximations, are results of simulations:</a:t>
-            </a:r>
-            <a:endParaRPr lang="en-US" sz="2800" kern="0" dirty="0">
-              <a:solidFill>
-                <a:srgbClr val="000000"/>
-              </a:solidFill>
-              <a:latin typeface="+mn-lt"/>
+            <a:endParaRPr lang="en-US" sz="4400" b="1" kern="0" dirty="0" smtClean="0">
+              <a:solidFill>
+                <a:schemeClr val="accent2"/>
+              </a:solidFill>
+              <a:latin typeface="+mj-lt"/>
             </a:endParaRPr>
           </a:p>
           <a:p>
@@ -3555,6 +4024,23 @@
               </a:tabLst>
               <a:defRPr/>
             </a:pPr>
+            <a:endParaRPr lang="en-US" sz="4400" b="1" kern="0" dirty="0">
+              <a:solidFill>
+                <a:schemeClr val="accent2"/>
+              </a:solidFill>
+              <a:latin typeface="+mj-lt"/>
+            </a:endParaRPr>
+          </a:p>
+          <a:p>
+            <a:pPr indent="205704" algn="just" defTabSz="908920" rtl="0" eaLnBrk="1" hangingPunct="1">
+              <a:spcBef>
+                <a:spcPct val="50000"/>
+              </a:spcBef>
+              <a:tabLst>
+                <a:tab pos="497067" algn="l"/>
+              </a:tabLst>
+              <a:defRPr/>
+            </a:pPr>
             <a:endParaRPr lang="en-US" sz="4400" b="1" kern="0" dirty="0" smtClean="0">
               <a:solidFill>
                 <a:schemeClr val="accent2"/>
@@ -3572,6 +4058,23 @@
               </a:tabLst>
               <a:defRPr/>
             </a:pPr>
+            <a:endParaRPr lang="en-US" sz="4400" b="1" kern="0" dirty="0" smtClean="0">
+              <a:solidFill>
+                <a:schemeClr val="accent2"/>
+              </a:solidFill>
+              <a:latin typeface="+mj-lt"/>
+            </a:endParaRPr>
+          </a:p>
+          <a:p>
+            <a:pPr indent="205704" algn="just" defTabSz="908920" rtl="0" eaLnBrk="1" hangingPunct="1">
+              <a:spcBef>
+                <a:spcPct val="50000"/>
+              </a:spcBef>
+              <a:tabLst>
+                <a:tab pos="497067" algn="l"/>
+              </a:tabLst>
+              <a:defRPr/>
+            </a:pPr>
             <a:endParaRPr lang="en-US" sz="4400" b="1" kern="0" dirty="0">
               <a:solidFill>
                 <a:schemeClr val="accent2"/>
@@ -3589,7 +4092,7 @@
               </a:tabLst>
               <a:defRPr/>
             </a:pPr>
-            <a:endParaRPr lang="en-US" sz="4400" b="1" kern="0" dirty="0" smtClean="0">
+            <a:endParaRPr lang="en-US" b="1" kern="0" dirty="0" smtClean="0">
               <a:solidFill>
                 <a:schemeClr val="accent2"/>
               </a:solidFill>
@@ -3606,126 +4109,12 @@
               </a:tabLst>
               <a:defRPr/>
             </a:pPr>
-            <a:endParaRPr lang="en-US" sz="4400" b="1" kern="0" dirty="0">
+            <a:endParaRPr lang="en-US" b="1" kern="0" dirty="0" smtClean="0">
               <a:solidFill>
                 <a:schemeClr val="accent2"/>
               </a:solidFill>
               <a:latin typeface="+mj-lt"/>
             </a:endParaRPr>
-          </a:p>
-          <a:p>
-            <a:pPr indent="205704" algn="just" defTabSz="908920" rtl="0" eaLnBrk="1" hangingPunct="1">
-              <a:spcBef>
-                <a:spcPct val="50000"/>
-              </a:spcBef>
-              <a:tabLst>
-                <a:tab pos="497067" algn="l"/>
-              </a:tabLst>
-              <a:defRPr/>
-            </a:pPr>
-            <a:endParaRPr lang="en-US" sz="4400" b="1" kern="0" dirty="0" smtClean="0">
-              <a:solidFill>
-                <a:schemeClr val="accent2"/>
-              </a:solidFill>
-              <a:latin typeface="+mj-lt"/>
-            </a:endParaRPr>
-          </a:p>
-          <a:p>
-            <a:pPr indent="205704" algn="just" defTabSz="908920" rtl="0" eaLnBrk="1" hangingPunct="1">
-              <a:spcBef>
-                <a:spcPct val="50000"/>
-              </a:spcBef>
-              <a:tabLst>
-                <a:tab pos="497067" algn="l"/>
-              </a:tabLst>
-              <a:defRPr/>
-            </a:pPr>
-            <a:endParaRPr lang="en-US" sz="4400" b="1" kern="0" dirty="0" smtClean="0">
-              <a:solidFill>
-                <a:schemeClr val="accent2"/>
-              </a:solidFill>
-              <a:latin typeface="+mj-lt"/>
-            </a:endParaRPr>
-          </a:p>
-          <a:p>
-            <a:pPr indent="205704" algn="just" defTabSz="908920" rtl="0" eaLnBrk="1" hangingPunct="1">
-              <a:spcBef>
-                <a:spcPct val="50000"/>
-              </a:spcBef>
-              <a:tabLst>
-                <a:tab pos="497067" algn="l"/>
-              </a:tabLst>
-              <a:defRPr/>
-            </a:pPr>
-            <a:endParaRPr lang="en-US" sz="4400" b="1" kern="0" dirty="0">
-              <a:solidFill>
-                <a:schemeClr val="accent2"/>
-              </a:solidFill>
-              <a:latin typeface="+mj-lt"/>
-            </a:endParaRPr>
-          </a:p>
-          <a:p>
-            <a:pPr indent="205704" algn="just" defTabSz="908920" rtl="0" eaLnBrk="1" hangingPunct="1">
-              <a:spcBef>
-                <a:spcPct val="50000"/>
-              </a:spcBef>
-              <a:tabLst>
-                <a:tab pos="497067" algn="l"/>
-              </a:tabLst>
-              <a:defRPr/>
-            </a:pPr>
-            <a:endParaRPr lang="en-US" b="1" kern="0" dirty="0" smtClean="0">
-              <a:solidFill>
-                <a:schemeClr val="accent2"/>
-              </a:solidFill>
-              <a:latin typeface="+mj-lt"/>
-            </a:endParaRPr>
-          </a:p>
-          <a:p>
-            <a:pPr indent="205704" algn="just" defTabSz="908920" rtl="0" eaLnBrk="1" hangingPunct="1">
-              <a:spcBef>
-                <a:spcPct val="50000"/>
-              </a:spcBef>
-              <a:tabLst>
-                <a:tab pos="497067" algn="l"/>
-              </a:tabLst>
-              <a:defRPr/>
-            </a:pPr>
-            <a:endParaRPr lang="en-US" b="1" kern="0" dirty="0" smtClean="0">
-              <a:solidFill>
-                <a:schemeClr val="accent2"/>
-              </a:solidFill>
-              <a:latin typeface="+mj-lt"/>
-            </a:endParaRPr>
-          </a:p>
-          <a:p>
-            <a:pPr indent="205704" algn="just" defTabSz="908920" rtl="0" eaLnBrk="1" hangingPunct="1">
-              <a:spcBef>
-                <a:spcPct val="50000"/>
-              </a:spcBef>
-              <a:tabLst>
-                <a:tab pos="497067" algn="l"/>
-              </a:tabLst>
-              <a:defRPr/>
-            </a:pPr>
-            <a:r>
-              <a:rPr lang="en-US" b="1" kern="0" dirty="0" smtClean="0">
-                <a:solidFill>
-                  <a:schemeClr val="accent2"/>
-                </a:solidFill>
-                <a:latin typeface="+mj-lt"/>
-              </a:rPr>
-              <a:t>SIM </a:t>
-            </a:r>
-            <a:r>
-              <a:rPr lang="en-US" b="1" kern="0" dirty="0">
-                <a:solidFill>
-                  <a:schemeClr val="accent2"/>
-                </a:solidFill>
-                <a:latin typeface="+mj-lt"/>
-              </a:rPr>
-              <a:t>breaks off the adaptability-adaptedness trade-off</a:t>
-            </a:r>
           </a:p>
           <a:p>
             <a:pPr indent="205704" algn="just" defTabSz="908920" rtl="0" eaLnBrk="1" hangingPunct="1">
@@ -5659,19 +6048,80 @@
             </a:r>
           </a:p>
           <a:p>
+            <a:pPr indent="205704" algn="l" defTabSz="908920" rtl="0" eaLnBrk="1" hangingPunct="1">
+              <a:spcBef>
+                <a:spcPct val="50000"/>
+              </a:spcBef>
+              <a:tabLst>
+                <a:tab pos="497067" algn="l"/>
+              </a:tabLst>
+              <a:defRPr/>
+            </a:pPr>
+            <a:r>
+              <a:rPr lang="en-US" b="1" kern="0" dirty="0" smtClean="0">
+                <a:solidFill>
+                  <a:srgbClr val="C0504D"/>
+                </a:solidFill>
+                <a:latin typeface="Calibri"/>
+                <a:ea typeface="+mn-ea"/>
+              </a:rPr>
+              <a:t>Mutagenesis is induced by stress </a:t>
+            </a:r>
+            <a:r>
+              <a:rPr lang="en-US" sz="2800" kern="0" dirty="0" smtClean="0">
+                <a:latin typeface="+mn-lt"/>
+              </a:rPr>
+              <a:t>responses </a:t>
+            </a:r>
+            <a:r>
+              <a:rPr lang="en-US" sz="2800" kern="0" dirty="0">
+                <a:latin typeface="+mn-lt"/>
+              </a:rPr>
+              <a:t>in various species of bacteria </a:t>
+            </a:r>
+            <a:r>
+              <a:rPr lang="en-US" sz="2800" kern="0" dirty="0" smtClean="0">
+                <a:latin typeface="+mn-lt"/>
+              </a:rPr>
+              <a:t>(1-3).</a:t>
+            </a:r>
+          </a:p>
+          <a:p>
             <a:pPr indent="205704" algn="l" defTabSz="908920" rtl="0">
               <a:defRPr/>
             </a:pPr>
-            <a:endParaRPr lang="en-US" sz="2800" b="1" kern="0" dirty="0" smtClean="0">
-              <a:latin typeface="+mn-lt"/>
-            </a:endParaRPr>
-          </a:p>
-          <a:p>
-            <a:pPr indent="205704" algn="l" defTabSz="908920" rtl="0">
-              <a:defRPr/>
-            </a:pPr>
+            <a:r>
+              <a:rPr lang="en-US" sz="2800" kern="0" dirty="0" smtClean="0">
+                <a:latin typeface="+mn-lt"/>
+              </a:rPr>
+              <a:t>In </a:t>
+            </a:r>
+            <a:r>
+              <a:rPr lang="en-US" sz="2800" kern="0" dirty="0" smtClean="0">
+                <a:latin typeface="+mn-lt"/>
+              </a:rPr>
+              <a:t>a previous work (4) we studied the evolution of stress-induced </a:t>
+            </a:r>
+            <a:r>
+              <a:rPr lang="en-US" sz="2800" kern="0" dirty="0" smtClean="0">
+                <a:latin typeface="+mn-lt"/>
+              </a:rPr>
+              <a:t>mutagenesis in constant and changing environments. </a:t>
+            </a:r>
+            <a:r>
+              <a:rPr lang="en-US" sz="2800" kern="0" dirty="0" smtClean="0">
+                <a:latin typeface="+mn-lt"/>
+              </a:rPr>
+              <a:t>We showed that</a:t>
+            </a:r>
             <a:r>
               <a:rPr lang="en-US" sz="2800" b="1" kern="0" dirty="0" smtClean="0">
+                <a:latin typeface="+mn-lt"/>
+              </a:rPr>
+              <a:t> </a:t>
+            </a:r>
+            <a:r>
+              <a:rPr lang="en-US" sz="2800" b="1" kern="0" dirty="0">
                 <a:solidFill>
                   <a:schemeClr val="accent1">
                     <a:lumMod val="75000"/>
@@ -5679,10 +6129,10 @@
                 </a:solidFill>
                 <a:latin typeface="+mn-lt"/>
               </a:rPr>
-              <a:t>Mutagenesis is </a:t>
-            </a:r>
-            <a:r>
-              <a:rPr lang="en-US" sz="2800" b="1" kern="0" dirty="0">
+              <a:t>stress-induced </a:t>
+            </a:r>
+            <a:r>
+              <a:rPr lang="en-US" sz="2800" b="1" kern="0" dirty="0" smtClean="0">
                 <a:solidFill>
                   <a:schemeClr val="accent1">
                     <a:lumMod val="75000"/>
@@ -5690,44 +6140,7 @@
                 </a:solidFill>
                 <a:latin typeface="+mn-lt"/>
               </a:rPr>
-              <a:t>induced by stress responses in various species </a:t>
-            </a:r>
-            <a:r>
-              <a:rPr lang="en-US" sz="2800" kern="0" dirty="0">
-                <a:latin typeface="+mn-lt"/>
-              </a:rPr>
-              <a:t>of bacteria </a:t>
-            </a:r>
-            <a:r>
-              <a:rPr lang="en-US" sz="2800" kern="0" dirty="0" smtClean="0">
-                <a:latin typeface="+mn-lt"/>
-              </a:rPr>
-              <a:t>(1-3).</a:t>
-            </a:r>
-          </a:p>
-          <a:p>
-            <a:pPr indent="205704" algn="l" defTabSz="908920" rtl="0">
-              <a:defRPr/>
-            </a:pPr>
-            <a:endParaRPr lang="en-US" sz="2800" kern="0" dirty="0" smtClean="0">
-              <a:latin typeface="+mn-lt"/>
-            </a:endParaRPr>
-          </a:p>
-          <a:p>
-            <a:pPr indent="205704" algn="l" defTabSz="908920" rtl="0">
-              <a:defRPr/>
-            </a:pPr>
-            <a:r>
-              <a:rPr lang="en-US" sz="2800" kern="0" dirty="0" smtClean="0">
-                <a:latin typeface="+mn-lt"/>
-              </a:rPr>
-              <a:t>In a previous work (4) we studied the evolution of stress-induced mutagenesis in constant and changing environments. We showed that</a:t>
-            </a:r>
-            <a:r>
-              <a:rPr lang="en-US" sz="2800" b="1" kern="0" dirty="0" smtClean="0">
-                <a:latin typeface="+mn-lt"/>
-              </a:rPr>
-              <a:t> </a:t>
+              <a:t>mutagenesis (SIM) </a:t>
             </a:r>
             <a:r>
               <a:rPr lang="en-US" sz="2800" b="1" kern="0" dirty="0">
@@ -5738,28 +6151,6 @@
                 </a:solidFill>
                 <a:latin typeface="+mn-lt"/>
               </a:rPr>
-              <a:t>stress-induced </a:t>
-            </a:r>
-            <a:r>
-              <a:rPr lang="en-US" sz="2800" b="1" kern="0" dirty="0" smtClean="0">
-                <a:solidFill>
-                  <a:schemeClr val="accent1">
-                    <a:lumMod val="75000"/>
-                  </a:schemeClr>
-                </a:solidFill>
-                <a:latin typeface="+mn-lt"/>
-              </a:rPr>
-              <a:t>mutagenesis (SIM) </a:t>
-            </a:r>
-            <a:r>
-              <a:rPr lang="en-US" sz="2800" b="1" kern="0" dirty="0">
-                <a:solidFill>
-                  <a:schemeClr val="accent1">
-                    <a:lumMod val="75000"/>
-                  </a:schemeClr>
-                </a:solidFill>
-                <a:latin typeface="+mn-lt"/>
-              </a:rPr>
               <a:t>is favored by selection </a:t>
             </a:r>
             <a:r>
@@ -5769,14 +6160,104 @@
                 </a:solidFill>
                 <a:latin typeface="+mn-lt"/>
               </a:rPr>
-              <a:t>over constant rate mutagenesis  because it generates beneficial mutations when they are most needed.</a:t>
+              <a:t>over constant rate mutagenesis </a:t>
+            </a:r>
+            <a:r>
+              <a:rPr lang="en-US" sz="2800" kern="0" dirty="0" smtClean="0">
+                <a:solidFill>
+                  <a:srgbClr val="000000"/>
+                </a:solidFill>
+                <a:latin typeface="+mn-lt"/>
+              </a:rPr>
+              <a:t> because </a:t>
+            </a:r>
+            <a:r>
+              <a:rPr lang="en-US" sz="2800" kern="0" dirty="0" smtClean="0">
+                <a:solidFill>
+                  <a:srgbClr val="000000"/>
+                </a:solidFill>
+                <a:latin typeface="+mn-lt"/>
+              </a:rPr>
+              <a:t>it generates beneficial mutations when they are most needed</a:t>
+            </a:r>
+            <a:r>
+              <a:rPr lang="en-US" sz="2800" kern="0" dirty="0" smtClean="0">
+                <a:solidFill>
+                  <a:srgbClr val="000000"/>
+                </a:solidFill>
+                <a:latin typeface="+mn-lt"/>
+              </a:rPr>
+              <a:t>.</a:t>
             </a:r>
           </a:p>
           <a:p>
             <a:pPr indent="205704" algn="l" defTabSz="908920" rtl="0">
               <a:defRPr/>
             </a:pPr>
+            <a:r>
+              <a:rPr lang="en-US" b="1" kern="0" dirty="0" smtClean="0">
+                <a:solidFill>
+                  <a:srgbClr val="C0504D"/>
+                </a:solidFill>
+                <a:latin typeface="+mn-lt"/>
+                <a:ea typeface="+mn-ea"/>
+              </a:rPr>
+              <a:t>Complex adaptations </a:t>
+            </a:r>
+            <a:r>
+              <a:rPr lang="en-US" sz="2800" kern="0" dirty="0" smtClean="0">
+                <a:solidFill>
+                  <a:srgbClr val="000000"/>
+                </a:solidFill>
+                <a:latin typeface="Calibri"/>
+                <a:ea typeface="+mn-ea"/>
+              </a:rPr>
+              <a:t>require two or more mutations that are jointly advantageous but separately deleterious, and therefore </a:t>
+            </a:r>
+            <a:r>
+              <a:rPr lang="en-US" sz="2800" kern="0" dirty="0">
+                <a:solidFill>
+                  <a:srgbClr val="000000"/>
+                </a:solidFill>
+                <a:latin typeface="Calibri"/>
+                <a:ea typeface="+mn-ea"/>
+              </a:rPr>
+              <a:t>presents an open evolutionary question, first described by Sewall Wright in 1931 </a:t>
+            </a:r>
+            <a:r>
+              <a:rPr lang="en-US" sz="2800" kern="0" dirty="0" smtClean="0">
+                <a:solidFill>
+                  <a:srgbClr val="000000"/>
+                </a:solidFill>
+                <a:latin typeface="Calibri"/>
+                <a:ea typeface="+mn-ea"/>
+              </a:rPr>
+              <a:t>(5) and popularized using the fitness landscape metaphor:</a:t>
+            </a:r>
             <a:endParaRPr lang="en-US" sz="2800" kern="0" dirty="0">
+              <a:solidFill>
+                <a:srgbClr val="000000"/>
+              </a:solidFill>
+              <a:latin typeface="Calibri"/>
+              <a:ea typeface="+mn-ea"/>
+            </a:endParaRPr>
+          </a:p>
+          <a:p>
+            <a:pPr indent="205704" algn="l" defTabSz="908920" rtl="0">
+              <a:defRPr/>
+            </a:pPr>
+            <a:endParaRPr lang="en-US" kern="0" dirty="0" smtClean="0">
+              <a:solidFill>
+                <a:srgbClr val="000000"/>
+              </a:solidFill>
+              <a:latin typeface="+mn-lt"/>
+            </a:endParaRPr>
+          </a:p>
+          <a:p>
+            <a:pPr indent="205704" algn="l" defTabSz="908920" rtl="0">
+              <a:defRPr/>
+            </a:pPr>
+            <a:endParaRPr lang="en-US" sz="2800" kern="0" dirty="0" smtClean="0">
               <a:solidFill>
                 <a:srgbClr val="000000"/>
               </a:solidFill>
@@ -6067,7 +6548,19 @@
               <a:rPr lang="en-US" sz="11600" b="1" dirty="0" smtClean="0">
                 <a:latin typeface="+mj-lt"/>
               </a:rPr>
-              <a:t>Adaptability, Adaptedness and Stress-Induced Mutagenesis</a:t>
+              <a:t>Adaptability, Adaptedness </a:t>
+            </a:r>
+            <a:r>
+              <a:rPr lang="en-US" sz="11600" b="1" dirty="0" smtClean="0">
+                <a:latin typeface="+mj-lt"/>
+              </a:rPr>
+              <a:t>and Stress-Induced </a:t>
+            </a:r>
+            <a:r>
+              <a:rPr lang="en-US" sz="11600" b="1" dirty="0" smtClean="0">
+                <a:latin typeface="+mj-lt"/>
+              </a:rPr>
+              <a:t>Mutagenesis</a:t>
             </a:r>
             <a:endParaRPr lang="en-US" sz="11600" b="1" dirty="0">
               <a:latin typeface="+mj-lt"/>
@@ -6450,6 +6943,380 @@
             <a:pPr indent="205704" algn="l" defTabSz="908920" rtl="0">
               <a:defRPr/>
             </a:pPr>
+            <a:r>
+              <a:rPr lang="en-US" sz="4400" b="1" kern="0" dirty="0" smtClean="0">
+                <a:solidFill>
+                  <a:srgbClr val="C0504D"/>
+                </a:solidFill>
+                <a:latin typeface="+mj-lt"/>
+                <a:ea typeface="+mn-ea"/>
+              </a:rPr>
+              <a:t>Model</a:t>
+            </a:r>
+          </a:p>
+          <a:p>
+            <a:pPr indent="205704" algn="l" defTabSz="908920" rtl="0">
+              <a:defRPr/>
+            </a:pPr>
+            <a:r>
+              <a:rPr lang="en-US" sz="2800" kern="0" dirty="0">
+                <a:solidFill>
+                  <a:srgbClr val="000000"/>
+                </a:solidFill>
+                <a:latin typeface="+mn-lt"/>
+              </a:rPr>
+              <a:t>Figure </a:t>
+            </a:r>
+            <a:r>
+              <a:rPr lang="en-US" sz="2800" kern="0" dirty="0">
+                <a:solidFill>
+                  <a:srgbClr val="000000"/>
+                </a:solidFill>
+                <a:latin typeface="+mn-lt"/>
+              </a:rPr>
+              <a:t>2</a:t>
+            </a:r>
+            <a:r>
+              <a:rPr lang="en-US" sz="2800" kern="0" dirty="0" smtClean="0">
+                <a:solidFill>
+                  <a:srgbClr val="000000"/>
+                </a:solidFill>
+                <a:latin typeface="+mn-lt"/>
+              </a:rPr>
+              <a:t> </a:t>
+            </a:r>
+            <a:r>
+              <a:rPr lang="en-US" sz="2800" kern="0" dirty="0">
+                <a:solidFill>
+                  <a:srgbClr val="000000"/>
+                </a:solidFill>
+                <a:latin typeface="+mn-lt"/>
+              </a:rPr>
+              <a:t>describes are two-locus (</a:t>
+            </a:r>
+            <a:r>
+              <a:rPr lang="en-US" sz="2800" i="1" kern="0" dirty="0">
+                <a:solidFill>
+                  <a:srgbClr val="000000"/>
+                </a:solidFill>
+                <a:latin typeface="+mn-lt"/>
+              </a:rPr>
+              <a:t>A/a</a:t>
+            </a:r>
+            <a:r>
+              <a:rPr lang="en-US" sz="2800" kern="0" dirty="0">
+                <a:solidFill>
+                  <a:srgbClr val="000000"/>
+                </a:solidFill>
+                <a:latin typeface="+mn-lt"/>
+              </a:rPr>
+              <a:t> and </a:t>
+            </a:r>
+            <a:r>
+              <a:rPr lang="en-US" sz="2800" i="1" kern="0" dirty="0">
+                <a:solidFill>
+                  <a:srgbClr val="000000"/>
+                </a:solidFill>
+                <a:latin typeface="+mn-lt"/>
+              </a:rPr>
+              <a:t>B/b</a:t>
+            </a:r>
+            <a:r>
+              <a:rPr lang="en-US" sz="2800" kern="0" dirty="0">
+                <a:solidFill>
+                  <a:srgbClr val="000000"/>
+                </a:solidFill>
+                <a:latin typeface="+mn-lt"/>
+              </a:rPr>
+              <a:t>) analytic model of adaptation in a rugged fitness landscape. </a:t>
+            </a:r>
+          </a:p>
+          <a:p>
+            <a:pPr indent="205704" algn="l" defTabSz="908920" rtl="0">
+              <a:defRPr/>
+            </a:pPr>
+            <a:r>
+              <a:rPr lang="en-US" sz="2800" kern="0" dirty="0" smtClean="0">
+                <a:solidFill>
+                  <a:srgbClr val="000000"/>
+                </a:solidFill>
+                <a:latin typeface="+mn-lt"/>
+              </a:rPr>
+              <a:t>Each </a:t>
+            </a:r>
+            <a:r>
+              <a:rPr lang="en-US" sz="2800" kern="0" dirty="0">
+                <a:solidFill>
+                  <a:srgbClr val="000000"/>
+                </a:solidFill>
+                <a:latin typeface="+mn-lt"/>
+              </a:rPr>
+              <a:t>node represents a genotype. Genotype </a:t>
+            </a:r>
+            <a:r>
+              <a:rPr lang="en-US" sz="2800" b="1" i="1" kern="0" dirty="0" err="1">
+                <a:solidFill>
+                  <a:schemeClr val="accent1">
+                    <a:lumMod val="75000"/>
+                  </a:schemeClr>
+                </a:solidFill>
+                <a:latin typeface="+mn-lt"/>
+              </a:rPr>
+              <a:t>ab</a:t>
+            </a:r>
+            <a:r>
+              <a:rPr lang="en-US" sz="2800" b="1" kern="0" dirty="0">
+                <a:solidFill>
+                  <a:schemeClr val="accent1">
+                    <a:lumMod val="75000"/>
+                  </a:schemeClr>
+                </a:solidFill>
+                <a:latin typeface="+mn-lt"/>
+              </a:rPr>
+              <a:t> is the wildtype</a:t>
+            </a:r>
+            <a:r>
+              <a:rPr lang="en-US" sz="2800" kern="0" dirty="0">
+                <a:solidFill>
+                  <a:srgbClr val="000000"/>
+                </a:solidFill>
+                <a:latin typeface="+mn-lt"/>
+              </a:rPr>
+              <a:t>, </a:t>
+            </a:r>
+            <a:r>
+              <a:rPr lang="en-US" sz="2800" b="1" i="1" kern="0" dirty="0">
+                <a:solidFill>
+                  <a:schemeClr val="accent1">
+                    <a:lumMod val="75000"/>
+                  </a:schemeClr>
+                </a:solidFill>
+                <a:latin typeface="+mn-lt"/>
+              </a:rPr>
+              <a:t>AB</a:t>
+            </a:r>
+            <a:r>
+              <a:rPr lang="en-US" sz="2800" b="1" kern="0" dirty="0">
+                <a:solidFill>
+                  <a:schemeClr val="accent1">
+                    <a:lumMod val="75000"/>
+                  </a:schemeClr>
+                </a:solidFill>
+                <a:latin typeface="+mn-lt"/>
+              </a:rPr>
+              <a:t> is the adaptive peak</a:t>
+            </a:r>
+            <a:r>
+              <a:rPr lang="en-US" sz="2800" b="1" kern="0" dirty="0">
+                <a:solidFill>
+                  <a:srgbClr val="000000"/>
+                </a:solidFill>
+                <a:latin typeface="+mn-lt"/>
+              </a:rPr>
+              <a:t> </a:t>
+            </a:r>
+            <a:r>
+              <a:rPr lang="en-US" sz="2800" kern="0" dirty="0">
+                <a:solidFill>
+                  <a:srgbClr val="000000"/>
+                </a:solidFill>
+                <a:latin typeface="+mn-lt"/>
+              </a:rPr>
+              <a:t>with the highest fitness, and the single mutants </a:t>
+            </a:r>
+            <a:r>
+              <a:rPr lang="en-US" sz="2800" b="1" i="1" kern="0" dirty="0" err="1">
+                <a:solidFill>
+                  <a:schemeClr val="accent1">
+                    <a:lumMod val="75000"/>
+                  </a:schemeClr>
+                </a:solidFill>
+                <a:latin typeface="+mn-lt"/>
+              </a:rPr>
+              <a:t>Ab</a:t>
+            </a:r>
+            <a:r>
+              <a:rPr lang="en-US" sz="2800" b="1" i="1" kern="0" dirty="0">
+                <a:solidFill>
+                  <a:schemeClr val="accent1">
+                    <a:lumMod val="75000"/>
+                  </a:schemeClr>
+                </a:solidFill>
+                <a:latin typeface="+mn-lt"/>
+              </a:rPr>
+              <a:t> </a:t>
+            </a:r>
+            <a:r>
+              <a:rPr lang="en-US" sz="2800" b="1" kern="0" dirty="0">
+                <a:solidFill>
+                  <a:schemeClr val="accent1">
+                    <a:lumMod val="75000"/>
+                  </a:schemeClr>
+                </a:solidFill>
+                <a:latin typeface="+mn-lt"/>
+              </a:rPr>
+              <a:t>and </a:t>
+            </a:r>
+            <a:r>
+              <a:rPr lang="en-US" sz="2800" b="1" i="1" kern="0" dirty="0" err="1">
+                <a:solidFill>
+                  <a:schemeClr val="accent1">
+                    <a:lumMod val="75000"/>
+                  </a:schemeClr>
+                </a:solidFill>
+                <a:latin typeface="+mn-lt"/>
+              </a:rPr>
+              <a:t>aB</a:t>
+            </a:r>
+            <a:r>
+              <a:rPr lang="en-US" sz="2800" b="1" i="1" kern="0" dirty="0">
+                <a:solidFill>
+                  <a:schemeClr val="accent1">
+                    <a:lumMod val="75000"/>
+                  </a:schemeClr>
+                </a:solidFill>
+                <a:latin typeface="+mn-lt"/>
+              </a:rPr>
+              <a:t> </a:t>
+            </a:r>
+            <a:r>
+              <a:rPr lang="en-US" sz="2800" b="1" kern="0" dirty="0">
+                <a:solidFill>
+                  <a:schemeClr val="accent1">
+                    <a:lumMod val="75000"/>
+                  </a:schemeClr>
+                </a:solidFill>
+                <a:latin typeface="+mn-lt"/>
+              </a:rPr>
+              <a:t>are adaptive valleys </a:t>
+            </a:r>
+            <a:r>
+              <a:rPr lang="en-US" sz="2800" kern="0" dirty="0">
+                <a:solidFill>
+                  <a:srgbClr val="000000"/>
+                </a:solidFill>
+                <a:latin typeface="+mn-lt"/>
+              </a:rPr>
+              <a:t>with fitness lower than the wildtype - the darker the color the lower the fitness. “RIP” represents genotypes with deleterious mutations that will not contribute to adaptation (“the living dead”). </a:t>
+            </a:r>
+          </a:p>
+          <a:p>
+            <a:pPr indent="205704" algn="l" defTabSz="908920" rtl="0">
+              <a:defRPr/>
+            </a:pPr>
+            <a:r>
+              <a:rPr lang="en-US" sz="2800" kern="0" dirty="0" smtClean="0">
+                <a:solidFill>
+                  <a:srgbClr val="000000"/>
+                </a:solidFill>
+                <a:latin typeface="+mn-lt"/>
+              </a:rPr>
+              <a:t>Arrows </a:t>
+            </a:r>
+            <a:r>
+              <a:rPr lang="en-US" sz="2800" kern="0" dirty="0">
+                <a:solidFill>
+                  <a:srgbClr val="000000"/>
+                </a:solidFill>
+                <a:latin typeface="+mn-lt"/>
+              </a:rPr>
+              <a:t>define the direction of mutation and denote the relevant mutation rate: </a:t>
+            </a:r>
+            <a:r>
+              <a:rPr lang="en-US" sz="2800" b="1" i="1" kern="0" dirty="0">
+                <a:solidFill>
+                  <a:srgbClr val="000000"/>
+                </a:solidFill>
+                <a:latin typeface="+mn-lt"/>
+              </a:rPr>
+              <a:t>U</a:t>
+            </a:r>
+            <a:r>
+              <a:rPr lang="en-US" sz="2800" b="1" kern="0" dirty="0">
+                <a:solidFill>
+                  <a:srgbClr val="000000"/>
+                </a:solidFill>
+                <a:latin typeface="+mn-lt"/>
+              </a:rPr>
+              <a:t> for background deleterious mutation </a:t>
+            </a:r>
+            <a:r>
+              <a:rPr lang="en-US" sz="2800" kern="0" dirty="0">
+                <a:solidFill>
+                  <a:srgbClr val="000000"/>
+                </a:solidFill>
+                <a:latin typeface="+mn-lt"/>
+              </a:rPr>
+              <a:t>(dashed lines) and </a:t>
+            </a:r>
+            <a:r>
+              <a:rPr lang="en-US" sz="2800" b="1" i="1" kern="0" dirty="0">
+                <a:solidFill>
+                  <a:srgbClr val="000000"/>
+                </a:solidFill>
+                <a:latin typeface="+mn-lt"/>
+              </a:rPr>
+              <a:t>µ</a:t>
+            </a:r>
+            <a:r>
+              <a:rPr lang="en-US" sz="2800" b="1" kern="0" dirty="0">
+                <a:solidFill>
+                  <a:srgbClr val="000000"/>
+                </a:solidFill>
+                <a:latin typeface="+mn-lt"/>
+              </a:rPr>
+              <a:t> for mutations in the </a:t>
+            </a:r>
+            <a:r>
+              <a:rPr lang="en-US" sz="2800" b="1" i="1" kern="0" dirty="0">
+                <a:solidFill>
+                  <a:srgbClr val="000000"/>
+                </a:solidFill>
+                <a:latin typeface="+mn-lt"/>
+              </a:rPr>
+              <a:t>A/a </a:t>
+            </a:r>
+            <a:r>
+              <a:rPr lang="en-US" sz="2800" b="1" kern="0" dirty="0">
+                <a:solidFill>
+                  <a:srgbClr val="000000"/>
+                </a:solidFill>
+                <a:latin typeface="+mn-lt"/>
+              </a:rPr>
+              <a:t>and </a:t>
+            </a:r>
+            <a:r>
+              <a:rPr lang="en-US" sz="2800" b="1" i="1" kern="0" dirty="0">
+                <a:solidFill>
+                  <a:srgbClr val="000000"/>
+                </a:solidFill>
+                <a:latin typeface="+mn-lt"/>
+              </a:rPr>
+              <a:t>B/b </a:t>
+            </a:r>
+            <a:r>
+              <a:rPr lang="en-US" sz="2800" b="1" kern="0" dirty="0">
+                <a:solidFill>
+                  <a:srgbClr val="000000"/>
+                </a:solidFill>
+                <a:latin typeface="+mn-lt"/>
+              </a:rPr>
+              <a:t>loci </a:t>
+            </a:r>
+            <a:r>
+              <a:rPr lang="en-US" sz="2800" kern="0" dirty="0">
+                <a:solidFill>
+                  <a:srgbClr val="000000"/>
+                </a:solidFill>
+                <a:latin typeface="+mn-lt"/>
+              </a:rPr>
+              <a:t>(solid lines). </a:t>
+            </a:r>
+          </a:p>
+          <a:p>
+            <a:pPr indent="205704" algn="l" defTabSz="908920" rtl="0">
+              <a:defRPr/>
+            </a:pPr>
             <a:endParaRPr lang="en-GB" sz="2800" kern="0" dirty="0">
               <a:solidFill>
                 <a:srgbClr val="000000"/>
@@ -6492,8 +7359,8 @@
           </a:p>
         </p:txBody>
       </p:sp>
-      <mc:AlternateContent xmlns:mc="http://schemas.openxmlformats.org/markup-compatibility/2006" xmlns:a14="http://schemas.microsoft.com/office/drawing/2010/main">
-        <mc:Choice Requires="a14">
+      <mc:AlternateContent xmlns:mc="http://schemas.openxmlformats.org/markup-compatibility/2006">
+        <mc:Choice xmlns:a14="http://schemas.microsoft.com/office/drawing/2010/main" Requires="a14">
           <p:sp>
             <p:nvSpPr>
               <p:cNvPr id="101" name="Text Box 13"/>
@@ -6660,8 +7527,11 @@
               </a:lstStyle>
               <a:p>
                 <a:pPr indent="205704" algn="just" defTabSz="908920" rtl="0" eaLnBrk="1" hangingPunct="1">
+                  <a:spcBef>
+                    <a:spcPct val="50000"/>
+                  </a:spcBef>
                   <a:tabLst>
-                    <a:tab pos="631195" algn="l"/>
+                    <a:tab pos="497067" algn="l"/>
                   </a:tabLst>
                   <a:defRPr/>
                 </a:pPr>
@@ -6672,591 +7542,9 @@
                     </a:solidFill>
                     <a:latin typeface="+mj-lt"/>
                   </a:rPr>
-                  <a:t>Adaptation model</a:t>
+                  <a:t>Adaptation rate results</a:t>
                 </a:r>
-              </a:p>
-              <a:p>
-                <a:pPr indent="205704" algn="l" defTabSz="908920" rtl="0">
-                  <a:defRPr/>
-                </a:pPr>
-                <a:endParaRPr lang="en-US" sz="2800" kern="0" dirty="0" smtClean="0">
-                  <a:solidFill>
-                    <a:srgbClr val="000000"/>
-                  </a:solidFill>
-                  <a:latin typeface="+mn-lt"/>
-                </a:endParaRPr>
-              </a:p>
-              <a:p>
-                <a:pPr indent="205704" algn="l" defTabSz="908920" rtl="0">
-                  <a:defRPr/>
-                </a:pPr>
-                <a:r>
-                  <a:rPr lang="en-US" sz="2800" kern="0" dirty="0" smtClean="0">
-                    <a:solidFill>
-                      <a:srgbClr val="000000"/>
-                    </a:solidFill>
-                    <a:latin typeface="+mn-lt"/>
-                  </a:rPr>
-                  <a:t>Figure 3 describes are </a:t>
-                </a:r>
-                <a:r>
-                  <a:rPr lang="en-US" sz="2800" kern="0" dirty="0">
-                    <a:solidFill>
-                      <a:srgbClr val="000000"/>
-                    </a:solidFill>
-                    <a:latin typeface="+mn-lt"/>
-                  </a:rPr>
-                  <a:t>two-locus (</a:t>
-                </a:r>
-                <a:r>
-                  <a:rPr lang="en-US" sz="2800" i="1" kern="0" dirty="0">
-                    <a:solidFill>
-                      <a:srgbClr val="000000"/>
-                    </a:solidFill>
-                    <a:latin typeface="+mn-lt"/>
-                  </a:rPr>
-                  <a:t>A/a</a:t>
-                </a:r>
-                <a:r>
-                  <a:rPr lang="en-US" sz="2800" kern="0" dirty="0">
-                    <a:solidFill>
-                      <a:srgbClr val="000000"/>
-                    </a:solidFill>
-                    <a:latin typeface="+mn-lt"/>
-                  </a:rPr>
-                  <a:t> and </a:t>
-                </a:r>
-                <a:r>
-                  <a:rPr lang="en-US" sz="2800" i="1" kern="0" dirty="0">
-                    <a:solidFill>
-                      <a:srgbClr val="000000"/>
-                    </a:solidFill>
-                    <a:latin typeface="+mn-lt"/>
-                  </a:rPr>
-                  <a:t>B/b</a:t>
-                </a:r>
-                <a:r>
-                  <a:rPr lang="en-US" sz="2800" kern="0" dirty="0">
-                    <a:solidFill>
-                      <a:srgbClr val="000000"/>
-                    </a:solidFill>
-                    <a:latin typeface="+mn-lt"/>
-                  </a:rPr>
-                  <a:t>) analytic model of adaptation in a rugged fitness landscape. </a:t>
-                </a:r>
-                <a:endParaRPr lang="en-US" sz="2800" kern="0" dirty="0" smtClean="0">
-                  <a:solidFill>
-                    <a:srgbClr val="000000"/>
-                  </a:solidFill>
-                  <a:latin typeface="+mn-lt"/>
-                </a:endParaRPr>
-              </a:p>
-              <a:p>
-                <a:pPr indent="205704" algn="l" defTabSz="908920" rtl="0">
-                  <a:defRPr/>
-                </a:pPr>
-                <a:endParaRPr lang="en-US" sz="2800" kern="0" dirty="0" smtClean="0">
-                  <a:solidFill>
-                    <a:srgbClr val="000000"/>
-                  </a:solidFill>
-                  <a:latin typeface="+mn-lt"/>
-                </a:endParaRPr>
-              </a:p>
-              <a:p>
-                <a:pPr indent="205704" algn="l" defTabSz="908920" rtl="0">
-                  <a:defRPr/>
-                </a:pPr>
-                <a:r>
-                  <a:rPr lang="en-US" sz="2800" kern="0" dirty="0" smtClean="0">
-                    <a:solidFill>
-                      <a:srgbClr val="000000"/>
-                    </a:solidFill>
-                    <a:latin typeface="+mn-lt"/>
-                  </a:rPr>
-                  <a:t>Each </a:t>
-                </a:r>
-                <a:r>
-                  <a:rPr lang="en-US" sz="2800" kern="0" dirty="0">
-                    <a:solidFill>
-                      <a:srgbClr val="000000"/>
-                    </a:solidFill>
-                    <a:latin typeface="+mn-lt"/>
-                  </a:rPr>
-                  <a:t>node represents a genotype. </a:t>
-                </a:r>
-                <a:r>
-                  <a:rPr lang="en-US" sz="2800" kern="0" dirty="0" smtClean="0">
-                    <a:solidFill>
-                      <a:srgbClr val="000000"/>
-                    </a:solidFill>
-                    <a:latin typeface="+mn-lt"/>
-                  </a:rPr>
-                  <a:t>Genotype </a:t>
-                </a:r>
-                <a:r>
-                  <a:rPr lang="en-US" sz="2800" b="1" i="1" kern="0" dirty="0" err="1">
-                    <a:solidFill>
-                      <a:schemeClr val="accent1">
-                        <a:lumMod val="75000"/>
-                      </a:schemeClr>
-                    </a:solidFill>
-                    <a:latin typeface="+mn-lt"/>
-                  </a:rPr>
-                  <a:t>ab</a:t>
-                </a:r>
-                <a:r>
-                  <a:rPr lang="en-US" sz="2800" b="1" kern="0" dirty="0">
-                    <a:solidFill>
-                      <a:schemeClr val="accent1">
-                        <a:lumMod val="75000"/>
-                      </a:schemeClr>
-                    </a:solidFill>
-                    <a:latin typeface="+mn-lt"/>
-                  </a:rPr>
-                  <a:t> is the wildtype</a:t>
-                </a:r>
-                <a:r>
-                  <a:rPr lang="en-US" sz="2800" kern="0" dirty="0">
-                    <a:solidFill>
-                      <a:srgbClr val="000000"/>
-                    </a:solidFill>
-                    <a:latin typeface="+mn-lt"/>
-                  </a:rPr>
-                  <a:t>, </a:t>
-                </a:r>
-                <a:r>
-                  <a:rPr lang="en-US" sz="2800" b="1" i="1" kern="0" dirty="0">
-                    <a:solidFill>
-                      <a:schemeClr val="accent1">
-                        <a:lumMod val="75000"/>
-                      </a:schemeClr>
-                    </a:solidFill>
-                    <a:latin typeface="+mn-lt"/>
-                  </a:rPr>
-                  <a:t>AB</a:t>
-                </a:r>
-                <a:r>
-                  <a:rPr lang="en-US" sz="2800" b="1" kern="0" dirty="0">
-                    <a:solidFill>
-                      <a:schemeClr val="accent1">
-                        <a:lumMod val="75000"/>
-                      </a:schemeClr>
-                    </a:solidFill>
-                    <a:latin typeface="+mn-lt"/>
-                  </a:rPr>
-                  <a:t> is the adaptive peak</a:t>
-                </a:r>
-                <a:r>
-                  <a:rPr lang="en-US" sz="2800" b="1" kern="0" dirty="0">
-                    <a:solidFill>
-                      <a:srgbClr val="000000"/>
-                    </a:solidFill>
-                    <a:latin typeface="+mn-lt"/>
-                  </a:rPr>
-                  <a:t> </a:t>
-                </a:r>
-                <a:r>
-                  <a:rPr lang="en-US" sz="2800" kern="0" dirty="0">
-                    <a:solidFill>
-                      <a:srgbClr val="000000"/>
-                    </a:solidFill>
-                    <a:latin typeface="+mn-lt"/>
-                  </a:rPr>
-                  <a:t>with the highest fitness, and the single mutants </a:t>
-                </a:r>
-                <a:r>
-                  <a:rPr lang="en-US" sz="2800" b="1" i="1" kern="0" dirty="0" err="1">
-                    <a:solidFill>
-                      <a:schemeClr val="accent1">
-                        <a:lumMod val="75000"/>
-                      </a:schemeClr>
-                    </a:solidFill>
-                    <a:latin typeface="+mn-lt"/>
-                  </a:rPr>
-                  <a:t>Ab</a:t>
-                </a:r>
-                <a:r>
-                  <a:rPr lang="en-US" sz="2800" b="1" i="1" kern="0" dirty="0">
-                    <a:solidFill>
-                      <a:schemeClr val="accent1">
-                        <a:lumMod val="75000"/>
-                      </a:schemeClr>
-                    </a:solidFill>
-                    <a:latin typeface="+mn-lt"/>
-                  </a:rPr>
-                  <a:t> </a:t>
-                </a:r>
-                <a:r>
-                  <a:rPr lang="en-US" sz="2800" b="1" kern="0" dirty="0">
-                    <a:solidFill>
-                      <a:schemeClr val="accent1">
-                        <a:lumMod val="75000"/>
-                      </a:schemeClr>
-                    </a:solidFill>
-                    <a:latin typeface="+mn-lt"/>
-                  </a:rPr>
-                  <a:t>and </a:t>
-                </a:r>
-                <a:r>
-                  <a:rPr lang="en-US" sz="2800" b="1" i="1" kern="0" dirty="0" err="1">
-                    <a:solidFill>
-                      <a:schemeClr val="accent1">
-                        <a:lumMod val="75000"/>
-                      </a:schemeClr>
-                    </a:solidFill>
-                    <a:latin typeface="+mn-lt"/>
-                  </a:rPr>
-                  <a:t>aB</a:t>
-                </a:r>
-                <a:r>
-                  <a:rPr lang="en-US" sz="2800" b="1" i="1" kern="0" dirty="0">
-                    <a:solidFill>
-                      <a:schemeClr val="accent1">
-                        <a:lumMod val="75000"/>
-                      </a:schemeClr>
-                    </a:solidFill>
-                    <a:latin typeface="+mn-lt"/>
-                  </a:rPr>
-                  <a:t> </a:t>
-                </a:r>
-                <a:r>
-                  <a:rPr lang="en-US" sz="2800" b="1" kern="0" dirty="0">
-                    <a:solidFill>
-                      <a:schemeClr val="accent1">
-                        <a:lumMod val="75000"/>
-                      </a:schemeClr>
-                    </a:solidFill>
-                    <a:latin typeface="+mn-lt"/>
-                  </a:rPr>
-                  <a:t>are adaptive valleys </a:t>
-                </a:r>
-                <a:r>
-                  <a:rPr lang="en-US" sz="2800" kern="0" dirty="0">
-                    <a:solidFill>
-                      <a:srgbClr val="000000"/>
-                    </a:solidFill>
-                    <a:latin typeface="+mn-lt"/>
-                  </a:rPr>
-                  <a:t>with fitness lower than the wildtype - the darker the color the lower the fitness. </a:t>
-                </a:r>
-                <a:r>
-                  <a:rPr lang="en-US" sz="2800" kern="0" dirty="0" smtClean="0">
-                    <a:solidFill>
-                      <a:srgbClr val="000000"/>
-                    </a:solidFill>
-                    <a:latin typeface="+mn-lt"/>
-                  </a:rPr>
-                  <a:t>“</a:t>
-                </a:r>
-                <a:r>
-                  <a:rPr lang="en-US" sz="2800" kern="0" dirty="0">
-                    <a:solidFill>
-                      <a:srgbClr val="000000"/>
-                    </a:solidFill>
-                    <a:latin typeface="+mn-lt"/>
-                  </a:rPr>
-                  <a:t>RIP</a:t>
-                </a:r>
-                <a:r>
-                  <a:rPr lang="en-US" sz="2800" kern="0" dirty="0" smtClean="0">
-                    <a:solidFill>
-                      <a:srgbClr val="000000"/>
-                    </a:solidFill>
-                    <a:latin typeface="+mn-lt"/>
-                  </a:rPr>
-                  <a:t>” represents </a:t>
-                </a:r>
-                <a:r>
-                  <a:rPr lang="en-US" sz="2800" kern="0" dirty="0">
-                    <a:solidFill>
-                      <a:srgbClr val="000000"/>
-                    </a:solidFill>
-                    <a:latin typeface="+mn-lt"/>
-                  </a:rPr>
-                  <a:t>genotypes with deleterious mutations that will not contribute to </a:t>
-                </a:r>
-                <a:r>
-                  <a:rPr lang="en-US" sz="2800" kern="0" dirty="0" smtClean="0">
-                    <a:solidFill>
-                      <a:srgbClr val="000000"/>
-                    </a:solidFill>
-                    <a:latin typeface="+mn-lt"/>
-                  </a:rPr>
-                  <a:t>adaptation (“the living dead”). </a:t>
-                </a:r>
-              </a:p>
-              <a:p>
-                <a:pPr indent="205704" algn="l" defTabSz="908920" rtl="0">
-                  <a:defRPr/>
-                </a:pPr>
-                <a:endParaRPr lang="en-US" sz="2800" kern="0" dirty="0" smtClean="0">
-                  <a:solidFill>
-                    <a:srgbClr val="000000"/>
-                  </a:solidFill>
-                  <a:latin typeface="+mn-lt"/>
-                </a:endParaRPr>
-              </a:p>
-              <a:p>
-                <a:pPr indent="205704" algn="l" defTabSz="908920" rtl="0">
-                  <a:defRPr/>
-                </a:pPr>
-                <a:r>
-                  <a:rPr lang="en-US" sz="2800" kern="0" dirty="0" smtClean="0">
-                    <a:solidFill>
-                      <a:srgbClr val="000000"/>
-                    </a:solidFill>
-                    <a:latin typeface="+mn-lt"/>
-                  </a:rPr>
-                  <a:t>Arrows </a:t>
-                </a:r>
-                <a:r>
-                  <a:rPr lang="en-US" sz="2800" kern="0" dirty="0">
-                    <a:solidFill>
-                      <a:srgbClr val="000000"/>
-                    </a:solidFill>
-                    <a:latin typeface="+mn-lt"/>
-                  </a:rPr>
-                  <a:t>define the direction of mutation and denote the relevant mutation rate: </a:t>
-                </a:r>
-                <a:r>
-                  <a:rPr lang="en-US" sz="2800" b="1" i="1" kern="0" dirty="0">
-                    <a:solidFill>
-                      <a:srgbClr val="000000"/>
-                    </a:solidFill>
-                    <a:latin typeface="+mn-lt"/>
-                  </a:rPr>
-                  <a:t>U</a:t>
-                </a:r>
-                <a:r>
-                  <a:rPr lang="en-US" sz="2800" b="1" kern="0" dirty="0">
-                    <a:solidFill>
-                      <a:srgbClr val="000000"/>
-                    </a:solidFill>
-                    <a:latin typeface="+mn-lt"/>
-                  </a:rPr>
-                  <a:t> for background deleterious mutation </a:t>
-                </a:r>
-                <a:r>
-                  <a:rPr lang="en-US" sz="2800" kern="0" dirty="0">
-                    <a:solidFill>
-                      <a:srgbClr val="000000"/>
-                    </a:solidFill>
-                    <a:latin typeface="+mn-lt"/>
-                  </a:rPr>
-                  <a:t>(dashed lines) and </a:t>
-                </a:r>
-                <a:r>
-                  <a:rPr lang="en-US" sz="2800" b="1" i="1" kern="0" dirty="0">
-                    <a:solidFill>
-                      <a:srgbClr val="000000"/>
-                    </a:solidFill>
-                    <a:latin typeface="+mn-lt"/>
-                  </a:rPr>
-                  <a:t>µ</a:t>
-                </a:r>
-                <a:r>
-                  <a:rPr lang="en-US" sz="2800" b="1" kern="0" dirty="0">
-                    <a:solidFill>
-                      <a:srgbClr val="000000"/>
-                    </a:solidFill>
-                    <a:latin typeface="+mn-lt"/>
-                  </a:rPr>
-                  <a:t> for mutations in the </a:t>
-                </a:r>
-                <a:r>
-                  <a:rPr lang="en-US" sz="2800" b="1" i="1" kern="0" dirty="0">
-                    <a:solidFill>
-                      <a:srgbClr val="000000"/>
-                    </a:solidFill>
-                    <a:latin typeface="+mn-lt"/>
-                  </a:rPr>
-                  <a:t>A/a </a:t>
-                </a:r>
-                <a:r>
-                  <a:rPr lang="en-US" sz="2800" b="1" kern="0" dirty="0">
-                    <a:solidFill>
-                      <a:srgbClr val="000000"/>
-                    </a:solidFill>
-                    <a:latin typeface="+mn-lt"/>
-                  </a:rPr>
-                  <a:t>and </a:t>
-                </a:r>
-                <a:r>
-                  <a:rPr lang="en-US" sz="2800" b="1" i="1" kern="0" dirty="0">
-                    <a:solidFill>
-                      <a:srgbClr val="000000"/>
-                    </a:solidFill>
-                    <a:latin typeface="+mn-lt"/>
-                  </a:rPr>
-                  <a:t>B/b </a:t>
-                </a:r>
-                <a:r>
-                  <a:rPr lang="en-US" sz="2800" b="1" kern="0" dirty="0">
-                    <a:solidFill>
-                      <a:srgbClr val="000000"/>
-                    </a:solidFill>
-                    <a:latin typeface="+mn-lt"/>
-                  </a:rPr>
-                  <a:t>loci </a:t>
-                </a:r>
-                <a:r>
-                  <a:rPr lang="en-US" sz="2800" kern="0" dirty="0">
-                    <a:solidFill>
-                      <a:srgbClr val="000000"/>
-                    </a:solidFill>
-                    <a:latin typeface="+mn-lt"/>
-                  </a:rPr>
-                  <a:t>(solid lines). </a:t>
-                </a:r>
-              </a:p>
-              <a:p>
-                <a:pPr indent="205704" algn="l" defTabSz="908920" rtl="0">
-                  <a:defRPr/>
-                </a:pPr>
-                <a:endParaRPr lang="en-US" sz="2800" kern="0" dirty="0" smtClean="0">
-                  <a:solidFill>
-                    <a:srgbClr val="000000"/>
-                  </a:solidFill>
-                  <a:latin typeface="+mn-lt"/>
-                </a:endParaRPr>
-              </a:p>
-              <a:p>
-                <a:pPr indent="205704" algn="l" defTabSz="908920" rtl="0">
-                  <a:defRPr/>
-                </a:pPr>
-                <a:endParaRPr lang="en-US" b="1" kern="0" dirty="0">
-                  <a:solidFill>
-                    <a:schemeClr val="accent2"/>
-                  </a:solidFill>
-                  <a:latin typeface="+mj-lt"/>
-                </a:endParaRPr>
-              </a:p>
-              <a:p>
-                <a:pPr indent="205704" algn="l" defTabSz="908920" rtl="0">
-                  <a:defRPr/>
-                </a:pPr>
-                <a:endParaRPr lang="en-US" b="1" kern="0" dirty="0" smtClean="0">
-                  <a:solidFill>
-                    <a:schemeClr val="accent2"/>
-                  </a:solidFill>
-                  <a:latin typeface="+mj-lt"/>
-                </a:endParaRPr>
-              </a:p>
-              <a:p>
-                <a:pPr indent="205704" algn="l" defTabSz="908920" rtl="0">
-                  <a:defRPr/>
-                </a:pPr>
-                <a:endParaRPr lang="en-US" b="1" kern="0" dirty="0">
-                  <a:solidFill>
-                    <a:schemeClr val="accent2"/>
-                  </a:solidFill>
-                  <a:latin typeface="+mj-lt"/>
-                </a:endParaRPr>
-              </a:p>
-              <a:p>
-                <a:pPr indent="205704" algn="l" defTabSz="908920" rtl="0">
-                  <a:defRPr/>
-                </a:pPr>
-                <a:endParaRPr lang="en-US" b="1" kern="0" dirty="0" smtClean="0">
-                  <a:solidFill>
-                    <a:schemeClr val="accent2"/>
-                  </a:solidFill>
-                  <a:latin typeface="+mj-lt"/>
-                </a:endParaRPr>
-              </a:p>
-              <a:p>
-                <a:pPr indent="205704" algn="l" defTabSz="908920" rtl="0">
-                  <a:defRPr/>
-                </a:pPr>
-                <a:endParaRPr lang="en-US" b="1" kern="0" dirty="0" smtClean="0">
-                  <a:solidFill>
-                    <a:schemeClr val="accent2"/>
-                  </a:solidFill>
-                  <a:latin typeface="+mj-lt"/>
-                </a:endParaRPr>
-              </a:p>
-              <a:p>
-                <a:pPr indent="205704" algn="l" defTabSz="908920" rtl="0">
-                  <a:defRPr/>
-                </a:pPr>
-                <a:endParaRPr lang="en-US" b="1" kern="0" dirty="0">
-                  <a:solidFill>
-                    <a:schemeClr val="accent2"/>
-                  </a:solidFill>
-                  <a:latin typeface="+mj-lt"/>
-                </a:endParaRPr>
-              </a:p>
-              <a:p>
-                <a:pPr indent="205704" algn="l" defTabSz="908920" rtl="0">
-                  <a:defRPr/>
-                </a:pPr>
-                <a:endParaRPr lang="en-US" b="1" kern="0" dirty="0" smtClean="0">
-                  <a:solidFill>
-                    <a:schemeClr val="accent2"/>
-                  </a:solidFill>
-                  <a:latin typeface="+mj-lt"/>
-                </a:endParaRPr>
-              </a:p>
-              <a:p>
-                <a:pPr indent="205704" algn="l" defTabSz="908920" rtl="0">
-                  <a:defRPr/>
-                </a:pPr>
-                <a:endParaRPr lang="en-US" b="1" kern="0" dirty="0">
-                  <a:solidFill>
-                    <a:schemeClr val="accent2"/>
-                  </a:solidFill>
-                  <a:latin typeface="+mj-lt"/>
-                </a:endParaRPr>
-              </a:p>
-              <a:p>
-                <a:pPr indent="205704" algn="l" defTabSz="908920" rtl="0">
-                  <a:defRPr/>
-                </a:pPr>
-                <a:endParaRPr lang="en-US" b="1" kern="0" dirty="0" smtClean="0">
-                  <a:solidFill>
-                    <a:schemeClr val="accent2"/>
-                  </a:solidFill>
-                  <a:latin typeface="+mj-lt"/>
-                </a:endParaRPr>
-              </a:p>
-              <a:p>
-                <a:pPr indent="205704" algn="l" defTabSz="908920" rtl="0">
-                  <a:defRPr/>
-                </a:pPr>
-                <a:endParaRPr lang="en-US" b="1" kern="0" dirty="0">
-                  <a:solidFill>
-                    <a:schemeClr val="accent2"/>
-                  </a:solidFill>
-                  <a:latin typeface="+mj-lt"/>
-                </a:endParaRPr>
-              </a:p>
-              <a:p>
-                <a:pPr indent="205704" algn="l" defTabSz="908920" rtl="0">
-                  <a:defRPr/>
-                </a:pPr>
-                <a:endParaRPr lang="en-US" b="1" kern="0" dirty="0" smtClean="0">
-                  <a:solidFill>
-                    <a:schemeClr val="accent2"/>
-                  </a:solidFill>
-                  <a:latin typeface="+mj-lt"/>
-                </a:endParaRPr>
-              </a:p>
-              <a:p>
-                <a:pPr indent="205704" algn="l" defTabSz="908920" rtl="0">
-                  <a:defRPr/>
-                </a:pPr>
-                <a:endParaRPr lang="en-US" b="1" kern="0" dirty="0">
-                  <a:solidFill>
-                    <a:schemeClr val="accent2"/>
-                  </a:solidFill>
-                  <a:latin typeface="+mj-lt"/>
-                </a:endParaRPr>
-              </a:p>
-              <a:p>
-                <a:pPr indent="205704" algn="l" defTabSz="908920" rtl="0">
-                  <a:defRPr/>
-                </a:pPr>
-                <a:endParaRPr lang="en-US" b="1" kern="0" dirty="0" smtClean="0">
+                <a:endParaRPr lang="en-US" sz="4400" b="1" kern="0" dirty="0">
                   <a:solidFill>
                     <a:schemeClr val="accent2"/>
                   </a:solidFill>
@@ -7268,20 +7556,22 @@
                   <a:defRPr/>
                 </a:pPr>
                 <a:r>
-                  <a:rPr lang="en-US" b="1" kern="0" dirty="0" smtClean="0">
+                  <a:rPr lang="en-US" b="1" kern="0" dirty="0">
                     <a:solidFill>
-                      <a:schemeClr val="accent2"/>
+                      <a:srgbClr val="C0504D"/>
                     </a:solidFill>
-                    <a:latin typeface="+mj-lt"/>
+                    <a:latin typeface="Calibri"/>
+                    <a:ea typeface="+mn-ea"/>
                   </a:rPr>
                   <a:t>The adaptation rate </a:t>
                 </a:r>
                 <a:r>
-                  <a:rPr lang="el-GR" b="1" i="1" kern="0" dirty="0" smtClean="0">
+                  <a:rPr lang="el-GR" b="1" kern="0" dirty="0">
                     <a:solidFill>
-                      <a:schemeClr val="accent2"/>
+                      <a:srgbClr val="C0504D"/>
                     </a:solidFill>
-                    <a:latin typeface="+mj-lt"/>
+                    <a:latin typeface="Calibri"/>
+                    <a:ea typeface="+mn-ea"/>
                   </a:rPr>
                   <a:t>ν</a:t>
                 </a:r>
@@ -7301,8 +7591,28 @@
                     </a:solidFill>
                     <a:latin typeface="+mn-lt"/>
                   </a:rPr>
-                  <a:t>is approximated with normal mutagenesis (NM), constitutive mutagenesis (CM) and stress-induced mutagenesis (SIM):</a:t>
+                  <a:t>is approximated with normal mutagenesis (NM), constitutive mutagenesis (CM) and stress-induced mutagenesis (SIM</a:t>
                 </a:r>
+                <a:r>
+                  <a:rPr lang="en-US" sz="2800" kern="0" dirty="0" smtClean="0">
+                    <a:solidFill>
+                      <a:srgbClr val="000000"/>
+                    </a:solidFill>
+                    <a:latin typeface="+mn-lt"/>
+                  </a:rPr>
+                  <a:t>):</a:t>
+                </a:r>
+              </a:p>
+              <a:p>
+                <a:pPr indent="205704" algn="l" defTabSz="908920" rtl="0">
+                  <a:defRPr/>
+                </a:pPr>
+                <a:endParaRPr lang="en-US" sz="2800" kern="0" dirty="0" smtClean="0">
+                  <a:solidFill>
+                    <a:srgbClr val="000000"/>
+                  </a:solidFill>
+                  <a:latin typeface="+mn-lt"/>
+                </a:endParaRPr>
               </a:p>
               <a:p>
                 <a:pPr indent="205704" algn="l" defTabSz="908920" rtl="0">
@@ -7497,6 +7807,14 @@
                     </m:oMath>
                   </m:oMathPara>
                 </a14:m>
+                <a:endParaRPr lang="en-US" sz="2800" dirty="0" smtClean="0">
+                  <a:latin typeface="+mn-lt"/>
+                </a:endParaRPr>
+              </a:p>
+              <a:p>
+                <a:pPr indent="205704" algn="l" defTabSz="908920" rtl="0">
+                  <a:defRPr/>
+                </a:pPr>
                 <a:endParaRPr lang="en-US" sz="2800" kern="0" dirty="0" smtClean="0">
                   <a:solidFill>
                     <a:schemeClr val="tx1"/>
@@ -7615,6 +7933,14 @@
                     </m:oMath>
                   </m:oMathPara>
                 </a14:m>
+                <a:endParaRPr lang="en-US" sz="2800" dirty="0" smtClean="0">
+                  <a:latin typeface="+mn-lt"/>
+                </a:endParaRPr>
+              </a:p>
+              <a:p>
+                <a:pPr indent="205704" algn="l" defTabSz="908920" rtl="0">
+                  <a:defRPr/>
+                </a:pPr>
                 <a:endParaRPr lang="en-US" sz="2800" kern="0" dirty="0" smtClean="0">
                   <a:latin typeface="+mn-lt"/>
                 </a:endParaRPr>
@@ -7805,6 +8131,14 @@
                     </m:oMath>
                   </m:oMathPara>
                 </a14:m>
+                <a:endParaRPr lang="en-US" sz="2800" dirty="0" smtClean="0">
+                  <a:latin typeface="+mn-lt"/>
+                </a:endParaRPr>
+              </a:p>
+              <a:p>
+                <a:pPr indent="205704" algn="l" defTabSz="908920" rtl="0">
+                  <a:defRPr/>
+                </a:pPr>
                 <a:endParaRPr lang="en-US" sz="2800" kern="0" dirty="0" smtClean="0">
                   <a:latin typeface="+mn-lt"/>
                 </a:endParaRPr>
@@ -7821,39 +8155,106 @@
                 <a:pPr indent="205704" algn="l" defTabSz="908920" rtl="0">
                   <a:defRPr/>
                 </a:pPr>
+                <a:endParaRPr lang="en-US" b="1" kern="0" dirty="0" smtClean="0">
+                  <a:solidFill>
+                    <a:schemeClr val="accent2"/>
+                  </a:solidFill>
+                  <a:latin typeface="+mn-lt"/>
+                </a:endParaRPr>
+              </a:p>
+              <a:p>
+                <a:pPr indent="205704" algn="l" defTabSz="908920" rtl="0">
+                  <a:defRPr/>
+                </a:pPr>
                 <a:r>
-                  <a:rPr lang="en-US" sz="2800" b="1" kern="0" dirty="0">
+                  <a:rPr lang="en-US" b="1" kern="0" dirty="0" smtClean="0">
                     <a:solidFill>
-                      <a:schemeClr val="accent1">
-                        <a:lumMod val="75000"/>
-                      </a:schemeClr>
+                      <a:schemeClr val="accent2"/>
                     </a:solidFill>
                     <a:latin typeface="+mn-lt"/>
                   </a:rPr>
-                  <a:t>SIM increases the adaptation rate linearly with the mutation rate fold increase </a:t>
+                  <a:t>SIM </a:t>
                 </a:r>
                 <a:r>
-                  <a:rPr lang="el-GR" sz="2800" b="1" kern="0" dirty="0">
+                  <a:rPr lang="en-US" b="1" kern="0" dirty="0">
                     <a:solidFill>
-                      <a:schemeClr val="accent1">
-                        <a:lumMod val="75000"/>
-                      </a:schemeClr>
+                      <a:schemeClr val="accent2"/>
                     </a:solidFill>
                     <a:latin typeface="+mn-lt"/>
                   </a:rPr>
-                  <a:t>τ</a:t>
+                  <a:t>increases the adaptation </a:t>
                 </a:r>
                 <a:r>
-                  <a:rPr lang="en-US" sz="2800" b="1" kern="0" dirty="0">
+                  <a:rPr lang="en-US" b="1" kern="0" dirty="0" smtClean="0">
                     <a:solidFill>
-                      <a:schemeClr val="accent1">
-                        <a:lumMod val="75000"/>
-                      </a:schemeClr>
+                      <a:schemeClr val="accent2"/>
                     </a:solidFill>
                     <a:latin typeface="+mn-lt"/>
                   </a:rPr>
-                  <a:t>.</a:t>
+                  <a:t>rate of complex traits: </a:t>
                 </a:r>
+                <a:r>
+                  <a:rPr lang="en-US" sz="2800" kern="0" dirty="0" smtClean="0">
+                    <a:solidFill>
+                      <a:srgbClr val="000000"/>
+                    </a:solidFill>
+                    <a:latin typeface="+mn-lt"/>
+                  </a:rPr>
+                  <a:t>solid </a:t>
+                </a:r>
+                <a:r>
+                  <a:rPr lang="en-US" sz="2800" kern="0" dirty="0">
+                    <a:solidFill>
+                      <a:srgbClr val="000000"/>
+                    </a:solidFill>
+                    <a:latin typeface="+mn-lt"/>
+                  </a:rPr>
+                  <a:t>lines are analytic approximations, </a:t>
+                </a:r>
+                <a:r>
+                  <a:rPr lang="en-US" sz="2800" kern="0" dirty="0" smtClean="0">
+                    <a:solidFill>
+                      <a:srgbClr val="000000"/>
+                    </a:solidFill>
+                    <a:latin typeface="+mn-lt"/>
+                  </a:rPr>
+                  <a:t>markers are </a:t>
+                </a:r>
+                <a:r>
+                  <a:rPr lang="en-US" sz="2800" kern="0" dirty="0">
+                    <a:solidFill>
+                      <a:srgbClr val="000000"/>
+                    </a:solidFill>
+                    <a:latin typeface="+mn-lt"/>
+                  </a:rPr>
+                  <a:t>results of </a:t>
+                </a:r>
+                <a:r>
+                  <a:rPr lang="en-US" sz="2800" kern="0" dirty="0" smtClean="0">
+                    <a:solidFill>
+                      <a:srgbClr val="000000"/>
+                    </a:solidFill>
+                    <a:latin typeface="+mn-lt"/>
+                  </a:rPr>
+                  <a:t>simulations (see below), error bars are 95% CI:</a:t>
+                </a:r>
+                <a:endParaRPr lang="en-US" sz="2800" kern="0" dirty="0">
+                  <a:solidFill>
+                    <a:srgbClr val="000000"/>
+                  </a:solidFill>
+                  <a:latin typeface="+mn-lt"/>
+                </a:endParaRPr>
+              </a:p>
+              <a:p>
+                <a:pPr indent="205704" algn="l" defTabSz="908920" rtl="0">
+                  <a:defRPr/>
+                </a:pPr>
+                <a:endParaRPr lang="en-US" sz="2800" kern="0" dirty="0" smtClean="0">
+                  <a:solidFill>
+                    <a:srgbClr val="000000"/>
+                  </a:solidFill>
+                  <a:latin typeface="+mn-lt"/>
+                </a:endParaRPr>
               </a:p>
               <a:p>
                 <a:pPr indent="205704" algn="l" defTabSz="908920" rtl="0">
@@ -7891,7 +8292,7 @@
             </p:txBody>
           </p:sp>
         </mc:Choice>
-        <mc:Fallback xmlns="">
+        <mc:Fallback>
           <p:sp>
             <p:nvSpPr>
               <p:cNvPr id="101" name="Text Box 13"/>
@@ -8426,8 +8827,8 @@
         </p:nvSpPr>
         <p:spPr bwMode="auto">
           <a:xfrm>
-            <a:off x="29307600" y="34132092"/>
-            <a:ext cx="11520000" cy="4737981"/>
+            <a:off x="29307600" y="33484020"/>
+            <a:ext cx="11520000" cy="5386053"/>
           </a:xfrm>
           <a:prstGeom prst="rect">
             <a:avLst/>
@@ -8582,7 +8983,13 @@
               <a:rPr lang="en-US" sz="2400" dirty="0" smtClean="0">
                 <a:latin typeface="+mn-lt"/>
               </a:rPr>
-              <a:t>Rosenberg SM, et al. </a:t>
+              <a:t>Rosenberg </a:t>
+            </a:r>
+            <a:r>
+              <a:rPr lang="en-US" sz="2400" dirty="0" smtClean="0">
+                <a:latin typeface="+mn-lt"/>
+              </a:rPr>
+              <a:t>SM, et al. </a:t>
             </a:r>
             <a:r>
               <a:rPr lang="en-US" sz="2400" i="1" dirty="0">
@@ -8801,44 +9208,23 @@
               <a:buAutoNum type="arabicPeriod"/>
             </a:pPr>
             <a:r>
-              <a:rPr lang="en-US" sz="2400" dirty="0" err="1">
-                <a:latin typeface="+mn-lt"/>
-              </a:rPr>
-              <a:t>Kibota</a:t>
-            </a:r>
-            <a:r>
-              <a:rPr lang="en-US" sz="2400" dirty="0">
-                <a:latin typeface="+mn-lt"/>
-              </a:rPr>
-              <a:t> TT, Lynch </a:t>
-            </a:r>
-            <a:r>
-              <a:rPr lang="en-US" sz="2400" dirty="0" smtClean="0">
-                <a:latin typeface="+mn-lt"/>
-              </a:rPr>
-              <a:t>M. </a:t>
-            </a:r>
-            <a:r>
-              <a:rPr lang="en-US" sz="2400" i="1" dirty="0">
-                <a:latin typeface="+mn-lt"/>
-              </a:rPr>
-              <a:t>Nature</a:t>
-            </a:r>
-            <a:r>
-              <a:rPr lang="en-US" sz="2400" dirty="0">
-                <a:latin typeface="+mn-lt"/>
-              </a:rPr>
-              <a:t> 1996, </a:t>
-            </a:r>
-            <a:r>
-              <a:rPr lang="en-US" sz="2400" dirty="0" smtClean="0">
-                <a:latin typeface="+mn-lt"/>
-              </a:rPr>
-              <a:t>381:694–6</a:t>
-            </a:r>
-            <a:endParaRPr lang="en-US" sz="2400" dirty="0">
-              <a:latin typeface="+mn-lt"/>
-            </a:endParaRPr>
+              <a:rPr lang="de-DE" sz="2400" dirty="0">
+                <a:latin typeface="+mn-lt"/>
+              </a:rPr>
+              <a:t>Wright S. </a:t>
+            </a:r>
+            <a:r>
+              <a:rPr lang="de-DE" sz="2400" i="1" dirty="0">
+                <a:latin typeface="+mn-lt"/>
+              </a:rPr>
+              <a:t>Am Nat</a:t>
+            </a:r>
+            <a:r>
+              <a:rPr lang="de-DE" sz="2400" dirty="0">
+                <a:latin typeface="+mn-lt"/>
+              </a:rPr>
+              <a:t> 1988, 131:115–123</a:t>
+            </a:r>
           </a:p>
           <a:p>
             <a:pPr lvl="0" algn="l" rtl="0">
@@ -8846,62 +9232,29 @@
               <a:buAutoNum type="arabicPeriod"/>
             </a:pPr>
             <a:r>
-              <a:rPr lang="en-US" sz="2400" dirty="0">
-                <a:latin typeface="+mn-lt"/>
-              </a:rPr>
-              <a:t>Gordo </a:t>
+              <a:rPr lang="en-US" sz="2400" dirty="0" err="1" smtClean="0">
+                <a:latin typeface="+mn-lt"/>
+              </a:rPr>
+              <a:t>Kibota</a:t>
             </a:r>
             <a:r>
               <a:rPr lang="en-US" sz="2400" dirty="0" smtClean="0">
                 <a:latin typeface="+mn-lt"/>
               </a:rPr>
-              <a:t>I, et al. </a:t>
-            </a:r>
-            <a:r>
-              <a:rPr lang="en-US" sz="2400" i="1" dirty="0">
-                <a:latin typeface="+mn-lt"/>
-              </a:rPr>
-              <a:t>J </a:t>
-            </a:r>
-            <a:r>
-              <a:rPr lang="en-US" sz="2400" i="1" dirty="0" err="1">
-                <a:latin typeface="+mn-lt"/>
-              </a:rPr>
-              <a:t>Mol</a:t>
-            </a:r>
-            <a:r>
-              <a:rPr lang="en-US" sz="2400" i="1" dirty="0">
-                <a:latin typeface="+mn-lt"/>
-              </a:rPr>
-              <a:t> </a:t>
-            </a:r>
-            <a:r>
-              <a:rPr lang="en-US" sz="2400" i="1" dirty="0" err="1">
-                <a:latin typeface="+mn-lt"/>
-              </a:rPr>
-              <a:t>Microbiol</a:t>
-            </a:r>
-            <a:r>
-              <a:rPr lang="en-US" sz="2400" i="1" dirty="0">
-                <a:latin typeface="+mn-lt"/>
-              </a:rPr>
-              <a:t> Biotech</a:t>
-            </a:r>
-            <a:r>
-              <a:rPr lang="en-US" sz="2400" dirty="0">
-                <a:latin typeface="+mn-lt"/>
-              </a:rPr>
-              <a:t> 2011, </a:t>
+              <a:t> TT, Lynch M. </a:t>
+            </a:r>
+            <a:r>
+              <a:rPr lang="en-US" sz="2400" i="1" dirty="0" smtClean="0">
+                <a:latin typeface="+mn-lt"/>
+              </a:rPr>
+              <a:t>Nature</a:t>
             </a:r>
             <a:r>
               <a:rPr lang="en-US" sz="2400" dirty="0" smtClean="0">
                 <a:latin typeface="+mn-lt"/>
               </a:rPr>
-              <a:t>21:20–35</a:t>
-            </a:r>
-            <a:endParaRPr lang="en-US" sz="2400" dirty="0">
-              <a:latin typeface="+mn-lt"/>
-            </a:endParaRPr>
+              <a:t> 1996, 381:694–6</a:t>
+            </a:r>
           </a:p>
           <a:p>
             <a:pPr lvl="0" algn="l" rtl="0">
@@ -8909,34 +9262,58 @@
               <a:buAutoNum type="arabicPeriod"/>
             </a:pPr>
             <a:r>
+              <a:rPr lang="en-US" sz="2400" dirty="0" smtClean="0">
+                <a:latin typeface="+mn-lt"/>
+              </a:rPr>
+              <a:t>Gordo </a:t>
+            </a:r>
+            <a:r>
+              <a:rPr lang="en-US" sz="2400" dirty="0" smtClean="0">
+                <a:latin typeface="+mn-lt"/>
+              </a:rPr>
+              <a:t>I, et al. </a:t>
+            </a:r>
+            <a:r>
+              <a:rPr lang="en-US" sz="2400" i="1" dirty="0">
+                <a:latin typeface="+mn-lt"/>
+              </a:rPr>
+              <a:t>J </a:t>
+            </a:r>
+            <a:r>
+              <a:rPr lang="en-US" sz="2400" i="1" dirty="0" err="1">
+                <a:latin typeface="+mn-lt"/>
+              </a:rPr>
+              <a:t>Mol</a:t>
+            </a:r>
+            <a:r>
+              <a:rPr lang="en-US" sz="2400" i="1" dirty="0">
+                <a:latin typeface="+mn-lt"/>
+              </a:rPr>
+              <a:t> </a:t>
+            </a:r>
+            <a:r>
+              <a:rPr lang="en-US" sz="2400" i="1" dirty="0" err="1">
+                <a:latin typeface="+mn-lt"/>
+              </a:rPr>
+              <a:t>Microbiol</a:t>
+            </a:r>
+            <a:r>
+              <a:rPr lang="en-US" sz="2400" i="1" dirty="0">
+                <a:latin typeface="+mn-lt"/>
+              </a:rPr>
+              <a:t> Biotech</a:t>
+            </a:r>
+            <a:r>
               <a:rPr lang="en-US" sz="2400" dirty="0">
                 <a:latin typeface="+mn-lt"/>
               </a:rPr>
-              <a:t>Drake JW, et al</a:t>
+              <a:t> 2011, </a:t>
             </a:r>
             <a:r>
               <a:rPr lang="en-US" sz="2400" dirty="0" smtClean="0">
                 <a:latin typeface="+mn-lt"/>
               </a:rPr>
-              <a:t>. </a:t>
-            </a:r>
-            <a:r>
-              <a:rPr lang="en-US" sz="2400" i="1" dirty="0">
-                <a:latin typeface="+mn-lt"/>
-              </a:rPr>
-              <a:t>Genetics</a:t>
-            </a:r>
-            <a:r>
-              <a:rPr lang="en-US" sz="2400" dirty="0">
-                <a:latin typeface="+mn-lt"/>
-              </a:rPr>
-              <a:t> 1998, </a:t>
-            </a:r>
-            <a:r>
-              <a:rPr lang="en-US" sz="2400" dirty="0" smtClean="0">
-                <a:latin typeface="+mn-lt"/>
-              </a:rPr>
-              <a:t>148:1667–86</a:t>
+              <a:t>21:20–35</a:t>
             </a:r>
             <a:endParaRPr lang="en-US" sz="2400" dirty="0">
               <a:latin typeface="+mn-lt"/>
@@ -8948,40 +9325,34 @@
               <a:buAutoNum type="arabicPeriod"/>
             </a:pPr>
             <a:r>
-              <a:rPr lang="en-US" sz="2400" dirty="0" err="1">
-                <a:latin typeface="+mn-lt"/>
-              </a:rPr>
-              <a:t>Wielgoss</a:t>
-            </a:r>
-            <a:r>
               <a:rPr lang="en-US" sz="2400" dirty="0">
                 <a:latin typeface="+mn-lt"/>
               </a:rPr>
-              <a:t> S, et </a:t>
+              <a:t>Drake JW, et al</a:t>
             </a:r>
             <a:r>
               <a:rPr lang="en-US" sz="2400" dirty="0" smtClean="0">
                 <a:latin typeface="+mn-lt"/>
               </a:rPr>
-              <a:t>al. </a:t>
+              <a:t>. </a:t>
             </a:r>
             <a:r>
               <a:rPr lang="en-US" sz="2400" i="1" dirty="0">
                 <a:latin typeface="+mn-lt"/>
               </a:rPr>
-              <a:t>G3</a:t>
+              <a:t>Genetics</a:t>
             </a:r>
             <a:r>
               <a:rPr lang="en-US" sz="2400" dirty="0">
                 <a:latin typeface="+mn-lt"/>
               </a:rPr>
-              <a:t> 2011, </a:t>
+              <a:t> 1998, </a:t>
             </a:r>
             <a:r>
               <a:rPr lang="en-US" sz="2400" dirty="0" smtClean="0">
                 <a:latin typeface="+mn-lt"/>
               </a:rPr>
-              <a:t>1:183</a:t>
+              <a:t>148:1667–86</a:t>
             </a:r>
             <a:endParaRPr lang="en-US" sz="2400" dirty="0">
               <a:latin typeface="+mn-lt"/>
@@ -8993,77 +9364,44 @@
               <a:buAutoNum type="arabicPeriod"/>
             </a:pPr>
             <a:r>
+              <a:rPr lang="en-US" sz="2400" dirty="0" err="1">
+                <a:latin typeface="+mn-lt"/>
+              </a:rPr>
+              <a:t>Wielgoss</a:t>
+            </a:r>
+            <a:r>
               <a:rPr lang="en-US" sz="2400" dirty="0">
                 <a:latin typeface="+mn-lt"/>
               </a:rPr>
-              <a:t>Hall LMC, Henderson-</a:t>
-            </a:r>
-            <a:r>
-              <a:rPr lang="en-US" sz="2400" dirty="0" err="1">
-                <a:latin typeface="+mn-lt"/>
-              </a:rPr>
-              <a:t>Begg</a:t>
+              <a:t> S, et </a:t>
+            </a:r>
+            <a:r>
+              <a:rPr lang="en-US" sz="2400" dirty="0" smtClean="0">
+                <a:latin typeface="+mn-lt"/>
+              </a:rPr>
+              <a:t>al. </a:t>
+            </a:r>
+            <a:r>
+              <a:rPr lang="en-US" sz="2400" i="1" dirty="0">
+                <a:latin typeface="+mn-lt"/>
+              </a:rPr>
+              <a:t>G3</a:t>
             </a:r>
             <a:r>
               <a:rPr lang="en-US" sz="2400" dirty="0">
                 <a:latin typeface="+mn-lt"/>
               </a:rPr>
-              <a:t> </a:t>
+              <a:t> 2011, </a:t>
             </a:r>
             <a:r>
               <a:rPr lang="en-US" sz="2400" dirty="0" smtClean="0">
                 <a:latin typeface="+mn-lt"/>
               </a:rPr>
-              <a:t>SK. </a:t>
-            </a:r>
-            <a:r>
-              <a:rPr lang="en-US" sz="2400" i="1" dirty="0" smtClean="0">
-                <a:latin typeface="+mn-lt"/>
-              </a:rPr>
-              <a:t>Microbiology </a:t>
-            </a:r>
-            <a:r>
-              <a:rPr lang="en-US" sz="2400" i="1" dirty="0">
-                <a:latin typeface="+mn-lt"/>
-              </a:rPr>
-              <a:t>(UK)</a:t>
-            </a:r>
-            <a:r>
-              <a:rPr lang="en-US" sz="2400" dirty="0">
-                <a:latin typeface="+mn-lt"/>
-              </a:rPr>
-              <a:t> </a:t>
-            </a:r>
-            <a:r>
-              <a:rPr lang="en-US" sz="2400" dirty="0" smtClean="0">
-                <a:latin typeface="+mn-lt"/>
-              </a:rPr>
-              <a:t>2006, 152(</a:t>
-            </a:r>
-            <a:r>
-              <a:rPr lang="en-US" sz="2400" dirty="0" err="1" smtClean="0">
-                <a:latin typeface="+mn-lt"/>
-              </a:rPr>
-              <a:t>Pt</a:t>
-            </a:r>
-            <a:r>
-              <a:rPr lang="en-US" sz="2400" dirty="0" smtClean="0">
-                <a:latin typeface="+mn-lt"/>
-              </a:rPr>
-              <a:t> </a:t>
-            </a:r>
-            <a:r>
-              <a:rPr lang="en-US" sz="2400" dirty="0">
-                <a:latin typeface="+mn-lt"/>
-              </a:rPr>
-              <a:t>9):</a:t>
-            </a:r>
-            <a:r>
-              <a:rPr lang="en-US" sz="2400" dirty="0" smtClean="0">
-                <a:latin typeface="+mn-lt"/>
-              </a:rPr>
-              <a:t>2505–14</a:t>
-            </a:r>
+              <a:t>1:183</a:t>
+            </a:r>
+            <a:endParaRPr lang="en-US" sz="2400" dirty="0">
+              <a:latin typeface="+mn-lt"/>
+            </a:endParaRPr>
           </a:p>
           <a:p>
             <a:pPr lvl="0" algn="l" rtl="0">
@@ -9071,9 +9409,87 @@
               <a:buAutoNum type="arabicPeriod"/>
             </a:pPr>
             <a:r>
+              <a:rPr lang="en-US" sz="2400" dirty="0">
+                <a:latin typeface="+mn-lt"/>
+              </a:rPr>
+              <a:t>Hall LMC, Henderson-</a:t>
+            </a:r>
+            <a:r>
+              <a:rPr lang="en-US" sz="2400" dirty="0" err="1">
+                <a:latin typeface="+mn-lt"/>
+              </a:rPr>
+              <a:t>Begg</a:t>
+            </a:r>
+            <a:r>
+              <a:rPr lang="en-US" sz="2400" dirty="0">
+                <a:latin typeface="+mn-lt"/>
+              </a:rPr>
+              <a:t> </a:t>
+            </a:r>
+            <a:r>
               <a:rPr lang="en-US" sz="2400" dirty="0" smtClean="0">
                 <a:latin typeface="+mn-lt"/>
               </a:rPr>
+              <a:t>SK. </a:t>
+            </a:r>
+            <a:r>
+              <a:rPr lang="en-US" sz="2400" i="1" dirty="0" smtClean="0">
+                <a:latin typeface="+mn-lt"/>
+              </a:rPr>
+              <a:t>Microbiology </a:t>
+            </a:r>
+            <a:r>
+              <a:rPr lang="en-US" sz="2400" i="1" dirty="0">
+                <a:latin typeface="+mn-lt"/>
+              </a:rPr>
+              <a:t>(UK)</a:t>
+            </a:r>
+            <a:r>
+              <a:rPr lang="en-US" sz="2400" dirty="0">
+                <a:latin typeface="+mn-lt"/>
+              </a:rPr>
+              <a:t> </a:t>
+            </a:r>
+            <a:r>
+              <a:rPr lang="en-US" sz="2400" dirty="0" smtClean="0">
+                <a:latin typeface="+mn-lt"/>
+              </a:rPr>
+              <a:t>2006, 152(</a:t>
+            </a:r>
+            <a:r>
+              <a:rPr lang="en-US" sz="2400" dirty="0" err="1" smtClean="0">
+                <a:latin typeface="+mn-lt"/>
+              </a:rPr>
+              <a:t>Pt</a:t>
+            </a:r>
+            <a:r>
+              <a:rPr lang="en-US" sz="2400" dirty="0" smtClean="0">
+                <a:latin typeface="+mn-lt"/>
+              </a:rPr>
+              <a:t> </a:t>
+            </a:r>
+            <a:r>
+              <a:rPr lang="en-US" sz="2400" dirty="0">
+                <a:latin typeface="+mn-lt"/>
+              </a:rPr>
+              <a:t>9):</a:t>
+            </a:r>
+            <a:r>
+              <a:rPr lang="en-US" sz="2400" dirty="0" smtClean="0">
+                <a:latin typeface="+mn-lt"/>
+              </a:rPr>
+              <a:t>2505–14</a:t>
+            </a:r>
+          </a:p>
+          <a:p>
+            <a:pPr lvl="0" algn="l" rtl="0">
+              <a:buFont typeface="+mj-lt"/>
+              <a:buAutoNum type="arabicPeriod"/>
+            </a:pPr>
+            <a:r>
+              <a:rPr lang="en-US" sz="2400" dirty="0" smtClean="0">
+                <a:latin typeface="+mn-lt"/>
+              </a:rPr>
               <a:t>Berg OG</a:t>
             </a:r>
             <a:r>
@@ -9092,7 +9508,13 @@
               <a:rPr lang="en-US" sz="2400" dirty="0" smtClean="0">
                 <a:latin typeface="+mn-lt"/>
               </a:rPr>
-              <a:t>1996. 142:1379–82</a:t>
+              <a:t>1996, </a:t>
+            </a:r>
+            <a:r>
+              <a:rPr lang="en-US" sz="2400" dirty="0" smtClean="0">
+                <a:latin typeface="+mn-lt"/>
+              </a:rPr>
+              <a:t>142:1379–82</a:t>
             </a:r>
             <a:r>
               <a:rPr lang="en-US" sz="2400" dirty="0">
@@ -9100,7 +9522,40 @@
               </a:rPr>
               <a:t>. </a:t>
             </a:r>
-            <a:endParaRPr lang="en-US" sz="2200" dirty="0">
+            <a:endParaRPr lang="en-US" sz="2400" dirty="0" smtClean="0">
+              <a:latin typeface="+mn-lt"/>
+            </a:endParaRPr>
+          </a:p>
+          <a:p>
+            <a:pPr lvl="0" algn="l" rtl="0">
+              <a:buFont typeface="+mj-lt"/>
+              <a:buAutoNum type="arabicPeriod"/>
+            </a:pPr>
+            <a:r>
+              <a:rPr lang="en-US" sz="2400" dirty="0" smtClean="0">
+                <a:latin typeface="+mn-lt"/>
+              </a:rPr>
+              <a:t>Kimura M, Maruyama T. </a:t>
+            </a:r>
+            <a:r>
+              <a:rPr lang="en-US" sz="2400" i="1" dirty="0" smtClean="0">
+                <a:latin typeface="+mn-lt"/>
+              </a:rPr>
+              <a:t>Genetics </a:t>
+            </a:r>
+            <a:r>
+              <a:rPr lang="en-US" sz="2400" dirty="0" smtClean="0">
+                <a:latin typeface="+mn-lt"/>
+              </a:rPr>
+              <a:t>1966, 54:1337–51</a:t>
+            </a:r>
+            <a:r>
+              <a:rPr lang="en-US" sz="2400" dirty="0">
+                <a:latin typeface="+mn-lt"/>
+              </a:rPr>
+              <a:t>. </a:t>
+            </a:r>
+            <a:endParaRPr lang="en-US" sz="2400" dirty="0" smtClean="0">
               <a:latin typeface="+mn-lt"/>
             </a:endParaRPr>
           </a:p>
@@ -9169,192 +9624,6 @@
           </a:p>
         </p:txBody>
       </p:sp>
-      <p:grpSp>
-        <p:nvGrpSpPr>
-          <p:cNvPr id="7" name="Group 6"/>
-          <p:cNvGrpSpPr/>
-          <p:nvPr/>
-        </p:nvGrpSpPr>
-        <p:grpSpPr>
-          <a:xfrm>
-            <a:off x="18079298" y="13825836"/>
-            <a:ext cx="6763762" cy="6624736"/>
-            <a:chOff x="20494204" y="13298937"/>
-            <a:chExt cx="6763762" cy="6624736"/>
-          </a:xfrm>
-        </p:grpSpPr>
-        <p:pic>
-          <p:nvPicPr>
-            <p:cNvPr id="17" name="Picture 13" descr="D:\university\confrences\GRC2013\fitness_landscape_analytic_model.png"/>
-            <p:cNvPicPr>
-              <a:picLocks noChangeAspect="1" noChangeArrowheads="1"/>
-            </p:cNvPicPr>
-            <p:nvPr/>
-          </p:nvPicPr>
-          <p:blipFill rotWithShape="1">
-            <a:blip r:embed="rId3">
-              <a:extLst>
-                <a:ext uri="{28A0092B-C50C-407E-A947-70E740481C1C}">
-                  <a14:useLocalDpi xmlns:a14="http://schemas.microsoft.com/office/drawing/2010/main" val="0"/>
-                </a:ext>
-              </a:extLst>
-            </a:blip>
-            <a:srcRect l="11765" r="6304"/>
-            <a:stretch/>
-          </p:blipFill>
-          <p:spPr bwMode="auto">
-            <a:xfrm>
-              <a:off x="20494204" y="13592599"/>
-              <a:ext cx="5010120" cy="6115050"/>
-            </a:xfrm>
-            <a:prstGeom prst="rect">
-              <a:avLst/>
-            </a:prstGeom>
-            <a:noFill/>
-            <a:extLst>
-              <a:ext uri="{909E8E84-426E-40DD-AFC4-6F175D3DCCD1}">
-                <a14:hiddenFill xmlns:a14="http://schemas.microsoft.com/office/drawing/2010/main">
-                  <a:solidFill>
-                    <a:srgbClr val="FFFFFF"/>
-                  </a:solidFill>
-                </a14:hiddenFill>
-              </a:ext>
-            </a:extLst>
-          </p:spPr>
-        </p:pic>
-        <p:pic>
-          <p:nvPicPr>
-            <p:cNvPr id="62" name="Picture 2" descr="D:\workspace\ruggedsim\manuscript\fitness_landscape_colorbar.png"/>
-            <p:cNvPicPr>
-              <a:picLocks noChangeAspect="1" noChangeArrowheads="1"/>
-            </p:cNvPicPr>
-            <p:nvPr/>
-          </p:nvPicPr>
-          <p:blipFill rotWithShape="1">
-            <a:blip r:embed="rId4">
-              <a:extLst>
-                <a:ext uri="{28A0092B-C50C-407E-A947-70E740481C1C}">
-                  <a14:useLocalDpi xmlns:a14="http://schemas.microsoft.com/office/drawing/2010/main" val="0"/>
-                </a:ext>
-              </a:extLst>
-            </a:blip>
-            <a:srcRect l="77619" t="5537" r="16198" b="8115"/>
-            <a:stretch/>
-          </p:blipFill>
-          <p:spPr bwMode="auto">
-            <a:xfrm>
-              <a:off x="25504324" y="13541870"/>
-              <a:ext cx="879668" cy="6381803"/>
-            </a:xfrm>
-            <a:prstGeom prst="rect">
-              <a:avLst/>
-            </a:prstGeom>
-            <a:noFill/>
-            <a:extLst>
-              <a:ext uri="{909E8E84-426E-40DD-AFC4-6F175D3DCCD1}">
-                <a14:hiddenFill xmlns:a14="http://schemas.microsoft.com/office/drawing/2010/main">
-                  <a:solidFill>
-                    <a:srgbClr val="FFFFFF"/>
-                  </a:solidFill>
-                </a14:hiddenFill>
-              </a:ext>
-            </a:extLst>
-          </p:spPr>
-        </p:pic>
-        <p:sp>
-          <p:nvSpPr>
-            <p:cNvPr id="63" name="TextBox 62"/>
-            <p:cNvSpPr txBox="1"/>
-            <p:nvPr/>
-          </p:nvSpPr>
-          <p:spPr>
-            <a:xfrm>
-              <a:off x="24271002" y="13298937"/>
-              <a:ext cx="2986964" cy="523220"/>
-            </a:xfrm>
-            <a:prstGeom prst="rect">
-              <a:avLst/>
-            </a:prstGeom>
-            <a:noFill/>
-          </p:spPr>
-          <p:txBody>
-            <a:bodyPr wrap="square" rtlCol="1">
-              <a:spAutoFit/>
-            </a:bodyPr>
-            <a:lstStyle/>
-            <a:p>
-              <a:pPr algn="ctr"/>
-              <a:r>
-                <a:rPr lang="en-US" sz="2800" dirty="0" smtClean="0"/>
-                <a:t>fitness</a:t>
-              </a:r>
-              <a:endParaRPr lang="he-IL" sz="2800" dirty="0"/>
-            </a:p>
-          </p:txBody>
-        </p:sp>
-        <p:sp>
-          <p:nvSpPr>
-            <p:cNvPr id="103" name="TextBox 102"/>
-            <p:cNvSpPr txBox="1"/>
-            <p:nvPr/>
-          </p:nvSpPr>
-          <p:spPr>
-            <a:xfrm>
-              <a:off x="21274311" y="13657642"/>
-              <a:ext cx="1519159" cy="830997"/>
-            </a:xfrm>
-            <a:prstGeom prst="rect">
-              <a:avLst/>
-            </a:prstGeom>
-            <a:noFill/>
-          </p:spPr>
-          <p:txBody>
-            <a:bodyPr wrap="square" rtlCol="1">
-              <a:spAutoFit/>
-            </a:bodyPr>
-            <a:lstStyle/>
-            <a:p>
-              <a:pPr algn="ctr" rtl="0"/>
-              <a:r>
-                <a:rPr lang="en-US" sz="4800" dirty="0" smtClean="0"/>
-                <a:t>[3]</a:t>
-              </a:r>
-              <a:endParaRPr lang="he-IL" sz="4800" dirty="0"/>
-            </a:p>
-          </p:txBody>
-        </p:sp>
-      </p:grpSp>
-      <p:sp>
-        <p:nvSpPr>
-          <p:cNvPr id="105" name="TextBox 104"/>
-          <p:cNvSpPr txBox="1"/>
-          <p:nvPr/>
-        </p:nvSpPr>
-        <p:spPr>
-          <a:xfrm>
-            <a:off x="10552779" y="11558620"/>
-            <a:ext cx="1519159" cy="830997"/>
-          </a:xfrm>
-          <a:prstGeom prst="rect">
-            <a:avLst/>
-          </a:prstGeom>
-          <a:noFill/>
-        </p:spPr>
-        <p:txBody>
-          <a:bodyPr wrap="square" rtlCol="1">
-            <a:spAutoFit/>
-          </a:bodyPr>
-          <a:lstStyle/>
-          <a:p>
-            <a:pPr rtl="0"/>
-            <a:r>
-              <a:rPr lang="en-US" sz="4800" dirty="0" smtClean="0"/>
-              <a:t>[1]</a:t>
-            </a:r>
-            <a:endParaRPr lang="he-IL" sz="4800" dirty="0"/>
-          </a:p>
-        </p:txBody>
-      </p:sp>
       <p:pic>
         <p:nvPicPr>
           <p:cNvPr id="1046" name="Picture 22" descr="D:\university\confrences\GRC2013\fitness_landscape_stochastic_model.png"/>
@@ -9364,7 +9633,7 @@
           <p:nvPr/>
         </p:nvPicPr>
         <p:blipFill>
-          <a:blip r:embed="rId5">
+          <a:blip r:embed="rId3">
             <a:extLst>
               <a:ext uri="{28A0092B-C50C-407E-A947-70E740481C1C}">
                 <a14:useLocalDpi xmlns:a14="http://schemas.microsoft.com/office/drawing/2010/main" val="0"/>
@@ -9436,7 +9705,7 @@
           <p:nvPr/>
         </p:nvPicPr>
         <p:blipFill rotWithShape="1">
-          <a:blip r:embed="rId6">
+          <a:blip r:embed="rId4">
             <a:extLst>
               <a:ext uri="{28A0092B-C50C-407E-A947-70E740481C1C}">
                 <a14:useLocalDpi xmlns:a14="http://schemas.microsoft.com/office/drawing/2010/main" val="0"/>
@@ -9506,7 +9775,7 @@
           <p:nvPr/>
         </p:nvPicPr>
         <p:blipFill>
-          <a:blip r:embed="rId7">
+          <a:blip r:embed="rId5">
             <a:extLst>
               <a:ext uri="{28A0092B-C50C-407E-A947-70E740481C1C}">
                 <a14:useLocalDpi xmlns:a14="http://schemas.microsoft.com/office/drawing/2010/main" val="0"/>
@@ -9547,7 +9816,7 @@
           <p:nvPr/>
         </p:nvPicPr>
         <p:blipFill>
-          <a:blip r:embed="rId8">
+          <a:blip r:embed="rId6">
             <a:extLst>
               <a:ext uri="{28A0092B-C50C-407E-A947-70E740481C1C}">
                 <a14:useLocalDpi xmlns:a14="http://schemas.microsoft.com/office/drawing/2010/main" val="0"/>
@@ -9609,7 +9878,7 @@
             <p:nvPr/>
           </p:nvPicPr>
           <p:blipFill>
-            <a:blip r:embed="rId9">
+            <a:blip r:embed="rId7">
               <a:extLst>
                 <a:ext uri="{28A0092B-C50C-407E-A947-70E740481C1C}">
                   <a14:useLocalDpi xmlns:a14="http://schemas.microsoft.com/office/drawing/2010/main" val="0"/>
@@ -9673,7 +9942,7 @@
             <p:nvPr/>
           </p:nvPicPr>
           <p:blipFill>
-            <a:blip r:embed="rId10">
+            <a:blip r:embed="rId8">
               <a:extLst>
                 <a:ext uri="{28A0092B-C50C-407E-A947-70E740481C1C}">
                   <a14:useLocalDpi xmlns:a14="http://schemas.microsoft.com/office/drawing/2010/main" val="0"/>
@@ -9737,7 +10006,7 @@
             <p:nvPr/>
           </p:nvPicPr>
           <p:blipFill>
-            <a:blip r:embed="rId11">
+            <a:blip r:embed="rId9">
               <a:extLst>
                 <a:ext uri="{28A0092B-C50C-407E-A947-70E740481C1C}">
                   <a14:useLocalDpi xmlns:a14="http://schemas.microsoft.com/office/drawing/2010/main" val="0"/>
@@ -9854,7 +10123,7 @@
           <p:nvPr/>
         </p:nvPicPr>
         <p:blipFill>
-          <a:blip r:embed="rId12">
+          <a:blip r:embed="rId10">
             <a:biLevel thresh="75000"/>
             <a:extLst>
               <a:ext uri="{28A0092B-C50C-407E-A947-70E740481C1C}">
@@ -9887,148 +10156,6 @@
           </a:extLst>
         </p:spPr>
       </p:pic>
-      <p:pic>
-        <p:nvPicPr>
-          <p:cNvPr id="1026" name="Picture 2" descr="D:\workspace\ruggedsim\manuscript\adaptation_rate_pop1e6_s_0.05_logN_6.png"/>
-          <p:cNvPicPr>
-            <a:picLocks noChangeAspect="1" noChangeArrowheads="1"/>
-          </p:cNvPicPr>
-          <p:nvPr/>
-        </p:nvPicPr>
-        <p:blipFill>
-          <a:blip r:embed="rId13">
-            <a:extLst>
-              <a:ext uri="{28A0092B-C50C-407E-A947-70E740481C1C}">
-                <a14:useLocalDpi xmlns:a14="http://schemas.microsoft.com/office/drawing/2010/main" val="0"/>
-              </a:ext>
-            </a:extLst>
-          </a:blip>
-          <a:srcRect/>
-          <a:stretch>
-            <a:fillRect/>
-          </a:stretch>
-        </p:blipFill>
-        <p:spPr bwMode="auto">
-          <a:xfrm>
-            <a:off x="30243660" y="9605393"/>
-            <a:ext cx="9145587" cy="7316787"/>
-          </a:xfrm>
-          <a:prstGeom prst="rect">
-            <a:avLst/>
-          </a:prstGeom>
-          <a:noFill/>
-          <a:extLst>
-            <a:ext uri="{909E8E84-426E-40DD-AFC4-6F175D3DCCD1}">
-              <a14:hiddenFill xmlns:a14="http://schemas.microsoft.com/office/drawing/2010/main">
-                <a:solidFill>
-                  <a:srgbClr val="FFFFFF"/>
-                </a:solidFill>
-              </a14:hiddenFill>
-            </a:ext>
-          </a:extLst>
-        </p:spPr>
-      </p:pic>
-      <p:pic>
-        <p:nvPicPr>
-          <p:cNvPr id="1027" name="Picture 3" descr="D:\workspace\ruggedsim\manuscript\tradeoff_s_0.05_logN_6.png"/>
-          <p:cNvPicPr>
-            <a:picLocks noChangeAspect="1" noChangeArrowheads="1"/>
-          </p:cNvPicPr>
-          <p:nvPr/>
-        </p:nvPicPr>
-        <p:blipFill rotWithShape="1">
-          <a:blip r:embed="rId14">
-            <a:extLst>
-              <a:ext uri="{28A0092B-C50C-407E-A947-70E740481C1C}">
-                <a14:useLocalDpi xmlns:a14="http://schemas.microsoft.com/office/drawing/2010/main" val="0"/>
-              </a:ext>
-            </a:extLst>
-          </a:blip>
-          <a:srcRect t="6451" b="3256"/>
-          <a:stretch/>
-        </p:blipFill>
-        <p:spPr bwMode="auto">
-          <a:xfrm>
-            <a:off x="30584972" y="18884592"/>
-            <a:ext cx="9145587" cy="6606540"/>
-          </a:xfrm>
-          <a:prstGeom prst="rect">
-            <a:avLst/>
-          </a:prstGeom>
-          <a:noFill/>
-          <a:extLst>
-            <a:ext uri="{909E8E84-426E-40DD-AFC4-6F175D3DCCD1}">
-              <a14:hiddenFill xmlns:a14="http://schemas.microsoft.com/office/drawing/2010/main">
-                <a:solidFill>
-                  <a:srgbClr val="FFFFFF"/>
-                </a:solidFill>
-              </a14:hiddenFill>
-            </a:ext>
-          </a:extLst>
-        </p:spPr>
-      </p:pic>
-      <p:sp>
-        <p:nvSpPr>
-          <p:cNvPr id="75" name="TextBox 74"/>
-          <p:cNvSpPr txBox="1"/>
-          <p:nvPr/>
-        </p:nvSpPr>
-        <p:spPr>
-          <a:xfrm>
-            <a:off x="29484080" y="9640497"/>
-            <a:ext cx="1519159" cy="830997"/>
-          </a:xfrm>
-          <a:prstGeom prst="rect">
-            <a:avLst/>
-          </a:prstGeom>
-          <a:noFill/>
-        </p:spPr>
-        <p:txBody>
-          <a:bodyPr wrap="square" rtlCol="1">
-            <a:spAutoFit/>
-          </a:bodyPr>
-          <a:lstStyle/>
-          <a:p>
-            <a:pPr algn="ctr" rtl="0"/>
-            <a:r>
-              <a:rPr lang="en-US" sz="4800" dirty="0" smtClean="0"/>
-              <a:t>[5]</a:t>
-            </a:r>
-            <a:endParaRPr lang="he-IL" sz="4800" dirty="0"/>
-          </a:p>
-        </p:txBody>
-      </p:sp>
-      <p:sp>
-        <p:nvSpPr>
-          <p:cNvPr id="76" name="TextBox 75"/>
-          <p:cNvSpPr txBox="1"/>
-          <p:nvPr/>
-        </p:nvSpPr>
-        <p:spPr>
-          <a:xfrm>
-            <a:off x="29636480" y="19348688"/>
-            <a:ext cx="1519159" cy="830997"/>
-          </a:xfrm>
-          <a:prstGeom prst="rect">
-            <a:avLst/>
-          </a:prstGeom>
-          <a:noFill/>
-        </p:spPr>
-        <p:txBody>
-          <a:bodyPr wrap="square" rtlCol="1">
-            <a:spAutoFit/>
-          </a:bodyPr>
-          <a:lstStyle/>
-          <a:p>
-            <a:pPr algn="ctr" rtl="0"/>
-            <a:r>
-              <a:rPr lang="en-US" sz="4800" dirty="0" smtClean="0"/>
-              <a:t>[6]</a:t>
-            </a:r>
-            <a:endParaRPr lang="he-IL" sz="4800" dirty="0"/>
-          </a:p>
-        </p:txBody>
-      </p:sp>
       <p:graphicFrame>
         <p:nvGraphicFramePr>
           <p:cNvPr id="77" name="Table 76"/>
@@ -10038,13 +10165,13 @@
           <p:nvPr>
             <p:extLst>
               <p:ext uri="{D42A27DB-BD31-4B8C-83A1-F6EECF244321}">
-                <p14:modId xmlns:p14="http://schemas.microsoft.com/office/powerpoint/2010/main" val="2845616467"/>
+                <p14:modId xmlns:p14="http://schemas.microsoft.com/office/powerpoint/2010/main" val="2240096178"/>
               </p:ext>
             </p:extLst>
           </p:nvPr>
         </p:nvGraphicFramePr>
         <p:xfrm>
-          <a:off x="3251397" y="21818724"/>
+          <a:off x="3251397" y="21962740"/>
           <a:ext cx="9900000" cy="3627120"/>
         </p:xfrm>
         <a:graphic>
@@ -10157,7 +10284,7 @@
                           <a:latin typeface="+mn-lt"/>
                           <a:cs typeface="Helvetica" pitchFamily="34" charset="0"/>
                         </a:rPr>
-                        <a:t>5,6</a:t>
+                        <a:t>6,7</a:t>
                       </a:r>
                       <a:endParaRPr lang="he-IL" sz="2800" dirty="0">
                         <a:latin typeface="+mn-lt"/>
@@ -10259,7 +10386,7 @@
                           <a:latin typeface="+mn-lt"/>
                           <a:cs typeface="Helvetica" pitchFamily="34" charset="0"/>
                         </a:rPr>
-                        <a:t>7</a:t>
+                        <a:t>8</a:t>
                       </a:r>
                       <a:endParaRPr lang="he-IL" sz="2800" dirty="0" smtClean="0">
                         <a:latin typeface="+mn-lt"/>
@@ -10345,8 +10472,12 @@
                           <a:latin typeface="+mn-lt"/>
                           <a:cs typeface="Helvetica" pitchFamily="34" charset="0"/>
                         </a:rPr>
-                        <a:t>7,8</a:t>
+                        <a:t>8,9</a:t>
                       </a:r>
+                      <a:endParaRPr lang="en-US" sz="2800" dirty="0" smtClean="0">
+                        <a:latin typeface="+mn-lt"/>
+                        <a:cs typeface="Helvetica" pitchFamily="34" charset="0"/>
+                      </a:endParaRPr>
                     </a:p>
                   </a:txBody>
                   <a:tcPr/>
@@ -10427,7 +10558,7 @@
                           <a:latin typeface="+mn-lt"/>
                           <a:cs typeface="Helvetica" pitchFamily="34" charset="0"/>
                         </a:rPr>
-                        <a:t>6</a:t>
+                        <a:t>7</a:t>
                       </a:r>
                       <a:endParaRPr lang="he-IL" sz="2800" dirty="0">
                         <a:latin typeface="+mn-lt"/>
@@ -10520,7 +10651,7 @@
                           <a:latin typeface="+mn-lt"/>
                           <a:cs typeface="Helvetica" pitchFamily="34" charset="0"/>
                         </a:rPr>
-                        <a:t>9</a:t>
+                        <a:t>10</a:t>
                       </a:r>
                       <a:endParaRPr lang="he-IL" sz="2800" dirty="0">
                         <a:latin typeface="+mn-lt"/>
@@ -10606,7 +10737,7 @@
                           <a:latin typeface="+mn-lt"/>
                           <a:cs typeface="Helvetica" pitchFamily="34" charset="0"/>
                         </a:rPr>
-                        <a:t>10</a:t>
+                        <a:t>11</a:t>
                       </a:r>
                       <a:endParaRPr lang="he-IL" sz="2800" dirty="0">
                         <a:latin typeface="+mn-lt"/>
@@ -10713,7 +10844,7 @@
         </p:nvSpPr>
         <p:spPr>
           <a:xfrm>
-            <a:off x="3055936" y="25717225"/>
+            <a:off x="3055936" y="25861241"/>
             <a:ext cx="10409860" cy="1070051"/>
           </a:xfrm>
           <a:prstGeom prst="rect">
@@ -10769,6 +10900,1232 @@
           </a:p>
         </p:txBody>
       </p:sp>
+      <p:grpSp>
+        <p:nvGrpSpPr>
+          <p:cNvPr id="40" name="Group 39"/>
+          <p:cNvGrpSpPr/>
+          <p:nvPr/>
+        </p:nvGrpSpPr>
+        <p:grpSpPr>
+          <a:xfrm>
+            <a:off x="4973842" y="34276108"/>
+            <a:ext cx="6763762" cy="6624736"/>
+            <a:chOff x="20494204" y="13298937"/>
+            <a:chExt cx="6763762" cy="6624736"/>
+          </a:xfrm>
+        </p:grpSpPr>
+        <p:pic>
+          <p:nvPicPr>
+            <p:cNvPr id="42" name="Picture 13" descr="D:\university\confrences\GRC2013\fitness_landscape_analytic_model.png"/>
+            <p:cNvPicPr>
+              <a:picLocks noChangeAspect="1" noChangeArrowheads="1"/>
+            </p:cNvPicPr>
+            <p:nvPr/>
+          </p:nvPicPr>
+          <p:blipFill rotWithShape="1">
+            <a:blip r:embed="rId11">
+              <a:extLst>
+                <a:ext uri="{28A0092B-C50C-407E-A947-70E740481C1C}">
+                  <a14:useLocalDpi xmlns:a14="http://schemas.microsoft.com/office/drawing/2010/main" val="0"/>
+                </a:ext>
+              </a:extLst>
+            </a:blip>
+            <a:srcRect l="11765" r="6304"/>
+            <a:stretch/>
+          </p:blipFill>
+          <p:spPr bwMode="auto">
+            <a:xfrm>
+              <a:off x="20494204" y="13592599"/>
+              <a:ext cx="5010120" cy="6115050"/>
+            </a:xfrm>
+            <a:prstGeom prst="rect">
+              <a:avLst/>
+            </a:prstGeom>
+            <a:noFill/>
+            <a:extLst>
+              <a:ext uri="{909E8E84-426E-40DD-AFC4-6F175D3DCCD1}">
+                <a14:hiddenFill xmlns:a14="http://schemas.microsoft.com/office/drawing/2010/main">
+                  <a:solidFill>
+                    <a:srgbClr val="FFFFFF"/>
+                  </a:solidFill>
+                </a14:hiddenFill>
+              </a:ext>
+            </a:extLst>
+          </p:spPr>
+        </p:pic>
+        <p:pic>
+          <p:nvPicPr>
+            <p:cNvPr id="43" name="Picture 2" descr="D:\workspace\ruggedsim\manuscript\fitness_landscape_colorbar.png"/>
+            <p:cNvPicPr>
+              <a:picLocks noChangeAspect="1" noChangeArrowheads="1"/>
+            </p:cNvPicPr>
+            <p:nvPr/>
+          </p:nvPicPr>
+          <p:blipFill rotWithShape="1">
+            <a:blip r:embed="rId12">
+              <a:extLst>
+                <a:ext uri="{28A0092B-C50C-407E-A947-70E740481C1C}">
+                  <a14:useLocalDpi xmlns:a14="http://schemas.microsoft.com/office/drawing/2010/main" val="0"/>
+                </a:ext>
+              </a:extLst>
+            </a:blip>
+            <a:srcRect l="77619" t="5537" r="16198" b="8115"/>
+            <a:stretch/>
+          </p:blipFill>
+          <p:spPr bwMode="auto">
+            <a:xfrm>
+              <a:off x="25504324" y="13541870"/>
+              <a:ext cx="879668" cy="6381803"/>
+            </a:xfrm>
+            <a:prstGeom prst="rect">
+              <a:avLst/>
+            </a:prstGeom>
+            <a:noFill/>
+            <a:extLst>
+              <a:ext uri="{909E8E84-426E-40DD-AFC4-6F175D3DCCD1}">
+                <a14:hiddenFill xmlns:a14="http://schemas.microsoft.com/office/drawing/2010/main">
+                  <a:solidFill>
+                    <a:srgbClr val="FFFFFF"/>
+                  </a:solidFill>
+                </a14:hiddenFill>
+              </a:ext>
+            </a:extLst>
+          </p:spPr>
+        </p:pic>
+        <p:sp>
+          <p:nvSpPr>
+            <p:cNvPr id="45" name="TextBox 44"/>
+            <p:cNvSpPr txBox="1"/>
+            <p:nvPr/>
+          </p:nvSpPr>
+          <p:spPr>
+            <a:xfrm>
+              <a:off x="24271002" y="13298937"/>
+              <a:ext cx="2986964" cy="523220"/>
+            </a:xfrm>
+            <a:prstGeom prst="rect">
+              <a:avLst/>
+            </a:prstGeom>
+            <a:noFill/>
+          </p:spPr>
+          <p:txBody>
+            <a:bodyPr wrap="square" rtlCol="1">
+              <a:spAutoFit/>
+            </a:bodyPr>
+            <a:lstStyle/>
+            <a:p>
+              <a:pPr algn="ctr"/>
+              <a:r>
+                <a:rPr lang="en-US" sz="2800" dirty="0" smtClean="0"/>
+                <a:t>fitness</a:t>
+              </a:r>
+              <a:endParaRPr lang="he-IL" sz="2800" dirty="0"/>
+            </a:p>
+          </p:txBody>
+        </p:sp>
+        <p:sp>
+          <p:nvSpPr>
+            <p:cNvPr id="46" name="TextBox 45"/>
+            <p:cNvSpPr txBox="1"/>
+            <p:nvPr/>
+          </p:nvSpPr>
+          <p:spPr>
+            <a:xfrm>
+              <a:off x="21274311" y="13657642"/>
+              <a:ext cx="1519159" cy="830997"/>
+            </a:xfrm>
+            <a:prstGeom prst="rect">
+              <a:avLst/>
+            </a:prstGeom>
+            <a:noFill/>
+          </p:spPr>
+          <p:txBody>
+            <a:bodyPr wrap="square" rtlCol="1">
+              <a:spAutoFit/>
+            </a:bodyPr>
+            <a:lstStyle/>
+            <a:p>
+              <a:pPr algn="ctr" rtl="0"/>
+              <a:r>
+                <a:rPr lang="en-US" sz="4800" dirty="0" smtClean="0"/>
+                <a:t>[2]</a:t>
+              </a:r>
+              <a:endParaRPr lang="he-IL" sz="4800" dirty="0"/>
+            </a:p>
+          </p:txBody>
+        </p:sp>
+      </p:grpSp>
+      <p:pic>
+        <p:nvPicPr>
+          <p:cNvPr id="9" name="Picture 4" descr="D:\workspace\ruggedsim\manuscript\tradeoff_s_0.05_logN_6.png"/>
+          <p:cNvPicPr>
+            <a:picLocks noChangeAspect="1" noChangeArrowheads="1"/>
+          </p:cNvPicPr>
+          <p:nvPr/>
+        </p:nvPicPr>
+        <p:blipFill>
+          <a:blip r:embed="rId13">
+            <a:extLst>
+              <a:ext uri="{28A0092B-C50C-407E-A947-70E740481C1C}">
+                <a14:useLocalDpi xmlns:a14="http://schemas.microsoft.com/office/drawing/2010/main" val="0"/>
+              </a:ext>
+            </a:extLst>
+          </a:blip>
+          <a:srcRect/>
+          <a:stretch>
+            <a:fillRect/>
+          </a:stretch>
+        </p:blipFill>
+        <p:spPr bwMode="auto">
+          <a:xfrm>
+            <a:off x="29595588" y="16993617"/>
+            <a:ext cx="10975976" cy="9145587"/>
+          </a:xfrm>
+          <a:prstGeom prst="rect">
+            <a:avLst/>
+          </a:prstGeom>
+          <a:noFill/>
+          <a:extLst>
+            <a:ext uri="{909E8E84-426E-40DD-AFC4-6F175D3DCCD1}">
+              <a14:hiddenFill xmlns:a14="http://schemas.microsoft.com/office/drawing/2010/main">
+                <a:solidFill>
+                  <a:srgbClr val="FFFFFF"/>
+                </a:solidFill>
+              </a14:hiddenFill>
+            </a:ext>
+          </a:extLst>
+        </p:spPr>
+      </p:pic>
+      <p:sp>
+        <p:nvSpPr>
+          <p:cNvPr id="76" name="TextBox 75"/>
+          <p:cNvSpPr txBox="1"/>
+          <p:nvPr/>
+        </p:nvSpPr>
+        <p:spPr>
+          <a:xfrm>
+            <a:off x="29163540" y="17210212"/>
+            <a:ext cx="1519159" cy="830997"/>
+          </a:xfrm>
+          <a:prstGeom prst="rect">
+            <a:avLst/>
+          </a:prstGeom>
+          <a:noFill/>
+        </p:spPr>
+        <p:txBody>
+          <a:bodyPr wrap="square" rtlCol="1">
+            <a:spAutoFit/>
+          </a:bodyPr>
+          <a:lstStyle/>
+          <a:p>
+            <a:pPr algn="ctr" rtl="0"/>
+            <a:r>
+              <a:rPr lang="en-US" sz="4800" dirty="0" smtClean="0"/>
+              <a:t>[5]</a:t>
+            </a:r>
+            <a:endParaRPr lang="he-IL" sz="4800" dirty="0"/>
+          </a:p>
+        </p:txBody>
+      </p:sp>
+      <p:pic>
+        <p:nvPicPr>
+          <p:cNvPr id="1030" name="Picture 6" descr="D:\workspace\ruggedsim\manuscript\adaptation_rate_s_0.05_logN_6.png"/>
+          <p:cNvPicPr>
+            <a:picLocks noChangeAspect="1" noChangeArrowheads="1"/>
+          </p:cNvPicPr>
+          <p:nvPr/>
+        </p:nvPicPr>
+        <p:blipFill>
+          <a:blip r:embed="rId14">
+            <a:extLst>
+              <a:ext uri="{28A0092B-C50C-407E-A947-70E740481C1C}">
+                <a14:useLocalDpi xmlns:a14="http://schemas.microsoft.com/office/drawing/2010/main" val="0"/>
+              </a:ext>
+            </a:extLst>
+          </a:blip>
+          <a:srcRect/>
+          <a:stretch>
+            <a:fillRect/>
+          </a:stretch>
+        </p:blipFill>
+        <p:spPr bwMode="auto">
+          <a:xfrm>
+            <a:off x="15960985" y="16915865"/>
+            <a:ext cx="10975975" cy="9145588"/>
+          </a:xfrm>
+          <a:prstGeom prst="rect">
+            <a:avLst/>
+          </a:prstGeom>
+          <a:noFill/>
+          <a:extLst>
+            <a:ext uri="{909E8E84-426E-40DD-AFC4-6F175D3DCCD1}">
+              <a14:hiddenFill xmlns:a14="http://schemas.microsoft.com/office/drawing/2010/main">
+                <a:solidFill>
+                  <a:srgbClr val="FFFFFF"/>
+                </a:solidFill>
+              </a14:hiddenFill>
+            </a:ext>
+          </a:extLst>
+        </p:spPr>
+      </p:pic>
+      <p:sp>
+        <p:nvSpPr>
+          <p:cNvPr id="75" name="TextBox 74"/>
+          <p:cNvSpPr txBox="1"/>
+          <p:nvPr/>
+        </p:nvSpPr>
+        <p:spPr>
+          <a:xfrm>
+            <a:off x="15698044" y="17243311"/>
+            <a:ext cx="1519159" cy="830997"/>
+          </a:xfrm>
+          <a:prstGeom prst="rect">
+            <a:avLst/>
+          </a:prstGeom>
+          <a:noFill/>
+        </p:spPr>
+        <p:txBody>
+          <a:bodyPr wrap="square" rtlCol="1">
+            <a:spAutoFit/>
+          </a:bodyPr>
+          <a:lstStyle/>
+          <a:p>
+            <a:pPr algn="ctr" rtl="0"/>
+            <a:r>
+              <a:rPr lang="en-US" sz="4800" dirty="0" smtClean="0"/>
+              <a:t>[3]</a:t>
+            </a:r>
+            <a:endParaRPr lang="he-IL" sz="4800" dirty="0"/>
+          </a:p>
+        </p:txBody>
+      </p:sp>
+      <p:grpSp>
+        <p:nvGrpSpPr>
+          <p:cNvPr id="11" name="Group 10"/>
+          <p:cNvGrpSpPr/>
+          <p:nvPr/>
+        </p:nvGrpSpPr>
+        <p:grpSpPr>
+          <a:xfrm>
+            <a:off x="2808612" y="13753828"/>
+            <a:ext cx="9361040" cy="7920880"/>
+            <a:chOff x="2880620" y="13753828"/>
+            <a:chExt cx="9361040" cy="7920880"/>
+          </a:xfrm>
+        </p:grpSpPr>
+        <p:sp>
+          <p:nvSpPr>
+            <p:cNvPr id="105" name="TextBox 104"/>
+            <p:cNvSpPr txBox="1"/>
+            <p:nvPr/>
+          </p:nvSpPr>
+          <p:spPr>
+            <a:xfrm>
+              <a:off x="2880620" y="13753828"/>
+              <a:ext cx="1519159" cy="830997"/>
+            </a:xfrm>
+            <a:prstGeom prst="rect">
+              <a:avLst/>
+            </a:prstGeom>
+            <a:noFill/>
+          </p:spPr>
+          <p:txBody>
+            <a:bodyPr wrap="square" rtlCol="1">
+              <a:spAutoFit/>
+            </a:bodyPr>
+            <a:lstStyle/>
+            <a:p>
+              <a:pPr rtl="0"/>
+              <a:r>
+                <a:rPr lang="en-US" sz="4800" dirty="0" smtClean="0"/>
+                <a:t>[1]</a:t>
+              </a:r>
+              <a:endParaRPr lang="he-IL" sz="4800" dirty="0"/>
+            </a:p>
+          </p:txBody>
+        </p:sp>
+        <p:grpSp>
+          <p:nvGrpSpPr>
+            <p:cNvPr id="10" name="Group 9"/>
+            <p:cNvGrpSpPr/>
+            <p:nvPr/>
+          </p:nvGrpSpPr>
+          <p:grpSpPr>
+            <a:xfrm>
+              <a:off x="3442771" y="13753828"/>
+              <a:ext cx="8798889" cy="7920880"/>
+              <a:chOff x="3442771" y="13753828"/>
+              <a:chExt cx="8798889" cy="7920880"/>
+            </a:xfrm>
+          </p:grpSpPr>
+          <p:grpSp>
+            <p:nvGrpSpPr>
+              <p:cNvPr id="51" name="Group 50"/>
+              <p:cNvGrpSpPr/>
+              <p:nvPr/>
+            </p:nvGrpSpPr>
+            <p:grpSpPr>
+              <a:xfrm>
+                <a:off x="4554383" y="13753828"/>
+                <a:ext cx="7687277" cy="3114674"/>
+                <a:chOff x="4296747" y="14687552"/>
+                <a:chExt cx="7687277" cy="3114674"/>
+              </a:xfrm>
+            </p:grpSpPr>
+            <p:pic>
+              <p:nvPicPr>
+                <p:cNvPr id="52" name="Picture 2" descr="http://www.adventuretrekking.org/images/Ronthipeak6065m_000.jpg"/>
+                <p:cNvPicPr>
+                  <a:picLocks noChangeAspect="1" noChangeArrowheads="1"/>
+                </p:cNvPicPr>
+                <p:nvPr/>
+              </p:nvPicPr>
+              <p:blipFill rotWithShape="1">
+                <a:blip r:embed="rId15">
+                  <a:extLst>
+                    <a:ext uri="{28A0092B-C50C-407E-A947-70E740481C1C}">
+                      <a14:useLocalDpi xmlns:a14="http://schemas.microsoft.com/office/drawing/2010/main" val="0"/>
+                    </a:ext>
+                  </a:extLst>
+                </a:blip>
+                <a:srcRect l="4786" t="16200" r="9847" b="29727"/>
+                <a:stretch/>
+              </p:blipFill>
+              <p:spPr bwMode="auto">
+                <a:xfrm>
+                  <a:off x="4296747" y="14687552"/>
+                  <a:ext cx="7687277" cy="3114674"/>
+                </a:xfrm>
+                <a:prstGeom prst="rect">
+                  <a:avLst/>
+                </a:prstGeom>
+                <a:ln>
+                  <a:noFill/>
+                </a:ln>
+                <a:effectLst>
+                  <a:outerShdw blurRad="292100" dist="139700" dir="2700000" algn="tl" rotWithShape="0">
+                    <a:srgbClr val="333333">
+                      <a:alpha val="65000"/>
+                    </a:srgbClr>
+                  </a:outerShdw>
+                </a:effectLst>
+                <a:extLst>
+                  <a:ext uri="{909E8E84-426E-40DD-AFC4-6F175D3DCCD1}">
+                    <a14:hiddenFill xmlns:a14="http://schemas.microsoft.com/office/drawing/2010/main">
+                      <a:solidFill>
+                        <a:srgbClr val="FFFFFF"/>
+                      </a:solidFill>
+                    </a14:hiddenFill>
+                  </a:ext>
+                </a:extLst>
+              </p:spPr>
+            </p:pic>
+            <p:sp>
+              <p:nvSpPr>
+                <p:cNvPr id="53" name="Oval 52"/>
+                <p:cNvSpPr/>
+                <p:nvPr/>
+              </p:nvSpPr>
+              <p:spPr>
+                <a:xfrm>
+                  <a:off x="8218365" y="14970696"/>
+                  <a:ext cx="469216" cy="469216"/>
+                </a:xfrm>
+                <a:prstGeom prst="ellipse">
+                  <a:avLst/>
+                </a:prstGeom>
+                <a:noFill/>
+                <a:ln w="76200">
+                  <a:solidFill>
+                    <a:schemeClr val="tx1"/>
+                  </a:solidFill>
+                </a:ln>
+                <a:effectLst>
+                  <a:glow rad="101600">
+                    <a:schemeClr val="accent4">
+                      <a:satMod val="175000"/>
+                      <a:alpha val="40000"/>
+                    </a:schemeClr>
+                  </a:glow>
+                </a:effectLst>
+              </p:spPr>
+              <p:style>
+                <a:lnRef idx="2">
+                  <a:schemeClr val="accent4"/>
+                </a:lnRef>
+                <a:fillRef idx="1">
+                  <a:schemeClr val="lt1"/>
+                </a:fillRef>
+                <a:effectRef idx="0">
+                  <a:schemeClr val="accent4"/>
+                </a:effectRef>
+                <a:fontRef idx="minor">
+                  <a:schemeClr val="dk1"/>
+                </a:fontRef>
+              </p:style>
+              <p:txBody>
+                <a:bodyPr rtlCol="1" anchor="ctr"/>
+                <a:lstStyle/>
+                <a:p>
+                  <a:pPr algn="ctr"/>
+                  <a:endParaRPr lang="he-IL"/>
+                </a:p>
+              </p:txBody>
+            </p:sp>
+            <p:cxnSp>
+              <p:nvCxnSpPr>
+                <p:cNvPr id="55" name="Straight Arrow Connector 54"/>
+                <p:cNvCxnSpPr/>
+                <p:nvPr/>
+              </p:nvCxnSpPr>
+              <p:spPr>
+                <a:xfrm flipV="1">
+                  <a:off x="6652997" y="15767450"/>
+                  <a:ext cx="304800" cy="380998"/>
+                </a:xfrm>
+                <a:prstGeom prst="straightConnector1">
+                  <a:avLst/>
+                </a:prstGeom>
+                <a:ln w="38100">
+                  <a:solidFill>
+                    <a:schemeClr val="tx1"/>
+                  </a:solidFill>
+                  <a:tailEnd type="arrow"/>
+                </a:ln>
+              </p:spPr>
+              <p:style>
+                <a:lnRef idx="1">
+                  <a:schemeClr val="accent1"/>
+                </a:lnRef>
+                <a:fillRef idx="0">
+                  <a:schemeClr val="accent1"/>
+                </a:fillRef>
+                <a:effectRef idx="0">
+                  <a:schemeClr val="accent1"/>
+                </a:effectRef>
+                <a:fontRef idx="minor">
+                  <a:schemeClr val="tx1"/>
+                </a:fontRef>
+              </p:style>
+            </p:cxnSp>
+            <p:cxnSp>
+              <p:nvCxnSpPr>
+                <p:cNvPr id="56" name="Straight Arrow Connector 55"/>
+                <p:cNvCxnSpPr/>
+                <p:nvPr/>
+              </p:nvCxnSpPr>
+              <p:spPr>
+                <a:xfrm flipV="1">
+                  <a:off x="6957797" y="15161534"/>
+                  <a:ext cx="1184855" cy="574134"/>
+                </a:xfrm>
+                <a:prstGeom prst="straightConnector1">
+                  <a:avLst/>
+                </a:prstGeom>
+                <a:ln w="38100">
+                  <a:solidFill>
+                    <a:schemeClr val="tx1"/>
+                  </a:solidFill>
+                  <a:tailEnd type="arrow"/>
+                </a:ln>
+              </p:spPr>
+              <p:style>
+                <a:lnRef idx="1">
+                  <a:schemeClr val="accent1"/>
+                </a:lnRef>
+                <a:fillRef idx="0">
+                  <a:schemeClr val="accent1"/>
+                </a:fillRef>
+                <a:effectRef idx="0">
+                  <a:schemeClr val="accent1"/>
+                </a:effectRef>
+                <a:fontRef idx="minor">
+                  <a:schemeClr val="tx1"/>
+                </a:fontRef>
+              </p:style>
+            </p:cxnSp>
+            <p:cxnSp>
+              <p:nvCxnSpPr>
+                <p:cNvPr id="57" name="Straight Arrow Connector 56"/>
+                <p:cNvCxnSpPr/>
+                <p:nvPr/>
+              </p:nvCxnSpPr>
+              <p:spPr>
+                <a:xfrm flipH="1" flipV="1">
+                  <a:off x="8786597" y="15161534"/>
+                  <a:ext cx="1120184" cy="986914"/>
+                </a:xfrm>
+                <a:prstGeom prst="straightConnector1">
+                  <a:avLst/>
+                </a:prstGeom>
+                <a:ln w="38100">
+                  <a:solidFill>
+                    <a:schemeClr val="tx1"/>
+                  </a:solidFill>
+                  <a:tailEnd type="arrow"/>
+                </a:ln>
+              </p:spPr>
+              <p:style>
+                <a:lnRef idx="1">
+                  <a:schemeClr val="accent1"/>
+                </a:lnRef>
+                <a:fillRef idx="0">
+                  <a:schemeClr val="accent1"/>
+                </a:fillRef>
+                <a:effectRef idx="0">
+                  <a:schemeClr val="accent1"/>
+                </a:effectRef>
+                <a:fontRef idx="minor">
+                  <a:schemeClr val="tx1"/>
+                </a:fontRef>
+              </p:style>
+            </p:cxnSp>
+            <p:cxnSp>
+              <p:nvCxnSpPr>
+                <p:cNvPr id="58" name="Straight Arrow Connector 57"/>
+                <p:cNvCxnSpPr/>
+                <p:nvPr/>
+              </p:nvCxnSpPr>
+              <p:spPr>
+                <a:xfrm flipH="1" flipV="1">
+                  <a:off x="9891756" y="16200803"/>
+                  <a:ext cx="495300" cy="433665"/>
+                </a:xfrm>
+                <a:prstGeom prst="straightConnector1">
+                  <a:avLst/>
+                </a:prstGeom>
+                <a:ln w="38100">
+                  <a:solidFill>
+                    <a:schemeClr val="tx1"/>
+                  </a:solidFill>
+                  <a:tailEnd type="arrow"/>
+                </a:ln>
+              </p:spPr>
+              <p:style>
+                <a:lnRef idx="1">
+                  <a:schemeClr val="accent1"/>
+                </a:lnRef>
+                <a:fillRef idx="0">
+                  <a:schemeClr val="accent1"/>
+                </a:fillRef>
+                <a:effectRef idx="0">
+                  <a:schemeClr val="accent1"/>
+                </a:effectRef>
+                <a:fontRef idx="minor">
+                  <a:schemeClr val="tx1"/>
+                </a:fontRef>
+              </p:style>
+            </p:cxnSp>
+            <p:cxnSp>
+              <p:nvCxnSpPr>
+                <p:cNvPr id="59" name="Straight Arrow Connector 58"/>
+                <p:cNvCxnSpPr/>
+                <p:nvPr/>
+              </p:nvCxnSpPr>
+              <p:spPr>
+                <a:xfrm flipV="1">
+                  <a:off x="4824197" y="16175551"/>
+                  <a:ext cx="1295400" cy="1084118"/>
+                </a:xfrm>
+                <a:prstGeom prst="straightConnector1">
+                  <a:avLst/>
+                </a:prstGeom>
+                <a:ln w="38100">
+                  <a:solidFill>
+                    <a:schemeClr val="tx1"/>
+                  </a:solidFill>
+                  <a:tailEnd type="arrow"/>
+                </a:ln>
+              </p:spPr>
+              <p:style>
+                <a:lnRef idx="1">
+                  <a:schemeClr val="accent1"/>
+                </a:lnRef>
+                <a:fillRef idx="0">
+                  <a:schemeClr val="accent1"/>
+                </a:fillRef>
+                <a:effectRef idx="0">
+                  <a:schemeClr val="accent1"/>
+                </a:effectRef>
+                <a:fontRef idx="minor">
+                  <a:schemeClr val="tx1"/>
+                </a:fontRef>
+              </p:style>
+            </p:cxnSp>
+            <p:cxnSp>
+              <p:nvCxnSpPr>
+                <p:cNvPr id="60" name="Straight Arrow Connector 59"/>
+                <p:cNvCxnSpPr/>
+                <p:nvPr/>
+              </p:nvCxnSpPr>
+              <p:spPr>
+                <a:xfrm flipV="1">
+                  <a:off x="6119597" y="16148449"/>
+                  <a:ext cx="533400" cy="27102"/>
+                </a:xfrm>
+                <a:prstGeom prst="straightConnector1">
+                  <a:avLst/>
+                </a:prstGeom>
+                <a:ln w="38100">
+                  <a:solidFill>
+                    <a:schemeClr val="tx1"/>
+                  </a:solidFill>
+                  <a:tailEnd type="arrow"/>
+                </a:ln>
+              </p:spPr>
+              <p:style>
+                <a:lnRef idx="1">
+                  <a:schemeClr val="accent1"/>
+                </a:lnRef>
+                <a:fillRef idx="0">
+                  <a:schemeClr val="accent1"/>
+                </a:fillRef>
+                <a:effectRef idx="0">
+                  <a:schemeClr val="accent1"/>
+                </a:effectRef>
+                <a:fontRef idx="minor">
+                  <a:schemeClr val="tx1"/>
+                </a:fontRef>
+              </p:style>
+            </p:cxnSp>
+          </p:grpSp>
+          <p:grpSp>
+            <p:nvGrpSpPr>
+              <p:cNvPr id="61" name="Group 60"/>
+              <p:cNvGrpSpPr/>
+              <p:nvPr/>
+            </p:nvGrpSpPr>
+            <p:grpSpPr>
+              <a:xfrm>
+                <a:off x="3442771" y="14721267"/>
+                <a:ext cx="689086" cy="4863401"/>
+                <a:chOff x="3199646" y="19239441"/>
+                <a:chExt cx="689086" cy="4863401"/>
+              </a:xfrm>
+            </p:grpSpPr>
+            <p:cxnSp>
+              <p:nvCxnSpPr>
+                <p:cNvPr id="64" name="Straight Arrow Connector 63"/>
+                <p:cNvCxnSpPr/>
+                <p:nvPr/>
+              </p:nvCxnSpPr>
+              <p:spPr>
+                <a:xfrm flipV="1">
+                  <a:off x="3888732" y="19239441"/>
+                  <a:ext cx="0" cy="4863401"/>
+                </a:xfrm>
+                <a:prstGeom prst="straightConnector1">
+                  <a:avLst/>
+                </a:prstGeom>
+                <a:ln w="76200">
+                  <a:tailEnd type="arrow"/>
+                </a:ln>
+              </p:spPr>
+              <p:style>
+                <a:lnRef idx="3">
+                  <a:schemeClr val="dk1"/>
+                </a:lnRef>
+                <a:fillRef idx="0">
+                  <a:schemeClr val="dk1"/>
+                </a:fillRef>
+                <a:effectRef idx="2">
+                  <a:schemeClr val="dk1"/>
+                </a:effectRef>
+                <a:fontRef idx="minor">
+                  <a:schemeClr val="tx1"/>
+                </a:fontRef>
+              </p:style>
+            </p:cxnSp>
+            <p:sp>
+              <p:nvSpPr>
+                <p:cNvPr id="65" name="TextBox 64"/>
+                <p:cNvSpPr txBox="1"/>
+                <p:nvPr/>
+              </p:nvSpPr>
+              <p:spPr>
+                <a:xfrm rot="16200000">
+                  <a:off x="1887823" y="21444745"/>
+                  <a:ext cx="3269978" cy="646331"/>
+                </a:xfrm>
+                <a:prstGeom prst="rect">
+                  <a:avLst/>
+                </a:prstGeom>
+                <a:noFill/>
+              </p:spPr>
+              <p:txBody>
+                <a:bodyPr wrap="square" rtlCol="1">
+                  <a:spAutoFit/>
+                </a:bodyPr>
+                <a:lstStyle/>
+                <a:p>
+                  <a:pPr algn="ctr"/>
+                  <a:r>
+                    <a:rPr lang="en-US" sz="3600" dirty="0" smtClean="0">
+                      <a:latin typeface="Helvetica" pitchFamily="34" charset="0"/>
+                      <a:cs typeface="Helvetica" pitchFamily="34" charset="0"/>
+                    </a:rPr>
+                    <a:t>fitness</a:t>
+                  </a:r>
+                  <a:endParaRPr lang="he-IL" sz="3600" dirty="0">
+                    <a:latin typeface="Helvetica" pitchFamily="34" charset="0"/>
+                    <a:cs typeface="Helvetica" pitchFamily="34" charset="0"/>
+                  </a:endParaRPr>
+                </a:p>
+              </p:txBody>
+            </p:sp>
+          </p:grpSp>
+          <p:grpSp>
+            <p:nvGrpSpPr>
+              <p:cNvPr id="66" name="Group 65"/>
+              <p:cNvGrpSpPr/>
+              <p:nvPr/>
+            </p:nvGrpSpPr>
+            <p:grpSpPr>
+              <a:xfrm>
+                <a:off x="6076101" y="20954629"/>
+                <a:ext cx="4863401" cy="720079"/>
+                <a:chOff x="5832976" y="24915069"/>
+                <a:chExt cx="4863401" cy="720079"/>
+              </a:xfrm>
+            </p:grpSpPr>
+            <p:cxnSp>
+              <p:nvCxnSpPr>
+                <p:cNvPr id="67" name="Straight Arrow Connector 66"/>
+                <p:cNvCxnSpPr/>
+                <p:nvPr/>
+              </p:nvCxnSpPr>
+              <p:spPr>
+                <a:xfrm rot="5400000" flipV="1">
+                  <a:off x="8264677" y="22483368"/>
+                  <a:ext cx="0" cy="4863401"/>
+                </a:xfrm>
+                <a:prstGeom prst="straightConnector1">
+                  <a:avLst/>
+                </a:prstGeom>
+                <a:ln w="76200">
+                  <a:headEnd type="arrow" w="med" len="med"/>
+                  <a:tailEnd type="arrow" w="med" len="med"/>
+                </a:ln>
+              </p:spPr>
+              <p:style>
+                <a:lnRef idx="3">
+                  <a:schemeClr val="dk1"/>
+                </a:lnRef>
+                <a:fillRef idx="0">
+                  <a:schemeClr val="dk1"/>
+                </a:fillRef>
+                <a:effectRef idx="2">
+                  <a:schemeClr val="dk1"/>
+                </a:effectRef>
+                <a:fontRef idx="minor">
+                  <a:schemeClr val="tx1"/>
+                </a:fontRef>
+              </p:style>
+            </p:cxnSp>
+            <p:sp>
+              <p:nvSpPr>
+                <p:cNvPr id="68" name="TextBox 67"/>
+                <p:cNvSpPr txBox="1"/>
+                <p:nvPr/>
+              </p:nvSpPr>
+              <p:spPr>
+                <a:xfrm>
+                  <a:off x="6532919" y="24988817"/>
+                  <a:ext cx="3269978" cy="646331"/>
+                </a:xfrm>
+                <a:prstGeom prst="rect">
+                  <a:avLst/>
+                </a:prstGeom>
+                <a:noFill/>
+              </p:spPr>
+              <p:txBody>
+                <a:bodyPr wrap="square" rtlCol="1">
+                  <a:spAutoFit/>
+                </a:bodyPr>
+                <a:lstStyle/>
+                <a:p>
+                  <a:pPr algn="ctr"/>
+                  <a:r>
+                    <a:rPr lang="en-US" sz="3600" dirty="0" smtClean="0">
+                      <a:latin typeface="Helvetica" pitchFamily="34" charset="0"/>
+                      <a:cs typeface="Helvetica" pitchFamily="34" charset="0"/>
+                    </a:rPr>
+                    <a:t>genotype</a:t>
+                  </a:r>
+                  <a:endParaRPr lang="he-IL" sz="3600" dirty="0">
+                    <a:latin typeface="Helvetica" pitchFamily="34" charset="0"/>
+                    <a:cs typeface="Helvetica" pitchFamily="34" charset="0"/>
+                  </a:endParaRPr>
+                </a:p>
+              </p:txBody>
+            </p:sp>
+          </p:grpSp>
+          <p:grpSp>
+            <p:nvGrpSpPr>
+              <p:cNvPr id="79" name="Group 78"/>
+              <p:cNvGrpSpPr/>
+              <p:nvPr/>
+            </p:nvGrpSpPr>
+            <p:grpSpPr>
+              <a:xfrm>
+                <a:off x="4563536" y="17466785"/>
+                <a:ext cx="7678124" cy="3132413"/>
+                <a:chOff x="4393814" y="15306545"/>
+                <a:chExt cx="7678124" cy="3132413"/>
+              </a:xfrm>
+            </p:grpSpPr>
+            <p:grpSp>
+              <p:nvGrpSpPr>
+                <p:cNvPr id="80" name="Group 79"/>
+                <p:cNvGrpSpPr/>
+                <p:nvPr/>
+              </p:nvGrpSpPr>
+              <p:grpSpPr>
+                <a:xfrm>
+                  <a:off x="4393814" y="15306545"/>
+                  <a:ext cx="7678124" cy="3132413"/>
+                  <a:chOff x="4300513" y="20870586"/>
+                  <a:chExt cx="7678124" cy="3132413"/>
+                </a:xfrm>
+              </p:grpSpPr>
+              <p:pic>
+                <p:nvPicPr>
+                  <p:cNvPr id="84" name="Picture 2" descr="http://upload.wikimedia.org/wikipedia/commons/2/29/Le_Dorje_Lakpa_(Himalaya,_N%C3%A9pal)_(8449549937).jpg"/>
+                  <p:cNvPicPr>
+                    <a:picLocks noChangeAspect="1" noChangeArrowheads="1"/>
+                  </p:cNvPicPr>
+                  <p:nvPr/>
+                </p:nvPicPr>
+                <p:blipFill rotWithShape="1">
+                  <a:blip r:embed="rId16">
+                    <a:extLst>
+                      <a:ext uri="{28A0092B-C50C-407E-A947-70E740481C1C}">
+                        <a14:useLocalDpi xmlns:a14="http://schemas.microsoft.com/office/drawing/2010/main" val="0"/>
+                      </a:ext>
+                    </a:extLst>
+                  </a:blip>
+                  <a:srcRect t="23545" b="22073"/>
+                  <a:stretch/>
+                </p:blipFill>
+                <p:spPr bwMode="auto">
+                  <a:xfrm>
+                    <a:off x="4300513" y="20870586"/>
+                    <a:ext cx="7678124" cy="3132413"/>
+                  </a:xfrm>
+                  <a:prstGeom prst="rect">
+                    <a:avLst/>
+                  </a:prstGeom>
+                  <a:ln>
+                    <a:noFill/>
+                  </a:ln>
+                  <a:effectLst>
+                    <a:outerShdw blurRad="292100" dist="139700" dir="2700000" algn="tl" rotWithShape="0">
+                      <a:srgbClr val="333333">
+                        <a:alpha val="65000"/>
+                      </a:srgbClr>
+                    </a:outerShdw>
+                  </a:effectLst>
+                  <a:extLst>
+                    <a:ext uri="{909E8E84-426E-40DD-AFC4-6F175D3DCCD1}">
+                      <a14:hiddenFill xmlns:a14="http://schemas.microsoft.com/office/drawing/2010/main">
+                        <a:solidFill>
+                          <a:srgbClr val="FFFFFF"/>
+                        </a:solidFill>
+                      </a14:hiddenFill>
+                    </a:ext>
+                  </a:extLst>
+                </p:spPr>
+              </p:pic>
+              <p:sp>
+                <p:nvSpPr>
+                  <p:cNvPr id="85" name="Oval 84"/>
+                  <p:cNvSpPr/>
+                  <p:nvPr/>
+                </p:nvSpPr>
+                <p:spPr>
+                  <a:xfrm>
+                    <a:off x="8594781" y="21239112"/>
+                    <a:ext cx="469216" cy="469216"/>
+                  </a:xfrm>
+                  <a:prstGeom prst="ellipse">
+                    <a:avLst/>
+                  </a:prstGeom>
+                  <a:noFill/>
+                  <a:ln w="76200">
+                    <a:solidFill>
+                      <a:schemeClr val="tx1"/>
+                    </a:solidFill>
+                  </a:ln>
+                  <a:effectLst>
+                    <a:glow rad="101600">
+                      <a:schemeClr val="accent4">
+                        <a:satMod val="175000"/>
+                        <a:alpha val="40000"/>
+                      </a:schemeClr>
+                    </a:glow>
+                  </a:effectLst>
+                </p:spPr>
+                <p:style>
+                  <a:lnRef idx="2">
+                    <a:schemeClr val="accent4"/>
+                  </a:lnRef>
+                  <a:fillRef idx="1">
+                    <a:schemeClr val="lt1"/>
+                  </a:fillRef>
+                  <a:effectRef idx="0">
+                    <a:schemeClr val="accent4"/>
+                  </a:effectRef>
+                  <a:fontRef idx="minor">
+                    <a:schemeClr val="dk1"/>
+                  </a:fontRef>
+                </p:style>
+                <p:txBody>
+                  <a:bodyPr rtlCol="1" anchor="ctr"/>
+                  <a:lstStyle/>
+                  <a:p>
+                    <a:pPr algn="ctr"/>
+                    <a:endParaRPr lang="he-IL"/>
+                  </a:p>
+                </p:txBody>
+              </p:sp>
+              <p:cxnSp>
+                <p:nvCxnSpPr>
+                  <p:cNvPr id="86" name="Straight Arrow Connector 85"/>
+                  <p:cNvCxnSpPr/>
+                  <p:nvPr/>
+                </p:nvCxnSpPr>
+                <p:spPr>
+                  <a:xfrm flipV="1">
+                    <a:off x="6105654" y="21539286"/>
+                    <a:ext cx="2402472" cy="487890"/>
+                  </a:xfrm>
+                  <a:prstGeom prst="straightConnector1">
+                    <a:avLst/>
+                  </a:prstGeom>
+                  <a:ln w="38100">
+                    <a:solidFill>
+                      <a:schemeClr val="tx1"/>
+                    </a:solidFill>
+                    <a:prstDash val="dash"/>
+                    <a:tailEnd type="arrow"/>
+                  </a:ln>
+                </p:spPr>
+                <p:style>
+                  <a:lnRef idx="1">
+                    <a:schemeClr val="accent1"/>
+                  </a:lnRef>
+                  <a:fillRef idx="0">
+                    <a:schemeClr val="accent1"/>
+                  </a:fillRef>
+                  <a:effectRef idx="0">
+                    <a:schemeClr val="accent1"/>
+                  </a:effectRef>
+                  <a:fontRef idx="minor">
+                    <a:schemeClr val="tx1"/>
+                  </a:fontRef>
+                </p:style>
+              </p:cxnSp>
+              <p:sp>
+                <p:nvSpPr>
+                  <p:cNvPr id="87" name="Oval 86"/>
+                  <p:cNvSpPr/>
+                  <p:nvPr/>
+                </p:nvSpPr>
+                <p:spPr>
+                  <a:xfrm>
+                    <a:off x="5571104" y="21932034"/>
+                    <a:ext cx="469216" cy="469216"/>
+                  </a:xfrm>
+                  <a:prstGeom prst="ellipse">
+                    <a:avLst/>
+                  </a:prstGeom>
+                  <a:noFill/>
+                  <a:ln w="76200">
+                    <a:solidFill>
+                      <a:schemeClr val="tx1"/>
+                    </a:solidFill>
+                  </a:ln>
+                  <a:effectLst>
+                    <a:glow rad="101600">
+                      <a:schemeClr val="accent4">
+                        <a:satMod val="175000"/>
+                        <a:alpha val="40000"/>
+                      </a:schemeClr>
+                    </a:glow>
+                  </a:effectLst>
+                </p:spPr>
+                <p:style>
+                  <a:lnRef idx="2">
+                    <a:schemeClr val="accent4"/>
+                  </a:lnRef>
+                  <a:fillRef idx="1">
+                    <a:schemeClr val="lt1"/>
+                  </a:fillRef>
+                  <a:effectRef idx="0">
+                    <a:schemeClr val="accent4"/>
+                  </a:effectRef>
+                  <a:fontRef idx="minor">
+                    <a:schemeClr val="dk1"/>
+                  </a:fontRef>
+                </p:style>
+                <p:txBody>
+                  <a:bodyPr rtlCol="1" anchor="ctr"/>
+                  <a:lstStyle/>
+                  <a:p>
+                    <a:pPr algn="ctr"/>
+                    <a:endParaRPr lang="he-IL"/>
+                  </a:p>
+                </p:txBody>
+              </p:sp>
+              <p:cxnSp>
+                <p:nvCxnSpPr>
+                  <p:cNvPr id="88" name="Straight Arrow Connector 87"/>
+                  <p:cNvCxnSpPr/>
+                  <p:nvPr/>
+                </p:nvCxnSpPr>
+                <p:spPr>
+                  <a:xfrm>
+                    <a:off x="6114210" y="22288527"/>
+                    <a:ext cx="961111" cy="544589"/>
+                  </a:xfrm>
+                  <a:prstGeom prst="straightConnector1">
+                    <a:avLst/>
+                  </a:prstGeom>
+                  <a:ln w="38100">
+                    <a:solidFill>
+                      <a:schemeClr val="tx1"/>
+                    </a:solidFill>
+                    <a:headEnd type="arrow"/>
+                    <a:tailEnd type="none"/>
+                  </a:ln>
+                </p:spPr>
+                <p:style>
+                  <a:lnRef idx="1">
+                    <a:schemeClr val="accent1"/>
+                  </a:lnRef>
+                  <a:fillRef idx="0">
+                    <a:schemeClr val="accent1"/>
+                  </a:fillRef>
+                  <a:effectRef idx="0">
+                    <a:schemeClr val="accent1"/>
+                  </a:effectRef>
+                  <a:fontRef idx="minor">
+                    <a:schemeClr val="tx1"/>
+                  </a:fontRef>
+                </p:style>
+              </p:cxnSp>
+            </p:grpSp>
+            <p:cxnSp>
+              <p:nvCxnSpPr>
+                <p:cNvPr id="81" name="Straight Arrow Connector 80"/>
+                <p:cNvCxnSpPr/>
+                <p:nvPr/>
+              </p:nvCxnSpPr>
+              <p:spPr>
+                <a:xfrm flipV="1">
+                  <a:off x="7168622" y="16104313"/>
+                  <a:ext cx="1432805" cy="1164762"/>
+                </a:xfrm>
+                <a:prstGeom prst="straightConnector1">
+                  <a:avLst/>
+                </a:prstGeom>
+                <a:ln w="38100">
+                  <a:solidFill>
+                    <a:schemeClr val="tx1"/>
+                  </a:solidFill>
+                  <a:tailEnd type="arrow"/>
+                </a:ln>
+              </p:spPr>
+              <p:style>
+                <a:lnRef idx="1">
+                  <a:schemeClr val="accent1"/>
+                </a:lnRef>
+                <a:fillRef idx="0">
+                  <a:schemeClr val="accent1"/>
+                </a:fillRef>
+                <a:effectRef idx="0">
+                  <a:schemeClr val="accent1"/>
+                </a:effectRef>
+                <a:fontRef idx="minor">
+                  <a:schemeClr val="tx1"/>
+                </a:fontRef>
+              </p:style>
+            </p:cxnSp>
+            <p:cxnSp>
+              <p:nvCxnSpPr>
+                <p:cNvPr id="82" name="Straight Arrow Connector 81"/>
+                <p:cNvCxnSpPr/>
+                <p:nvPr/>
+              </p:nvCxnSpPr>
+              <p:spPr>
+                <a:xfrm flipV="1">
+                  <a:off x="4393814" y="16669238"/>
+                  <a:ext cx="1174206" cy="973022"/>
+                </a:xfrm>
+                <a:prstGeom prst="straightConnector1">
+                  <a:avLst/>
+                </a:prstGeom>
+                <a:ln w="38100">
+                  <a:solidFill>
+                    <a:schemeClr val="tx1"/>
+                  </a:solidFill>
+                  <a:tailEnd type="arrow"/>
+                </a:ln>
+              </p:spPr>
+              <p:style>
+                <a:lnRef idx="1">
+                  <a:schemeClr val="accent1"/>
+                </a:lnRef>
+                <a:fillRef idx="0">
+                  <a:schemeClr val="accent1"/>
+                </a:fillRef>
+                <a:effectRef idx="0">
+                  <a:schemeClr val="accent1"/>
+                </a:effectRef>
+                <a:fontRef idx="minor">
+                  <a:schemeClr val="tx1"/>
+                </a:fontRef>
+              </p:style>
+            </p:cxnSp>
+            <p:cxnSp>
+              <p:nvCxnSpPr>
+                <p:cNvPr id="83" name="Straight Arrow Connector 82"/>
+                <p:cNvCxnSpPr/>
+                <p:nvPr/>
+              </p:nvCxnSpPr>
+              <p:spPr>
+                <a:xfrm flipH="1" flipV="1">
+                  <a:off x="9277601" y="15975246"/>
+                  <a:ext cx="598699" cy="693166"/>
+                </a:xfrm>
+                <a:prstGeom prst="straightConnector1">
+                  <a:avLst/>
+                </a:prstGeom>
+                <a:ln w="38100">
+                  <a:solidFill>
+                    <a:schemeClr val="tx1"/>
+                  </a:solidFill>
+                  <a:tailEnd type="arrow"/>
+                </a:ln>
+              </p:spPr>
+              <p:style>
+                <a:lnRef idx="1">
+                  <a:schemeClr val="accent1"/>
+                </a:lnRef>
+                <a:fillRef idx="0">
+                  <a:schemeClr val="accent1"/>
+                </a:fillRef>
+                <a:effectRef idx="0">
+                  <a:schemeClr val="accent1"/>
+                </a:effectRef>
+                <a:fontRef idx="minor">
+                  <a:schemeClr val="tx1"/>
+                </a:fontRef>
+              </p:style>
+            </p:cxnSp>
+          </p:grpSp>
+        </p:grpSp>
+      </p:grpSp>
     </p:spTree>
     <p:extLst>
       <p:ext uri="{BB962C8B-B14F-4D97-AF65-F5344CB8AC3E}">

</xml_diff>

<commit_message>
revised fitness landscape figures
</commit_message>
<xml_diff>
--- a/poster.pptx
+++ b/poster.pptx
@@ -5642,28 +5642,10 @@
                 </a:solidFill>
                 <a:latin typeface="+mn-lt"/>
               </a:rPr>
-              <a:t>multi-locus Wright-Fisher simulations</a:t>
-            </a:r>
-            <a:r>
-              <a:rPr lang="en-US" sz="2800" kern="0" dirty="0" smtClean="0">
-                <a:solidFill>
-                  <a:srgbClr val="000000"/>
-                </a:solidFill>
-                <a:latin typeface="+mn-lt"/>
-              </a:rPr>
-              <a:t>. The major difference from </a:t>
-            </a:r>
-            <a:r>
-              <a:rPr lang="en-GB" sz="2800" kern="0" dirty="0" smtClean="0">
-                <a:solidFill>
-                  <a:srgbClr val="000000"/>
-                </a:solidFill>
-                <a:latin typeface="+mn-lt"/>
-              </a:rPr>
-              <a:t>Figure 3 is that nodes also specify the  </a:t>
-            </a:r>
-            <a:r>
-              <a:rPr lang="en-GB" sz="2800" b="1" kern="0" dirty="0">
+              <a:t>multi-locus Wright-Fisher </a:t>
+            </a:r>
+            <a:r>
+              <a:rPr lang="en-US" sz="2800" b="1" kern="0" dirty="0" smtClean="0">
                 <a:solidFill>
                   <a:schemeClr val="accent1">
                     <a:lumMod val="75000"/>
@@ -5671,7 +5653,45 @@
                 </a:solidFill>
                 <a:latin typeface="+mn-lt"/>
               </a:rPr>
-              <a:t>number of deleterious mutations after the forward slash</a:t>
+              <a:t>simulations</a:t>
+            </a:r>
+            <a:r>
+              <a:rPr lang="en-US" sz="2800" kern="0" dirty="0" smtClean="0">
+                <a:solidFill>
+                  <a:srgbClr val="000000"/>
+                </a:solidFill>
+                <a:latin typeface="+mn-lt"/>
+              </a:rPr>
+              <a:t>, which </a:t>
+            </a:r>
+            <a:r>
+              <a:rPr lang="en-US" sz="2800" kern="0" dirty="0" smtClean="0">
+                <a:solidFill>
+                  <a:srgbClr val="000000"/>
+                </a:solidFill>
+                <a:latin typeface="+mn-lt"/>
+              </a:rPr>
+              <a:t>also account for </a:t>
+            </a:r>
+            <a:r>
+              <a:rPr lang="en-GB" sz="2800" b="1" kern="0" dirty="0" smtClean="0">
+                <a:solidFill>
+                  <a:schemeClr val="accent1">
+                    <a:lumMod val="75000"/>
+                  </a:schemeClr>
+                </a:solidFill>
+                <a:latin typeface="+mn-lt"/>
+              </a:rPr>
+              <a:t>genotypes with deleterious mutations</a:t>
+            </a:r>
+            <a:r>
+              <a:rPr lang="en-GB" sz="2800" kern="0" dirty="0">
+                <a:solidFill>
+                  <a:srgbClr val="000000"/>
+                </a:solidFill>
+                <a:latin typeface="+mn-lt"/>
+              </a:rPr>
+              <a:t> </a:t>
             </a:r>
             <a:r>
               <a:rPr lang="en-GB" sz="2800" kern="0" dirty="0" smtClean="0">
@@ -5680,7 +5700,43 @@
                 </a:solidFill>
                 <a:latin typeface="+mn-lt"/>
               </a:rPr>
-              <a:t>. The figure shows as much as three mutations for simplicity; the simulations had as much as 25.</a:t>
+              <a:t>– denoted by the number after the slash. The </a:t>
+            </a:r>
+            <a:r>
+              <a:rPr lang="en-GB" sz="2800" kern="0" dirty="0" smtClean="0">
+                <a:solidFill>
+                  <a:srgbClr val="000000"/>
+                </a:solidFill>
+                <a:latin typeface="+mn-lt"/>
+              </a:rPr>
+              <a:t>figure shows </a:t>
+            </a:r>
+            <a:r>
+              <a:rPr lang="en-GB" sz="2800" kern="0" dirty="0" smtClean="0">
+                <a:solidFill>
+                  <a:srgbClr val="000000"/>
+                </a:solidFill>
+                <a:latin typeface="+mn-lt"/>
+              </a:rPr>
+              <a:t>up to three </a:t>
+            </a:r>
+            <a:r>
+              <a:rPr lang="en-GB" sz="2800" kern="0" dirty="0" smtClean="0">
+                <a:solidFill>
+                  <a:srgbClr val="000000"/>
+                </a:solidFill>
+                <a:latin typeface="+mn-lt"/>
+              </a:rPr>
+              <a:t>mutations for simplicity; the simulations </a:t>
+            </a:r>
+            <a:r>
+              <a:rPr lang="en-GB" sz="2800" kern="0" dirty="0" smtClean="0">
+                <a:solidFill>
+                  <a:srgbClr val="000000"/>
+                </a:solidFill>
+                <a:latin typeface="+mn-lt"/>
+              </a:rPr>
+              <a:t>has up to 25. </a:t>
             </a:r>
             <a:endParaRPr lang="en-US" sz="2800" kern="0" dirty="0" smtClean="0">
               <a:solidFill>
@@ -7028,8 +7084,41 @@
                 </a:solidFill>
                 <a:latin typeface="+mn-lt"/>
               </a:rPr>
-              <a:t>) analytic model of adaptation in a rugged fitness landscape. </a:t>
-            </a:r>
+              <a:t>) </a:t>
+            </a:r>
+            <a:r>
+              <a:rPr lang="en-US" sz="2800" kern="0" dirty="0" smtClean="0">
+                <a:solidFill>
+                  <a:srgbClr val="000000"/>
+                </a:solidFill>
+                <a:latin typeface="+mn-lt"/>
+              </a:rPr>
+              <a:t>model </a:t>
+            </a:r>
+            <a:r>
+              <a:rPr lang="en-US" sz="2800" kern="0" dirty="0">
+                <a:solidFill>
+                  <a:srgbClr val="000000"/>
+                </a:solidFill>
+                <a:latin typeface="+mn-lt"/>
+              </a:rPr>
+              <a:t>of </a:t>
+            </a:r>
+            <a:r>
+              <a:rPr lang="en-US" sz="2800" kern="0" dirty="0" smtClean="0">
+                <a:solidFill>
+                  <a:srgbClr val="000000"/>
+                </a:solidFill>
+                <a:latin typeface="+mn-lt"/>
+              </a:rPr>
+              <a:t>complex adaptation. </a:t>
+            </a:r>
+            <a:endParaRPr lang="en-US" sz="2800" kern="0" dirty="0">
+              <a:solidFill>
+                <a:srgbClr val="000000"/>
+              </a:solidFill>
+              <a:latin typeface="+mn-lt"/>
+            </a:endParaRPr>
           </a:p>
           <a:p>
             <a:pPr indent="205704" algn="l" defTabSz="908920" rtl="0">
@@ -7076,13 +7165,13 @@
               <a:t> is the wildtype</a:t>
             </a:r>
             <a:r>
-              <a:rPr lang="en-US" sz="2800" kern="0" dirty="0">
+              <a:rPr lang="en-US" sz="2800" kern="0" dirty="0" smtClean="0">
                 <a:solidFill>
                   <a:srgbClr val="000000"/>
                 </a:solidFill>
                 <a:latin typeface="+mn-lt"/>
               </a:rPr>
-              <a:t>, </a:t>
+              <a:t>, or local adaptive peak, </a:t>
             </a:r>
             <a:r>
               <a:rPr lang="en-US" sz="2800" b="1" i="1" kern="0" dirty="0">
@@ -7104,28 +7193,10 @@
                 </a:solidFill>
                 <a:latin typeface="+mn-lt"/>
               </a:rPr>
-              <a:t> is the adaptive peak</a:t>
-            </a:r>
-            <a:r>
-              <a:rPr lang="en-US" sz="2800" b="1" kern="0" dirty="0">
-                <a:solidFill>
-                  <a:srgbClr val="000000"/>
-                </a:solidFill>
-                <a:latin typeface="+mn-lt"/>
-              </a:rPr>
               <a:t> </a:t>
             </a:r>
             <a:r>
-              <a:rPr lang="en-US" sz="2800" kern="0" dirty="0">
-                <a:solidFill>
-                  <a:srgbClr val="000000"/>
-                </a:solidFill>
-                <a:latin typeface="+mn-lt"/>
-              </a:rPr>
-              <a:t>with the highest fitness, and the single mutants </a:t>
-            </a:r>
-            <a:r>
-              <a:rPr lang="en-US" sz="2800" b="1" i="1" kern="0" dirty="0" err="1">
+              <a:rPr lang="en-US" sz="2800" b="1" kern="0" dirty="0" smtClean="0">
                 <a:solidFill>
                   <a:schemeClr val="accent1">
                     <a:lumMod val="75000"/>
@@ -7133,10 +7204,10 @@
                 </a:solidFill>
                 <a:latin typeface="+mn-lt"/>
               </a:rPr>
-              <a:t>Ab</a:t>
-            </a:r>
-            <a:r>
-              <a:rPr lang="en-US" sz="2800" b="1" i="1" kern="0" dirty="0">
+              <a:t>is </a:t>
+            </a:r>
+            <a:r>
+              <a:rPr lang="en-US" sz="2800" b="1" kern="0" dirty="0">
                 <a:solidFill>
                   <a:schemeClr val="accent1">
                     <a:lumMod val="75000"/>
@@ -7144,10 +7215,10 @@
                 </a:solidFill>
                 <a:latin typeface="+mn-lt"/>
               </a:rPr>
-              <a:t> </a:t>
-            </a:r>
-            <a:r>
-              <a:rPr lang="en-US" sz="2800" b="1" kern="0" dirty="0">
+              <a:t>the </a:t>
+            </a:r>
+            <a:r>
+              <a:rPr lang="en-US" sz="2800" b="1" kern="0" dirty="0" smtClean="0">
                 <a:solidFill>
                   <a:schemeClr val="accent1">
                     <a:lumMod val="75000"/>
@@ -7155,7 +7226,34 @@
                 </a:solidFill>
                 <a:latin typeface="+mn-lt"/>
               </a:rPr>
-              <a:t>and </a:t>
+              <a:t>global adaptive peak</a:t>
+            </a:r>
+            <a:r>
+              <a:rPr lang="en-US" sz="2800" b="1" kern="0" dirty="0" smtClean="0">
+                <a:solidFill>
+                  <a:srgbClr val="000000"/>
+                </a:solidFill>
+                <a:latin typeface="+mn-lt"/>
+              </a:rPr>
+              <a:t> </a:t>
+            </a:r>
+            <a:r>
+              <a:rPr lang="en-US" sz="2800" kern="0" dirty="0" smtClean="0">
+                <a:solidFill>
+                  <a:srgbClr val="000000"/>
+                </a:solidFill>
+                <a:latin typeface="+mn-lt"/>
+              </a:rPr>
+              <a:t>with the highest fitness, </a:t>
+            </a:r>
+            <a:r>
+              <a:rPr lang="en-US" sz="2800" kern="0" dirty="0">
+                <a:solidFill>
+                  <a:srgbClr val="000000"/>
+                </a:solidFill>
+                <a:latin typeface="+mn-lt"/>
+              </a:rPr>
+              <a:t>and the single mutants </a:t>
             </a:r>
             <a:r>
               <a:rPr lang="en-US" sz="2800" b="1" i="1" kern="0" dirty="0" err="1">
@@ -7166,7 +7264,7 @@
                 </a:solidFill>
                 <a:latin typeface="+mn-lt"/>
               </a:rPr>
-              <a:t>aB</a:t>
+              <a:t>Ab</a:t>
             </a:r>
             <a:r>
               <a:rPr lang="en-US" sz="2800" b="1" i="1" kern="0" dirty="0">
@@ -7188,6 +7286,39 @@
                 </a:solidFill>
                 <a:latin typeface="+mn-lt"/>
               </a:rPr>
+              <a:t>and </a:t>
+            </a:r>
+            <a:r>
+              <a:rPr lang="en-US" sz="2800" b="1" i="1" kern="0" dirty="0" err="1">
+                <a:solidFill>
+                  <a:schemeClr val="accent1">
+                    <a:lumMod val="75000"/>
+                  </a:schemeClr>
+                </a:solidFill>
+                <a:latin typeface="+mn-lt"/>
+              </a:rPr>
+              <a:t>aB</a:t>
+            </a:r>
+            <a:r>
+              <a:rPr lang="en-US" sz="2800" b="1" i="1" kern="0" dirty="0">
+                <a:solidFill>
+                  <a:schemeClr val="accent1">
+                    <a:lumMod val="75000"/>
+                  </a:schemeClr>
+                </a:solidFill>
+                <a:latin typeface="+mn-lt"/>
+              </a:rPr>
+              <a:t> </a:t>
+            </a:r>
+            <a:r>
+              <a:rPr lang="en-US" sz="2800" b="1" kern="0" dirty="0">
+                <a:solidFill>
+                  <a:schemeClr val="accent1">
+                    <a:lumMod val="75000"/>
+                  </a:schemeClr>
+                </a:solidFill>
+                <a:latin typeface="+mn-lt"/>
+              </a:rPr>
               <a:t>are adaptive valleys </a:t>
             </a:r>
             <a:r>
@@ -7197,7 +7328,43 @@
                 </a:solidFill>
                 <a:latin typeface="+mn-lt"/>
               </a:rPr>
-              <a:t>with fitness lower than the wildtype - the darker the color the lower the fitness. “RIP” represents genotypes with deleterious mutations that will not contribute to adaptation (“the living dead”). </a:t>
+              <a:t>with fitness lower than the wildtype - </a:t>
+            </a:r>
+            <a:r>
+              <a:rPr lang="en-US" sz="2800" b="1" kern="0" dirty="0">
+                <a:solidFill>
+                  <a:srgbClr val="000000"/>
+                </a:solidFill>
+                <a:latin typeface="+mn-lt"/>
+              </a:rPr>
+              <a:t>the darker the color the lower the fitness</a:t>
+            </a:r>
+            <a:r>
+              <a:rPr lang="en-US" sz="2800" kern="0" dirty="0">
+                <a:solidFill>
+                  <a:srgbClr val="000000"/>
+                </a:solidFill>
+                <a:latin typeface="+mn-lt"/>
+              </a:rPr>
+              <a:t>. “RIP” represents genotypes with deleterious mutations that will not contribute to adaptation (</a:t>
+            </a:r>
+            <a:r>
+              <a:rPr lang="en-US" sz="2800" b="1" kern="0" dirty="0">
+                <a:solidFill>
+                  <a:srgbClr val="000000"/>
+                </a:solidFill>
+                <a:latin typeface="+mn-lt"/>
+              </a:rPr>
+              <a:t>“the living dead”</a:t>
+            </a:r>
+            <a:r>
+              <a:rPr lang="en-US" sz="2800" kern="0" dirty="0">
+                <a:solidFill>
+                  <a:srgbClr val="000000"/>
+                </a:solidFill>
+                <a:latin typeface="+mn-lt"/>
+              </a:rPr>
+              <a:t>). </a:t>
             </a:r>
           </a:p>
           <a:p>
@@ -7225,83 +7392,33 @@
             <a:r>
               <a:rPr lang="en-US" sz="2800" b="1" i="1" kern="0" dirty="0">
                 <a:solidFill>
+                  <a:schemeClr val="accent1">
+                    <a:lumMod val="75000"/>
+                  </a:schemeClr>
+                </a:solidFill>
+                <a:latin typeface="+mn-lt"/>
+              </a:rPr>
+              <a:t>U for background deleterious mutation </a:t>
+            </a:r>
+            <a:r>
+              <a:rPr lang="en-US" sz="2800" kern="0" dirty="0">
+                <a:solidFill>
                   <a:srgbClr val="000000"/>
                 </a:solidFill>
                 <a:latin typeface="+mn-lt"/>
               </a:rPr>
-              <a:t>U</a:t>
-            </a:r>
-            <a:r>
-              <a:rPr lang="en-US" sz="2800" b="1" kern="0" dirty="0">
-                <a:solidFill>
-                  <a:srgbClr val="000000"/>
-                </a:solidFill>
-                <a:latin typeface="+mn-lt"/>
-              </a:rPr>
-              <a:t> for background deleterious mutation </a:t>
-            </a:r>
-            <a:r>
-              <a:rPr lang="en-US" sz="2800" kern="0" dirty="0">
-                <a:solidFill>
-                  <a:srgbClr val="000000"/>
-                </a:solidFill>
-                <a:latin typeface="+mn-lt"/>
-              </a:rPr>
               <a:t>(dashed lines) and </a:t>
             </a:r>
             <a:r>
               <a:rPr lang="en-US" sz="2800" b="1" i="1" kern="0" dirty="0">
                 <a:solidFill>
-                  <a:srgbClr val="000000"/>
-                </a:solidFill>
-                <a:latin typeface="+mn-lt"/>
-              </a:rPr>
-              <a:t>µ</a:t>
-            </a:r>
-            <a:r>
-              <a:rPr lang="en-US" sz="2800" b="1" kern="0" dirty="0">
-                <a:solidFill>
-                  <a:srgbClr val="000000"/>
-                </a:solidFill>
-                <a:latin typeface="+mn-lt"/>
-              </a:rPr>
-              <a:t> for mutations in the </a:t>
-            </a:r>
-            <a:r>
-              <a:rPr lang="en-US" sz="2800" b="1" i="1" kern="0" dirty="0">
-                <a:solidFill>
-                  <a:srgbClr val="000000"/>
-                </a:solidFill>
-                <a:latin typeface="+mn-lt"/>
-              </a:rPr>
-              <a:t>A/a </a:t>
-            </a:r>
-            <a:r>
-              <a:rPr lang="en-US" sz="2800" b="1" kern="0" dirty="0">
-                <a:solidFill>
-                  <a:srgbClr val="000000"/>
-                </a:solidFill>
-                <a:latin typeface="+mn-lt"/>
-              </a:rPr>
-              <a:t>and </a:t>
-            </a:r>
-            <a:r>
-              <a:rPr lang="en-US" sz="2800" b="1" i="1" kern="0" dirty="0">
-                <a:solidFill>
-                  <a:srgbClr val="000000"/>
-                </a:solidFill>
-                <a:latin typeface="+mn-lt"/>
-              </a:rPr>
-              <a:t>B/b </a:t>
-            </a:r>
-            <a:r>
-              <a:rPr lang="en-US" sz="2800" b="1" kern="0" dirty="0">
-                <a:solidFill>
-                  <a:srgbClr val="000000"/>
-                </a:solidFill>
-                <a:latin typeface="+mn-lt"/>
-              </a:rPr>
-              <a:t>loci </a:t>
+                  <a:schemeClr val="accent1">
+                    <a:lumMod val="75000"/>
+                  </a:schemeClr>
+                </a:solidFill>
+                <a:latin typeface="+mn-lt"/>
+              </a:rPr>
+              <a:t>µ for mutations in the A/a and B/b loci </a:t>
             </a:r>
             <a:r>
               <a:rPr lang="en-US" sz="2800" kern="0" dirty="0">
@@ -7566,7 +7683,7 @@
                   <a:t>The adaptation rate </a:t>
                 </a:r>
                 <a:r>
-                  <a:rPr lang="el-GR" b="1" kern="0" dirty="0">
+                  <a:rPr lang="el-GR" b="1" i="1" kern="0" dirty="0">
                     <a:solidFill>
                       <a:srgbClr val="C0504D"/>
                     </a:solidFill>
@@ -7607,6 +7724,17 @@
                 <a:pPr indent="205704" algn="l" defTabSz="908920" rtl="0">
                   <a:defRPr/>
                 </a:pPr>
+                <a:endParaRPr lang="en-US" sz="2800" kern="0" dirty="0">
+                  <a:solidFill>
+                    <a:srgbClr val="000000"/>
+                  </a:solidFill>
+                  <a:latin typeface="+mn-lt"/>
+                </a:endParaRPr>
+              </a:p>
+              <a:p>
+                <a:pPr indent="205704" algn="l" defTabSz="908920" rtl="0">
+                  <a:defRPr/>
+                </a:pPr>
                 <a:endParaRPr lang="en-US" sz="2800" kern="0" dirty="0" smtClean="0">
                   <a:solidFill>
                     <a:srgbClr val="000000"/>
@@ -7638,14 +7766,14 @@
                       <m:sSub>
                         <m:sSubPr>
                           <m:ctrlPr>
-                            <a:rPr lang="en-US" sz="2800" i="1">
+                            <a:rPr lang="en-US" sz="3600" i="1">
                               <a:latin typeface="Cambria Math"/>
                             </a:rPr>
                           </m:ctrlPr>
                         </m:sSubPr>
                         <m:e>
                           <m:r>
-                            <a:rPr lang="en-US" sz="2800" i="1">
+                            <a:rPr lang="en-US" sz="3600" i="1">
                               <a:latin typeface="Cambria Math"/>
                             </a:rPr>
                             <m:t>𝜈</m:t>
@@ -7653,7 +7781,7 @@
                         </m:e>
                         <m:sub>
                           <m:r>
-                            <a:rPr lang="en-US" sz="2800" i="1">
+                            <a:rPr lang="en-US" sz="3600" i="1">
                               <a:latin typeface="Cambria Math"/>
                             </a:rPr>
                             <m:t>𝑁𝑀</m:t>
@@ -7661,19 +7789,19 @@
                         </m:sub>
                       </m:sSub>
                       <m:r>
-                        <a:rPr lang="en-US" sz="2800" i="1">
+                        <a:rPr lang="en-US" sz="3600" i="1">
                           <a:latin typeface="Cambria Math"/>
                         </a:rPr>
                         <m:t>≈</m:t>
                       </m:r>
                       <m:r>
-                        <a:rPr lang="en-US" sz="2800" i="1">
+                        <a:rPr lang="en-US" sz="3600" i="1">
                           <a:latin typeface="Cambria Math"/>
                         </a:rPr>
                         <m:t>2</m:t>
                       </m:r>
                       <m:r>
-                        <a:rPr lang="en-US" sz="2800" i="1">
+                        <a:rPr lang="en-US" sz="3600" i="1">
                           <a:latin typeface="Cambria Math"/>
                         </a:rPr>
                         <m:t>𝑁𝐻</m:t>
@@ -7681,14 +7809,14 @@
                       <m:sSup>
                         <m:sSupPr>
                           <m:ctrlPr>
-                            <a:rPr lang="en-US" sz="2800" i="1">
+                            <a:rPr lang="en-US" sz="3600" i="1">
                               <a:latin typeface="Cambria Math"/>
                             </a:rPr>
                           </m:ctrlPr>
                         </m:sSupPr>
                         <m:e>
                           <m:r>
-                            <a:rPr lang="en-US" sz="2800" i="1">
+                            <a:rPr lang="en-US" sz="3600" i="1">
                               <a:latin typeface="Cambria Math"/>
                             </a:rPr>
                             <m:t>𝜇</m:t>
@@ -7696,7 +7824,7 @@
                         </m:e>
                         <m:sup>
                           <m:r>
-                            <a:rPr lang="en-US" sz="2800" i="1">
+                            <a:rPr lang="en-US" sz="3600" i="1">
                               <a:latin typeface="Cambria Math"/>
                             </a:rPr>
                             <m:t>2</m:t>
@@ -7706,26 +7834,26 @@
                       <m:d>
                         <m:dPr>
                           <m:ctrlPr>
-                            <a:rPr lang="en-US" sz="2800" i="1">
+                            <a:rPr lang="en-US" sz="3600" i="1">
                               <a:latin typeface="Cambria Math"/>
                             </a:rPr>
                           </m:ctrlPr>
                         </m:dPr>
                         <m:e>
                           <m:r>
-                            <a:rPr lang="en-US" sz="2800" i="1">
+                            <a:rPr lang="en-US" sz="3600" i="1">
                               <a:latin typeface="Cambria Math"/>
                             </a:rPr>
                             <m:t>1</m:t>
                           </m:r>
                           <m:r>
-                            <a:rPr lang="en-US" sz="2800" i="1">
+                            <a:rPr lang="en-US" sz="3600" i="1">
                               <a:latin typeface="Cambria Math"/>
                             </a:rPr>
                             <m:t>−</m:t>
                           </m:r>
                           <m:r>
-                            <a:rPr lang="en-US" sz="2800" i="1">
+                            <a:rPr lang="en-US" sz="3600" i="1">
                               <a:latin typeface="Cambria Math"/>
                             </a:rPr>
                             <m:t>𝑈</m:t>
@@ -7735,26 +7863,26 @@
                       <m:d>
                         <m:dPr>
                           <m:ctrlPr>
-                            <a:rPr lang="en-US" sz="2800" i="1">
+                            <a:rPr lang="en-US" sz="3600" i="1">
                               <a:latin typeface="Cambria Math"/>
                             </a:rPr>
                           </m:ctrlPr>
                         </m:dPr>
                         <m:e>
                           <m:r>
-                            <a:rPr lang="en-US" sz="2800" i="1">
+                            <a:rPr lang="en-US" sz="3600" i="1">
                               <a:latin typeface="Cambria Math"/>
                             </a:rPr>
                             <m:t>2</m:t>
                           </m:r>
                           <m:r>
-                            <a:rPr lang="en-US" sz="2800" i="1">
+                            <a:rPr lang="en-US" sz="3600" i="1">
                               <a:latin typeface="Cambria Math"/>
                             </a:rPr>
                             <m:t>−</m:t>
                           </m:r>
                           <m:r>
-                            <a:rPr lang="en-US" sz="2800" i="1">
+                            <a:rPr lang="en-US" sz="3600" i="1">
                               <a:latin typeface="Cambria Math"/>
                             </a:rPr>
                             <m:t>𝑈</m:t>
@@ -7762,19 +7890,19 @@
                         </m:e>
                       </m:d>
                       <m:r>
-                        <a:rPr lang="en-US" sz="2800" i="1">
+                        <a:rPr lang="en-US" sz="3600" i="1">
                           <a:latin typeface="Cambria Math"/>
                         </a:rPr>
                         <m:t>≈</m:t>
                       </m:r>
                       <m:r>
-                        <a:rPr lang="en-US" sz="2800" i="1">
+                        <a:rPr lang="en-US" sz="3600" i="1">
                           <a:latin typeface="Cambria Math"/>
                         </a:rPr>
                         <m:t>4</m:t>
                       </m:r>
                       <m:r>
-                        <a:rPr lang="en-US" sz="2800" i="1">
+                        <a:rPr lang="en-US" sz="3600" i="1">
                           <a:latin typeface="Cambria Math"/>
                         </a:rPr>
                         <m:t>𝑁𝐻</m:t>
@@ -7782,14 +7910,14 @@
                       <m:sSup>
                         <m:sSupPr>
                           <m:ctrlPr>
-                            <a:rPr lang="en-US" sz="2800" i="1">
+                            <a:rPr lang="en-US" sz="3600" i="1">
                               <a:latin typeface="Cambria Math"/>
                             </a:rPr>
                           </m:ctrlPr>
                         </m:sSupPr>
                         <m:e>
                           <m:r>
-                            <a:rPr lang="en-US" sz="2800" i="1">
+                            <a:rPr lang="en-US" sz="3600" i="1">
                               <a:latin typeface="Cambria Math"/>
                             </a:rPr>
                             <m:t>𝜇</m:t>
@@ -7797,7 +7925,7 @@
                         </m:e>
                         <m:sup>
                           <m:r>
-                            <a:rPr lang="en-US" sz="2800" i="1">
+                            <a:rPr lang="en-US" sz="3600" i="1">
                               <a:latin typeface="Cambria Math"/>
                             </a:rPr>
                             <m:t>2</m:t>
@@ -7807,7 +7935,7 @@
                     </m:oMath>
                   </m:oMathPara>
                 </a14:m>
-                <a:endParaRPr lang="en-US" sz="2800" dirty="0" smtClean="0">
+                <a:endParaRPr lang="en-US" sz="3600" dirty="0" smtClean="0">
                   <a:latin typeface="+mn-lt"/>
                 </a:endParaRPr>
               </a:p>
@@ -7815,18 +7943,7 @@
                 <a:pPr indent="205704" algn="l" defTabSz="908920" rtl="0">
                   <a:defRPr/>
                 </a:pPr>
-                <a:endParaRPr lang="en-US" sz="2800" kern="0" dirty="0" smtClean="0">
-                  <a:solidFill>
-                    <a:schemeClr val="tx1"/>
-                  </a:solidFill>
-                  <a:latin typeface="+mn-lt"/>
-                </a:endParaRPr>
-              </a:p>
-              <a:p>
-                <a:pPr indent="205704" algn="l" defTabSz="908920" rtl="0">
-                  <a:defRPr/>
-                </a:pPr>
-                <a:endParaRPr lang="en-US" sz="2800" kern="0" dirty="0" smtClean="0">
+                <a:endParaRPr lang="en-US" sz="3600" kern="0" dirty="0" smtClean="0">
                   <a:solidFill>
                     <a:schemeClr val="tx1"/>
                   </a:solidFill>
@@ -7846,14 +7963,14 @@
                       <m:sSub>
                         <m:sSubPr>
                           <m:ctrlPr>
-                            <a:rPr lang="en-US" sz="2800" i="1">
+                            <a:rPr lang="en-US" sz="3600" i="1">
                               <a:latin typeface="Cambria Math"/>
                             </a:rPr>
                           </m:ctrlPr>
                         </m:sSubPr>
                         <m:e>
                           <m:r>
-                            <a:rPr lang="en-US" sz="2800" i="1">
+                            <a:rPr lang="en-US" sz="3600" i="1">
                               <a:latin typeface="Cambria Math"/>
                             </a:rPr>
                             <m:t>𝜈</m:t>
@@ -7861,7 +7978,7 @@
                         </m:e>
                         <m:sub>
                           <m:r>
-                            <a:rPr lang="en-US" sz="2800" i="1">
+                            <a:rPr lang="en-US" sz="3600" i="1">
                               <a:latin typeface="Cambria Math"/>
                             </a:rPr>
                             <m:t>𝐶𝑀</m:t>
@@ -7869,7 +7986,7 @@
                         </m:sub>
                       </m:sSub>
                       <m:r>
-                        <a:rPr lang="en-US" sz="2800" i="1">
+                        <a:rPr lang="en-US" sz="3600" i="1">
                           <a:latin typeface="Cambria Math"/>
                         </a:rPr>
                         <m:t>≈</m:t>
@@ -7877,14 +7994,14 @@
                       <m:sSup>
                         <m:sSupPr>
                           <m:ctrlPr>
-                            <a:rPr lang="en-US" sz="2800" i="1">
+                            <a:rPr lang="en-US" sz="3600" i="1">
                               <a:latin typeface="Cambria Math"/>
                             </a:rPr>
                           </m:ctrlPr>
                         </m:sSupPr>
                         <m:e>
                           <m:r>
-                            <a:rPr lang="en-US" sz="2800" i="1">
+                            <a:rPr lang="en-US" sz="3600" i="1">
                               <a:latin typeface="Cambria Math"/>
                             </a:rPr>
                             <m:t>𝜏</m:t>
@@ -7892,7 +8009,7 @@
                         </m:e>
                         <m:sup>
                           <m:r>
-                            <a:rPr lang="en-US" sz="2800" i="1">
+                            <a:rPr lang="en-US" sz="3600" i="1">
                               <a:latin typeface="Cambria Math"/>
                             </a:rPr>
                             <m:t>2</m:t>
@@ -7900,7 +8017,7 @@
                         </m:sup>
                       </m:sSup>
                       <m:r>
-                        <a:rPr lang="en-US" sz="2800" i="1">
+                        <a:rPr lang="en-US" sz="3600" i="1">
                           <a:latin typeface="Cambria Math"/>
                         </a:rPr>
                         <m:t>∙</m:t>
@@ -7908,14 +8025,14 @@
                       <m:sSub>
                         <m:sSubPr>
                           <m:ctrlPr>
-                            <a:rPr lang="en-US" sz="2800" i="1">
+                            <a:rPr lang="en-US" sz="3600" i="1">
                               <a:latin typeface="Cambria Math"/>
                             </a:rPr>
                           </m:ctrlPr>
                         </m:sSubPr>
                         <m:e>
                           <m:r>
-                            <a:rPr lang="en-US" sz="2800" i="1">
+                            <a:rPr lang="en-US" sz="3600" i="1">
                               <a:latin typeface="Cambria Math"/>
                             </a:rPr>
                             <m:t>𝜈</m:t>
@@ -7923,7 +8040,7 @@
                         </m:e>
                         <m:sub>
                           <m:r>
-                            <a:rPr lang="en-US" sz="2800" i="1">
+                            <a:rPr lang="en-US" sz="3600" i="1">
                               <a:latin typeface="Cambria Math"/>
                             </a:rPr>
                             <m:t>𝑁𝑀</m:t>
@@ -7933,7 +8050,7 @@
                     </m:oMath>
                   </m:oMathPara>
                 </a14:m>
-                <a:endParaRPr lang="en-US" sz="2800" dirty="0" smtClean="0">
+                <a:endParaRPr lang="en-US" sz="3600" dirty="0" smtClean="0">
                   <a:latin typeface="+mn-lt"/>
                 </a:endParaRPr>
               </a:p>
@@ -7941,15 +8058,7 @@
                 <a:pPr indent="205704" algn="l" defTabSz="908920" rtl="0">
                   <a:defRPr/>
                 </a:pPr>
-                <a:endParaRPr lang="en-US" sz="2800" kern="0" dirty="0" smtClean="0">
-                  <a:latin typeface="+mn-lt"/>
-                </a:endParaRPr>
-              </a:p>
-              <a:p>
-                <a:pPr indent="205704" algn="l" defTabSz="908920" rtl="0">
-                  <a:defRPr/>
-                </a:pPr>
-                <a:endParaRPr lang="en-US" sz="2800" kern="0" dirty="0" smtClean="0">
+                <a:endParaRPr lang="en-US" sz="3600" kern="0" dirty="0" smtClean="0">
                   <a:latin typeface="+mn-lt"/>
                 </a:endParaRPr>
               </a:p>
@@ -7966,14 +8075,14 @@
                       <m:sSub>
                         <m:sSubPr>
                           <m:ctrlPr>
-                            <a:rPr lang="en-US" sz="2800" i="1">
+                            <a:rPr lang="en-US" sz="3600" i="1">
                               <a:latin typeface="Cambria Math"/>
                             </a:rPr>
                           </m:ctrlPr>
                         </m:sSubPr>
                         <m:e>
                           <m:r>
-                            <a:rPr lang="en-US" sz="2800" i="1">
+                            <a:rPr lang="en-US" sz="3600" i="1">
                               <a:latin typeface="Cambria Math"/>
                             </a:rPr>
                             <m:t>𝜈</m:t>
@@ -7981,7 +8090,7 @@
                         </m:e>
                         <m:sub>
                           <m:r>
-                            <a:rPr lang="en-US" sz="2800" i="1">
+                            <a:rPr lang="en-US" sz="3600" i="1">
                               <a:latin typeface="Cambria Math"/>
                             </a:rPr>
                             <m:t>𝑆𝐼𝑀</m:t>
@@ -7989,7 +8098,7 @@
                         </m:sub>
                       </m:sSub>
                       <m:r>
-                        <a:rPr lang="en-US" sz="2800" i="1">
+                        <a:rPr lang="en-US" sz="3600" i="1">
                           <a:latin typeface="Cambria Math"/>
                         </a:rPr>
                         <m:t>≈</m:t>
@@ -7997,14 +8106,14 @@
                       <m:sSub>
                         <m:sSubPr>
                           <m:ctrlPr>
-                            <a:rPr lang="en-US" sz="2800" i="1">
+                            <a:rPr lang="en-US" sz="3600" i="1">
                               <a:latin typeface="Cambria Math"/>
                             </a:rPr>
                           </m:ctrlPr>
                         </m:sSubPr>
                         <m:e>
                           <m:r>
-                            <a:rPr lang="en-US" sz="2800" i="1">
+                            <a:rPr lang="en-US" sz="3600" i="1">
                               <a:latin typeface="Cambria Math"/>
                             </a:rPr>
                             <m:t>𝜈</m:t>
@@ -8012,7 +8121,7 @@
                         </m:e>
                         <m:sub>
                           <m:r>
-                            <a:rPr lang="en-US" sz="2800" i="1">
+                            <a:rPr lang="en-US" sz="3600" i="1">
                               <a:latin typeface="Cambria Math"/>
                             </a:rPr>
                             <m:t>𝑁𝑀</m:t>
@@ -8020,7 +8129,7 @@
                         </m:sub>
                       </m:sSub>
                       <m:r>
-                        <a:rPr lang="en-US" sz="2800" i="1">
+                        <a:rPr lang="en-US" sz="3600" i="1">
                           <a:latin typeface="Cambria Math"/>
                         </a:rPr>
                         <m:t>∙</m:t>
@@ -8028,20 +8137,20 @@
                       <m:f>
                         <m:fPr>
                           <m:ctrlPr>
-                            <a:rPr lang="en-US" sz="2800" i="1">
+                            <a:rPr lang="en-US" sz="3600" i="1">
                               <a:latin typeface="Cambria Math"/>
                             </a:rPr>
                           </m:ctrlPr>
                         </m:fPr>
                         <m:num>
                           <m:r>
-                            <a:rPr lang="en-US" sz="2800" i="1">
+                            <a:rPr lang="en-US" sz="3600" i="1">
                               <a:latin typeface="Cambria Math"/>
                             </a:rPr>
                             <m:t>2</m:t>
                           </m:r>
                           <m:r>
-                            <a:rPr lang="en-US" sz="2800" i="1">
+                            <a:rPr lang="en-US" sz="3600" i="1">
                               <a:latin typeface="Cambria Math"/>
                             </a:rPr>
                             <m:t>𝜏</m:t>
@@ -8051,32 +8160,32 @@
                           <m:d>
                             <m:dPr>
                               <m:ctrlPr>
-                                <a:rPr lang="en-US" sz="2800" i="1">
+                                <a:rPr lang="en-US" sz="3600" i="1">
                                   <a:latin typeface="Cambria Math"/>
                                 </a:rPr>
                               </m:ctrlPr>
                             </m:dPr>
                             <m:e>
                               <m:r>
-                                <a:rPr lang="en-US" sz="2800" i="1">
+                                <a:rPr lang="en-US" sz="3600" i="1">
                                   <a:latin typeface="Cambria Math"/>
                                 </a:rPr>
                                 <m:t>2</m:t>
                               </m:r>
                               <m:r>
-                                <a:rPr lang="en-US" sz="2800" i="1">
+                                <a:rPr lang="en-US" sz="3600" i="1">
                                   <a:latin typeface="Cambria Math"/>
                                 </a:rPr>
                                 <m:t>−</m:t>
                               </m:r>
                               <m:r>
-                                <a:rPr lang="en-US" sz="2800" i="1">
+                                <a:rPr lang="en-US" sz="3600" i="1">
                                   <a:latin typeface="Cambria Math"/>
                                 </a:rPr>
                                 <m:t>𝜏</m:t>
                               </m:r>
                               <m:r>
-                                <a:rPr lang="en-US" sz="2800" i="1">
+                                <a:rPr lang="en-US" sz="3600" i="1">
                                   <a:latin typeface="Cambria Math"/>
                                 </a:rPr>
                                 <m:t>𝑈</m:t>
@@ -8086,19 +8195,19 @@
                         </m:den>
                       </m:f>
                       <m:r>
-                        <a:rPr lang="en-US" sz="2800" i="1">
+                        <a:rPr lang="en-US" sz="3600" i="1">
                           <a:latin typeface="Cambria Math"/>
                         </a:rPr>
                         <m:t>≈</m:t>
                       </m:r>
                       <m:r>
-                        <a:rPr lang="en-US" sz="2800" i="1">
+                        <a:rPr lang="en-US" sz="3600" i="1">
                           <a:latin typeface="Cambria Math"/>
                         </a:rPr>
                         <m:t>𝜏</m:t>
                       </m:r>
                       <m:r>
-                        <a:rPr lang="en-US" sz="2800" i="1">
+                        <a:rPr lang="en-US" sz="3600" i="1">
                           <a:latin typeface="Cambria Math"/>
                         </a:rPr>
                         <m:t>∙</m:t>
@@ -8106,14 +8215,14 @@
                       <m:sSub>
                         <m:sSubPr>
                           <m:ctrlPr>
-                            <a:rPr lang="en-US" sz="2800" i="1">
+                            <a:rPr lang="en-US" sz="3600" i="1">
                               <a:latin typeface="Cambria Math"/>
                             </a:rPr>
                           </m:ctrlPr>
                         </m:sSubPr>
                         <m:e>
                           <m:r>
-                            <a:rPr lang="en-US" sz="2800" i="1">
+                            <a:rPr lang="en-US" sz="3600" i="1">
                               <a:latin typeface="Cambria Math"/>
                             </a:rPr>
                             <m:t>𝜈</m:t>
@@ -8121,7 +8230,7 @@
                         </m:e>
                         <m:sub>
                           <m:r>
-                            <a:rPr lang="en-US" sz="2800" i="1">
+                            <a:rPr lang="en-US" sz="3600" i="1">
                               <a:latin typeface="Cambria Math"/>
                             </a:rPr>
                             <m:t>𝑁𝑀</m:t>
@@ -8131,7 +8240,7 @@
                     </m:oMath>
                   </m:oMathPara>
                 </a14:m>
-                <a:endParaRPr lang="en-US" sz="2800" dirty="0" smtClean="0">
+                <a:endParaRPr lang="en-US" sz="3600" dirty="0" smtClean="0">
                   <a:latin typeface="+mn-lt"/>
                 </a:endParaRPr>
               </a:p>
@@ -9626,7 +9735,7 @@
       </p:sp>
       <p:pic>
         <p:nvPicPr>
-          <p:cNvPr id="1046" name="Picture 22" descr="D:\university\confrences\GRC2013\fitness_landscape_stochastic_model.png"/>
+          <p:cNvPr id="1052" name="Picture 28" descr="D:\university\confrences\GRC2013\qrcode.png"/>
           <p:cNvPicPr>
             <a:picLocks noChangeAspect="1" noChangeArrowheads="1"/>
           </p:cNvPicPr>
@@ -9634,148 +9743,6 @@
         </p:nvPicPr>
         <p:blipFill>
           <a:blip r:embed="rId3">
-            <a:extLst>
-              <a:ext uri="{28A0092B-C50C-407E-A947-70E740481C1C}">
-                <a14:useLocalDpi xmlns:a14="http://schemas.microsoft.com/office/drawing/2010/main" val="0"/>
-              </a:ext>
-            </a:extLst>
-          </a:blip>
-          <a:srcRect/>
-          <a:stretch>
-            <a:fillRect/>
-          </a:stretch>
-        </p:blipFill>
-        <p:spPr bwMode="auto">
-          <a:xfrm>
-            <a:off x="16634148" y="31611812"/>
-            <a:ext cx="9629651" cy="9629651"/>
-          </a:xfrm>
-          <a:prstGeom prst="rect">
-            <a:avLst/>
-          </a:prstGeom>
-          <a:noFill/>
-          <a:extLst>
-            <a:ext uri="{909E8E84-426E-40DD-AFC4-6F175D3DCCD1}">
-              <a14:hiddenFill xmlns:a14="http://schemas.microsoft.com/office/drawing/2010/main">
-                <a:solidFill>
-                  <a:srgbClr val="FFFFFF"/>
-                </a:solidFill>
-              </a14:hiddenFill>
-            </a:ext>
-          </a:extLst>
-        </p:spPr>
-      </p:pic>
-      <p:sp>
-        <p:nvSpPr>
-          <p:cNvPr id="104" name="TextBox 103"/>
-          <p:cNvSpPr txBox="1"/>
-          <p:nvPr/>
-        </p:nvSpPr>
-        <p:spPr>
-          <a:xfrm>
-            <a:off x="16638077" y="31695573"/>
-            <a:ext cx="1519159" cy="830997"/>
-          </a:xfrm>
-          <a:prstGeom prst="rect">
-            <a:avLst/>
-          </a:prstGeom>
-          <a:noFill/>
-        </p:spPr>
-        <p:txBody>
-          <a:bodyPr wrap="square" rtlCol="1">
-            <a:spAutoFit/>
-          </a:bodyPr>
-          <a:lstStyle/>
-          <a:p>
-            <a:pPr rtl="0"/>
-            <a:r>
-              <a:rPr lang="en-US" sz="4800" dirty="0" smtClean="0"/>
-              <a:t>[4]</a:t>
-            </a:r>
-            <a:endParaRPr lang="he-IL" sz="4800" dirty="0"/>
-          </a:p>
-        </p:txBody>
-      </p:sp>
-      <p:pic>
-        <p:nvPicPr>
-          <p:cNvPr id="1047" name="Picture 23" descr="D:\university\confrences\GRC2013\fitness_landscape_colorbar.png"/>
-          <p:cNvPicPr>
-            <a:picLocks noChangeAspect="1" noChangeArrowheads="1"/>
-          </p:cNvPicPr>
-          <p:nvPr/>
-        </p:nvPicPr>
-        <p:blipFill rotWithShape="1">
-          <a:blip r:embed="rId4">
-            <a:extLst>
-              <a:ext uri="{28A0092B-C50C-407E-A947-70E740481C1C}">
-                <a14:useLocalDpi xmlns:a14="http://schemas.microsoft.com/office/drawing/2010/main" val="0"/>
-              </a:ext>
-            </a:extLst>
-          </a:blip>
-          <a:srcRect l="77438" t="8590" r="15914" b="8599"/>
-          <a:stretch/>
-        </p:blipFill>
-        <p:spPr bwMode="auto">
-          <a:xfrm>
-            <a:off x="25923180" y="32874221"/>
-            <a:ext cx="1215997" cy="7573529"/>
-          </a:xfrm>
-          <a:prstGeom prst="rect">
-            <a:avLst/>
-          </a:prstGeom>
-          <a:noFill/>
-          <a:extLst>
-            <a:ext uri="{909E8E84-426E-40DD-AFC4-6F175D3DCCD1}">
-              <a14:hiddenFill xmlns:a14="http://schemas.microsoft.com/office/drawing/2010/main">
-                <a:solidFill>
-                  <a:srgbClr val="FFFFFF"/>
-                </a:solidFill>
-              </a14:hiddenFill>
-            </a:ext>
-          </a:extLst>
-        </p:spPr>
-      </p:pic>
-      <p:sp>
-        <p:nvSpPr>
-          <p:cNvPr id="116" name="TextBox 115"/>
-          <p:cNvSpPr txBox="1"/>
-          <p:nvPr/>
-        </p:nvSpPr>
-        <p:spPr>
-          <a:xfrm>
-            <a:off x="24808424" y="32384736"/>
-            <a:ext cx="2986964" cy="523220"/>
-          </a:xfrm>
-          <a:prstGeom prst="rect">
-            <a:avLst/>
-          </a:prstGeom>
-          <a:noFill/>
-        </p:spPr>
-        <p:txBody>
-          <a:bodyPr wrap="square" rtlCol="1">
-            <a:spAutoFit/>
-          </a:bodyPr>
-          <a:lstStyle/>
-          <a:p>
-            <a:pPr algn="ctr"/>
-            <a:r>
-              <a:rPr lang="en-US" sz="2800" dirty="0" smtClean="0"/>
-              <a:t>fitness</a:t>
-            </a:r>
-            <a:endParaRPr lang="he-IL" sz="2800" dirty="0"/>
-          </a:p>
-        </p:txBody>
-      </p:sp>
-      <p:pic>
-        <p:nvPicPr>
-          <p:cNvPr id="1052" name="Picture 28" descr="D:\university\confrences\GRC2013\qrcode.png"/>
-          <p:cNvPicPr>
-            <a:picLocks noChangeAspect="1" noChangeArrowheads="1"/>
-          </p:cNvPicPr>
-          <p:nvPr/>
-        </p:nvPicPr>
-        <p:blipFill>
-          <a:blip r:embed="rId5">
             <a:extLst>
               <a:ext uri="{28A0092B-C50C-407E-A947-70E740481C1C}">
                 <a14:useLocalDpi xmlns:a14="http://schemas.microsoft.com/office/drawing/2010/main" val="0"/>
@@ -9816,7 +9783,7 @@
           <p:nvPr/>
         </p:nvPicPr>
         <p:blipFill>
-          <a:blip r:embed="rId6">
+          <a:blip r:embed="rId4">
             <a:extLst>
               <a:ext uri="{28A0092B-C50C-407E-A947-70E740481C1C}">
                 <a14:useLocalDpi xmlns:a14="http://schemas.microsoft.com/office/drawing/2010/main" val="0"/>
@@ -9878,7 +9845,7 @@
             <p:nvPr/>
           </p:nvPicPr>
           <p:blipFill>
-            <a:blip r:embed="rId7">
+            <a:blip r:embed="rId5">
               <a:extLst>
                 <a:ext uri="{28A0092B-C50C-407E-A947-70E740481C1C}">
                   <a14:useLocalDpi xmlns:a14="http://schemas.microsoft.com/office/drawing/2010/main" val="0"/>
@@ -9942,7 +9909,7 @@
             <p:nvPr/>
           </p:nvPicPr>
           <p:blipFill>
-            <a:blip r:embed="rId8">
+            <a:blip r:embed="rId6">
               <a:extLst>
                 <a:ext uri="{28A0092B-C50C-407E-A947-70E740481C1C}">
                   <a14:useLocalDpi xmlns:a14="http://schemas.microsoft.com/office/drawing/2010/main" val="0"/>
@@ -10006,7 +9973,7 @@
             <p:nvPr/>
           </p:nvPicPr>
           <p:blipFill>
-            <a:blip r:embed="rId9">
+            <a:blip r:embed="rId7">
               <a:extLst>
                 <a:ext uri="{28A0092B-C50C-407E-A947-70E740481C1C}">
                   <a14:useLocalDpi xmlns:a14="http://schemas.microsoft.com/office/drawing/2010/main" val="0"/>
@@ -10123,7 +10090,7 @@
           <p:nvPr/>
         </p:nvPicPr>
         <p:blipFill>
-          <a:blip r:embed="rId10">
+          <a:blip r:embed="rId8">
             <a:biLevel thresh="75000"/>
             <a:extLst>
               <a:ext uri="{28A0092B-C50C-407E-A947-70E740481C1C}">
@@ -10900,161 +10867,6 @@
           </a:p>
         </p:txBody>
       </p:sp>
-      <p:grpSp>
-        <p:nvGrpSpPr>
-          <p:cNvPr id="40" name="Group 39"/>
-          <p:cNvGrpSpPr/>
-          <p:nvPr/>
-        </p:nvGrpSpPr>
-        <p:grpSpPr>
-          <a:xfrm>
-            <a:off x="4973842" y="34276108"/>
-            <a:ext cx="6763762" cy="6624736"/>
-            <a:chOff x="20494204" y="13298937"/>
-            <a:chExt cx="6763762" cy="6624736"/>
-          </a:xfrm>
-        </p:grpSpPr>
-        <p:pic>
-          <p:nvPicPr>
-            <p:cNvPr id="42" name="Picture 13" descr="D:\university\confrences\GRC2013\fitness_landscape_analytic_model.png"/>
-            <p:cNvPicPr>
-              <a:picLocks noChangeAspect="1" noChangeArrowheads="1"/>
-            </p:cNvPicPr>
-            <p:nvPr/>
-          </p:nvPicPr>
-          <p:blipFill rotWithShape="1">
-            <a:blip r:embed="rId11">
-              <a:extLst>
-                <a:ext uri="{28A0092B-C50C-407E-A947-70E740481C1C}">
-                  <a14:useLocalDpi xmlns:a14="http://schemas.microsoft.com/office/drawing/2010/main" val="0"/>
-                </a:ext>
-              </a:extLst>
-            </a:blip>
-            <a:srcRect l="11765" r="6304"/>
-            <a:stretch/>
-          </p:blipFill>
-          <p:spPr bwMode="auto">
-            <a:xfrm>
-              <a:off x="20494204" y="13592599"/>
-              <a:ext cx="5010120" cy="6115050"/>
-            </a:xfrm>
-            <a:prstGeom prst="rect">
-              <a:avLst/>
-            </a:prstGeom>
-            <a:noFill/>
-            <a:extLst>
-              <a:ext uri="{909E8E84-426E-40DD-AFC4-6F175D3DCCD1}">
-                <a14:hiddenFill xmlns:a14="http://schemas.microsoft.com/office/drawing/2010/main">
-                  <a:solidFill>
-                    <a:srgbClr val="FFFFFF"/>
-                  </a:solidFill>
-                </a14:hiddenFill>
-              </a:ext>
-            </a:extLst>
-          </p:spPr>
-        </p:pic>
-        <p:pic>
-          <p:nvPicPr>
-            <p:cNvPr id="43" name="Picture 2" descr="D:\workspace\ruggedsim\manuscript\fitness_landscape_colorbar.png"/>
-            <p:cNvPicPr>
-              <a:picLocks noChangeAspect="1" noChangeArrowheads="1"/>
-            </p:cNvPicPr>
-            <p:nvPr/>
-          </p:nvPicPr>
-          <p:blipFill rotWithShape="1">
-            <a:blip r:embed="rId12">
-              <a:extLst>
-                <a:ext uri="{28A0092B-C50C-407E-A947-70E740481C1C}">
-                  <a14:useLocalDpi xmlns:a14="http://schemas.microsoft.com/office/drawing/2010/main" val="0"/>
-                </a:ext>
-              </a:extLst>
-            </a:blip>
-            <a:srcRect l="77619" t="5537" r="16198" b="8115"/>
-            <a:stretch/>
-          </p:blipFill>
-          <p:spPr bwMode="auto">
-            <a:xfrm>
-              <a:off x="25504324" y="13541870"/>
-              <a:ext cx="879668" cy="6381803"/>
-            </a:xfrm>
-            <a:prstGeom prst="rect">
-              <a:avLst/>
-            </a:prstGeom>
-            <a:noFill/>
-            <a:extLst>
-              <a:ext uri="{909E8E84-426E-40DD-AFC4-6F175D3DCCD1}">
-                <a14:hiddenFill xmlns:a14="http://schemas.microsoft.com/office/drawing/2010/main">
-                  <a:solidFill>
-                    <a:srgbClr val="FFFFFF"/>
-                  </a:solidFill>
-                </a14:hiddenFill>
-              </a:ext>
-            </a:extLst>
-          </p:spPr>
-        </p:pic>
-        <p:sp>
-          <p:nvSpPr>
-            <p:cNvPr id="45" name="TextBox 44"/>
-            <p:cNvSpPr txBox="1"/>
-            <p:nvPr/>
-          </p:nvSpPr>
-          <p:spPr>
-            <a:xfrm>
-              <a:off x="24271002" y="13298937"/>
-              <a:ext cx="2986964" cy="523220"/>
-            </a:xfrm>
-            <a:prstGeom prst="rect">
-              <a:avLst/>
-            </a:prstGeom>
-            <a:noFill/>
-          </p:spPr>
-          <p:txBody>
-            <a:bodyPr wrap="square" rtlCol="1">
-              <a:spAutoFit/>
-            </a:bodyPr>
-            <a:lstStyle/>
-            <a:p>
-              <a:pPr algn="ctr"/>
-              <a:r>
-                <a:rPr lang="en-US" sz="2800" dirty="0" smtClean="0"/>
-                <a:t>fitness</a:t>
-              </a:r>
-              <a:endParaRPr lang="he-IL" sz="2800" dirty="0"/>
-            </a:p>
-          </p:txBody>
-        </p:sp>
-        <p:sp>
-          <p:nvSpPr>
-            <p:cNvPr id="46" name="TextBox 45"/>
-            <p:cNvSpPr txBox="1"/>
-            <p:nvPr/>
-          </p:nvSpPr>
-          <p:spPr>
-            <a:xfrm>
-              <a:off x="21274311" y="13657642"/>
-              <a:ext cx="1519159" cy="830997"/>
-            </a:xfrm>
-            <a:prstGeom prst="rect">
-              <a:avLst/>
-            </a:prstGeom>
-            <a:noFill/>
-          </p:spPr>
-          <p:txBody>
-            <a:bodyPr wrap="square" rtlCol="1">
-              <a:spAutoFit/>
-            </a:bodyPr>
-            <a:lstStyle/>
-            <a:p>
-              <a:pPr algn="ctr" rtl="0"/>
-              <a:r>
-                <a:rPr lang="en-US" sz="4800" dirty="0" smtClean="0"/>
-                <a:t>[2]</a:t>
-              </a:r>
-              <a:endParaRPr lang="he-IL" sz="4800" dirty="0"/>
-            </a:p>
-          </p:txBody>
-        </p:sp>
-      </p:grpSp>
       <p:pic>
         <p:nvPicPr>
           <p:cNvPr id="9" name="Picture 4" descr="D:\workspace\ruggedsim\manuscript\tradeoff_s_0.05_logN_6.png"/>
@@ -11064,7 +10876,7 @@
           <p:nvPr/>
         </p:nvPicPr>
         <p:blipFill>
-          <a:blip r:embed="rId13">
+          <a:blip r:embed="rId9">
             <a:extLst>
               <a:ext uri="{28A0092B-C50C-407E-A947-70E740481C1C}">
                 <a14:useLocalDpi xmlns:a14="http://schemas.microsoft.com/office/drawing/2010/main" val="0"/>
@@ -11136,7 +10948,7 @@
           <p:nvPr/>
         </p:nvPicPr>
         <p:blipFill>
-          <a:blip r:embed="rId14">
+          <a:blip r:embed="rId10">
             <a:extLst>
               <a:ext uri="{28A0092B-C50C-407E-A947-70E740481C1C}">
                 <a14:useLocalDpi xmlns:a14="http://schemas.microsoft.com/office/drawing/2010/main" val="0"/>
@@ -11281,7 +11093,7 @@
                 <p:nvPr/>
               </p:nvPicPr>
               <p:blipFill rotWithShape="1">
-                <a:blip r:embed="rId15">
+                <a:blip r:embed="rId11">
                   <a:extLst>
                     <a:ext uri="{28A0092B-C50C-407E-A947-70E740481C1C}">
                       <a14:useLocalDpi xmlns:a14="http://schemas.microsoft.com/office/drawing/2010/main" val="0"/>
@@ -11797,7 +11609,7 @@
                   <p:nvPr/>
                 </p:nvPicPr>
                 <p:blipFill rotWithShape="1">
-                  <a:blip r:embed="rId16">
+                  <a:blip r:embed="rId12">
                     <a:extLst>
                       <a:ext uri="{28A0092B-C50C-407E-A947-70E740481C1C}">
                         <a14:useLocalDpi xmlns:a14="http://schemas.microsoft.com/office/drawing/2010/main" val="0"/>
@@ -12126,6 +11938,332 @@
           </p:grpSp>
         </p:grpSp>
       </p:grpSp>
+      <p:pic>
+        <p:nvPicPr>
+          <p:cNvPr id="1033" name="Picture 9" descr="D:\workspace\ruggedsim\manuscript\fitness_landscape_stochastic_model.png"/>
+          <p:cNvPicPr>
+            <a:picLocks noChangeAspect="1" noChangeArrowheads="1"/>
+          </p:cNvPicPr>
+          <p:nvPr/>
+        </p:nvPicPr>
+        <p:blipFill>
+          <a:blip r:embed="rId13">
+            <a:extLst>
+              <a:ext uri="{28A0092B-C50C-407E-A947-70E740481C1C}">
+                <a14:useLocalDpi xmlns:a14="http://schemas.microsoft.com/office/drawing/2010/main" val="0"/>
+              </a:ext>
+            </a:extLst>
+          </a:blip>
+          <a:srcRect/>
+          <a:stretch>
+            <a:fillRect/>
+          </a:stretch>
+        </p:blipFill>
+        <p:spPr bwMode="auto">
+          <a:xfrm>
+            <a:off x="15986076" y="31131220"/>
+            <a:ext cx="10273679" cy="10273679"/>
+          </a:xfrm>
+          <a:prstGeom prst="rect">
+            <a:avLst/>
+          </a:prstGeom>
+          <a:noFill/>
+          <a:extLst>
+            <a:ext uri="{909E8E84-426E-40DD-AFC4-6F175D3DCCD1}">
+              <a14:hiddenFill xmlns:a14="http://schemas.microsoft.com/office/drawing/2010/main">
+                <a:solidFill>
+                  <a:srgbClr val="FFFFFF"/>
+                </a:solidFill>
+              </a14:hiddenFill>
+            </a:ext>
+          </a:extLst>
+        </p:spPr>
+      </p:pic>
+      <p:pic>
+        <p:nvPicPr>
+          <p:cNvPr id="1047" name="Picture 23" descr="D:\university\confrences\GRC2013\fitness_landscape_colorbar.png"/>
+          <p:cNvPicPr>
+            <a:picLocks noChangeAspect="1" noChangeArrowheads="1"/>
+          </p:cNvPicPr>
+          <p:nvPr/>
+        </p:nvPicPr>
+        <p:blipFill rotWithShape="1">
+          <a:blip r:embed="rId14">
+            <a:extLst>
+              <a:ext uri="{28A0092B-C50C-407E-A947-70E740481C1C}">
+                <a14:useLocalDpi xmlns:a14="http://schemas.microsoft.com/office/drawing/2010/main" val="0"/>
+              </a:ext>
+            </a:extLst>
+          </a:blip>
+          <a:srcRect l="77438" t="8590" r="15914" b="8599"/>
+          <a:stretch/>
+        </p:blipFill>
+        <p:spPr bwMode="auto">
+          <a:xfrm>
+            <a:off x="25923180" y="32874221"/>
+            <a:ext cx="1215997" cy="7573529"/>
+          </a:xfrm>
+          <a:prstGeom prst="rect">
+            <a:avLst/>
+          </a:prstGeom>
+          <a:noFill/>
+          <a:extLst>
+            <a:ext uri="{909E8E84-426E-40DD-AFC4-6F175D3DCCD1}">
+              <a14:hiddenFill xmlns:a14="http://schemas.microsoft.com/office/drawing/2010/main">
+                <a:solidFill>
+                  <a:srgbClr val="FFFFFF"/>
+                </a:solidFill>
+              </a14:hiddenFill>
+            </a:ext>
+          </a:extLst>
+        </p:spPr>
+      </p:pic>
+      <p:sp>
+        <p:nvSpPr>
+          <p:cNvPr id="116" name="TextBox 115"/>
+          <p:cNvSpPr txBox="1"/>
+          <p:nvPr/>
+        </p:nvSpPr>
+        <p:spPr>
+          <a:xfrm>
+            <a:off x="24808424" y="32384736"/>
+            <a:ext cx="2986964" cy="523220"/>
+          </a:xfrm>
+          <a:prstGeom prst="rect">
+            <a:avLst/>
+          </a:prstGeom>
+          <a:noFill/>
+        </p:spPr>
+        <p:txBody>
+          <a:bodyPr wrap="square" rtlCol="1">
+            <a:spAutoFit/>
+          </a:bodyPr>
+          <a:lstStyle/>
+          <a:p>
+            <a:pPr algn="ctr"/>
+            <a:r>
+              <a:rPr lang="en-US" sz="2800" dirty="0" smtClean="0"/>
+              <a:t>fitness</a:t>
+            </a:r>
+            <a:endParaRPr lang="he-IL" sz="2800" dirty="0"/>
+          </a:p>
+        </p:txBody>
+      </p:sp>
+      <p:sp>
+        <p:nvSpPr>
+          <p:cNvPr id="104" name="TextBox 103"/>
+          <p:cNvSpPr txBox="1"/>
+          <p:nvPr/>
+        </p:nvSpPr>
+        <p:spPr>
+          <a:xfrm>
+            <a:off x="15403021" y="31467796"/>
+            <a:ext cx="1519159" cy="830997"/>
+          </a:xfrm>
+          <a:prstGeom prst="rect">
+            <a:avLst/>
+          </a:prstGeom>
+          <a:noFill/>
+        </p:spPr>
+        <p:txBody>
+          <a:bodyPr wrap="square" rtlCol="1">
+            <a:spAutoFit/>
+          </a:bodyPr>
+          <a:lstStyle/>
+          <a:p>
+            <a:pPr rtl="0"/>
+            <a:r>
+              <a:rPr lang="en-US" sz="4800" dirty="0" smtClean="0"/>
+              <a:t>[4]</a:t>
+            </a:r>
+            <a:endParaRPr lang="he-IL" sz="4800" dirty="0"/>
+          </a:p>
+        </p:txBody>
+      </p:sp>
+      <p:pic>
+        <p:nvPicPr>
+          <p:cNvPr id="1034" name="Picture 10" descr="D:\workspace\ruggedsim\manuscript\fitness_landscape_analytic_model.png"/>
+          <p:cNvPicPr>
+            <a:picLocks noChangeAspect="1" noChangeArrowheads="1"/>
+          </p:cNvPicPr>
+          <p:nvPr/>
+        </p:nvPicPr>
+        <p:blipFill>
+          <a:blip r:embed="rId15">
+            <a:extLst>
+              <a:ext uri="{28A0092B-C50C-407E-A947-70E740481C1C}">
+                <a14:useLocalDpi xmlns:a14="http://schemas.microsoft.com/office/drawing/2010/main" val="0"/>
+              </a:ext>
+            </a:extLst>
+          </a:blip>
+          <a:srcRect/>
+          <a:stretch>
+            <a:fillRect/>
+          </a:stretch>
+        </p:blipFill>
+        <p:spPr bwMode="auto">
+          <a:xfrm>
+            <a:off x="7328645" y="34492132"/>
+            <a:ext cx="6353175" cy="6115050"/>
+          </a:xfrm>
+          <a:prstGeom prst="rect">
+            <a:avLst/>
+          </a:prstGeom>
+          <a:noFill/>
+          <a:extLst>
+            <a:ext uri="{909E8E84-426E-40DD-AFC4-6F175D3DCCD1}">
+              <a14:hiddenFill xmlns:a14="http://schemas.microsoft.com/office/drawing/2010/main">
+                <a:solidFill>
+                  <a:srgbClr val="FFFFFF"/>
+                </a:solidFill>
+              </a14:hiddenFill>
+            </a:ext>
+          </a:extLst>
+        </p:spPr>
+      </p:pic>
+      <p:sp>
+        <p:nvSpPr>
+          <p:cNvPr id="46" name="TextBox 45"/>
+          <p:cNvSpPr txBox="1"/>
+          <p:nvPr/>
+        </p:nvSpPr>
+        <p:spPr>
+          <a:xfrm>
+            <a:off x="2071562" y="34492132"/>
+            <a:ext cx="1601146" cy="875845"/>
+          </a:xfrm>
+          <a:prstGeom prst="rect">
+            <a:avLst/>
+          </a:prstGeom>
+          <a:noFill/>
+        </p:spPr>
+        <p:txBody>
+          <a:bodyPr wrap="square" rtlCol="1">
+            <a:spAutoFit/>
+          </a:bodyPr>
+          <a:lstStyle/>
+          <a:p>
+            <a:pPr algn="ctr" rtl="0"/>
+            <a:r>
+              <a:rPr lang="en-US" sz="4800" dirty="0" smtClean="0"/>
+              <a:t>[2]</a:t>
+            </a:r>
+            <a:endParaRPr lang="he-IL" sz="4800" dirty="0"/>
+          </a:p>
+        </p:txBody>
+      </p:sp>
+      <p:pic>
+        <p:nvPicPr>
+          <p:cNvPr id="1035" name="Picture 11"/>
+          <p:cNvPicPr>
+            <a:picLocks noChangeAspect="1" noChangeArrowheads="1"/>
+          </p:cNvPicPr>
+          <p:nvPr/>
+        </p:nvPicPr>
+        <p:blipFill>
+          <a:blip r:embed="rId16">
+            <a:extLst>
+              <a:ext uri="{28A0092B-C50C-407E-A947-70E740481C1C}">
+                <a14:useLocalDpi xmlns:a14="http://schemas.microsoft.com/office/drawing/2010/main" val="0"/>
+              </a:ext>
+            </a:extLst>
+          </a:blip>
+          <a:stretch>
+            <a:fillRect/>
+          </a:stretch>
+        </p:blipFill>
+        <p:spPr bwMode="auto">
+          <a:xfrm>
+            <a:off x="3825368" y="40535174"/>
+            <a:ext cx="8429651" cy="869726"/>
+          </a:xfrm>
+          <a:prstGeom prst="rect">
+            <a:avLst/>
+          </a:prstGeom>
+          <a:noFill/>
+          <a:extLst>
+            <a:ext uri="{909E8E84-426E-40DD-AFC4-6F175D3DCCD1}">
+              <a14:hiddenFill xmlns:a14="http://schemas.microsoft.com/office/drawing/2010/main">
+                <a:solidFill>
+                  <a:srgbClr val="FFFFFF"/>
+                </a:solidFill>
+              </a14:hiddenFill>
+            </a:ext>
+          </a:extLst>
+        </p:spPr>
+      </p:pic>
+      <p:sp>
+        <p:nvSpPr>
+          <p:cNvPr id="45" name="TextBox 44"/>
+          <p:cNvSpPr txBox="1"/>
+          <p:nvPr/>
+        </p:nvSpPr>
+        <p:spPr>
+          <a:xfrm>
+            <a:off x="3384676" y="40133363"/>
+            <a:ext cx="3148166" cy="551457"/>
+          </a:xfrm>
+          <a:prstGeom prst="rect">
+            <a:avLst/>
+          </a:prstGeom>
+          <a:noFill/>
+        </p:spPr>
+        <p:txBody>
+          <a:bodyPr wrap="square" rtlCol="1">
+            <a:spAutoFit/>
+          </a:bodyPr>
+          <a:lstStyle/>
+          <a:p>
+            <a:pPr algn="ctr"/>
+            <a:r>
+              <a:rPr lang="en-US" sz="2800" dirty="0" smtClean="0"/>
+              <a:t>fitness</a:t>
+            </a:r>
+            <a:endParaRPr lang="he-IL" sz="2800" dirty="0"/>
+          </a:p>
+        </p:txBody>
+      </p:sp>
+      <p:pic>
+        <p:nvPicPr>
+          <p:cNvPr id="1039" name="Picture 15" descr="D:\workspace\ruggedsim\manuscript\fitness_landscape_key_vertical.png"/>
+          <p:cNvPicPr>
+            <a:picLocks noChangeAspect="1" noChangeArrowheads="1"/>
+          </p:cNvPicPr>
+          <p:nvPr/>
+        </p:nvPicPr>
+        <p:blipFill>
+          <a:blip r:embed="rId17">
+            <a:extLst>
+              <a:ext uri="{28A0092B-C50C-407E-A947-70E740481C1C}">
+                <a14:useLocalDpi xmlns:a14="http://schemas.microsoft.com/office/drawing/2010/main" val="0"/>
+              </a:ext>
+            </a:extLst>
+          </a:blip>
+          <a:srcRect/>
+          <a:stretch>
+            <a:fillRect/>
+          </a:stretch>
+        </p:blipFill>
+        <p:spPr bwMode="auto">
+          <a:xfrm>
+            <a:off x="3058866" y="35590483"/>
+            <a:ext cx="4286250" cy="4086225"/>
+          </a:xfrm>
+          <a:prstGeom prst="rect">
+            <a:avLst/>
+          </a:prstGeom>
+          <a:noFill/>
+          <a:extLst>
+            <a:ext uri="{909E8E84-426E-40DD-AFC4-6F175D3DCCD1}">
+              <a14:hiddenFill xmlns:a14="http://schemas.microsoft.com/office/drawing/2010/main">
+                <a:solidFill>
+                  <a:srgbClr val="FFFFFF"/>
+                </a:solidFill>
+              </a14:hiddenFill>
+            </a:ext>
+          </a:extLst>
+        </p:spPr>
+      </p:pic>
     </p:spTree>
     <p:extLst>
       <p:ext uri="{BB962C8B-B14F-4D97-AF65-F5344CB8AC3E}">

</xml_diff>

<commit_message>
changed after lab meeting
</commit_message>
<xml_diff>
--- a/poster.pptx
+++ b/poster.pptx
@@ -288,7 +288,7 @@
           <a:p>
             <a:fld id="{AA8A2AE2-601D-4A2C-970A-532E2F2D0EF3}" type="datetimeFigureOut">
               <a:rPr lang="he-IL" smtClean="0"/>
-              <a:t>כ"ד/אב/תשע"ג</a:t>
+              <a:t>ב'/אלול/תשע"ג</a:t>
             </a:fld>
             <a:endParaRPr lang="he-IL"/>
           </a:p>
@@ -458,7 +458,7 @@
           <a:p>
             <a:fld id="{AA8A2AE2-601D-4A2C-970A-532E2F2D0EF3}" type="datetimeFigureOut">
               <a:rPr lang="he-IL" smtClean="0"/>
-              <a:t>כ"ד/אב/תשע"ג</a:t>
+              <a:t>ב'/אלול/תשע"ג</a:t>
             </a:fld>
             <a:endParaRPr lang="he-IL"/>
           </a:p>
@@ -638,7 +638,7 @@
           <a:p>
             <a:fld id="{AA8A2AE2-601D-4A2C-970A-532E2F2D0EF3}" type="datetimeFigureOut">
               <a:rPr lang="he-IL" smtClean="0"/>
-              <a:t>כ"ד/אב/תשע"ג</a:t>
+              <a:t>ב'/אלול/תשע"ג</a:t>
             </a:fld>
             <a:endParaRPr lang="he-IL"/>
           </a:p>
@@ -808,7 +808,7 @@
           <a:p>
             <a:fld id="{AA8A2AE2-601D-4A2C-970A-532E2F2D0EF3}" type="datetimeFigureOut">
               <a:rPr lang="he-IL" smtClean="0"/>
-              <a:t>כ"ד/אב/תשע"ג</a:t>
+              <a:t>ב'/אלול/תשע"ג</a:t>
             </a:fld>
             <a:endParaRPr lang="he-IL"/>
           </a:p>
@@ -1054,7 +1054,7 @@
           <a:p>
             <a:fld id="{AA8A2AE2-601D-4A2C-970A-532E2F2D0EF3}" type="datetimeFigureOut">
               <a:rPr lang="he-IL" smtClean="0"/>
-              <a:t>כ"ד/אב/תשע"ג</a:t>
+              <a:t>ב'/אלול/תשע"ג</a:t>
             </a:fld>
             <a:endParaRPr lang="he-IL"/>
           </a:p>
@@ -1342,7 +1342,7 @@
           <a:p>
             <a:fld id="{AA8A2AE2-601D-4A2C-970A-532E2F2D0EF3}" type="datetimeFigureOut">
               <a:rPr lang="he-IL" smtClean="0"/>
-              <a:t>כ"ד/אב/תשע"ג</a:t>
+              <a:t>ב'/אלול/תשע"ג</a:t>
             </a:fld>
             <a:endParaRPr lang="he-IL"/>
           </a:p>
@@ -1769,7 +1769,7 @@
           <a:p>
             <a:fld id="{AA8A2AE2-601D-4A2C-970A-532E2F2D0EF3}" type="datetimeFigureOut">
               <a:rPr lang="he-IL" smtClean="0"/>
-              <a:t>כ"ד/אב/תשע"ג</a:t>
+              <a:t>ב'/אלול/תשע"ג</a:t>
             </a:fld>
             <a:endParaRPr lang="he-IL"/>
           </a:p>
@@ -1887,7 +1887,7 @@
           <a:p>
             <a:fld id="{AA8A2AE2-601D-4A2C-970A-532E2F2D0EF3}" type="datetimeFigureOut">
               <a:rPr lang="he-IL" smtClean="0"/>
-              <a:t>כ"ד/אב/תשע"ג</a:t>
+              <a:t>ב'/אלול/תשע"ג</a:t>
             </a:fld>
             <a:endParaRPr lang="he-IL"/>
           </a:p>
@@ -1982,7 +1982,7 @@
           <a:p>
             <a:fld id="{AA8A2AE2-601D-4A2C-970A-532E2F2D0EF3}" type="datetimeFigureOut">
               <a:rPr lang="he-IL" smtClean="0"/>
-              <a:t>כ"ד/אב/תשע"ג</a:t>
+              <a:t>ב'/אלול/תשע"ג</a:t>
             </a:fld>
             <a:endParaRPr lang="he-IL"/>
           </a:p>
@@ -2259,7 +2259,7 @@
           <a:p>
             <a:fld id="{AA8A2AE2-601D-4A2C-970A-532E2F2D0EF3}" type="datetimeFigureOut">
               <a:rPr lang="he-IL" smtClean="0"/>
-              <a:t>כ"ד/אב/תשע"ג</a:t>
+              <a:t>ב'/אלול/תשע"ג</a:t>
             </a:fld>
             <a:endParaRPr lang="he-IL"/>
           </a:p>
@@ -2512,7 +2512,7 @@
           <a:p>
             <a:fld id="{AA8A2AE2-601D-4A2C-970A-532E2F2D0EF3}" type="datetimeFigureOut">
               <a:rPr lang="he-IL" smtClean="0"/>
-              <a:t>כ"ד/אב/תשע"ג</a:t>
+              <a:t>ב'/אלול/תשע"ג</a:t>
             </a:fld>
             <a:endParaRPr lang="he-IL"/>
           </a:p>
@@ -2725,7 +2725,7 @@
           <a:p>
             <a:fld id="{AA8A2AE2-601D-4A2C-970A-532E2F2D0EF3}" type="datetimeFigureOut">
               <a:rPr lang="he-IL" smtClean="0"/>
-              <a:t>כ"ד/אב/תשע"ג</a:t>
+              <a:t>ב'/אלול/תשע"ג</a:t>
             </a:fld>
             <a:endParaRPr lang="he-IL"/>
           </a:p>
@@ -3635,11 +3635,38 @@
               <a:t>bacteria and even in eukaryotes </a:t>
             </a:r>
             <a:r>
-              <a:rPr lang="en-US" sz="2400" kern="0" dirty="0">
-                <a:latin typeface="+mn-lt"/>
-              </a:rPr>
-              <a:t>(1-3).</a:t>
-            </a:r>
+              <a:rPr lang="en-US" sz="2400" kern="0" dirty="0" smtClean="0">
+                <a:latin typeface="+mn-lt"/>
+              </a:rPr>
+              <a:t>(Rosenberg et al. 1998, </a:t>
+            </a:r>
+            <a:r>
+              <a:rPr lang="en-US" sz="2400" kern="0" dirty="0" err="1" smtClean="0">
+                <a:latin typeface="+mn-lt"/>
+              </a:rPr>
+              <a:t>Galhardo</a:t>
+            </a:r>
+            <a:r>
+              <a:rPr lang="en-US" sz="2400" kern="0" dirty="0" smtClean="0">
+                <a:latin typeface="+mn-lt"/>
+              </a:rPr>
+              <a:t> et al. 2007, </a:t>
+            </a:r>
+            <a:r>
+              <a:rPr lang="en-US" sz="2400" kern="0" dirty="0" err="1" smtClean="0">
+                <a:latin typeface="+mn-lt"/>
+              </a:rPr>
+              <a:t>Bjedov</a:t>
+            </a:r>
+            <a:r>
+              <a:rPr lang="en-US" sz="2400" kern="0" dirty="0" smtClean="0">
+                <a:latin typeface="+mn-lt"/>
+              </a:rPr>
+              <a:t> et al. 2003).</a:t>
+            </a:r>
+            <a:endParaRPr lang="en-US" sz="2400" kern="0" dirty="0">
+              <a:latin typeface="+mn-lt"/>
+            </a:endParaRPr>
           </a:p>
           <a:p>
             <a:pPr indent="205684" algn="l" defTabSz="908834" rtl="0">
@@ -3649,7 +3676,19 @@
               <a:rPr lang="en-US" sz="2400" kern="0" dirty="0">
                 <a:latin typeface="+mn-lt"/>
               </a:rPr>
-              <a:t>In a previous work (4) we studied the evolution of stress-induced mutagenesis in constant and changing environments. We showed that</a:t>
+              <a:t>In a previous work </a:t>
+            </a:r>
+            <a:r>
+              <a:rPr lang="en-US" sz="2400" kern="0" dirty="0" smtClean="0">
+                <a:latin typeface="+mn-lt"/>
+              </a:rPr>
+              <a:t>(Ram &amp; Hadany 2012) </a:t>
+            </a:r>
+            <a:r>
+              <a:rPr lang="en-US" sz="2400" kern="0" dirty="0">
+                <a:latin typeface="+mn-lt"/>
+              </a:rPr>
+              <a:t>we studied the evolution of stress-induced mutagenesis in constant and changing environments. We showed that</a:t>
             </a:r>
             <a:r>
               <a:rPr lang="en-US" sz="2400" b="1" kern="0" dirty="0">
@@ -3734,14 +3773,24 @@
               <a:t>Sewall Wright </a:t>
             </a:r>
             <a:r>
-              <a:rPr lang="en-US" sz="2400" kern="0" dirty="0">
+              <a:rPr lang="en-US" sz="2400" kern="0" dirty="0" smtClean="0">
                 <a:solidFill>
                   <a:srgbClr val="000000"/>
                 </a:solidFill>
                 <a:latin typeface="Calibri"/>
                 <a:ea typeface="+mn-ea"/>
               </a:rPr>
-              <a:t>in 1931 (5) and popularized using the </a:t>
+              <a:t>(1931) </a:t>
+            </a:r>
+            <a:r>
+              <a:rPr lang="en-US" sz="2400" kern="0" dirty="0">
+                <a:solidFill>
+                  <a:srgbClr val="000000"/>
+                </a:solidFill>
+                <a:latin typeface="Calibri"/>
+                <a:ea typeface="+mn-ea"/>
+              </a:rPr>
+              <a:t>and popularized using the </a:t>
             </a:r>
             <a:r>
               <a:rPr lang="en-US" sz="2400" b="1" kern="0" dirty="0">
@@ -4820,7 +4869,61 @@
                 </a:solidFill>
                 <a:latin typeface="+mn-lt"/>
               </a:rPr>
-              <a:t> – denoted by the number after the slash. </a:t>
+              <a:t> – denoted by the number after the </a:t>
+            </a:r>
+            <a:r>
+              <a:rPr lang="en-GB" sz="2400" kern="0" dirty="0" smtClean="0">
+                <a:solidFill>
+                  <a:srgbClr val="000000"/>
+                </a:solidFill>
+                <a:latin typeface="+mn-lt"/>
+              </a:rPr>
+              <a:t>slash (</a:t>
+            </a:r>
+            <a:r>
+              <a:rPr lang="en-GB" sz="2400" i="1" kern="0" dirty="0" err="1" smtClean="0">
+                <a:solidFill>
+                  <a:srgbClr val="000000"/>
+                </a:solidFill>
+                <a:latin typeface="+mn-lt"/>
+              </a:rPr>
+              <a:t>ab</a:t>
+            </a:r>
+            <a:r>
+              <a:rPr lang="en-GB" sz="2400" i="1" kern="0" dirty="0" smtClean="0">
+                <a:solidFill>
+                  <a:srgbClr val="000000"/>
+                </a:solidFill>
+                <a:latin typeface="+mn-lt"/>
+              </a:rPr>
+              <a:t>/2</a:t>
+            </a:r>
+            <a:r>
+              <a:rPr lang="en-GB" sz="2400" kern="0" dirty="0" smtClean="0">
+                <a:solidFill>
+                  <a:srgbClr val="000000"/>
+                </a:solidFill>
+                <a:latin typeface="+mn-lt"/>
+              </a:rPr>
+              <a:t> is </a:t>
+            </a:r>
+            <a:r>
+              <a:rPr lang="en-GB" sz="2400" i="1" kern="0" dirty="0" err="1" smtClean="0">
+                <a:solidFill>
+                  <a:srgbClr val="000000"/>
+                </a:solidFill>
+                <a:latin typeface="+mn-lt"/>
+              </a:rPr>
+              <a:t>ab</a:t>
+            </a:r>
+            <a:r>
+              <a:rPr lang="en-GB" sz="2400" kern="0" dirty="0" smtClean="0">
+                <a:solidFill>
+                  <a:srgbClr val="000000"/>
+                </a:solidFill>
+                <a:latin typeface="+mn-lt"/>
+              </a:rPr>
+              <a:t> with two deleterious mutations). </a:t>
             </a:r>
             <a:endParaRPr lang="en-GB" sz="2400" kern="0" dirty="0" smtClean="0">
               <a:solidFill>
@@ -5382,7 +5485,7 @@
           </a:ln>
         </p:spPr>
         <p:txBody>
-          <a:bodyPr lIns="540000" tIns="432000" rIns="540000" bIns="432000"/>
+          <a:bodyPr lIns="540000" tIns="270000" rIns="540000" bIns="432000"/>
           <a:lstStyle>
             <a:lvl1pPr eaLnBrk="0" hangingPunct="0">
               <a:defRPr sz="3200">
@@ -5826,19 +5929,28 @@
               <a:buAutoNum type="arabicPeriod"/>
             </a:pPr>
             <a:r>
-              <a:rPr lang="en-US" sz="2100" dirty="0" smtClean="0">
+              <a:rPr lang="en-US" sz="2400" b="1" dirty="0" smtClean="0">
+                <a:solidFill>
+                  <a:schemeClr val="tx2"/>
+                </a:solidFill>
                 <a:latin typeface="+mn-lt"/>
               </a:rPr>
               <a:t>Ram Y, Hadany L. </a:t>
             </a:r>
             <a:r>
-              <a:rPr lang="en-US" sz="2100" i="1" dirty="0" smtClean="0">
+              <a:rPr lang="en-US" sz="2400" b="1" i="1" dirty="0" smtClean="0">
+                <a:solidFill>
+                  <a:schemeClr val="tx2"/>
+                </a:solidFill>
                 <a:latin typeface="+mn-lt"/>
               </a:rPr>
               <a:t>Evolution</a:t>
             </a:r>
             <a:r>
-              <a:rPr lang="en-US" sz="2100" dirty="0" smtClean="0">
+              <a:rPr lang="en-US" sz="2400" b="1" dirty="0" smtClean="0">
+                <a:solidFill>
+                  <a:schemeClr val="tx2"/>
+                </a:solidFill>
                 <a:latin typeface="+mn-lt"/>
               </a:rPr>
               <a:t> 2012, 66:2315–28</a:t>
@@ -6095,8 +6207,8 @@
           </a:p>
         </p:txBody>
       </p:sp>
-      <mc:AlternateContent xmlns:mc="http://schemas.openxmlformats.org/markup-compatibility/2006">
-        <mc:Choice xmlns:a14="http://schemas.microsoft.com/office/drawing/2010/main" Requires="a14">
+      <mc:AlternateContent xmlns:mc="http://schemas.openxmlformats.org/markup-compatibility/2006" xmlns:a14="http://schemas.microsoft.com/office/drawing/2010/main">
+        <mc:Choice Requires="a14">
           <p:sp>
             <p:nvSpPr>
               <p:cNvPr id="14" name="Text Box 13"/>
@@ -6348,16 +6460,7 @@
                     </a:solidFill>
                     <a:latin typeface="+mn-lt"/>
                   </a:rPr>
-                  <a:t> is approximated </a:t>
-                </a:r>
-                <a:r>
-                  <a:rPr lang="en-US" sz="2400" kern="0" dirty="0">
-                    <a:solidFill>
-                      <a:srgbClr val="000000"/>
-                    </a:solidFill>
-                    <a:latin typeface="+mn-lt"/>
-                  </a:rPr>
-                  <a:t>with normal mutagenesis (NM), constitutive mutagenesis (CM) and stress-induced mutagenesis (SIM</a:t>
+                  <a:t> is approximated with normal mutagenesis (NM), constitutive mutagenesis (CM) and stress-induced mutagenesis (SIM</a:t>
                 </a:r>
                 <a:r>
                   <a:rPr lang="en-US" sz="2400" kern="0" dirty="0" smtClean="0">
@@ -6951,16 +7054,7 @@
                     </a:solidFill>
                     <a:latin typeface="+mn-lt"/>
                   </a:rPr>
-                  <a:t>CI. Both axes are in log scale – the slope of </a:t>
-                </a:r>
-                <a:r>
-                  <a:rPr lang="en-US" sz="2400" kern="0" dirty="0" smtClean="0">
-                    <a:solidFill>
-                      <a:srgbClr val="000000"/>
-                    </a:solidFill>
-                    <a:latin typeface="+mn-lt"/>
-                  </a:rPr>
-                  <a:t>the </a:t>
+                  <a:t>CI. Both axes are in log scale – the slope of the </a:t>
                 </a:r>
                 <a:r>
                   <a:rPr lang="en-US" sz="2400" kern="0" dirty="0" smtClean="0">
@@ -6978,16 +7072,7 @@
                     </a:solidFill>
                     <a:latin typeface="+mn-lt"/>
                   </a:rPr>
-                  <a:t>line </a:t>
-                </a:r>
-                <a:r>
-                  <a:rPr lang="en-US" sz="2400" kern="0" dirty="0" smtClean="0">
-                    <a:solidFill>
-                      <a:srgbClr val="000000"/>
-                    </a:solidFill>
-                    <a:latin typeface="+mn-lt"/>
-                  </a:rPr>
-                  <a:t>is twice as steep as the slope of the </a:t>
+                  <a:t>line is twice as steep as the slope of the </a:t>
                 </a:r>
                 <a:r>
                   <a:rPr lang="en-US" sz="2400" kern="0" dirty="0" smtClean="0">
@@ -7005,25 +7090,7 @@
                     </a:solidFill>
                     <a:latin typeface="+mn-lt"/>
                   </a:rPr>
-                  <a:t> </a:t>
-                </a:r>
-                <a:r>
-                  <a:rPr lang="en-US" sz="2400" kern="0" dirty="0" smtClean="0">
-                    <a:solidFill>
-                      <a:srgbClr val="000000"/>
-                    </a:solidFill>
-                    <a:latin typeface="+mn-lt"/>
-                  </a:rPr>
-                  <a:t>line</a:t>
-                </a:r>
-                <a:r>
-                  <a:rPr lang="en-US" sz="2400" kern="0" dirty="0" smtClean="0">
-                    <a:solidFill>
-                      <a:srgbClr val="000000"/>
-                    </a:solidFill>
-                    <a:latin typeface="+mn-lt"/>
-                  </a:rPr>
-                  <a:t>.</a:t>
+                  <a:t> line.</a:t>
                 </a:r>
               </a:p>
               <a:p>
@@ -7120,7 +7187,7 @@
             </p:txBody>
           </p:sp>
         </mc:Choice>
-        <mc:Fallback>
+        <mc:Fallback xmlns="">
           <p:sp>
             <p:nvSpPr>
               <p:cNvPr id="14" name="Text Box 13"/>
@@ -7462,23 +7529,8 @@
                 </a:solidFill>
                 <a:latin typeface="Calibri"/>
               </a:rPr>
-              <a:t>rate </a:t>
-            </a:r>
-            <a:r>
-              <a:rPr lang="en-US" sz="2400" kern="0" dirty="0">
-                <a:solidFill>
-                  <a:srgbClr val="000000"/>
-                </a:solidFill>
-                <a:latin typeface="Calibri"/>
-              </a:rPr>
-              <a:t>fold-increase).</a:t>
-            </a:r>
-            <a:endParaRPr lang="en-US" sz="2400" kern="0" dirty="0">
-              <a:solidFill>
-                <a:srgbClr val="000000"/>
-              </a:solidFill>
-              <a:latin typeface="Calibri"/>
-            </a:endParaRPr>
+              <a:t>rate fold-increase).</a:t>
+            </a:r>
           </a:p>
           <a:p>
             <a:pPr marL="457157" indent="-457157" algn="just" defTabSz="908834" rtl="0" eaLnBrk="1" hangingPunct="1">
@@ -7643,16 +7695,7 @@
                 </a:solidFill>
                 <a:latin typeface="Calibri"/>
               </a:rPr>
-              <a:t>(12)</a:t>
-            </a:r>
-            <a:r>
-              <a:rPr lang="en-US" sz="2400" kern="0" dirty="0" smtClean="0">
-                <a:solidFill>
-                  <a:srgbClr val="000000"/>
-                </a:solidFill>
-                <a:latin typeface="Calibri"/>
-              </a:rPr>
-              <a:t>.</a:t>
+              <a:t>(Kimura &amp; Maruyama 1966).</a:t>
             </a:r>
             <a:endParaRPr lang="en-US" sz="2400" kern="0" dirty="0">
               <a:solidFill>
@@ -7681,8 +7724,25 @@
                 <a:latin typeface="Calibri"/>
                 <a:ea typeface="+mn-ea"/>
               </a:rPr>
-              <a:t>SIM slightly increases the population mean fitness (4).</a:t>
-            </a:r>
+              <a:t>SIM slightly increases the population mean fitness </a:t>
+            </a:r>
+            <a:r>
+              <a:rPr lang="en-US" sz="2400" kern="0" dirty="0" smtClean="0">
+                <a:solidFill>
+                  <a:srgbClr val="000000"/>
+                </a:solidFill>
+                <a:latin typeface="Calibri"/>
+                <a:ea typeface="+mn-ea"/>
+              </a:rPr>
+              <a:t>(Ram &amp; Hadany 2012).</a:t>
+            </a:r>
+            <a:endParaRPr lang="en-US" sz="2400" kern="0" dirty="0">
+              <a:solidFill>
+                <a:srgbClr val="000000"/>
+              </a:solidFill>
+              <a:latin typeface="Calibri"/>
+              <a:ea typeface="+mn-ea"/>
+            </a:endParaRPr>
           </a:p>
           <a:p>
             <a:pPr algn="just" defTabSz="908834" rtl="0" eaLnBrk="1" hangingPunct="1">
@@ -7702,17 +7762,7 @@
                 <a:latin typeface="Calibri"/>
                 <a:ea typeface="+mn-ea"/>
               </a:rPr>
-              <a:t>Breaking the adaptability-adaptedness </a:t>
-            </a:r>
-            <a:r>
-              <a:rPr lang="en-US" sz="2800" b="1" kern="0" dirty="0" smtClean="0">
-                <a:solidFill>
-                  <a:srgbClr val="C0504D"/>
-                </a:solidFill>
-                <a:latin typeface="Calibri"/>
-                <a:ea typeface="+mn-ea"/>
-              </a:rPr>
-              <a:t>trade-off</a:t>
+              <a:t>Breaking the adaptability-adaptedness trade-off</a:t>
             </a:r>
           </a:p>
           <a:p>
@@ -8267,8 +8317,8 @@
         </p:blipFill>
         <p:spPr bwMode="auto">
           <a:xfrm>
-            <a:off x="23996971" y="39262246"/>
-            <a:ext cx="1561117" cy="1561117"/>
+            <a:off x="24177163" y="39370430"/>
+            <a:ext cx="1548000" cy="1548000"/>
           </a:xfrm>
           <a:prstGeom prst="rect">
             <a:avLst/>
@@ -8309,7 +8359,7 @@
         </p:blipFill>
         <p:spPr bwMode="auto">
           <a:xfrm>
-            <a:off x="25724689" y="40365842"/>
+            <a:off x="25845143" y="40365842"/>
             <a:ext cx="2400300" cy="485775"/>
           </a:xfrm>
           <a:prstGeom prst="rect">
@@ -8335,7 +8385,7 @@
         </p:nvGrpSpPr>
         <p:grpSpPr>
           <a:xfrm>
-            <a:off x="20468579" y="38038110"/>
+            <a:off x="20540587" y="37776207"/>
             <a:ext cx="4917155" cy="2062103"/>
             <a:chOff x="20736000" y="39190238"/>
             <a:chExt cx="4917155" cy="2062103"/>
@@ -8652,7 +8702,7 @@
         </p:nvGrpSpPr>
         <p:grpSpPr>
           <a:xfrm>
-            <a:off x="1530475" y="14419486"/>
+            <a:off x="1530475" y="14715744"/>
             <a:ext cx="7920000" cy="6688518"/>
             <a:chOff x="2880620" y="13753828"/>
             <a:chExt cx="9361040" cy="7905491"/>
@@ -9645,7 +9695,7 @@
       </p:sp>
       <p:pic>
         <p:nvPicPr>
-          <p:cNvPr id="66" name="Picture 11"/>
+          <p:cNvPr id="69" name="Picture 9" descr="D:\workspace\ruggedsim\manuscript\fitness_landscape_stochastic_model.png"/>
           <p:cNvPicPr>
             <a:picLocks noChangeAspect="1" noChangeArrowheads="1"/>
           </p:cNvPicPr>
@@ -9653,46 +9703,6 @@
         </p:nvPicPr>
         <p:blipFill>
           <a:blip r:embed="rId12">
-            <a:extLst>
-              <a:ext uri="{28A0092B-C50C-407E-A947-70E740481C1C}">
-                <a14:useLocalDpi xmlns:a14="http://schemas.microsoft.com/office/drawing/2010/main" val="0"/>
-              </a:ext>
-            </a:extLst>
-          </a:blip>
-          <a:stretch>
-            <a:fillRect/>
-          </a:stretch>
-        </p:blipFill>
-        <p:spPr bwMode="auto">
-          <a:xfrm>
-            <a:off x="1962523" y="39929474"/>
-            <a:ext cx="7920000" cy="817143"/>
-          </a:xfrm>
-          <a:prstGeom prst="rect">
-            <a:avLst/>
-          </a:prstGeom>
-          <a:noFill/>
-          <a:extLst>
-            <a:ext uri="{909E8E84-426E-40DD-AFC4-6F175D3DCCD1}">
-              <a14:hiddenFill xmlns:a14="http://schemas.microsoft.com/office/drawing/2010/main">
-                <a:solidFill>
-                  <a:srgbClr val="FFFFFF"/>
-                </a:solidFill>
-              </a14:hiddenFill>
-            </a:ext>
-          </a:extLst>
-        </p:spPr>
-      </p:pic>
-      <p:pic>
-        <p:nvPicPr>
-          <p:cNvPr id="69" name="Picture 9" descr="D:\workspace\ruggedsim\manuscript\fitness_landscape_stochastic_model.png"/>
-          <p:cNvPicPr>
-            <a:picLocks noChangeAspect="1" noChangeArrowheads="1"/>
-          </p:cNvPicPr>
-          <p:nvPr/>
-        </p:nvPicPr>
-        <p:blipFill>
-          <a:blip r:embed="rId13">
             <a:extLst>
               <a:ext uri="{28A0092B-C50C-407E-A947-70E740481C1C}">
                 <a14:useLocalDpi xmlns:a14="http://schemas.microsoft.com/office/drawing/2010/main" val="0"/>
@@ -9764,13 +9774,13 @@
           <p:nvPr>
             <p:extLst>
               <p:ext uri="{D42A27DB-BD31-4B8C-83A1-F6EECF244321}">
-                <p14:modId xmlns:p14="http://schemas.microsoft.com/office/powerpoint/2010/main" val="2240059232"/>
+                <p14:modId xmlns:p14="http://schemas.microsoft.com/office/powerpoint/2010/main" val="2741046476"/>
               </p:ext>
             </p:extLst>
           </p:nvPr>
         </p:nvGraphicFramePr>
         <p:xfrm>
-          <a:off x="2178547" y="21404262"/>
+          <a:off x="2178547" y="21544708"/>
           <a:ext cx="7560001" cy="3675978"/>
         </p:xfrm>
         <a:graphic>
@@ -10482,77 +10492,6 @@
       </p:sp>
       <p:pic>
         <p:nvPicPr>
-          <p:cNvPr id="75" name="Picture 11"/>
-          <p:cNvPicPr>
-            <a:picLocks noChangeAspect="1" noChangeArrowheads="1"/>
-          </p:cNvPicPr>
-          <p:nvPr/>
-        </p:nvPicPr>
-        <p:blipFill>
-          <a:blip r:embed="rId12">
-            <a:extLst>
-              <a:ext uri="{28A0092B-C50C-407E-A947-70E740481C1C}">
-                <a14:useLocalDpi xmlns:a14="http://schemas.microsoft.com/office/drawing/2010/main" val="0"/>
-              </a:ext>
-            </a:extLst>
-          </a:blip>
-          <a:stretch>
-            <a:fillRect/>
-          </a:stretch>
-        </p:blipFill>
-        <p:spPr bwMode="auto">
-          <a:xfrm>
-            <a:off x="11180427" y="39957271"/>
-            <a:ext cx="7920000" cy="817143"/>
-          </a:xfrm>
-          <a:prstGeom prst="rect">
-            <a:avLst/>
-          </a:prstGeom>
-          <a:noFill/>
-          <a:extLst>
-            <a:ext uri="{909E8E84-426E-40DD-AFC4-6F175D3DCCD1}">
-              <a14:hiddenFill xmlns:a14="http://schemas.microsoft.com/office/drawing/2010/main">
-                <a:solidFill>
-                  <a:srgbClr val="FFFFFF"/>
-                </a:solidFill>
-              </a14:hiddenFill>
-            </a:ext>
-          </a:extLst>
-        </p:spPr>
-      </p:pic>
-      <p:sp>
-        <p:nvSpPr>
-          <p:cNvPr id="76" name="TextBox 75"/>
-          <p:cNvSpPr txBox="1"/>
-          <p:nvPr/>
-        </p:nvSpPr>
-        <p:spPr>
-          <a:xfrm>
-            <a:off x="10747499" y="39550278"/>
-            <a:ext cx="3148167" cy="523212"/>
-          </a:xfrm>
-          <a:prstGeom prst="rect">
-            <a:avLst/>
-          </a:prstGeom>
-          <a:noFill/>
-        </p:spPr>
-        <p:txBody>
-          <a:bodyPr wrap="square" lIns="91431" tIns="45716" rIns="91431" bIns="45716" rtlCol="1">
-            <a:spAutoFit/>
-          </a:bodyPr>
-          <a:lstStyle/>
-          <a:p>
-            <a:pPr algn="ctr"/>
-            <a:r>
-              <a:rPr lang="en-US" sz="2800" dirty="0"/>
-              <a:t>fitness</a:t>
-            </a:r>
-            <a:endParaRPr lang="he-IL" sz="2800" dirty="0"/>
-          </a:p>
-        </p:txBody>
-      </p:sp>
-      <p:pic>
-        <p:nvPicPr>
           <p:cNvPr id="35" name="Picture 6" descr="D:\workspace\ruggedsim\manuscript\adaptation_rate_s_0.05_logN_6.png"/>
           <p:cNvPicPr>
             <a:picLocks noChangeAspect="1" noChangeArrowheads="1"/>
@@ -10560,7 +10499,7 @@
           <p:nvPr/>
         </p:nvPicPr>
         <p:blipFill>
-          <a:blip r:embed="rId14">
+          <a:blip r:embed="rId13">
             <a:extLst>
               <a:ext uri="{28A0092B-C50C-407E-A947-70E740481C1C}">
                 <a14:useLocalDpi xmlns:a14="http://schemas.microsoft.com/office/drawing/2010/main" val="0"/>
@@ -10600,7 +10539,7 @@
         </p:nvSpPr>
         <p:spPr>
           <a:xfrm>
-            <a:off x="10380468" y="18597600"/>
+            <a:off x="17588259" y="18451934"/>
             <a:ext cx="1519159" cy="830989"/>
           </a:xfrm>
           <a:prstGeom prst="rect">
@@ -10632,7 +10571,7 @@
           <p:nvPr/>
         </p:nvPicPr>
         <p:blipFill>
-          <a:blip r:embed="rId15">
+          <a:blip r:embed="rId14">
             <a:extLst>
               <a:ext uri="{28A0092B-C50C-407E-A947-70E740481C1C}">
                 <a14:useLocalDpi xmlns:a14="http://schemas.microsoft.com/office/drawing/2010/main" val="0"/>
@@ -10672,7 +10611,7 @@
         </p:nvSpPr>
         <p:spPr>
           <a:xfrm>
-            <a:off x="19525484" y="18629057"/>
+            <a:off x="26798292" y="18523942"/>
             <a:ext cx="1519159" cy="830989"/>
           </a:xfrm>
           <a:prstGeom prst="rect">
@@ -10697,208 +10636,6 @@
       </p:sp>
       <p:pic>
         <p:nvPicPr>
-          <p:cNvPr id="81" name="Picture 15" descr="D:\workspace\ruggedsim\manuscript\fitness_landscape_key_vertical.png"/>
-          <p:cNvPicPr>
-            <a:picLocks noChangeAspect="1" noChangeArrowheads="1"/>
-          </p:cNvPicPr>
-          <p:nvPr/>
-        </p:nvPicPr>
-        <p:blipFill rotWithShape="1">
-          <a:blip r:embed="rId16">
-            <a:extLst>
-              <a:ext uri="{28A0092B-C50C-407E-A947-70E740481C1C}">
-                <a14:useLocalDpi xmlns:a14="http://schemas.microsoft.com/office/drawing/2010/main" val="0"/>
-              </a:ext>
-            </a:extLst>
-          </a:blip>
-          <a:srcRect l="41233" b="35462"/>
-          <a:stretch/>
-        </p:blipFill>
-        <p:spPr bwMode="auto">
-          <a:xfrm>
-            <a:off x="2250555" y="36669958"/>
-            <a:ext cx="2518881" cy="2637163"/>
-          </a:xfrm>
-          <a:prstGeom prst="rect">
-            <a:avLst/>
-          </a:prstGeom>
-          <a:noFill/>
-          <a:extLst>
-            <a:ext uri="{909E8E84-426E-40DD-AFC4-6F175D3DCCD1}">
-              <a14:hiddenFill xmlns:a14="http://schemas.microsoft.com/office/drawing/2010/main">
-                <a:solidFill>
-                  <a:srgbClr val="FFFFFF"/>
-                </a:solidFill>
-              </a14:hiddenFill>
-            </a:ext>
-          </a:extLst>
-        </p:spPr>
-      </p:pic>
-      <p:grpSp>
-        <p:nvGrpSpPr>
-          <p:cNvPr id="1028" name="Group 1027"/>
-          <p:cNvGrpSpPr/>
-          <p:nvPr/>
-        </p:nvGrpSpPr>
-        <p:grpSpPr>
-          <a:xfrm>
-            <a:off x="2106539" y="33501606"/>
-            <a:ext cx="1872208" cy="2871808"/>
-            <a:chOff x="2106539" y="34446222"/>
-            <a:chExt cx="1872208" cy="2871808"/>
-          </a:xfrm>
-        </p:grpSpPr>
-        <p:pic>
-          <p:nvPicPr>
-            <p:cNvPr id="80" name="Picture 15" descr="D:\workspace\ruggedsim\manuscript\fitness_landscape_key_vertical.png"/>
-            <p:cNvPicPr>
-              <a:picLocks noChangeAspect="1" noChangeArrowheads="1"/>
-            </p:cNvPicPr>
-            <p:nvPr/>
-          </p:nvPicPr>
-          <p:blipFill rotWithShape="1">
-            <a:blip r:embed="rId17">
-              <a:extLst>
-                <a:ext uri="{28A0092B-C50C-407E-A947-70E740481C1C}">
-                  <a14:useLocalDpi xmlns:a14="http://schemas.microsoft.com/office/drawing/2010/main" val="0"/>
-                </a:ext>
-              </a:extLst>
-            </a:blip>
-            <a:srcRect t="38941" r="56795" b="37231"/>
-            <a:stretch/>
-          </p:blipFill>
-          <p:spPr bwMode="auto">
-            <a:xfrm>
-              <a:off x="2126882" y="35301806"/>
-              <a:ext cx="1851865" cy="973669"/>
-            </a:xfrm>
-            <a:prstGeom prst="rect">
-              <a:avLst/>
-            </a:prstGeom>
-            <a:noFill/>
-            <a:extLst>
-              <a:ext uri="{909E8E84-426E-40DD-AFC4-6F175D3DCCD1}">
-                <a14:hiddenFill xmlns:a14="http://schemas.microsoft.com/office/drawing/2010/main">
-                  <a:solidFill>
-                    <a:srgbClr val="FFFFFF"/>
-                  </a:solidFill>
-                </a14:hiddenFill>
-              </a:ext>
-            </a:extLst>
-          </p:spPr>
-        </p:pic>
-        <p:pic>
-          <p:nvPicPr>
-            <p:cNvPr id="82" name="Picture 15" descr="D:\workspace\ruggedsim\manuscript\fitness_landscape_key_vertical.png"/>
-            <p:cNvPicPr>
-              <a:picLocks noChangeAspect="1" noChangeArrowheads="1"/>
-            </p:cNvPicPr>
-            <p:nvPr/>
-          </p:nvPicPr>
-          <p:blipFill rotWithShape="1">
-            <a:blip r:embed="rId17">
-              <a:extLst>
-                <a:ext uri="{28A0092B-C50C-407E-A947-70E740481C1C}">
-                  <a14:useLocalDpi xmlns:a14="http://schemas.microsoft.com/office/drawing/2010/main" val="0"/>
-                </a:ext>
-              </a:extLst>
-            </a:blip>
-            <a:srcRect r="56795" b="76887"/>
-            <a:stretch/>
-          </p:blipFill>
-          <p:spPr bwMode="auto">
-            <a:xfrm>
-              <a:off x="2114923" y="34446222"/>
-              <a:ext cx="1851865" cy="944445"/>
-            </a:xfrm>
-            <a:prstGeom prst="rect">
-              <a:avLst/>
-            </a:prstGeom>
-            <a:noFill/>
-            <a:extLst>
-              <a:ext uri="{909E8E84-426E-40DD-AFC4-6F175D3DCCD1}">
-                <a14:hiddenFill xmlns:a14="http://schemas.microsoft.com/office/drawing/2010/main">
-                  <a:solidFill>
-                    <a:srgbClr val="FFFFFF"/>
-                  </a:solidFill>
-                </a14:hiddenFill>
-              </a:ext>
-            </a:extLst>
-          </p:spPr>
-        </p:pic>
-        <p:pic>
-          <p:nvPicPr>
-            <p:cNvPr id="83" name="Picture 15" descr="D:\workspace\ruggedsim\manuscript\fitness_landscape_key_vertical.png"/>
-            <p:cNvPicPr>
-              <a:picLocks noChangeAspect="1" noChangeArrowheads="1"/>
-            </p:cNvPicPr>
-            <p:nvPr/>
-          </p:nvPicPr>
-          <p:blipFill rotWithShape="1">
-            <a:blip r:embed="rId17">
-              <a:extLst>
-                <a:ext uri="{28A0092B-C50C-407E-A947-70E740481C1C}">
-                  <a14:useLocalDpi xmlns:a14="http://schemas.microsoft.com/office/drawing/2010/main" val="0"/>
-                </a:ext>
-              </a:extLst>
-            </a:blip>
-            <a:srcRect t="76020" r="56795"/>
-            <a:stretch/>
-          </p:blipFill>
-          <p:spPr bwMode="auto">
-            <a:xfrm>
-              <a:off x="2106539" y="36338147"/>
-              <a:ext cx="1851865" cy="979883"/>
-            </a:xfrm>
-            <a:prstGeom prst="rect">
-              <a:avLst/>
-            </a:prstGeom>
-            <a:noFill/>
-            <a:extLst>
-              <a:ext uri="{909E8E84-426E-40DD-AFC4-6F175D3DCCD1}">
-                <a14:hiddenFill xmlns:a14="http://schemas.microsoft.com/office/drawing/2010/main">
-                  <a:solidFill>
-                    <a:srgbClr val="FFFFFF"/>
-                  </a:solidFill>
-                </a14:hiddenFill>
-              </a:ext>
-            </a:extLst>
-          </p:spPr>
-        </p:pic>
-      </p:grpSp>
-      <p:sp>
-        <p:nvSpPr>
-          <p:cNvPr id="67" name="TextBox 66"/>
-          <p:cNvSpPr txBox="1"/>
-          <p:nvPr/>
-        </p:nvSpPr>
-        <p:spPr>
-          <a:xfrm>
-            <a:off x="1622668" y="39478270"/>
-            <a:ext cx="3148167" cy="523212"/>
-          </a:xfrm>
-          <a:prstGeom prst="rect">
-            <a:avLst/>
-          </a:prstGeom>
-          <a:noFill/>
-        </p:spPr>
-        <p:txBody>
-          <a:bodyPr wrap="square" lIns="91431" tIns="45716" rIns="91431" bIns="45716" rtlCol="1">
-            <a:spAutoFit/>
-          </a:bodyPr>
-          <a:lstStyle/>
-          <a:p>
-            <a:pPr algn="ctr"/>
-            <a:r>
-              <a:rPr lang="en-US" sz="2800" dirty="0"/>
-              <a:t>fitness</a:t>
-            </a:r>
-            <a:endParaRPr lang="he-IL" sz="2800" dirty="0"/>
-          </a:p>
-        </p:txBody>
-      </p:sp>
-      <p:pic>
-        <p:nvPicPr>
           <p:cNvPr id="90" name="Picture 29" descr="D:\university\confrences\GRC2013\yoav_mypictr_Facebook.jpg"/>
           <p:cNvPicPr>
             <a:picLocks noChangeAspect="1" noChangeArrowheads="1"/>
@@ -10906,7 +10643,7 @@
           <p:nvPr/>
         </p:nvPicPr>
         <p:blipFill>
-          <a:blip r:embed="rId18">
+          <a:blip r:embed="rId15">
             <a:extLst>
               <a:ext uri="{28A0092B-C50C-407E-A947-70E740481C1C}">
                 <a14:useLocalDpi xmlns:a14="http://schemas.microsoft.com/office/drawing/2010/main" val="0"/>
@@ -10920,7 +10657,7 @@
         </p:blipFill>
         <p:spPr bwMode="auto">
           <a:xfrm>
-            <a:off x="25797171" y="37246022"/>
+            <a:off x="25869179" y="37246022"/>
             <a:ext cx="2376264" cy="2970330"/>
           </a:xfrm>
           <a:prstGeom prst="rect">
@@ -10945,354 +10682,6 @@
           </a:extLst>
         </p:spPr>
       </p:pic>
-      <p:sp>
-        <p:nvSpPr>
-          <p:cNvPr id="6" name="Rectangle 5"/>
-          <p:cNvSpPr/>
-          <p:nvPr/>
-        </p:nvSpPr>
-        <p:spPr>
-          <a:xfrm>
-            <a:off x="869302" y="665958"/>
-            <a:ext cx="1813301" cy="936104"/>
-          </a:xfrm>
-          <a:prstGeom prst="rect">
-            <a:avLst/>
-          </a:prstGeom>
-        </p:spPr>
-        <p:style>
-          <a:lnRef idx="2">
-            <a:schemeClr val="accent5"/>
-          </a:lnRef>
-          <a:fillRef idx="1">
-            <a:schemeClr val="lt1"/>
-          </a:fillRef>
-          <a:effectRef idx="0">
-            <a:schemeClr val="accent5"/>
-          </a:effectRef>
-          <a:fontRef idx="minor">
-            <a:schemeClr val="dk1"/>
-          </a:fontRef>
-        </p:style>
-        <p:txBody>
-          <a:bodyPr rtlCol="1" anchor="ctr"/>
-          <a:lstStyle/>
-          <a:p>
-            <a:pPr algn="ctr"/>
-            <a:endParaRPr lang="he-IL"/>
-          </a:p>
-        </p:txBody>
-      </p:sp>
-      <p:pic>
-        <p:nvPicPr>
-          <p:cNvPr id="3" name="Picture 4" descr="D:\university\confrences\ESEB2013\tmnt.jpg"/>
-          <p:cNvPicPr>
-            <a:picLocks noChangeAspect="1" noChangeArrowheads="1"/>
-          </p:cNvPicPr>
-          <p:nvPr/>
-        </p:nvPicPr>
-        <p:blipFill rotWithShape="1">
-          <a:blip r:embed="rId19">
-            <a:clrChange>
-              <a:clrFrom>
-                <a:srgbClr val="FFFFFF"/>
-              </a:clrFrom>
-              <a:clrTo>
-                <a:srgbClr val="FFFFFF">
-                  <a:alpha val="0"/>
-                </a:srgbClr>
-              </a:clrTo>
-            </a:clrChange>
-            <a:extLst>
-              <a:ext uri="{28A0092B-C50C-407E-A947-70E740481C1C}">
-                <a14:useLocalDpi xmlns:a14="http://schemas.microsoft.com/office/drawing/2010/main" val="0"/>
-              </a:ext>
-            </a:extLst>
-          </a:blip>
-          <a:srcRect l="3040" t="3608" r="53306" b="48387"/>
-          <a:stretch/>
-        </p:blipFill>
-        <p:spPr bwMode="auto">
-          <a:xfrm>
-            <a:off x="-24315" y="65498"/>
-            <a:ext cx="3534310" cy="3369924"/>
-          </a:xfrm>
-          <a:prstGeom prst="rect">
-            <a:avLst/>
-          </a:prstGeom>
-          <a:noFill/>
-          <a:extLst>
-            <a:ext uri="{909E8E84-426E-40DD-AFC4-6F175D3DCCD1}">
-              <a14:hiddenFill xmlns:a14="http://schemas.microsoft.com/office/drawing/2010/main">
-                <a:solidFill>
-                  <a:srgbClr val="FFFFFF"/>
-                </a:solidFill>
-              </a14:hiddenFill>
-            </a:ext>
-          </a:extLst>
-        </p:spPr>
-      </p:pic>
-      <p:sp>
-        <p:nvSpPr>
-          <p:cNvPr id="17" name="Rectangle 16"/>
-          <p:cNvSpPr/>
-          <p:nvPr/>
-        </p:nvSpPr>
-        <p:spPr>
-          <a:xfrm>
-            <a:off x="3751941" y="3082621"/>
-            <a:ext cx="1348725" cy="1180815"/>
-          </a:xfrm>
-          <a:prstGeom prst="rect">
-            <a:avLst/>
-          </a:prstGeom>
-        </p:spPr>
-        <p:style>
-          <a:lnRef idx="2">
-            <a:schemeClr val="accent4"/>
-          </a:lnRef>
-          <a:fillRef idx="1">
-            <a:schemeClr val="lt1"/>
-          </a:fillRef>
-          <a:effectRef idx="0">
-            <a:schemeClr val="accent4"/>
-          </a:effectRef>
-          <a:fontRef idx="minor">
-            <a:schemeClr val="dk1"/>
-          </a:fontRef>
-        </p:style>
-        <p:txBody>
-          <a:bodyPr rtlCol="1" anchor="ctr"/>
-          <a:lstStyle/>
-          <a:p>
-            <a:pPr algn="ctr"/>
-            <a:endParaRPr lang="he-IL"/>
-          </a:p>
-        </p:txBody>
-      </p:sp>
-      <p:pic>
-        <p:nvPicPr>
-          <p:cNvPr id="77" name="Picture 4" descr="D:\university\confrences\ESEB2013\tmnt.jpg"/>
-          <p:cNvPicPr>
-            <a:picLocks noChangeAspect="1" noChangeArrowheads="1"/>
-          </p:cNvPicPr>
-          <p:nvPr/>
-        </p:nvPicPr>
-        <p:blipFill rotWithShape="1">
-          <a:blip r:embed="rId19">
-            <a:clrChange>
-              <a:clrFrom>
-                <a:srgbClr val="FFFFFF"/>
-              </a:clrFrom>
-              <a:clrTo>
-                <a:srgbClr val="FFFFFF">
-                  <a:alpha val="0"/>
-                </a:srgbClr>
-              </a:clrTo>
-            </a:clrChange>
-            <a:extLst>
-              <a:ext uri="{28A0092B-C50C-407E-A947-70E740481C1C}">
-                <a14:useLocalDpi xmlns:a14="http://schemas.microsoft.com/office/drawing/2010/main" val="0"/>
-              </a:ext>
-            </a:extLst>
-          </a:blip>
-          <a:srcRect l="5657" t="52711" r="51069" b="291"/>
-          <a:stretch/>
-        </p:blipFill>
-        <p:spPr bwMode="auto">
-          <a:xfrm>
-            <a:off x="2612065" y="2650733"/>
-            <a:ext cx="3503488" cy="3299271"/>
-          </a:xfrm>
-          <a:prstGeom prst="rect">
-            <a:avLst/>
-          </a:prstGeom>
-          <a:noFill/>
-          <a:extLst>
-            <a:ext uri="{909E8E84-426E-40DD-AFC4-6F175D3DCCD1}">
-              <a14:hiddenFill xmlns:a14="http://schemas.microsoft.com/office/drawing/2010/main">
-                <a:solidFill>
-                  <a:srgbClr val="FFFFFF"/>
-                </a:solidFill>
-              </a14:hiddenFill>
-            </a:ext>
-          </a:extLst>
-        </p:spPr>
-      </p:pic>
-      <p:sp>
-        <p:nvSpPr>
-          <p:cNvPr id="24" name="Rectangle 23"/>
-          <p:cNvSpPr/>
-          <p:nvPr/>
-        </p:nvSpPr>
-        <p:spPr>
-          <a:xfrm>
-            <a:off x="24717051" y="3673028"/>
-            <a:ext cx="1872208" cy="809354"/>
-          </a:xfrm>
-          <a:prstGeom prst="rect">
-            <a:avLst/>
-          </a:prstGeom>
-        </p:spPr>
-        <p:style>
-          <a:lnRef idx="2">
-            <a:schemeClr val="accent5"/>
-          </a:lnRef>
-          <a:fillRef idx="1">
-            <a:schemeClr val="lt1"/>
-          </a:fillRef>
-          <a:effectRef idx="0">
-            <a:schemeClr val="accent5"/>
-          </a:effectRef>
-          <a:fontRef idx="minor">
-            <a:schemeClr val="dk1"/>
-          </a:fontRef>
-        </p:style>
-        <p:txBody>
-          <a:bodyPr rtlCol="1" anchor="ctr"/>
-          <a:lstStyle/>
-          <a:p>
-            <a:pPr algn="ctr"/>
-            <a:endParaRPr lang="he-IL"/>
-          </a:p>
-        </p:txBody>
-      </p:sp>
-      <p:sp>
-        <p:nvSpPr>
-          <p:cNvPr id="86" name="Rectangle 85"/>
-          <p:cNvSpPr/>
-          <p:nvPr/>
-        </p:nvSpPr>
-        <p:spPr>
-          <a:xfrm>
-            <a:off x="27323896" y="747107"/>
-            <a:ext cx="1872208" cy="809354"/>
-          </a:xfrm>
-          <a:prstGeom prst="rect">
-            <a:avLst/>
-          </a:prstGeom>
-        </p:spPr>
-        <p:style>
-          <a:lnRef idx="2">
-            <a:schemeClr val="accent5"/>
-          </a:lnRef>
-          <a:fillRef idx="1">
-            <a:schemeClr val="lt1"/>
-          </a:fillRef>
-          <a:effectRef idx="0">
-            <a:schemeClr val="accent5"/>
-          </a:effectRef>
-          <a:fontRef idx="minor">
-            <a:schemeClr val="dk1"/>
-          </a:fontRef>
-        </p:style>
-        <p:txBody>
-          <a:bodyPr rtlCol="1" anchor="ctr"/>
-          <a:lstStyle/>
-          <a:p>
-            <a:pPr algn="ctr"/>
-            <a:endParaRPr lang="he-IL"/>
-          </a:p>
-        </p:txBody>
-      </p:sp>
-      <p:pic>
-        <p:nvPicPr>
-          <p:cNvPr id="85" name="Picture 4" descr="D:\university\confrences\ESEB2013\tmnt.jpg"/>
-          <p:cNvPicPr>
-            <a:picLocks noChangeAspect="1" noChangeArrowheads="1"/>
-          </p:cNvPicPr>
-          <p:nvPr/>
-        </p:nvPicPr>
-        <p:blipFill rotWithShape="1">
-          <a:blip r:embed="rId19">
-            <a:clrChange>
-              <a:clrFrom>
-                <a:srgbClr val="FFFFFF"/>
-              </a:clrFrom>
-              <a:clrTo>
-                <a:srgbClr val="FFFFFF">
-                  <a:alpha val="0"/>
-                </a:srgbClr>
-              </a:clrTo>
-            </a:clrChange>
-            <a:extLst>
-              <a:ext uri="{28A0092B-C50C-407E-A947-70E740481C1C}">
-                <a14:useLocalDpi xmlns:a14="http://schemas.microsoft.com/office/drawing/2010/main" val="0"/>
-              </a:ext>
-            </a:extLst>
-          </a:blip>
-          <a:srcRect l="50804" t="51850" r="4527" b="1462"/>
-          <a:stretch/>
-        </p:blipFill>
-        <p:spPr bwMode="auto">
-          <a:xfrm>
-            <a:off x="23916438" y="3066742"/>
-            <a:ext cx="3616502" cy="3277457"/>
-          </a:xfrm>
-          <a:prstGeom prst="rect">
-            <a:avLst/>
-          </a:prstGeom>
-          <a:noFill/>
-          <a:extLst>
-            <a:ext uri="{909E8E84-426E-40DD-AFC4-6F175D3DCCD1}">
-              <a14:hiddenFill xmlns:a14="http://schemas.microsoft.com/office/drawing/2010/main">
-                <a:solidFill>
-                  <a:srgbClr val="FFFFFF"/>
-                </a:solidFill>
-              </a14:hiddenFill>
-            </a:ext>
-          </a:extLst>
-        </p:spPr>
-      </p:pic>
-      <p:pic>
-        <p:nvPicPr>
-          <p:cNvPr id="84" name="Picture 4" descr="D:\university\confrences\ESEB2013\tmnt.jpg"/>
-          <p:cNvPicPr>
-            <a:picLocks noChangeAspect="1" noChangeArrowheads="1"/>
-          </p:cNvPicPr>
-          <p:nvPr/>
-        </p:nvPicPr>
-        <p:blipFill rotWithShape="1">
-          <a:blip r:embed="rId19">
-            <a:clrChange>
-              <a:clrFrom>
-                <a:srgbClr val="FFFFFF"/>
-              </a:clrFrom>
-              <a:clrTo>
-                <a:srgbClr val="FFFFFF">
-                  <a:alpha val="0"/>
-                </a:srgbClr>
-              </a:clrTo>
-            </a:clrChange>
-            <a:extLst>
-              <a:ext uri="{28A0092B-C50C-407E-A947-70E740481C1C}">
-                <a14:useLocalDpi xmlns:a14="http://schemas.microsoft.com/office/drawing/2010/main" val="0"/>
-              </a:ext>
-            </a:extLst>
-          </a:blip>
-          <a:srcRect l="48517" t="3608" r="7575" b="47872"/>
-          <a:stretch/>
-        </p:blipFill>
-        <p:spPr bwMode="auto">
-          <a:xfrm>
-            <a:off x="26589259" y="29363"/>
-            <a:ext cx="3554858" cy="3406059"/>
-          </a:xfrm>
-          <a:prstGeom prst="rect">
-            <a:avLst/>
-          </a:prstGeom>
-          <a:noFill/>
-          <a:extLst>
-            <a:ext uri="{909E8E84-426E-40DD-AFC4-6F175D3DCCD1}">
-              <a14:hiddenFill xmlns:a14="http://schemas.microsoft.com/office/drawing/2010/main">
-                <a:solidFill>
-                  <a:srgbClr val="FFFFFF"/>
-                </a:solidFill>
-              </a14:hiddenFill>
-            </a:ext>
-          </a:extLst>
-        </p:spPr>
-      </p:pic>
       <p:pic>
         <p:nvPicPr>
           <p:cNvPr id="1029" name="Picture 5"/>
@@ -11302,7 +10691,7 @@
           <p:nvPr/>
         </p:nvPicPr>
         <p:blipFill>
-          <a:blip r:embed="rId20" cstate="print">
+          <a:blip r:embed="rId16" cstate="print">
             <a:clrChange>
               <a:clrFrom>
                 <a:srgbClr val="FFFFFF"/>
@@ -11357,134 +10746,6 @@
           </a:extLst>
         </p:spPr>
       </p:pic>
-      <p:pic>
-        <p:nvPicPr>
-          <p:cNvPr id="88" name="Picture 5"/>
-          <p:cNvPicPr>
-            <a:picLocks noChangeAspect="1" noChangeArrowheads="1"/>
-          </p:cNvPicPr>
-          <p:nvPr/>
-        </p:nvPicPr>
-        <p:blipFill>
-          <a:blip r:embed="rId20" cstate="print">
-            <a:clrChange>
-              <a:clrFrom>
-                <a:srgbClr val="FFFFFF"/>
-              </a:clrFrom>
-              <a:clrTo>
-                <a:srgbClr val="FFFFFF">
-                  <a:alpha val="0"/>
-                </a:srgbClr>
-              </a:clrTo>
-            </a:clrChange>
-            <a:extLst>
-              <a:ext uri="{28A0092B-C50C-407E-A947-70E740481C1C}">
-                <a14:useLocalDpi xmlns:a14="http://schemas.microsoft.com/office/drawing/2010/main" val="0"/>
-              </a:ext>
-            </a:extLst>
-          </a:blip>
-          <a:srcRect/>
-          <a:stretch>
-            <a:fillRect/>
-          </a:stretch>
-        </p:blipFill>
-        <p:spPr bwMode="auto">
-          <a:xfrm>
-            <a:off x="9160997" y="29597518"/>
-            <a:ext cx="793534" cy="1278954"/>
-          </a:xfrm>
-          <a:prstGeom prst="rect">
-            <a:avLst/>
-          </a:prstGeom>
-          <a:noFill/>
-          <a:ln>
-            <a:noFill/>
-          </a:ln>
-          <a:extLst>
-            <a:ext uri="{909E8E84-426E-40DD-AFC4-6F175D3DCCD1}">
-              <a14:hiddenFill xmlns:a14="http://schemas.microsoft.com/office/drawing/2010/main">
-                <a:solidFill>
-                  <a:schemeClr val="accent1"/>
-                </a:solidFill>
-              </a14:hiddenFill>
-            </a:ext>
-            <a:ext uri="{91240B29-F687-4F45-9708-019B960494DF}">
-              <a14:hiddenLine xmlns:a14="http://schemas.microsoft.com/office/drawing/2010/main" w="9525">
-                <a:solidFill>
-                  <a:schemeClr val="tx1"/>
-                </a:solidFill>
-                <a:miter lim="800000"/>
-                <a:headEnd/>
-                <a:tailEnd/>
-              </a14:hiddenLine>
-            </a:ext>
-          </a:extLst>
-        </p:spPr>
-      </p:pic>
-      <p:pic>
-        <p:nvPicPr>
-          <p:cNvPr id="89" name="Picture 5"/>
-          <p:cNvPicPr>
-            <a:picLocks noChangeAspect="1" noChangeArrowheads="1"/>
-          </p:cNvPicPr>
-          <p:nvPr/>
-        </p:nvPicPr>
-        <p:blipFill>
-          <a:blip r:embed="rId20" cstate="print">
-            <a:clrChange>
-              <a:clrFrom>
-                <a:srgbClr val="FFFFFF"/>
-              </a:clrFrom>
-              <a:clrTo>
-                <a:srgbClr val="FFFFFF">
-                  <a:alpha val="0"/>
-                </a:srgbClr>
-              </a:clrTo>
-            </a:clrChange>
-            <a:extLst>
-              <a:ext uri="{28A0092B-C50C-407E-A947-70E740481C1C}">
-                <a14:useLocalDpi xmlns:a14="http://schemas.microsoft.com/office/drawing/2010/main" val="0"/>
-              </a:ext>
-            </a:extLst>
-          </a:blip>
-          <a:srcRect/>
-          <a:stretch>
-            <a:fillRect/>
-          </a:stretch>
-        </p:blipFill>
-        <p:spPr bwMode="auto">
-          <a:xfrm>
-            <a:off x="18378901" y="16737756"/>
-            <a:ext cx="793534" cy="1278954"/>
-          </a:xfrm>
-          <a:prstGeom prst="rect">
-            <a:avLst/>
-          </a:prstGeom>
-          <a:noFill/>
-          <a:ln>
-            <a:noFill/>
-          </a:ln>
-          <a:extLst>
-            <a:ext uri="{909E8E84-426E-40DD-AFC4-6F175D3DCCD1}">
-              <a14:hiddenFill xmlns:a14="http://schemas.microsoft.com/office/drawing/2010/main">
-                <a:solidFill>
-                  <a:schemeClr val="accent1"/>
-                </a:solidFill>
-              </a14:hiddenFill>
-            </a:ext>
-            <a:ext uri="{91240B29-F687-4F45-9708-019B960494DF}">
-              <a14:hiddenLine xmlns:a14="http://schemas.microsoft.com/office/drawing/2010/main" w="9525">
-                <a:solidFill>
-                  <a:schemeClr val="tx1"/>
-                </a:solidFill>
-                <a:miter lim="800000"/>
-                <a:headEnd/>
-                <a:tailEnd/>
-              </a14:hiddenLine>
-            </a:ext>
-          </a:extLst>
-        </p:spPr>
-      </p:pic>
       <p:sp>
         <p:nvSpPr>
           <p:cNvPr id="26" name="TextBox 25"/>
@@ -11508,20 +10769,6 @@
           <a:lstStyle/>
           <a:p>
             <a:pPr algn="ctr" rtl="0"/>
-            <a:r>
-              <a:rPr lang="en-US" sz="2200" dirty="0" smtClean="0">
-                <a:solidFill>
-                  <a:schemeClr val="tx1">
-                    <a:lumMod val="65000"/>
-                    <a:lumOff val="35000"/>
-                  </a:schemeClr>
-                </a:solidFill>
-                <a:latin typeface="Droid Sans" panose="020B0606030804020204" pitchFamily="34" charset="0"/>
-                <a:ea typeface="Droid Sans" panose="020B0606030804020204" pitchFamily="34" charset="0"/>
-                <a:cs typeface="Droid Sans" panose="020B0606030804020204" pitchFamily="34" charset="0"/>
-              </a:rPr>
-              <a:t>(NM: normal mutagenesis)</a:t>
-            </a:r>
             <a:endParaRPr lang="he-IL" sz="2200" dirty="0">
               <a:solidFill>
                 <a:schemeClr val="tx1">
@@ -11532,6 +10779,1364 @@
               <a:latin typeface="Droid Sans" panose="020B0606030804020204" pitchFamily="34" charset="0"/>
               <a:ea typeface="Droid Sans" panose="020B0606030804020204" pitchFamily="34" charset="0"/>
             </a:endParaRPr>
+          </a:p>
+        </p:txBody>
+      </p:sp>
+      <p:cxnSp>
+        <p:nvCxnSpPr>
+          <p:cNvPr id="25" name="Straight Connector 24"/>
+          <p:cNvCxnSpPr/>
+          <p:nvPr/>
+        </p:nvCxnSpPr>
+        <p:spPr>
+          <a:xfrm>
+            <a:off x="12321582" y="18953669"/>
+            <a:ext cx="720000" cy="0"/>
+          </a:xfrm>
+          <a:prstGeom prst="line">
+            <a:avLst/>
+          </a:prstGeom>
+        </p:spPr>
+        <p:style>
+          <a:lnRef idx="3">
+            <a:schemeClr val="dk1"/>
+          </a:lnRef>
+          <a:fillRef idx="0">
+            <a:schemeClr val="dk1"/>
+          </a:fillRef>
+          <a:effectRef idx="2">
+            <a:schemeClr val="dk1"/>
+          </a:effectRef>
+          <a:fontRef idx="minor">
+            <a:schemeClr val="tx1"/>
+          </a:fontRef>
+        </p:style>
+      </p:cxnSp>
+      <p:grpSp>
+        <p:nvGrpSpPr>
+          <p:cNvPr id="31" name="Group 30"/>
+          <p:cNvGrpSpPr/>
+          <p:nvPr/>
+        </p:nvGrpSpPr>
+        <p:grpSpPr>
+          <a:xfrm>
+            <a:off x="13083393" y="18710349"/>
+            <a:ext cx="2056594" cy="821705"/>
+            <a:chOff x="13463618" y="18710349"/>
+            <a:chExt cx="2056594" cy="821705"/>
+          </a:xfrm>
+        </p:grpSpPr>
+        <p:sp>
+          <p:nvSpPr>
+            <p:cNvPr id="27" name="TextBox 26"/>
+            <p:cNvSpPr txBox="1"/>
+            <p:nvPr/>
+          </p:nvSpPr>
+          <p:spPr>
+            <a:xfrm>
+              <a:off x="13483803" y="18710349"/>
+              <a:ext cx="2036409" cy="461665"/>
+            </a:xfrm>
+            <a:prstGeom prst="rect">
+              <a:avLst/>
+            </a:prstGeom>
+            <a:noFill/>
+          </p:spPr>
+          <p:txBody>
+            <a:bodyPr wrap="square" rtlCol="1">
+              <a:spAutoFit/>
+            </a:bodyPr>
+            <a:lstStyle/>
+            <a:p>
+              <a:pPr algn="l" rtl="0"/>
+              <a:r>
+                <a:rPr lang="en-US" sz="2400" dirty="0" smtClean="0"/>
+                <a:t>Approximation</a:t>
+              </a:r>
+              <a:endParaRPr lang="he-IL" sz="2400" dirty="0"/>
+            </a:p>
+          </p:txBody>
+        </p:sp>
+        <p:sp>
+          <p:nvSpPr>
+            <p:cNvPr id="91" name="TextBox 90"/>
+            <p:cNvSpPr txBox="1"/>
+            <p:nvPr/>
+          </p:nvSpPr>
+          <p:spPr>
+            <a:xfrm>
+              <a:off x="13463618" y="19070389"/>
+              <a:ext cx="2036409" cy="461665"/>
+            </a:xfrm>
+            <a:prstGeom prst="rect">
+              <a:avLst/>
+            </a:prstGeom>
+            <a:noFill/>
+          </p:spPr>
+          <p:txBody>
+            <a:bodyPr wrap="square" rtlCol="1">
+              <a:spAutoFit/>
+            </a:bodyPr>
+            <a:lstStyle/>
+            <a:p>
+              <a:pPr algn="l" rtl="0"/>
+              <a:r>
+                <a:rPr lang="en-US" sz="2400" dirty="0" smtClean="0"/>
+                <a:t>Simulation</a:t>
+              </a:r>
+              <a:endParaRPr lang="he-IL" sz="2400" dirty="0"/>
+            </a:p>
+          </p:txBody>
+        </p:sp>
+      </p:grpSp>
+      <p:grpSp>
+        <p:nvGrpSpPr>
+          <p:cNvPr id="30" name="Group 29"/>
+          <p:cNvGrpSpPr/>
+          <p:nvPr/>
+        </p:nvGrpSpPr>
+        <p:grpSpPr>
+          <a:xfrm>
+            <a:off x="12637723" y="19116000"/>
+            <a:ext cx="126000" cy="387533"/>
+            <a:chOff x="12637723" y="19116000"/>
+            <a:chExt cx="126000" cy="387533"/>
+          </a:xfrm>
+        </p:grpSpPr>
+        <p:sp>
+          <p:nvSpPr>
+            <p:cNvPr id="28" name="Oval 27"/>
+            <p:cNvSpPr/>
+            <p:nvPr/>
+          </p:nvSpPr>
+          <p:spPr>
+            <a:xfrm>
+              <a:off x="12637723" y="19244022"/>
+              <a:ext cx="126000" cy="126000"/>
+            </a:xfrm>
+            <a:prstGeom prst="ellipse">
+              <a:avLst/>
+            </a:prstGeom>
+          </p:spPr>
+          <p:style>
+            <a:lnRef idx="2">
+              <a:schemeClr val="dk1">
+                <a:shade val="50000"/>
+              </a:schemeClr>
+            </a:lnRef>
+            <a:fillRef idx="1">
+              <a:schemeClr val="dk1"/>
+            </a:fillRef>
+            <a:effectRef idx="0">
+              <a:schemeClr val="dk1"/>
+            </a:effectRef>
+            <a:fontRef idx="minor">
+              <a:schemeClr val="lt1"/>
+            </a:fontRef>
+          </p:style>
+          <p:txBody>
+            <a:bodyPr rtlCol="1" anchor="ctr"/>
+            <a:lstStyle/>
+            <a:p>
+              <a:pPr algn="ctr"/>
+              <a:endParaRPr lang="he-IL"/>
+            </a:p>
+          </p:txBody>
+        </p:sp>
+        <p:cxnSp>
+          <p:nvCxnSpPr>
+            <p:cNvPr id="95" name="Straight Connector 94"/>
+            <p:cNvCxnSpPr/>
+            <p:nvPr/>
+          </p:nvCxnSpPr>
+          <p:spPr>
+            <a:xfrm>
+              <a:off x="12700800" y="19116000"/>
+              <a:ext cx="0" cy="387533"/>
+            </a:xfrm>
+            <a:prstGeom prst="line">
+              <a:avLst/>
+            </a:prstGeom>
+            <a:effectLst/>
+          </p:spPr>
+          <p:style>
+            <a:lnRef idx="3">
+              <a:schemeClr val="dk1"/>
+            </a:lnRef>
+            <a:fillRef idx="0">
+              <a:schemeClr val="dk1"/>
+            </a:fillRef>
+            <a:effectRef idx="2">
+              <a:schemeClr val="dk1"/>
+            </a:effectRef>
+            <a:fontRef idx="minor">
+              <a:schemeClr val="tx1"/>
+            </a:fontRef>
+          </p:style>
+        </p:cxnSp>
+      </p:grpSp>
+      <p:grpSp>
+        <p:nvGrpSpPr>
+          <p:cNvPr id="114" name="Group 113"/>
+          <p:cNvGrpSpPr/>
+          <p:nvPr/>
+        </p:nvGrpSpPr>
+        <p:grpSpPr>
+          <a:xfrm>
+            <a:off x="1962523" y="33357590"/>
+            <a:ext cx="2751940" cy="5976664"/>
+            <a:chOff x="1962523" y="33357590"/>
+            <a:chExt cx="2751940" cy="5976664"/>
+          </a:xfrm>
+        </p:grpSpPr>
+        <p:pic>
+          <p:nvPicPr>
+            <p:cNvPr id="81" name="Picture 15" descr="D:\workspace\ruggedsim\manuscript\fitness_landscape_key_vertical.png"/>
+            <p:cNvPicPr>
+              <a:picLocks noChangeAspect="1" noChangeArrowheads="1"/>
+            </p:cNvPicPr>
+            <p:nvPr/>
+          </p:nvPicPr>
+          <p:blipFill rotWithShape="1">
+            <a:blip r:embed="rId17">
+              <a:extLst>
+                <a:ext uri="{28A0092B-C50C-407E-A947-70E740481C1C}">
+                  <a14:useLocalDpi xmlns:a14="http://schemas.microsoft.com/office/drawing/2010/main" val="0"/>
+                </a:ext>
+              </a:extLst>
+            </a:blip>
+            <a:srcRect l="41233" b="35462"/>
+            <a:stretch/>
+          </p:blipFill>
+          <p:spPr bwMode="auto">
+            <a:xfrm>
+              <a:off x="2107938" y="36597950"/>
+              <a:ext cx="2518881" cy="2637163"/>
+            </a:xfrm>
+            <a:prstGeom prst="rect">
+              <a:avLst/>
+            </a:prstGeom>
+            <a:noFill/>
+            <a:extLst>
+              <a:ext uri="{909E8E84-426E-40DD-AFC4-6F175D3DCCD1}">
+                <a14:hiddenFill xmlns:a14="http://schemas.microsoft.com/office/drawing/2010/main">
+                  <a:solidFill>
+                    <a:srgbClr val="FFFFFF"/>
+                  </a:solidFill>
+                </a14:hiddenFill>
+              </a:ext>
+            </a:extLst>
+          </p:spPr>
+        </p:pic>
+        <p:grpSp>
+          <p:nvGrpSpPr>
+            <p:cNvPr id="1028" name="Group 1027"/>
+            <p:cNvGrpSpPr/>
+            <p:nvPr/>
+          </p:nvGrpSpPr>
+          <p:grpSpPr>
+            <a:xfrm>
+              <a:off x="2034531" y="33501606"/>
+              <a:ext cx="1872208" cy="2871808"/>
+              <a:chOff x="2106539" y="34446222"/>
+              <a:chExt cx="1872208" cy="2871808"/>
+            </a:xfrm>
+          </p:grpSpPr>
+          <p:pic>
+            <p:nvPicPr>
+              <p:cNvPr id="80" name="Picture 15" descr="D:\workspace\ruggedsim\manuscript\fitness_landscape_key_vertical.png"/>
+              <p:cNvPicPr>
+                <a:picLocks noChangeAspect="1" noChangeArrowheads="1"/>
+              </p:cNvPicPr>
+              <p:nvPr/>
+            </p:nvPicPr>
+            <p:blipFill rotWithShape="1">
+              <a:blip r:embed="rId18">
+                <a:extLst>
+                  <a:ext uri="{28A0092B-C50C-407E-A947-70E740481C1C}">
+                    <a14:useLocalDpi xmlns:a14="http://schemas.microsoft.com/office/drawing/2010/main" val="0"/>
+                  </a:ext>
+                </a:extLst>
+              </a:blip>
+              <a:srcRect t="38941" r="56795" b="37231"/>
+              <a:stretch/>
+            </p:blipFill>
+            <p:spPr bwMode="auto">
+              <a:xfrm>
+                <a:off x="2126882" y="35301806"/>
+                <a:ext cx="1851865" cy="973669"/>
+              </a:xfrm>
+              <a:prstGeom prst="rect">
+                <a:avLst/>
+              </a:prstGeom>
+              <a:noFill/>
+              <a:extLst>
+                <a:ext uri="{909E8E84-426E-40DD-AFC4-6F175D3DCCD1}">
+                  <a14:hiddenFill xmlns:a14="http://schemas.microsoft.com/office/drawing/2010/main">
+                    <a:solidFill>
+                      <a:srgbClr val="FFFFFF"/>
+                    </a:solidFill>
+                  </a14:hiddenFill>
+                </a:ext>
+              </a:extLst>
+            </p:spPr>
+          </p:pic>
+          <p:pic>
+            <p:nvPicPr>
+              <p:cNvPr id="82" name="Picture 15" descr="D:\workspace\ruggedsim\manuscript\fitness_landscape_key_vertical.png"/>
+              <p:cNvPicPr>
+                <a:picLocks noChangeAspect="1" noChangeArrowheads="1"/>
+              </p:cNvPicPr>
+              <p:nvPr/>
+            </p:nvPicPr>
+            <p:blipFill rotWithShape="1">
+              <a:blip r:embed="rId18">
+                <a:extLst>
+                  <a:ext uri="{28A0092B-C50C-407E-A947-70E740481C1C}">
+                    <a14:useLocalDpi xmlns:a14="http://schemas.microsoft.com/office/drawing/2010/main" val="0"/>
+                  </a:ext>
+                </a:extLst>
+              </a:blip>
+              <a:srcRect r="56795" b="76887"/>
+              <a:stretch/>
+            </p:blipFill>
+            <p:spPr bwMode="auto">
+              <a:xfrm>
+                <a:off x="2114923" y="34446222"/>
+                <a:ext cx="1851865" cy="944445"/>
+              </a:xfrm>
+              <a:prstGeom prst="rect">
+                <a:avLst/>
+              </a:prstGeom>
+              <a:noFill/>
+              <a:extLst>
+                <a:ext uri="{909E8E84-426E-40DD-AFC4-6F175D3DCCD1}">
+                  <a14:hiddenFill xmlns:a14="http://schemas.microsoft.com/office/drawing/2010/main">
+                    <a:solidFill>
+                      <a:srgbClr val="FFFFFF"/>
+                    </a:solidFill>
+                  </a14:hiddenFill>
+                </a:ext>
+              </a:extLst>
+            </p:spPr>
+          </p:pic>
+          <p:pic>
+            <p:nvPicPr>
+              <p:cNvPr id="83" name="Picture 15" descr="D:\workspace\ruggedsim\manuscript\fitness_landscape_key_vertical.png"/>
+              <p:cNvPicPr>
+                <a:picLocks noChangeAspect="1" noChangeArrowheads="1"/>
+              </p:cNvPicPr>
+              <p:nvPr/>
+            </p:nvPicPr>
+            <p:blipFill rotWithShape="1">
+              <a:blip r:embed="rId18">
+                <a:extLst>
+                  <a:ext uri="{28A0092B-C50C-407E-A947-70E740481C1C}">
+                    <a14:useLocalDpi xmlns:a14="http://schemas.microsoft.com/office/drawing/2010/main" val="0"/>
+                  </a:ext>
+                </a:extLst>
+              </a:blip>
+              <a:srcRect t="76020" r="56795"/>
+              <a:stretch/>
+            </p:blipFill>
+            <p:spPr bwMode="auto">
+              <a:xfrm>
+                <a:off x="2106539" y="36338147"/>
+                <a:ext cx="1851865" cy="979883"/>
+              </a:xfrm>
+              <a:prstGeom prst="rect">
+                <a:avLst/>
+              </a:prstGeom>
+              <a:noFill/>
+              <a:extLst>
+                <a:ext uri="{909E8E84-426E-40DD-AFC4-6F175D3DCCD1}">
+                  <a14:hiddenFill xmlns:a14="http://schemas.microsoft.com/office/drawing/2010/main">
+                    <a:solidFill>
+                      <a:srgbClr val="FFFFFF"/>
+                    </a:solidFill>
+                  </a14:hiddenFill>
+                </a:ext>
+              </a:extLst>
+            </p:spPr>
+          </p:pic>
+        </p:grpSp>
+        <p:grpSp>
+          <p:nvGrpSpPr>
+            <p:cNvPr id="113" name="Group 112"/>
+            <p:cNvGrpSpPr/>
+            <p:nvPr/>
+          </p:nvGrpSpPr>
+          <p:grpSpPr>
+            <a:xfrm>
+              <a:off x="1962523" y="33357590"/>
+              <a:ext cx="2751940" cy="5976664"/>
+              <a:chOff x="1962523" y="33357590"/>
+              <a:chExt cx="2751940" cy="5976664"/>
+            </a:xfrm>
+          </p:grpSpPr>
+          <p:cxnSp>
+            <p:nvCxnSpPr>
+              <p:cNvPr id="101" name="Straight Connector 100"/>
+              <p:cNvCxnSpPr/>
+              <p:nvPr/>
+            </p:nvCxnSpPr>
+            <p:spPr>
+              <a:xfrm flipV="1">
+                <a:off x="1962523" y="33357590"/>
+                <a:ext cx="50076" cy="5961930"/>
+              </a:xfrm>
+              <a:prstGeom prst="line">
+                <a:avLst/>
+              </a:prstGeom>
+              <a:ln>
+                <a:prstDash val="dash"/>
+              </a:ln>
+            </p:spPr>
+            <p:style>
+              <a:lnRef idx="1">
+                <a:schemeClr val="dk1"/>
+              </a:lnRef>
+              <a:fillRef idx="0">
+                <a:schemeClr val="dk1"/>
+              </a:fillRef>
+              <a:effectRef idx="0">
+                <a:schemeClr val="dk1"/>
+              </a:effectRef>
+              <a:fontRef idx="minor">
+                <a:schemeClr val="tx1"/>
+              </a:fontRef>
+            </p:style>
+          </p:cxnSp>
+          <p:cxnSp>
+            <p:nvCxnSpPr>
+              <p:cNvPr id="106" name="Straight Connector 105"/>
+              <p:cNvCxnSpPr/>
+              <p:nvPr/>
+            </p:nvCxnSpPr>
+            <p:spPr>
+              <a:xfrm flipV="1">
+                <a:off x="3906739" y="33357590"/>
+                <a:ext cx="14599" cy="3168000"/>
+              </a:xfrm>
+              <a:prstGeom prst="line">
+                <a:avLst/>
+              </a:prstGeom>
+              <a:ln>
+                <a:prstDash val="dash"/>
+              </a:ln>
+            </p:spPr>
+            <p:style>
+              <a:lnRef idx="1">
+                <a:schemeClr val="dk1"/>
+              </a:lnRef>
+              <a:fillRef idx="0">
+                <a:schemeClr val="dk1"/>
+              </a:fillRef>
+              <a:effectRef idx="0">
+                <a:schemeClr val="dk1"/>
+              </a:effectRef>
+              <a:fontRef idx="minor">
+                <a:schemeClr val="tx1"/>
+              </a:fontRef>
+            </p:style>
+          </p:cxnSp>
+          <p:cxnSp>
+            <p:nvCxnSpPr>
+              <p:cNvPr id="107" name="Straight Connector 106"/>
+              <p:cNvCxnSpPr/>
+              <p:nvPr/>
+            </p:nvCxnSpPr>
+            <p:spPr>
+              <a:xfrm flipV="1">
+                <a:off x="4698827" y="36634254"/>
+                <a:ext cx="14599" cy="2700000"/>
+              </a:xfrm>
+              <a:prstGeom prst="line">
+                <a:avLst/>
+              </a:prstGeom>
+              <a:ln>
+                <a:prstDash val="dash"/>
+              </a:ln>
+            </p:spPr>
+            <p:style>
+              <a:lnRef idx="1">
+                <a:schemeClr val="dk1"/>
+              </a:lnRef>
+              <a:fillRef idx="0">
+                <a:schemeClr val="dk1"/>
+              </a:fillRef>
+              <a:effectRef idx="0">
+                <a:schemeClr val="dk1"/>
+              </a:effectRef>
+              <a:fontRef idx="minor">
+                <a:schemeClr val="tx1"/>
+              </a:fontRef>
+            </p:style>
+          </p:cxnSp>
+          <p:cxnSp>
+            <p:nvCxnSpPr>
+              <p:cNvPr id="112" name="Straight Connector 111"/>
+              <p:cNvCxnSpPr/>
+              <p:nvPr/>
+            </p:nvCxnSpPr>
+            <p:spPr>
+              <a:xfrm>
+                <a:off x="1962523" y="39334254"/>
+                <a:ext cx="2751940" cy="0"/>
+              </a:xfrm>
+              <a:prstGeom prst="line">
+                <a:avLst/>
+              </a:prstGeom>
+              <a:ln>
+                <a:prstDash val="dash"/>
+              </a:ln>
+            </p:spPr>
+            <p:style>
+              <a:lnRef idx="1">
+                <a:schemeClr val="dk1"/>
+              </a:lnRef>
+              <a:fillRef idx="0">
+                <a:schemeClr val="dk1"/>
+              </a:fillRef>
+              <a:effectRef idx="0">
+                <a:schemeClr val="dk1"/>
+              </a:effectRef>
+              <a:fontRef idx="minor">
+                <a:schemeClr val="tx1"/>
+              </a:fontRef>
+            </p:style>
+          </p:cxnSp>
+          <p:cxnSp>
+            <p:nvCxnSpPr>
+              <p:cNvPr id="115" name="Straight Connector 114"/>
+              <p:cNvCxnSpPr/>
+              <p:nvPr/>
+            </p:nvCxnSpPr>
+            <p:spPr>
+              <a:xfrm>
+                <a:off x="3906739" y="36606334"/>
+                <a:ext cx="799387" cy="0"/>
+              </a:xfrm>
+              <a:prstGeom prst="line">
+                <a:avLst/>
+              </a:prstGeom>
+              <a:ln>
+                <a:prstDash val="dash"/>
+              </a:ln>
+            </p:spPr>
+            <p:style>
+              <a:lnRef idx="1">
+                <a:schemeClr val="dk1"/>
+              </a:lnRef>
+              <a:fillRef idx="0">
+                <a:schemeClr val="dk1"/>
+              </a:fillRef>
+              <a:effectRef idx="0">
+                <a:schemeClr val="dk1"/>
+              </a:effectRef>
+              <a:fontRef idx="minor">
+                <a:schemeClr val="tx1"/>
+              </a:fontRef>
+            </p:style>
+          </p:cxnSp>
+          <p:cxnSp>
+            <p:nvCxnSpPr>
+              <p:cNvPr id="118" name="Straight Connector 117"/>
+              <p:cNvCxnSpPr/>
+              <p:nvPr/>
+            </p:nvCxnSpPr>
+            <p:spPr>
+              <a:xfrm>
+                <a:off x="2034531" y="33357590"/>
+                <a:ext cx="1872000" cy="0"/>
+              </a:xfrm>
+              <a:prstGeom prst="line">
+                <a:avLst/>
+              </a:prstGeom>
+              <a:ln>
+                <a:prstDash val="dash"/>
+              </a:ln>
+            </p:spPr>
+            <p:style>
+              <a:lnRef idx="1">
+                <a:schemeClr val="dk1"/>
+              </a:lnRef>
+              <a:fillRef idx="0">
+                <a:schemeClr val="dk1"/>
+              </a:fillRef>
+              <a:effectRef idx="0">
+                <a:schemeClr val="dk1"/>
+              </a:effectRef>
+              <a:fontRef idx="minor">
+                <a:schemeClr val="tx1"/>
+              </a:fontRef>
+            </p:style>
+          </p:cxnSp>
+        </p:grpSp>
+      </p:grpSp>
+      <p:grpSp>
+        <p:nvGrpSpPr>
+          <p:cNvPr id="117" name="Group 116"/>
+          <p:cNvGrpSpPr/>
+          <p:nvPr/>
+        </p:nvGrpSpPr>
+        <p:grpSpPr>
+          <a:xfrm>
+            <a:off x="10747499" y="39550278"/>
+            <a:ext cx="8352928" cy="1224136"/>
+            <a:chOff x="10747499" y="39550278"/>
+            <a:chExt cx="8352928" cy="1224136"/>
+          </a:xfrm>
+        </p:grpSpPr>
+        <p:pic>
+          <p:nvPicPr>
+            <p:cNvPr id="75" name="Picture 11"/>
+            <p:cNvPicPr>
+              <a:picLocks noChangeAspect="1" noChangeArrowheads="1"/>
+            </p:cNvPicPr>
+            <p:nvPr/>
+          </p:nvPicPr>
+          <p:blipFill>
+            <a:blip r:embed="rId19">
+              <a:extLst>
+                <a:ext uri="{28A0092B-C50C-407E-A947-70E740481C1C}">
+                  <a14:useLocalDpi xmlns:a14="http://schemas.microsoft.com/office/drawing/2010/main" val="0"/>
+                </a:ext>
+              </a:extLst>
+            </a:blip>
+            <a:stretch>
+              <a:fillRect/>
+            </a:stretch>
+          </p:blipFill>
+          <p:spPr bwMode="auto">
+            <a:xfrm>
+              <a:off x="11180427" y="39957271"/>
+              <a:ext cx="7920000" cy="817143"/>
+            </a:xfrm>
+            <a:prstGeom prst="rect">
+              <a:avLst/>
+            </a:prstGeom>
+            <a:noFill/>
+            <a:extLst>
+              <a:ext uri="{909E8E84-426E-40DD-AFC4-6F175D3DCCD1}">
+                <a14:hiddenFill xmlns:a14="http://schemas.microsoft.com/office/drawing/2010/main">
+                  <a:solidFill>
+                    <a:srgbClr val="FFFFFF"/>
+                  </a:solidFill>
+                </a14:hiddenFill>
+              </a:ext>
+            </a:extLst>
+          </p:spPr>
+        </p:pic>
+        <p:sp>
+          <p:nvSpPr>
+            <p:cNvPr id="76" name="TextBox 75"/>
+            <p:cNvSpPr txBox="1"/>
+            <p:nvPr/>
+          </p:nvSpPr>
+          <p:spPr>
+            <a:xfrm>
+              <a:off x="10747499" y="39550278"/>
+              <a:ext cx="3148167" cy="523212"/>
+            </a:xfrm>
+            <a:prstGeom prst="rect">
+              <a:avLst/>
+            </a:prstGeom>
+            <a:noFill/>
+          </p:spPr>
+          <p:txBody>
+            <a:bodyPr wrap="square" lIns="91431" tIns="45716" rIns="91431" bIns="45716" rtlCol="1">
+              <a:spAutoFit/>
+            </a:bodyPr>
+            <a:lstStyle/>
+            <a:p>
+              <a:pPr algn="ctr"/>
+              <a:r>
+                <a:rPr lang="en-US" sz="2800" dirty="0"/>
+                <a:t>fitness</a:t>
+              </a:r>
+              <a:endParaRPr lang="he-IL" sz="2800" dirty="0"/>
+            </a:p>
+          </p:txBody>
+        </p:sp>
+        <p:sp>
+          <p:nvSpPr>
+            <p:cNvPr id="116" name="Rectangle 115"/>
+            <p:cNvSpPr/>
+            <p:nvPr/>
+          </p:nvSpPr>
+          <p:spPr>
+            <a:xfrm>
+              <a:off x="11795109" y="40032000"/>
+              <a:ext cx="6912000" cy="342000"/>
+            </a:xfrm>
+            <a:prstGeom prst="rect">
+              <a:avLst/>
+            </a:prstGeom>
+            <a:noFill/>
+            <a:ln w="3175"/>
+          </p:spPr>
+          <p:style>
+            <a:lnRef idx="2">
+              <a:schemeClr val="dk1"/>
+            </a:lnRef>
+            <a:fillRef idx="1">
+              <a:schemeClr val="lt1"/>
+            </a:fillRef>
+            <a:effectRef idx="0">
+              <a:schemeClr val="dk1"/>
+            </a:effectRef>
+            <a:fontRef idx="minor">
+              <a:schemeClr val="dk1"/>
+            </a:fontRef>
+          </p:style>
+          <p:txBody>
+            <a:bodyPr rtlCol="1" anchor="ctr"/>
+            <a:lstStyle/>
+            <a:p>
+              <a:pPr algn="ctr"/>
+              <a:endParaRPr lang="he-IL" dirty="0"/>
+            </a:p>
+          </p:txBody>
+        </p:sp>
+      </p:grpSp>
+      <p:grpSp>
+        <p:nvGrpSpPr>
+          <p:cNvPr id="123" name="Group 122"/>
+          <p:cNvGrpSpPr/>
+          <p:nvPr/>
+        </p:nvGrpSpPr>
+        <p:grpSpPr>
+          <a:xfrm>
+            <a:off x="1386459" y="39549600"/>
+            <a:ext cx="8352928" cy="1224136"/>
+            <a:chOff x="10747499" y="39550278"/>
+            <a:chExt cx="8352928" cy="1224136"/>
+          </a:xfrm>
+        </p:grpSpPr>
+        <p:pic>
+          <p:nvPicPr>
+            <p:cNvPr id="124" name="Picture 11"/>
+            <p:cNvPicPr>
+              <a:picLocks noChangeAspect="1" noChangeArrowheads="1"/>
+            </p:cNvPicPr>
+            <p:nvPr/>
+          </p:nvPicPr>
+          <p:blipFill>
+            <a:blip r:embed="rId19">
+              <a:extLst>
+                <a:ext uri="{28A0092B-C50C-407E-A947-70E740481C1C}">
+                  <a14:useLocalDpi xmlns:a14="http://schemas.microsoft.com/office/drawing/2010/main" val="0"/>
+                </a:ext>
+              </a:extLst>
+            </a:blip>
+            <a:stretch>
+              <a:fillRect/>
+            </a:stretch>
+          </p:blipFill>
+          <p:spPr bwMode="auto">
+            <a:xfrm>
+              <a:off x="11180427" y="39957271"/>
+              <a:ext cx="7920000" cy="817143"/>
+            </a:xfrm>
+            <a:prstGeom prst="rect">
+              <a:avLst/>
+            </a:prstGeom>
+            <a:noFill/>
+            <a:extLst>
+              <a:ext uri="{909E8E84-426E-40DD-AFC4-6F175D3DCCD1}">
+                <a14:hiddenFill xmlns:a14="http://schemas.microsoft.com/office/drawing/2010/main">
+                  <a:solidFill>
+                    <a:srgbClr val="FFFFFF"/>
+                  </a:solidFill>
+                </a14:hiddenFill>
+              </a:ext>
+            </a:extLst>
+          </p:spPr>
+        </p:pic>
+        <p:sp>
+          <p:nvSpPr>
+            <p:cNvPr id="125" name="TextBox 124"/>
+            <p:cNvSpPr txBox="1"/>
+            <p:nvPr/>
+          </p:nvSpPr>
+          <p:spPr>
+            <a:xfrm>
+              <a:off x="10747499" y="39550278"/>
+              <a:ext cx="3148167" cy="523212"/>
+            </a:xfrm>
+            <a:prstGeom prst="rect">
+              <a:avLst/>
+            </a:prstGeom>
+            <a:noFill/>
+          </p:spPr>
+          <p:txBody>
+            <a:bodyPr wrap="square" lIns="91431" tIns="45716" rIns="91431" bIns="45716" rtlCol="1">
+              <a:spAutoFit/>
+            </a:bodyPr>
+            <a:lstStyle/>
+            <a:p>
+              <a:pPr algn="ctr"/>
+              <a:r>
+                <a:rPr lang="en-US" sz="2800" dirty="0"/>
+                <a:t>fitness</a:t>
+              </a:r>
+              <a:endParaRPr lang="he-IL" sz="2800" dirty="0"/>
+            </a:p>
+          </p:txBody>
+        </p:sp>
+        <p:sp>
+          <p:nvSpPr>
+            <p:cNvPr id="126" name="Rectangle 125"/>
+            <p:cNvSpPr/>
+            <p:nvPr/>
+          </p:nvSpPr>
+          <p:spPr>
+            <a:xfrm>
+              <a:off x="11795109" y="40032000"/>
+              <a:ext cx="6912000" cy="342000"/>
+            </a:xfrm>
+            <a:prstGeom prst="rect">
+              <a:avLst/>
+            </a:prstGeom>
+            <a:noFill/>
+            <a:ln w="3175"/>
+          </p:spPr>
+          <p:style>
+            <a:lnRef idx="2">
+              <a:schemeClr val="dk1"/>
+            </a:lnRef>
+            <a:fillRef idx="1">
+              <a:schemeClr val="lt1"/>
+            </a:fillRef>
+            <a:effectRef idx="0">
+              <a:schemeClr val="dk1"/>
+            </a:effectRef>
+            <a:fontRef idx="minor">
+              <a:schemeClr val="dk1"/>
+            </a:fontRef>
+          </p:style>
+          <p:txBody>
+            <a:bodyPr rtlCol="1" anchor="ctr"/>
+            <a:lstStyle/>
+            <a:p>
+              <a:pPr algn="ctr"/>
+              <a:endParaRPr lang="he-IL" dirty="0"/>
+            </a:p>
+          </p:txBody>
+        </p:sp>
+      </p:grpSp>
+      <p:pic>
+        <p:nvPicPr>
+          <p:cNvPr id="1027" name="Picture 3"/>
+          <p:cNvPicPr>
+            <a:picLocks noChangeAspect="1" noChangeArrowheads="1"/>
+          </p:cNvPicPr>
+          <p:nvPr/>
+        </p:nvPicPr>
+        <p:blipFill>
+          <a:blip r:embed="rId20">
+            <a:extLst>
+              <a:ext uri="{28A0092B-C50C-407E-A947-70E740481C1C}">
+                <a14:useLocalDpi xmlns:a14="http://schemas.microsoft.com/office/drawing/2010/main" val="0"/>
+              </a:ext>
+            </a:extLst>
+          </a:blip>
+          <a:srcRect/>
+          <a:stretch>
+            <a:fillRect/>
+          </a:stretch>
+        </p:blipFill>
+        <p:spPr bwMode="auto">
+          <a:xfrm>
+            <a:off x="22916851" y="39838430"/>
+            <a:ext cx="1080000" cy="1080000"/>
+          </a:xfrm>
+          <a:prstGeom prst="rect">
+            <a:avLst/>
+          </a:prstGeom>
+          <a:noFill/>
+          <a:ln>
+            <a:noFill/>
+          </a:ln>
+          <a:extLst>
+            <a:ext uri="{909E8E84-426E-40DD-AFC4-6F175D3DCCD1}">
+              <a14:hiddenFill xmlns:a14="http://schemas.microsoft.com/office/drawing/2010/main">
+                <a:solidFill>
+                  <a:schemeClr val="accent1"/>
+                </a:solidFill>
+              </a14:hiddenFill>
+            </a:ext>
+            <a:ext uri="{91240B29-F687-4F45-9708-019B960494DF}">
+              <a14:hiddenLine xmlns:a14="http://schemas.microsoft.com/office/drawing/2010/main" w="9525">
+                <a:solidFill>
+                  <a:schemeClr val="tx1"/>
+                </a:solidFill>
+                <a:miter lim="800000"/>
+                <a:headEnd/>
+                <a:tailEnd/>
+              </a14:hiddenLine>
+            </a:ext>
+          </a:extLst>
+        </p:spPr>
+      </p:pic>
+      <p:pic>
+        <p:nvPicPr>
+          <p:cNvPr id="1031" name="Picture 7"/>
+          <p:cNvPicPr>
+            <a:picLocks noChangeAspect="1" noChangeArrowheads="1"/>
+          </p:cNvPicPr>
+          <p:nvPr/>
+        </p:nvPicPr>
+        <p:blipFill>
+          <a:blip r:embed="rId21" cstate="print">
+            <a:extLst>
+              <a:ext uri="{28A0092B-C50C-407E-A947-70E740481C1C}">
+                <a14:useLocalDpi xmlns:a14="http://schemas.microsoft.com/office/drawing/2010/main" val="0"/>
+              </a:ext>
+            </a:extLst>
+          </a:blip>
+          <a:srcRect/>
+          <a:stretch>
+            <a:fillRect/>
+          </a:stretch>
+        </p:blipFill>
+        <p:spPr bwMode="auto">
+          <a:xfrm>
+            <a:off x="21692715" y="39838430"/>
+            <a:ext cx="1113383" cy="1080000"/>
+          </a:xfrm>
+          <a:prstGeom prst="rect">
+            <a:avLst/>
+          </a:prstGeom>
+          <a:noFill/>
+          <a:ln>
+            <a:noFill/>
+          </a:ln>
+          <a:extLst>
+            <a:ext uri="{909E8E84-426E-40DD-AFC4-6F175D3DCCD1}">
+              <a14:hiddenFill xmlns:a14="http://schemas.microsoft.com/office/drawing/2010/main">
+                <a:solidFill>
+                  <a:schemeClr val="accent1"/>
+                </a:solidFill>
+              </a14:hiddenFill>
+            </a:ext>
+            <a:ext uri="{91240B29-F687-4F45-9708-019B960494DF}">
+              <a14:hiddenLine xmlns:a14="http://schemas.microsoft.com/office/drawing/2010/main" w="9525">
+                <a:solidFill>
+                  <a:schemeClr val="tx1"/>
+                </a:solidFill>
+                <a:miter lim="800000"/>
+                <a:headEnd/>
+                <a:tailEnd/>
+              </a14:hiddenLine>
+            </a:ext>
+          </a:extLst>
+        </p:spPr>
+      </p:pic>
+      <p:grpSp>
+        <p:nvGrpSpPr>
+          <p:cNvPr id="139" name="Group 138"/>
+          <p:cNvGrpSpPr/>
+          <p:nvPr/>
+        </p:nvGrpSpPr>
+        <p:grpSpPr>
+          <a:xfrm>
+            <a:off x="26445243" y="235348"/>
+            <a:ext cx="3530726" cy="3382938"/>
+            <a:chOff x="2771800" y="1844824"/>
+            <a:chExt cx="3530726" cy="3382938"/>
+          </a:xfrm>
+        </p:grpSpPr>
+        <p:sp>
+          <p:nvSpPr>
+            <p:cNvPr id="140" name="Rectangle 139"/>
+            <p:cNvSpPr/>
+            <p:nvPr/>
+          </p:nvSpPr>
+          <p:spPr>
+            <a:xfrm>
+              <a:off x="3635896" y="2420888"/>
+              <a:ext cx="1800200" cy="1008112"/>
+            </a:xfrm>
+            <a:prstGeom prst="rect">
+              <a:avLst/>
+            </a:prstGeom>
+          </p:spPr>
+          <p:style>
+            <a:lnRef idx="2">
+              <a:schemeClr val="dk1"/>
+            </a:lnRef>
+            <a:fillRef idx="1">
+              <a:schemeClr val="lt1"/>
+            </a:fillRef>
+            <a:effectRef idx="0">
+              <a:schemeClr val="dk1"/>
+            </a:effectRef>
+            <a:fontRef idx="minor">
+              <a:schemeClr val="dk1"/>
+            </a:fontRef>
+          </p:style>
+          <p:txBody>
+            <a:bodyPr rtlCol="1" anchor="ctr"/>
+            <a:lstStyle/>
+            <a:p>
+              <a:pPr algn="ctr"/>
+              <a:endParaRPr lang="he-IL"/>
+            </a:p>
+          </p:txBody>
+        </p:sp>
+        <p:pic>
+          <p:nvPicPr>
+            <p:cNvPr id="141" name="Picture 4" descr="D:\university\confrences\ESEB2013\tmnt.jpg"/>
+            <p:cNvPicPr>
+              <a:picLocks noChangeAspect="1" noChangeArrowheads="1"/>
+            </p:cNvPicPr>
+            <p:nvPr/>
+          </p:nvPicPr>
+          <p:blipFill rotWithShape="1">
+            <a:blip r:embed="rId22">
+              <a:clrChange>
+                <a:clrFrom>
+                  <a:srgbClr val="FFFFFF"/>
+                </a:clrFrom>
+                <a:clrTo>
+                  <a:srgbClr val="FFFFFF">
+                    <a:alpha val="0"/>
+                  </a:srgbClr>
+                </a:clrTo>
+              </a:clrChange>
+              <a:extLst>
+                <a:ext uri="{28A0092B-C50C-407E-A947-70E740481C1C}">
+                  <a14:useLocalDpi xmlns:a14="http://schemas.microsoft.com/office/drawing/2010/main" val="0"/>
+                </a:ext>
+              </a:extLst>
+            </a:blip>
+            <a:srcRect l="48517" t="3608" r="7575" b="47872"/>
+            <a:stretch/>
+          </p:blipFill>
+          <p:spPr bwMode="auto">
+            <a:xfrm>
+              <a:off x="2771800" y="1844824"/>
+              <a:ext cx="3530726" cy="3382938"/>
+            </a:xfrm>
+            <a:prstGeom prst="rect">
+              <a:avLst/>
+            </a:prstGeom>
+            <a:noFill/>
+            <a:extLst>
+              <a:ext uri="{909E8E84-426E-40DD-AFC4-6F175D3DCCD1}">
+                <a14:hiddenFill xmlns:a14="http://schemas.microsoft.com/office/drawing/2010/main">
+                  <a:solidFill>
+                    <a:srgbClr val="FFFFFF"/>
+                  </a:solidFill>
+                </a14:hiddenFill>
+              </a:ext>
+            </a:extLst>
+          </p:spPr>
+        </p:pic>
+      </p:grpSp>
+      <p:sp>
+        <p:nvSpPr>
+          <p:cNvPr id="121" name="Rectangle 120"/>
+          <p:cNvSpPr/>
+          <p:nvPr/>
+        </p:nvSpPr>
+        <p:spPr>
+          <a:xfrm>
+            <a:off x="22628820" y="24860646"/>
+            <a:ext cx="4176464" cy="278590"/>
+          </a:xfrm>
+          <a:prstGeom prst="rect">
+            <a:avLst/>
+          </a:prstGeom>
+          <a:ln>
+            <a:noFill/>
+          </a:ln>
+        </p:spPr>
+        <p:style>
+          <a:lnRef idx="2">
+            <a:schemeClr val="dk1"/>
+          </a:lnRef>
+          <a:fillRef idx="1">
+            <a:schemeClr val="lt1"/>
+          </a:fillRef>
+          <a:effectRef idx="0">
+            <a:schemeClr val="dk1"/>
+          </a:effectRef>
+          <a:fontRef idx="minor">
+            <a:schemeClr val="dk1"/>
+          </a:fontRef>
+        </p:style>
+        <p:txBody>
+          <a:bodyPr rtlCol="1" anchor="ctr"/>
+          <a:lstStyle/>
+          <a:p>
+            <a:pPr algn="ctr"/>
+            <a:endParaRPr lang="he-IL"/>
+          </a:p>
+        </p:txBody>
+      </p:sp>
+      <p:sp>
+        <p:nvSpPr>
+          <p:cNvPr id="145" name="TextBox 144"/>
+          <p:cNvSpPr txBox="1"/>
+          <p:nvPr/>
+        </p:nvSpPr>
+        <p:spPr>
+          <a:xfrm>
+            <a:off x="20324563" y="24861807"/>
+            <a:ext cx="7920880" cy="769441"/>
+          </a:xfrm>
+          <a:prstGeom prst="rect">
+            <a:avLst/>
+          </a:prstGeom>
+          <a:noFill/>
+        </p:spPr>
+        <p:txBody>
+          <a:bodyPr wrap="square" rtlCol="1">
+            <a:spAutoFit/>
+          </a:bodyPr>
+          <a:lstStyle/>
+          <a:p>
+            <a:pPr algn="ctr" rtl="0"/>
+            <a:r>
+              <a:rPr lang="en-US" sz="2200" i="1" dirty="0" smtClean="0">
+                <a:solidFill>
+                  <a:schemeClr val="tx1">
+                    <a:lumMod val="65000"/>
+                    <a:lumOff val="35000"/>
+                  </a:schemeClr>
+                </a:solidFill>
+                <a:latin typeface="Droid Sans" panose="020B0606030804020204" pitchFamily="34" charset="0"/>
+                <a:ea typeface="Droid Sans" panose="020B0606030804020204" pitchFamily="34" charset="0"/>
+                <a:cs typeface="Droid Sans" panose="020B0606030804020204" pitchFamily="34" charset="0"/>
+              </a:rPr>
+              <a:t>Adaptedness</a:t>
+            </a:r>
+            <a:r>
+              <a:rPr lang="en-US" sz="2200" dirty="0" smtClean="0">
+                <a:solidFill>
+                  <a:schemeClr val="tx1">
+                    <a:lumMod val="65000"/>
+                    <a:lumOff val="35000"/>
+                  </a:schemeClr>
+                </a:solidFill>
+                <a:latin typeface="Droid Sans" panose="020B0606030804020204" pitchFamily="34" charset="0"/>
+                <a:ea typeface="Droid Sans" panose="020B0606030804020204" pitchFamily="34" charset="0"/>
+                <a:cs typeface="Droid Sans" panose="020B0606030804020204" pitchFamily="34" charset="0"/>
+              </a:rPr>
+              <a:t> - Mean fitness relative to NM</a:t>
+            </a:r>
+          </a:p>
+          <a:p>
+            <a:pPr algn="ctr" rtl="0"/>
+            <a:r>
+              <a:rPr lang="en-US" sz="2200" dirty="0">
+                <a:solidFill>
+                  <a:schemeClr val="tx1">
+                    <a:lumMod val="65000"/>
+                    <a:lumOff val="35000"/>
+                  </a:schemeClr>
+                </a:solidFill>
+                <a:latin typeface="Droid Sans" panose="020B0606030804020204" pitchFamily="34" charset="0"/>
+                <a:ea typeface="Droid Sans" panose="020B0606030804020204" pitchFamily="34" charset="0"/>
+                <a:cs typeface="Droid Sans" panose="020B0606030804020204" pitchFamily="34" charset="0"/>
+              </a:rPr>
+              <a:t>(NM: normal mutagenesis</a:t>
+            </a:r>
+            <a:r>
+              <a:rPr lang="en-US" sz="2200" dirty="0" smtClean="0">
+                <a:solidFill>
+                  <a:schemeClr val="tx1">
+                    <a:lumMod val="65000"/>
+                    <a:lumOff val="35000"/>
+                  </a:schemeClr>
+                </a:solidFill>
+                <a:latin typeface="Droid Sans" panose="020B0606030804020204" pitchFamily="34" charset="0"/>
+                <a:ea typeface="Droid Sans" panose="020B0606030804020204" pitchFamily="34" charset="0"/>
+                <a:cs typeface="Droid Sans" panose="020B0606030804020204" pitchFamily="34" charset="0"/>
+              </a:rPr>
+              <a:t>)</a:t>
+            </a:r>
+          </a:p>
+        </p:txBody>
+      </p:sp>
+      <p:sp>
+        <p:nvSpPr>
+          <p:cNvPr id="122" name="Rectangle 121"/>
+          <p:cNvSpPr/>
+          <p:nvPr/>
+        </p:nvSpPr>
+        <p:spPr>
+          <a:xfrm>
+            <a:off x="20324563" y="19503533"/>
+            <a:ext cx="324000" cy="4276993"/>
+          </a:xfrm>
+          <a:prstGeom prst="rect">
+            <a:avLst/>
+          </a:prstGeom>
+          <a:ln>
+            <a:noFill/>
+          </a:ln>
+        </p:spPr>
+        <p:style>
+          <a:lnRef idx="2">
+            <a:schemeClr val="dk1"/>
+          </a:lnRef>
+          <a:fillRef idx="1">
+            <a:schemeClr val="lt1"/>
+          </a:fillRef>
+          <a:effectRef idx="0">
+            <a:schemeClr val="dk1"/>
+          </a:effectRef>
+          <a:fontRef idx="minor">
+            <a:schemeClr val="dk1"/>
+          </a:fontRef>
+        </p:style>
+        <p:txBody>
+          <a:bodyPr rtlCol="1" anchor="ctr"/>
+          <a:lstStyle/>
+          <a:p>
+            <a:pPr algn="ctr"/>
+            <a:endParaRPr lang="he-IL">
+              <a:ln>
+                <a:solidFill>
+                  <a:schemeClr val="tx1"/>
+                </a:solidFill>
+              </a:ln>
+            </a:endParaRPr>
+          </a:p>
+        </p:txBody>
+      </p:sp>
+      <p:sp>
+        <p:nvSpPr>
+          <p:cNvPr id="147" name="TextBox 146"/>
+          <p:cNvSpPr txBox="1"/>
+          <p:nvPr/>
+        </p:nvSpPr>
+        <p:spPr>
+          <a:xfrm rot="16200000">
+            <a:off x="17592384" y="21400138"/>
+            <a:ext cx="5751229" cy="430887"/>
+          </a:xfrm>
+          <a:prstGeom prst="rect">
+            <a:avLst/>
+          </a:prstGeom>
+          <a:noFill/>
+        </p:spPr>
+        <p:txBody>
+          <a:bodyPr wrap="square" rtlCol="1">
+            <a:spAutoFit/>
+          </a:bodyPr>
+          <a:lstStyle/>
+          <a:p>
+            <a:pPr algn="ctr" rtl="0"/>
+            <a:r>
+              <a:rPr lang="en-US" sz="2200" i="1" dirty="0" smtClean="0">
+                <a:solidFill>
+                  <a:schemeClr val="tx1">
+                    <a:lumMod val="65000"/>
+                    <a:lumOff val="35000"/>
+                  </a:schemeClr>
+                </a:solidFill>
+                <a:latin typeface="Droid Sans" panose="020B0606030804020204" pitchFamily="34" charset="0"/>
+                <a:ea typeface="Droid Sans" panose="020B0606030804020204" pitchFamily="34" charset="0"/>
+                <a:cs typeface="Droid Sans" panose="020B0606030804020204" pitchFamily="34" charset="0"/>
+              </a:rPr>
+              <a:t>Adaptability </a:t>
+            </a:r>
+            <a:r>
+              <a:rPr lang="en-US" sz="2200" dirty="0" smtClean="0">
+                <a:solidFill>
+                  <a:schemeClr val="tx1">
+                    <a:lumMod val="65000"/>
+                    <a:lumOff val="35000"/>
+                  </a:schemeClr>
+                </a:solidFill>
+                <a:latin typeface="Droid Sans" panose="020B0606030804020204" pitchFamily="34" charset="0"/>
+                <a:ea typeface="Droid Sans" panose="020B0606030804020204" pitchFamily="34" charset="0"/>
+                <a:cs typeface="Droid Sans" panose="020B0606030804020204" pitchFamily="34" charset="0"/>
+              </a:rPr>
+              <a:t>- Adaptation rate relative to NM</a:t>
+            </a:r>
+          </a:p>
+        </p:txBody>
+      </p:sp>
+      <p:sp>
+        <p:nvSpPr>
+          <p:cNvPr id="1025" name="TextBox 1024"/>
+          <p:cNvSpPr txBox="1"/>
+          <p:nvPr/>
+        </p:nvSpPr>
+        <p:spPr>
+          <a:xfrm>
+            <a:off x="20252555" y="39910318"/>
+            <a:ext cx="1440160" cy="830997"/>
+          </a:xfrm>
+          <a:prstGeom prst="rect">
+            <a:avLst/>
+          </a:prstGeom>
+          <a:noFill/>
+        </p:spPr>
+        <p:txBody>
+          <a:bodyPr wrap="square" rtlCol="1">
+            <a:spAutoFit/>
+          </a:bodyPr>
+          <a:lstStyle/>
+          <a:p>
+            <a:pPr algn="ctr"/>
+            <a:r>
+              <a:rPr lang="en-US" sz="1600" b="1" dirty="0"/>
+              <a:t>Manna Center for Plant Biosciences</a:t>
+            </a:r>
+            <a:endParaRPr lang="he-IL" sz="1600" dirty="0"/>
+          </a:p>
+        </p:txBody>
+      </p:sp>
+      <p:sp>
+        <p:nvSpPr>
+          <p:cNvPr id="1032" name="TextBox 1031"/>
+          <p:cNvSpPr txBox="1"/>
+          <p:nvPr/>
+        </p:nvSpPr>
+        <p:spPr>
+          <a:xfrm>
+            <a:off x="810395" y="185709"/>
+            <a:ext cx="16461622" cy="1200329"/>
+          </a:xfrm>
+          <a:prstGeom prst="rect">
+            <a:avLst/>
+          </a:prstGeom>
+          <a:noFill/>
+        </p:spPr>
+        <p:txBody>
+          <a:bodyPr wrap="none" rtlCol="1">
+            <a:spAutoFit/>
+          </a:bodyPr>
+          <a:lstStyle/>
+          <a:p>
+            <a:pPr algn="l" rtl="0"/>
+            <a:r>
+              <a:rPr lang="en-US" sz="3600" b="1" dirty="0" smtClean="0"/>
+              <a:t>D21SY13PS0001</a:t>
+            </a:r>
+            <a:r>
+              <a:rPr lang="en-US" sz="3600" dirty="0" smtClean="0"/>
+              <a:t> | Poster #1 | Wed. 21 | SY13</a:t>
+            </a:r>
+            <a:r>
+              <a:rPr lang="en-US" sz="3600" dirty="0"/>
+              <a:t>: Rapid evolution and population genetics</a:t>
+            </a:r>
+            <a:r>
+              <a:rPr lang="en-US" sz="3600" dirty="0"/>
+              <a:t/>
+            </a:r>
+            <a:br>
+              <a:rPr lang="en-US" sz="3600" dirty="0"/>
+            </a:br>
+            <a:endParaRPr lang="he-IL" sz="3600" dirty="0"/>
           </a:p>
         </p:txBody>
       </p:sp>

</xml_diff>

<commit_message>
a bit more figgeting
</commit_message>
<xml_diff>
--- a/poster.pptx
+++ b/poster.pptx
@@ -3151,7 +3151,7 @@
         <p:spPr bwMode="auto">
           <a:xfrm>
             <a:off x="900000" y="1043493"/>
-            <a:ext cx="28476000" cy="3661978"/>
+            <a:ext cx="28476000" cy="3908199"/>
           </a:xfrm>
           <a:prstGeom prst="rect">
             <a:avLst/>
@@ -3188,25 +3188,25 @@
           <a:p>
             <a:pPr indent="205684" algn="ctr" rtl="0"/>
             <a:r>
-              <a:rPr lang="en-US" sz="11600" b="1" dirty="0">
+              <a:rPr lang="en-US" sz="12400" b="1" dirty="0">
                 <a:latin typeface="+mj-lt"/>
               </a:rPr>
               <a:t>Adaptability, Adaptedness and </a:t>
             </a:r>
-            <a:endParaRPr lang="en-US" sz="11600" b="1" dirty="0" smtClean="0">
+            <a:endParaRPr lang="en-US" sz="12400" b="1" dirty="0" smtClean="0">
               <a:latin typeface="+mj-lt"/>
             </a:endParaRPr>
           </a:p>
           <a:p>
             <a:pPr indent="205684" algn="ctr" rtl="0"/>
             <a:r>
-              <a:rPr lang="en-US" sz="11600" b="1" dirty="0" smtClean="0">
+              <a:rPr lang="en-US" sz="12400" b="1" dirty="0" smtClean="0">
                 <a:latin typeface="+mj-lt"/>
               </a:rPr>
               <a:t>Stress-Induced </a:t>
             </a:r>
             <a:r>
-              <a:rPr lang="en-US" sz="11600" b="1" dirty="0">
+              <a:rPr lang="en-US" sz="12400" b="1" dirty="0">
                 <a:latin typeface="+mj-lt"/>
               </a:rPr>
               <a:t>Mutagenesis</a:t>
@@ -8317,7 +8317,7 @@
         </p:blipFill>
         <p:spPr bwMode="auto">
           <a:xfrm>
-            <a:off x="24177163" y="39370430"/>
+            <a:off x="24140987" y="39190238"/>
             <a:ext cx="1548000" cy="1548000"/>
           </a:xfrm>
           <a:prstGeom prst="rect">
@@ -8359,7 +8359,7 @@
         </p:blipFill>
         <p:spPr bwMode="auto">
           <a:xfrm>
-            <a:off x="25845143" y="40365842"/>
+            <a:off x="25845143" y="40270358"/>
             <a:ext cx="2400300" cy="485775"/>
           </a:xfrm>
           <a:prstGeom prst="rect">
@@ -8386,9 +8386,9 @@
         <p:grpSpPr>
           <a:xfrm>
             <a:off x="20540587" y="37776207"/>
-            <a:ext cx="4917155" cy="2062103"/>
+            <a:ext cx="4917155" cy="1815882"/>
             <a:chOff x="20736000" y="39190238"/>
-            <a:chExt cx="4917155" cy="2062103"/>
+            <a:chExt cx="4917155" cy="1815882"/>
           </a:xfrm>
         </p:grpSpPr>
         <p:grpSp>
@@ -8400,9 +8400,9 @@
           <p:grpSpPr>
             <a:xfrm>
               <a:off x="20736000" y="39190238"/>
-              <a:ext cx="4917155" cy="2062103"/>
+              <a:ext cx="4917155" cy="1815882"/>
               <a:chOff x="1022996" y="5356373"/>
-              <a:chExt cx="4917156" cy="2062103"/>
+              <a:chExt cx="4917156" cy="1815882"/>
             </a:xfrm>
           </p:grpSpPr>
           <p:pic>
@@ -8428,7 +8428,7 @@
             </p:blipFill>
             <p:spPr bwMode="auto">
               <a:xfrm>
-                <a:off x="1022996" y="6995789"/>
+                <a:off x="1022996" y="6770404"/>
                 <a:ext cx="304800" cy="304800"/>
               </a:xfrm>
               <a:prstGeom prst="rect">
@@ -8492,7 +8492,7 @@
             </p:blipFill>
             <p:spPr bwMode="auto">
               <a:xfrm>
-                <a:off x="1026840" y="5510607"/>
+                <a:off x="1026840" y="5474260"/>
                 <a:ext cx="304800" cy="304800"/>
               </a:xfrm>
               <a:prstGeom prst="rect">
@@ -8556,7 +8556,7 @@
             </p:blipFill>
             <p:spPr bwMode="auto">
               <a:xfrm>
-                <a:off x="1022996" y="6004445"/>
+                <a:off x="1022996" y="5889540"/>
                 <a:ext cx="304800" cy="304800"/>
               </a:xfrm>
               <a:prstGeom prst="rect">
@@ -8606,7 +8606,7 @@
             <p:spPr>
               <a:xfrm>
                 <a:off x="1368152" y="5356373"/>
-                <a:ext cx="4572000" cy="2062103"/>
+                <a:ext cx="4572000" cy="1815882"/>
               </a:xfrm>
               <a:prstGeom prst="rect">
                 <a:avLst/>
@@ -8620,32 +8620,32 @@
               <a:p>
                 <a:pPr algn="l" rtl="0"/>
                 <a:r>
-                  <a:rPr lang="en-US" sz="3200" b="1" dirty="0" smtClean="0"/>
+                  <a:rPr lang="en-US" sz="2800" b="1" dirty="0" smtClean="0"/>
                   <a:t>yoavram@post.tau.ac.il</a:t>
                 </a:r>
               </a:p>
               <a:p>
                 <a:pPr algn="l" rtl="0"/>
                 <a:r>
-                  <a:rPr lang="en-US" sz="3200" b="1" dirty="0" smtClean="0"/>
+                  <a:rPr lang="en-US" sz="2800" b="1" dirty="0" smtClean="0"/>
                   <a:t>www.yoavram.com</a:t>
                 </a:r>
-                <a:endParaRPr lang="he-IL" sz="3200" b="1" dirty="0" smtClean="0"/>
+                <a:endParaRPr lang="he-IL" sz="2800" b="1" dirty="0" smtClean="0"/>
               </a:p>
               <a:p>
                 <a:pPr algn="l" rtl="0"/>
                 <a:r>
-                  <a:rPr lang="en-US" sz="3200" b="1" dirty="0" smtClean="0"/>
+                  <a:rPr lang="en-US" sz="2800" b="1" dirty="0" smtClean="0"/>
                   <a:t>+972.545.383136</a:t>
                 </a:r>
               </a:p>
               <a:p>
                 <a:pPr algn="l" rtl="0"/>
                 <a:r>
-                  <a:rPr lang="en-US" sz="3200" b="1" dirty="0" smtClean="0"/>
+                  <a:rPr lang="en-US" sz="2800" b="1" dirty="0" smtClean="0"/>
                   <a:t>@yoavram</a:t>
                 </a:r>
-                <a:endParaRPr lang="en-US" sz="3200" b="1" dirty="0"/>
+                <a:endParaRPr lang="en-US" sz="2800" b="1" dirty="0"/>
               </a:p>
             </p:txBody>
           </p:sp>
@@ -8673,7 +8673,7 @@
           </p:blipFill>
           <p:spPr bwMode="auto">
             <a:xfrm>
-              <a:off x="20790000" y="40312898"/>
+              <a:off x="20790000" y="40142753"/>
               <a:ext cx="190500" cy="317500"/>
             </a:xfrm>
             <a:prstGeom prst="rect">
@@ -11649,7 +11649,7 @@
         </p:blipFill>
         <p:spPr bwMode="auto">
           <a:xfrm>
-            <a:off x="22916851" y="39838430"/>
+            <a:off x="22916851" y="39694294"/>
             <a:ext cx="1080000" cy="1080000"/>
           </a:xfrm>
           <a:prstGeom prst="rect">
@@ -11703,7 +11703,7 @@
         </p:blipFill>
         <p:spPr bwMode="auto">
           <a:xfrm>
-            <a:off x="21692715" y="39838430"/>
+            <a:off x="21692715" y="39694294"/>
             <a:ext cx="1113383" cy="1080000"/>
           </a:xfrm>
           <a:prstGeom prst="rect">
@@ -12071,7 +12071,7 @@
         </p:nvSpPr>
         <p:spPr>
           <a:xfrm>
-            <a:off x="20252555" y="39910318"/>
+            <a:off x="20252555" y="39766182"/>
             <a:ext cx="1440160" cy="830997"/>
           </a:xfrm>
           <a:prstGeom prst="rect">

</xml_diff>

<commit_message>
some last comments from lilach
</commit_message>
<xml_diff>
--- a/poster.pptx
+++ b/poster.pptx
@@ -3632,31 +3632,19 @@
               <a:rPr lang="en-US" sz="2400" kern="0" dirty="0" smtClean="0">
                 <a:latin typeface="+mn-lt"/>
               </a:rPr>
-              <a:t>bacteria and even in eukaryotes </a:t>
+              <a:t>bacteria and even in eukaryotes (</a:t>
+            </a:r>
+            <a:r>
+              <a:rPr lang="en-US" sz="2400" kern="0" dirty="0" err="1" smtClean="0">
+                <a:latin typeface="+mn-lt"/>
+              </a:rPr>
+              <a:t>Galhardo</a:t>
             </a:r>
             <a:r>
               <a:rPr lang="en-US" sz="2400" kern="0" dirty="0" smtClean="0">
                 <a:latin typeface="+mn-lt"/>
               </a:rPr>
-              <a:t>(</a:t>
-            </a:r>
-            <a:r>
-              <a:rPr lang="en-US" sz="2400" kern="0" dirty="0" err="1" smtClean="0">
-                <a:latin typeface="+mn-lt"/>
-              </a:rPr>
-              <a:t>Galhardo</a:t>
-            </a:r>
-            <a:r>
-              <a:rPr lang="en-US" sz="2400" kern="0" dirty="0" smtClean="0">
-                <a:latin typeface="+mn-lt"/>
-              </a:rPr>
-              <a:t> </a:t>
-            </a:r>
-            <a:r>
-              <a:rPr lang="en-US" sz="2400" kern="0" dirty="0" smtClean="0">
-                <a:latin typeface="+mn-lt"/>
-              </a:rPr>
-              <a:t>et al. 2007, </a:t>
+              <a:t> et al. 2007, </a:t>
             </a:r>
             <a:r>
               <a:rPr lang="en-US" sz="2400" kern="0" dirty="0" err="1" smtClean="0">
@@ -5047,23 +5035,8 @@
                 </a:solidFill>
                 <a:latin typeface="+mn-lt"/>
               </a:rPr>
-              <a:t> with two deleterious mutations</a:t>
-            </a:r>
-            <a:r>
-              <a:rPr lang="en-GB" sz="2400" kern="0" dirty="0" smtClean="0">
-                <a:solidFill>
-                  <a:srgbClr val="000000"/>
-                </a:solidFill>
-                <a:latin typeface="+mn-lt"/>
-              </a:rPr>
-              <a:t>) – so there are no “living dead”. </a:t>
-            </a:r>
-            <a:endParaRPr lang="en-GB" sz="2400" kern="0" dirty="0" smtClean="0">
-              <a:solidFill>
-                <a:srgbClr val="000000"/>
-              </a:solidFill>
-              <a:latin typeface="+mn-lt"/>
-            </a:endParaRPr>
+              <a:t> with two deleterious mutations) – so there are no “living dead”. </a:t>
+            </a:r>
           </a:p>
           <a:p>
             <a:pPr marL="0" indent="205684" algn="just" defTabSz="908834" rtl="0" eaLnBrk="1" hangingPunct="1">
@@ -5666,13 +5639,22 @@
               <a:t>adaptability</a:t>
             </a:r>
             <a:r>
+              <a:rPr lang="en-US" sz="2400" kern="0" dirty="0">
+                <a:solidFill>
+                  <a:srgbClr val="000000"/>
+                </a:solidFill>
+                <a:latin typeface="+mn-lt"/>
+              </a:rPr>
+              <a:t> </a:t>
+            </a:r>
+            <a:r>
               <a:rPr lang="en-US" sz="2400" kern="0" dirty="0" smtClean="0">
                 <a:solidFill>
                   <a:srgbClr val="000000"/>
                 </a:solidFill>
                 <a:latin typeface="+mn-lt"/>
               </a:rPr>
-              <a:t>, </a:t>
+              <a:t>of a population </a:t>
             </a:r>
             <a:r>
               <a:rPr lang="en-US" sz="2400" kern="0" dirty="0">
@@ -5692,10 +5674,10 @@
                 </a:solidFill>
                 <a:latin typeface="+mn-lt"/>
               </a:rPr>
-              <a:t>it does not jeopardize the </a:t>
-            </a:r>
-            <a:r>
-              <a:rPr lang="en-US" sz="2400" b="1" i="1" kern="0" dirty="0" smtClean="0">
+              <a:t>it does not jeopardize </a:t>
+            </a:r>
+            <a:r>
+              <a:rPr lang="en-US" sz="2400" b="1" kern="0" dirty="0" smtClean="0">
                 <a:solidFill>
                   <a:schemeClr val="accent1">
                     <a:lumMod val="75000"/>
@@ -5703,10 +5685,10 @@
                 </a:solidFill>
                 <a:latin typeface="+mn-lt"/>
               </a:rPr>
-              <a:t>adaptedness</a:t>
-            </a:r>
-            <a:r>
-              <a:rPr lang="en-US" sz="2400" b="1" kern="0" dirty="0" smtClean="0">
+              <a:t>its </a:t>
+            </a:r>
+            <a:r>
+              <a:rPr lang="en-US" sz="2400" b="1" i="1" kern="0" dirty="0" smtClean="0">
                 <a:solidFill>
                   <a:schemeClr val="accent1">
                     <a:lumMod val="75000"/>
@@ -5714,29 +5696,7 @@
                 </a:solidFill>
                 <a:latin typeface="+mn-lt"/>
               </a:rPr>
-              <a:t> </a:t>
-            </a:r>
-            <a:r>
-              <a:rPr lang="en-US" sz="2400" b="1" kern="0" dirty="0">
-                <a:solidFill>
-                  <a:schemeClr val="accent1">
-                    <a:lumMod val="75000"/>
-                  </a:schemeClr>
-                </a:solidFill>
-                <a:latin typeface="+mn-lt"/>
-              </a:rPr>
-              <a:t>of </a:t>
-            </a:r>
-            <a:r>
-              <a:rPr lang="en-US" sz="2400" b="1" kern="0" dirty="0" smtClean="0">
-                <a:solidFill>
-                  <a:schemeClr val="accent1">
-                    <a:lumMod val="75000"/>
-                  </a:schemeClr>
-                </a:solidFill>
-                <a:latin typeface="+mn-lt"/>
-              </a:rPr>
-              <a:t>populations</a:t>
+              <a:t>adaptedness</a:t>
             </a:r>
             <a:r>
               <a:rPr lang="en-US" sz="2400" kern="0" dirty="0" smtClean="0">
@@ -6112,13 +6072,7 @@
               <a:rPr lang="en-US" sz="2100" dirty="0" smtClean="0">
                 <a:latin typeface="+mn-lt"/>
               </a:rPr>
-              <a:t> </a:t>
-            </a:r>
-            <a:r>
-              <a:rPr lang="en-US" sz="2100" dirty="0" smtClean="0">
-                <a:latin typeface="+mn-lt"/>
-              </a:rPr>
-              <a:t>RS, et al. </a:t>
+              <a:t> RS, et al. </a:t>
             </a:r>
             <a:r>
               <a:rPr lang="en-US" sz="2100" i="1" dirty="0" err="1" smtClean="0">
@@ -6489,8 +6443,8 @@
           </a:p>
         </p:txBody>
       </p:sp>
-      <mc:AlternateContent xmlns:mc="http://schemas.openxmlformats.org/markup-compatibility/2006">
-        <mc:Choice xmlns:a14="http://schemas.microsoft.com/office/drawing/2010/main" Requires="a14">
+      <mc:AlternateContent xmlns:mc="http://schemas.openxmlformats.org/markup-compatibility/2006" xmlns:a14="http://schemas.microsoft.com/office/drawing/2010/main">
+        <mc:Choice Requires="a14">
           <p:sp>
             <p:nvSpPr>
               <p:cNvPr id="14" name="Text Box 13"/>
@@ -7458,16 +7412,7 @@
                     </a:solidFill>
                     <a:latin typeface="+mn-lt"/>
                   </a:rPr>
-                  <a:t> on deleterious backgrounds in the </a:t>
-                </a:r>
-                <a:r>
-                  <a:rPr lang="en-US" sz="2400" kern="0" dirty="0" smtClean="0">
-                    <a:solidFill>
-                      <a:srgbClr val="000000"/>
-                    </a:solidFill>
-                    <a:latin typeface="+mn-lt"/>
-                  </a:rPr>
-                  <a:t>simulations (“rise of the living dead”).</a:t>
+                  <a:t> on deleterious backgrounds in the simulations (“rise of the living dead”).</a:t>
                 </a:r>
                 <a:endParaRPr lang="en-US" sz="2400" i="1" kern="0" dirty="0">
                   <a:solidFill>
@@ -7523,7 +7468,7 @@
             </p:txBody>
           </p:sp>
         </mc:Choice>
-        <mc:Fallback>
+        <mc:Fallback xmlns="">
           <p:sp>
             <p:nvSpPr>
               <p:cNvPr id="14" name="Text Box 13"/>
@@ -8143,16 +8088,7 @@
                 </a:solidFill>
                 <a:latin typeface="Calibri"/>
               </a:rPr>
-              <a:t>the </a:t>
-            </a:r>
-            <a:r>
-              <a:rPr lang="en-US" sz="2400" kern="0" dirty="0" smtClean="0">
-                <a:solidFill>
-                  <a:srgbClr val="000000"/>
-                </a:solidFill>
-                <a:latin typeface="Calibri"/>
-              </a:rPr>
-              <a:t>accumulation </a:t>
+              <a:t>the accumulation </a:t>
             </a:r>
             <a:r>
               <a:rPr lang="en-US" sz="2400" kern="0" dirty="0">
@@ -8218,17 +8154,7 @@
                 <a:latin typeface="Calibri"/>
                 <a:ea typeface="+mn-ea"/>
               </a:rPr>
-              <a:t>fitness </a:t>
-            </a:r>
-            <a:r>
-              <a:rPr lang="en-US" sz="2400" kern="0" dirty="0" smtClean="0">
-                <a:solidFill>
-                  <a:srgbClr val="000000"/>
-                </a:solidFill>
-                <a:latin typeface="Calibri"/>
-                <a:ea typeface="+mn-ea"/>
-              </a:rPr>
-              <a:t>(Ram &amp; Hadany 2012).</a:t>
+              <a:t>fitness (Ram &amp; Hadany 2012).</a:t>
             </a:r>
             <a:endParaRPr lang="en-US" sz="2400" kern="0" dirty="0">
               <a:solidFill>
@@ -8345,27 +8271,27 @@
                 <a:latin typeface="Calibri"/>
                 <a:ea typeface="+mn-ea"/>
               </a:rPr>
-              <a:t> </a:t>
-            </a:r>
-            <a:r>
-              <a:rPr lang="en-US" sz="2400" kern="0" dirty="0" smtClean="0">
+              <a:t> increase the </a:t>
+            </a:r>
+            <a:r>
+              <a:rPr lang="en-US" sz="2400" b="1" i="1" kern="0" dirty="0" smtClean="0">
                 <a:solidFill>
                   <a:srgbClr val="000000"/>
                 </a:solidFill>
                 <a:latin typeface="Calibri"/>
                 <a:ea typeface="+mn-ea"/>
               </a:rPr>
-              <a:t>increase the </a:t>
-            </a:r>
-            <a:r>
-              <a:rPr lang="en-US" sz="2400" b="1" i="1" kern="0" dirty="0" smtClean="0">
+              <a:t>adaptability</a:t>
+            </a:r>
+            <a:r>
+              <a:rPr lang="en-US" sz="2400" kern="0" dirty="0" smtClean="0">
                 <a:solidFill>
                   <a:srgbClr val="000000"/>
                 </a:solidFill>
                 <a:latin typeface="Calibri"/>
                 <a:ea typeface="+mn-ea"/>
               </a:rPr>
-              <a:t>adaptability</a:t>
+              <a:t> of populations, </a:t>
             </a:r>
             <a:r>
               <a:rPr lang="en-US" sz="2400" kern="0" dirty="0" smtClean="0">
@@ -8375,16 +8301,7 @@
                 <a:latin typeface="Calibri"/>
                 <a:ea typeface="+mn-ea"/>
               </a:rPr>
-              <a:t>, represented by the adaptation rate. </a:t>
-            </a:r>
-            <a:r>
-              <a:rPr lang="en-US" sz="2400" kern="0" dirty="0">
-                <a:solidFill>
-                  <a:schemeClr val="accent1"/>
-                </a:solidFill>
-                <a:latin typeface="+mn-lt"/>
-              </a:rPr>
-              <a:t>SIM</a:t>
+              <a:t>represented by </a:t>
             </a:r>
             <a:r>
               <a:rPr lang="en-US" sz="2400" kern="0" dirty="0" smtClean="0">
@@ -8394,16 +8311,7 @@
                 <a:latin typeface="Calibri"/>
                 <a:ea typeface="+mn-ea"/>
               </a:rPr>
-              <a:t>, in contrast to </a:t>
-            </a:r>
-            <a:r>
-              <a:rPr lang="en-US" sz="2400" kern="0" dirty="0">
-                <a:solidFill>
-                  <a:schemeClr val="accent2"/>
-                </a:solidFill>
-                <a:latin typeface="+mn-lt"/>
-              </a:rPr>
-              <a:t>CM</a:t>
+              <a:t>their </a:t>
             </a:r>
             <a:r>
               <a:rPr lang="en-US" sz="2400" kern="0" dirty="0" smtClean="0">
@@ -8413,17 +8321,35 @@
                 <a:latin typeface="Calibri"/>
                 <a:ea typeface="+mn-ea"/>
               </a:rPr>
-              <a:t>, doesn’t reduce the </a:t>
-            </a:r>
-            <a:r>
-              <a:rPr lang="en-US" sz="2400" b="1" i="1" kern="0" dirty="0" smtClean="0">
+              <a:t>adaptation rate. </a:t>
+            </a:r>
+            <a:r>
+              <a:rPr lang="en-US" sz="2400" kern="0" dirty="0">
+                <a:solidFill>
+                  <a:schemeClr val="accent1"/>
+                </a:solidFill>
+                <a:latin typeface="+mn-lt"/>
+              </a:rPr>
+              <a:t>SIM</a:t>
+            </a:r>
+            <a:r>
+              <a:rPr lang="en-US" sz="2400" kern="0" dirty="0" smtClean="0">
                 <a:solidFill>
                   <a:srgbClr val="000000"/>
                 </a:solidFill>
                 <a:latin typeface="Calibri"/>
                 <a:ea typeface="+mn-ea"/>
               </a:rPr>
-              <a:t>adaptedness</a:t>
+              <a:t>, in contrast to </a:t>
+            </a:r>
+            <a:r>
+              <a:rPr lang="en-US" sz="2400" kern="0" dirty="0">
+                <a:solidFill>
+                  <a:schemeClr val="accent2"/>
+                </a:solidFill>
+                <a:latin typeface="+mn-lt"/>
+              </a:rPr>
+              <a:t>CM</a:t>
             </a:r>
             <a:r>
               <a:rPr lang="en-US" sz="2400" kern="0" dirty="0" smtClean="0">
@@ -8433,7 +8359,67 @@
                 <a:latin typeface="Calibri"/>
                 <a:ea typeface="+mn-ea"/>
               </a:rPr>
-              <a:t>, represented by the mean fitness in stable environments. </a:t>
+              <a:t>, doesn’t </a:t>
+            </a:r>
+            <a:r>
+              <a:rPr lang="en-US" sz="2400" kern="0" dirty="0" smtClean="0">
+                <a:solidFill>
+                  <a:srgbClr val="000000"/>
+                </a:solidFill>
+                <a:latin typeface="Calibri"/>
+                <a:ea typeface="+mn-ea"/>
+              </a:rPr>
+              <a:t>reduce </a:t>
+            </a:r>
+            <a:r>
+              <a:rPr lang="en-US" sz="2400" kern="0" dirty="0" smtClean="0">
+                <a:solidFill>
+                  <a:srgbClr val="000000"/>
+                </a:solidFill>
+                <a:latin typeface="Calibri"/>
+                <a:ea typeface="+mn-ea"/>
+              </a:rPr>
+              <a:t>the </a:t>
+            </a:r>
+            <a:r>
+              <a:rPr lang="en-US" sz="2400" b="1" i="1" kern="0" dirty="0" smtClean="0">
+                <a:solidFill>
+                  <a:srgbClr val="000000"/>
+                </a:solidFill>
+                <a:latin typeface="Calibri"/>
+                <a:ea typeface="+mn-ea"/>
+              </a:rPr>
+              <a:t>adaptedness</a:t>
+            </a:r>
+            <a:r>
+              <a:rPr lang="en-US" sz="2400" kern="0" dirty="0">
+                <a:solidFill>
+                  <a:srgbClr val="000000"/>
+                </a:solidFill>
+                <a:latin typeface="Calibri"/>
+                <a:ea typeface="+mn-ea"/>
+              </a:rPr>
+              <a:t> </a:t>
+            </a:r>
+            <a:r>
+              <a:rPr lang="en-US" sz="2400" kern="0" dirty="0" smtClean="0">
+                <a:solidFill>
+                  <a:srgbClr val="000000"/>
+                </a:solidFill>
+                <a:latin typeface="Calibri"/>
+                <a:ea typeface="+mn-ea"/>
+              </a:rPr>
+              <a:t>of populations, represented </a:t>
+            </a:r>
+            <a:r>
+              <a:rPr lang="en-US" sz="2400" kern="0" dirty="0" smtClean="0">
+                <a:solidFill>
+                  <a:srgbClr val="000000"/>
+                </a:solidFill>
+                <a:latin typeface="Calibri"/>
+                <a:ea typeface="+mn-ea"/>
+              </a:rPr>
+              <a:t>by the mean fitness in stable environments. </a:t>
             </a:r>
           </a:p>
           <a:p>
@@ -10592,10 +10578,6 @@
                         </a:rPr>
                         <a:t>7,8</a:t>
                       </a:r>
-                      <a:endParaRPr lang="en-US" sz="2300" dirty="0" smtClean="0">
-                        <a:latin typeface="+mn-lt"/>
-                        <a:cs typeface="Helvetica" pitchFamily="34" charset="0"/>
-                      </a:endParaRPr>
                     </a:p>
                   </a:txBody>
                   <a:tcPr marL="75589" marR="75589" marT="37794" marB="37794"/>
@@ -11026,7 +11008,7 @@
         </p:blipFill>
         <p:spPr bwMode="auto">
           <a:xfrm>
-            <a:off x="11160000" y="18706663"/>
+            <a:off x="11160000" y="18778671"/>
             <a:ext cx="7920000" cy="6599236"/>
           </a:xfrm>
           <a:prstGeom prst="rect">
@@ -11052,7 +11034,7 @@
         </p:nvSpPr>
         <p:spPr>
           <a:xfrm>
-            <a:off x="17588259" y="18618597"/>
+            <a:off x="17588259" y="18690605"/>
             <a:ext cx="1519159" cy="830989"/>
           </a:xfrm>
           <a:prstGeom prst="rect">
@@ -11098,7 +11080,7 @@
         </p:blipFill>
         <p:spPr bwMode="auto">
           <a:xfrm>
-            <a:off x="20340000" y="18706663"/>
+            <a:off x="20340000" y="18778671"/>
             <a:ext cx="7920000" cy="6599235"/>
           </a:xfrm>
           <a:prstGeom prst="rect">
@@ -11124,7 +11106,7 @@
         </p:nvSpPr>
         <p:spPr>
           <a:xfrm>
-            <a:off x="26798292" y="18690605"/>
+            <a:off x="26798292" y="18762613"/>
             <a:ext cx="1519159" cy="830989"/>
           </a:xfrm>
           <a:prstGeom prst="rect">
@@ -11259,42 +11241,6 @@
           </a:extLst>
         </p:spPr>
       </p:pic>
-      <p:sp>
-        <p:nvSpPr>
-          <p:cNvPr id="26" name="TextBox 25"/>
-          <p:cNvSpPr txBox="1"/>
-          <p:nvPr/>
-        </p:nvSpPr>
-        <p:spPr>
-          <a:xfrm>
-            <a:off x="22700827" y="25221847"/>
-            <a:ext cx="3816424" cy="430887"/>
-          </a:xfrm>
-          <a:prstGeom prst="rect">
-            <a:avLst/>
-          </a:prstGeom>
-          <a:noFill/>
-        </p:spPr>
-        <p:txBody>
-          <a:bodyPr wrap="square" rtlCol="1">
-            <a:spAutoFit/>
-          </a:bodyPr>
-          <a:lstStyle/>
-          <a:p>
-            <a:pPr algn="ctr" rtl="0"/>
-            <a:endParaRPr lang="he-IL" sz="2200" dirty="0">
-              <a:solidFill>
-                <a:schemeClr val="tx1">
-                  <a:lumMod val="65000"/>
-                  <a:lumOff val="35000"/>
-                </a:schemeClr>
-              </a:solidFill>
-              <a:latin typeface="Droid Sans" panose="020B0606030804020204" pitchFamily="34" charset="0"/>
-              <a:ea typeface="Droid Sans" panose="020B0606030804020204" pitchFamily="34" charset="0"/>
-            </a:endParaRPr>
-          </a:p>
-        </p:txBody>
-      </p:sp>
       <p:cxnSp>
         <p:nvCxnSpPr>
           <p:cNvPr id="25" name="Straight Connector 24"/>
@@ -12357,7 +12303,7 @@
         </p:nvSpPr>
         <p:spPr>
           <a:xfrm>
-            <a:off x="22628820" y="25004662"/>
+            <a:off x="22628820" y="25076670"/>
             <a:ext cx="4176464" cy="278590"/>
           </a:xfrm>
           <a:prstGeom prst="rect">
@@ -12387,91 +12333,6 @@
           <a:p>
             <a:pPr algn="ctr"/>
             <a:endParaRPr lang="he-IL"/>
-          </a:p>
-        </p:txBody>
-      </p:sp>
-      <p:sp>
-        <p:nvSpPr>
-          <p:cNvPr id="145" name="TextBox 144"/>
-          <p:cNvSpPr txBox="1"/>
-          <p:nvPr/>
-        </p:nvSpPr>
-        <p:spPr>
-          <a:xfrm>
-            <a:off x="20324563" y="24955301"/>
-            <a:ext cx="7920880" cy="769441"/>
-          </a:xfrm>
-          <a:prstGeom prst="rect">
-            <a:avLst/>
-          </a:prstGeom>
-          <a:noFill/>
-        </p:spPr>
-        <p:txBody>
-          <a:bodyPr wrap="square" rtlCol="1">
-            <a:spAutoFit/>
-          </a:bodyPr>
-          <a:lstStyle/>
-          <a:p>
-            <a:pPr algn="ctr" rtl="0"/>
-            <a:r>
-              <a:rPr lang="en-US" sz="2200" i="1" dirty="0" smtClean="0">
-                <a:solidFill>
-                  <a:schemeClr val="tx1">
-                    <a:lumMod val="65000"/>
-                    <a:lumOff val="35000"/>
-                  </a:schemeClr>
-                </a:solidFill>
-                <a:latin typeface="Droid Sans" panose="020B0606030804020204" pitchFamily="34" charset="0"/>
-                <a:ea typeface="Droid Sans" panose="020B0606030804020204" pitchFamily="34" charset="0"/>
-                <a:cs typeface="Droid Sans" panose="020B0606030804020204" pitchFamily="34" charset="0"/>
-              </a:rPr>
-              <a:t>Adaptedness</a:t>
-            </a:r>
-            <a:r>
-              <a:rPr lang="en-US" sz="2200" dirty="0" smtClean="0">
-                <a:solidFill>
-                  <a:schemeClr val="tx1">
-                    <a:lumMod val="65000"/>
-                    <a:lumOff val="35000"/>
-                  </a:schemeClr>
-                </a:solidFill>
-                <a:latin typeface="Droid Sans" panose="020B0606030804020204" pitchFamily="34" charset="0"/>
-                <a:ea typeface="Droid Sans" panose="020B0606030804020204" pitchFamily="34" charset="0"/>
-                <a:cs typeface="Droid Sans" panose="020B0606030804020204" pitchFamily="34" charset="0"/>
-              </a:rPr>
-              <a:t> - Mean fitness relative to NM</a:t>
-            </a:r>
-          </a:p>
-          <a:p>
-            <a:pPr algn="ctr" rtl="0"/>
-            <a:r>
-              <a:rPr lang="en-US" sz="2200" dirty="0">
-                <a:solidFill>
-                  <a:schemeClr val="tx1">
-                    <a:lumMod val="65000"/>
-                    <a:lumOff val="35000"/>
-                  </a:schemeClr>
-                </a:solidFill>
-                <a:latin typeface="Droid Sans" panose="020B0606030804020204" pitchFamily="34" charset="0"/>
-                <a:ea typeface="Droid Sans" panose="020B0606030804020204" pitchFamily="34" charset="0"/>
-                <a:cs typeface="Droid Sans" panose="020B0606030804020204" pitchFamily="34" charset="0"/>
-              </a:rPr>
-              <a:t>(NM: normal mutagenesis</a:t>
-            </a:r>
-            <a:r>
-              <a:rPr lang="en-US" sz="2200" dirty="0" smtClean="0">
-                <a:solidFill>
-                  <a:schemeClr val="tx1">
-                    <a:lumMod val="65000"/>
-                    <a:lumOff val="35000"/>
-                  </a:schemeClr>
-                </a:solidFill>
-                <a:latin typeface="Droid Sans" panose="020B0606030804020204" pitchFamily="34" charset="0"/>
-                <a:ea typeface="Droid Sans" panose="020B0606030804020204" pitchFamily="34" charset="0"/>
-                <a:cs typeface="Droid Sans" panose="020B0606030804020204" pitchFamily="34" charset="0"/>
-              </a:rPr>
-              <a:t>)</a:t>
-            </a:r>
           </a:p>
         </p:txBody>
       </p:sp>
@@ -12646,6 +12507,129 @@
               <a:rPr lang="en-US" sz="3600" dirty="0"/>
             </a:br>
             <a:endParaRPr lang="he-IL" sz="3600" dirty="0"/>
+          </a:p>
+        </p:txBody>
+      </p:sp>
+      <p:sp>
+        <p:nvSpPr>
+          <p:cNvPr id="26" name="TextBox 25"/>
+          <p:cNvSpPr txBox="1"/>
+          <p:nvPr/>
+        </p:nvSpPr>
+        <p:spPr>
+          <a:xfrm>
+            <a:off x="22700827" y="25148678"/>
+            <a:ext cx="3816424" cy="430887"/>
+          </a:xfrm>
+          <a:prstGeom prst="rect">
+            <a:avLst/>
+          </a:prstGeom>
+          <a:solidFill>
+            <a:schemeClr val="bg1"/>
+          </a:solidFill>
+        </p:spPr>
+        <p:txBody>
+          <a:bodyPr wrap="square" rtlCol="1">
+            <a:spAutoFit/>
+          </a:bodyPr>
+          <a:lstStyle/>
+          <a:p>
+            <a:pPr algn="ctr" rtl="0"/>
+            <a:endParaRPr lang="he-IL" sz="2200" dirty="0">
+              <a:solidFill>
+                <a:schemeClr val="tx1">
+                  <a:lumMod val="65000"/>
+                  <a:lumOff val="35000"/>
+                </a:schemeClr>
+              </a:solidFill>
+              <a:latin typeface="Droid Sans" panose="020B0606030804020204" pitchFamily="34" charset="0"/>
+              <a:ea typeface="Droid Sans" panose="020B0606030804020204" pitchFamily="34" charset="0"/>
+            </a:endParaRPr>
+          </a:p>
+        </p:txBody>
+      </p:sp>
+      <p:sp>
+        <p:nvSpPr>
+          <p:cNvPr id="145" name="TextBox 144"/>
+          <p:cNvSpPr txBox="1"/>
+          <p:nvPr/>
+        </p:nvSpPr>
+        <p:spPr>
+          <a:xfrm>
+            <a:off x="20252555" y="25004662"/>
+            <a:ext cx="7920880" cy="769441"/>
+          </a:xfrm>
+          <a:prstGeom prst="rect">
+            <a:avLst/>
+          </a:prstGeom>
+          <a:noFill/>
+        </p:spPr>
+        <p:txBody>
+          <a:bodyPr wrap="square" rtlCol="1">
+            <a:spAutoFit/>
+          </a:bodyPr>
+          <a:lstStyle/>
+          <a:p>
+            <a:pPr algn="ctr" rtl="0"/>
+            <a:r>
+              <a:rPr lang="en-US" sz="2200" i="1" dirty="0" smtClean="0">
+                <a:solidFill>
+                  <a:schemeClr val="tx1">
+                    <a:lumMod val="65000"/>
+                    <a:lumOff val="35000"/>
+                  </a:schemeClr>
+                </a:solidFill>
+                <a:latin typeface="Droid Sans" panose="020B0606030804020204" pitchFamily="34" charset="0"/>
+                <a:ea typeface="Droid Sans" panose="020B0606030804020204" pitchFamily="34" charset="0"/>
+                <a:cs typeface="Droid Sans" panose="020B0606030804020204" pitchFamily="34" charset="0"/>
+              </a:rPr>
+              <a:t>Adaptedness</a:t>
+            </a:r>
+            <a:r>
+              <a:rPr lang="en-US" sz="2200" dirty="0" smtClean="0">
+                <a:solidFill>
+                  <a:schemeClr val="tx1">
+                    <a:lumMod val="65000"/>
+                    <a:lumOff val="35000"/>
+                  </a:schemeClr>
+                </a:solidFill>
+                <a:latin typeface="Droid Sans" panose="020B0606030804020204" pitchFamily="34" charset="0"/>
+                <a:ea typeface="Droid Sans" panose="020B0606030804020204" pitchFamily="34" charset="0"/>
+                <a:cs typeface="Droid Sans" panose="020B0606030804020204" pitchFamily="34" charset="0"/>
+              </a:rPr>
+              <a:t> - Mean fitness relative to NM</a:t>
+            </a:r>
+          </a:p>
+          <a:p>
+            <a:pPr algn="ctr" rtl="0"/>
+            <a:r>
+              <a:rPr lang="en-US" sz="2200" dirty="0">
+                <a:solidFill>
+                  <a:schemeClr val="tx1">
+                    <a:lumMod val="65000"/>
+                    <a:lumOff val="35000"/>
+                  </a:schemeClr>
+                </a:solidFill>
+                <a:latin typeface="Droid Sans" panose="020B0606030804020204" pitchFamily="34" charset="0"/>
+                <a:ea typeface="Droid Sans" panose="020B0606030804020204" pitchFamily="34" charset="0"/>
+                <a:cs typeface="Droid Sans" panose="020B0606030804020204" pitchFamily="34" charset="0"/>
+              </a:rPr>
+              <a:t>(NM: normal mutagenesis</a:t>
+            </a:r>
+            <a:r>
+              <a:rPr lang="en-US" sz="2200" dirty="0" smtClean="0">
+                <a:solidFill>
+                  <a:schemeClr val="tx1">
+                    <a:lumMod val="65000"/>
+                    <a:lumOff val="35000"/>
+                  </a:schemeClr>
+                </a:solidFill>
+                <a:latin typeface="Droid Sans" panose="020B0606030804020204" pitchFamily="34" charset="0"/>
+                <a:ea typeface="Droid Sans" panose="020B0606030804020204" pitchFamily="34" charset="0"/>
+                <a:cs typeface="Droid Sans" panose="020B0606030804020204" pitchFamily="34" charset="0"/>
+              </a:rPr>
+              <a:t>)</a:t>
+            </a:r>
           </a:p>
         </p:txBody>
       </p:sp>

</xml_diff>